<commit_message>
Updated package diagrams in doc
</commit_message>
<xml_diff>
--- a/doc/diagrams/CommonComponent.pptx
+++ b/doc/diagrams/CommonComponent.pptx
@@ -289,7 +289,7 @@
             <a:fld id="{1D8BD707-D9CF-40AE-B4C6-C98DA3205C09}" type="datetimeFigureOut">
               <a:rPr lang="en-US" smtClean="0"/>
               <a:pPr/>
-              <a:t>7/8/2012</a:t>
+              <a:t>14/8/12</a:t>
             </a:fld>
             <a:endParaRPr lang="en-US"/>
           </a:p>
@@ -456,7 +456,7 @@
             <a:fld id="{1D8BD707-D9CF-40AE-B4C6-C98DA3205C09}" type="datetimeFigureOut">
               <a:rPr lang="en-US" smtClean="0"/>
               <a:pPr/>
-              <a:t>7/8/2012</a:t>
+              <a:t>14/8/12</a:t>
             </a:fld>
             <a:endParaRPr lang="en-US"/>
           </a:p>
@@ -633,7 +633,7 @@
             <a:fld id="{1D8BD707-D9CF-40AE-B4C6-C98DA3205C09}" type="datetimeFigureOut">
               <a:rPr lang="en-US" smtClean="0"/>
               <a:pPr/>
-              <a:t>7/8/2012</a:t>
+              <a:t>14/8/12</a:t>
             </a:fld>
             <a:endParaRPr lang="en-US"/>
           </a:p>
@@ -800,7 +800,7 @@
             <a:fld id="{1D8BD707-D9CF-40AE-B4C6-C98DA3205C09}" type="datetimeFigureOut">
               <a:rPr lang="en-US" smtClean="0"/>
               <a:pPr/>
-              <a:t>7/8/2012</a:t>
+              <a:t>14/8/12</a:t>
             </a:fld>
             <a:endParaRPr lang="en-US"/>
           </a:p>
@@ -1043,7 +1043,7 @@
             <a:fld id="{1D8BD707-D9CF-40AE-B4C6-C98DA3205C09}" type="datetimeFigureOut">
               <a:rPr lang="en-US" smtClean="0"/>
               <a:pPr/>
-              <a:t>7/8/2012</a:t>
+              <a:t>14/8/12</a:t>
             </a:fld>
             <a:endParaRPr lang="en-US"/>
           </a:p>
@@ -1328,7 +1328,7 @@
             <a:fld id="{1D8BD707-D9CF-40AE-B4C6-C98DA3205C09}" type="datetimeFigureOut">
               <a:rPr lang="en-US" smtClean="0"/>
               <a:pPr/>
-              <a:t>7/8/2012</a:t>
+              <a:t>14/8/12</a:t>
             </a:fld>
             <a:endParaRPr lang="en-US"/>
           </a:p>
@@ -1747,7 +1747,7 @@
             <a:fld id="{1D8BD707-D9CF-40AE-B4C6-C98DA3205C09}" type="datetimeFigureOut">
               <a:rPr lang="en-US" smtClean="0"/>
               <a:pPr/>
-              <a:t>7/8/2012</a:t>
+              <a:t>14/8/12</a:t>
             </a:fld>
             <a:endParaRPr lang="en-US"/>
           </a:p>
@@ -1862,7 +1862,7 @@
             <a:fld id="{1D8BD707-D9CF-40AE-B4C6-C98DA3205C09}" type="datetimeFigureOut">
               <a:rPr lang="en-US" smtClean="0"/>
               <a:pPr/>
-              <a:t>7/8/2012</a:t>
+              <a:t>14/8/12</a:t>
             </a:fld>
             <a:endParaRPr lang="en-US"/>
           </a:p>
@@ -1954,7 +1954,7 @@
             <a:fld id="{1D8BD707-D9CF-40AE-B4C6-C98DA3205C09}" type="datetimeFigureOut">
               <a:rPr lang="en-US" smtClean="0"/>
               <a:pPr/>
-              <a:t>7/8/2012</a:t>
+              <a:t>14/8/12</a:t>
             </a:fld>
             <a:endParaRPr lang="en-US"/>
           </a:p>
@@ -2228,7 +2228,7 @@
             <a:fld id="{1D8BD707-D9CF-40AE-B4C6-C98DA3205C09}" type="datetimeFigureOut">
               <a:rPr lang="en-US" smtClean="0"/>
               <a:pPr/>
-              <a:t>7/8/2012</a:t>
+              <a:t>14/8/12</a:t>
             </a:fld>
             <a:endParaRPr lang="en-US"/>
           </a:p>
@@ -2478,7 +2478,7 @@
             <a:fld id="{1D8BD707-D9CF-40AE-B4C6-C98DA3205C09}" type="datetimeFigureOut">
               <a:rPr lang="en-US" smtClean="0"/>
               <a:pPr/>
-              <a:t>7/8/2012</a:t>
+              <a:t>14/8/12</a:t>
             </a:fld>
             <a:endParaRPr lang="en-US"/>
           </a:p>
@@ -2688,7 +2688,7 @@
             <a:fld id="{1D8BD707-D9CF-40AE-B4C6-C98DA3205C09}" type="datetimeFigureOut">
               <a:rPr lang="en-US" smtClean="0"/>
               <a:pPr/>
-              <a:t>7/8/2012</a:t>
+              <a:t>14/8/12</a:t>
             </a:fld>
             <a:endParaRPr lang="en-US"/>
           </a:p>
@@ -3067,8 +3067,8 @@
         </p:nvSpPr>
         <p:spPr>
           <a:xfrm>
-            <a:off x="228600" y="274637"/>
-            <a:ext cx="8610600" cy="4572000"/>
+            <a:off x="228600" y="122237"/>
+            <a:ext cx="8610600" cy="4724400"/>
           </a:xfrm>
           <a:prstGeom prst="roundRect">
             <a:avLst>
@@ -3374,8 +3374,8 @@
         </p:nvGrpSpPr>
         <p:grpSpPr>
           <a:xfrm>
-            <a:off x="457200" y="655637"/>
-            <a:ext cx="1981200" cy="1295400"/>
+            <a:off x="457200" y="427037"/>
+            <a:ext cx="2057400" cy="1676400"/>
             <a:chOff x="-838200" y="1371600"/>
             <a:chExt cx="1981200" cy="1295400"/>
           </a:xfrm>
@@ -3572,17 +3572,7 @@
                     </a:schemeClr>
                   </a:solidFill>
                 </a:rPr>
-                <a:t>common::</a:t>
-              </a:r>
-              <a:r>
-                <a:rPr lang="en-US" sz="1400" b="1" dirty="0" smtClean="0">
-                  <a:solidFill>
-                    <a:schemeClr val="accent5">
-                      <a:lumMod val="75000"/>
-                    </a:schemeClr>
-                  </a:solidFill>
-                </a:rPr>
-                <a:t>exception</a:t>
+                <a:t>common::exception</a:t>
               </a:r>
               <a:endParaRPr lang="en-SG" sz="1400" b="1" dirty="0">
                 <a:solidFill>
@@ -3657,8 +3647,8 @@
         </p:nvSpPr>
         <p:spPr>
           <a:xfrm>
-            <a:off x="762000" y="1265237"/>
-            <a:ext cx="1219200" cy="457200"/>
+            <a:off x="762000" y="960437"/>
+            <a:ext cx="1524000" cy="457200"/>
           </a:xfrm>
           <a:prstGeom prst="rect">
             <a:avLst/>
@@ -3779,11 +3769,7 @@
             </a:r>
             <a:r>
               <a:rPr lang="en-US" sz="1600" b="1" dirty="0" smtClean="0"/>
-              <a:t> </a:t>
-            </a:r>
-            <a:r>
-              <a:rPr lang="en-US" sz="1600" b="1" dirty="0" smtClean="0"/>
-              <a:t>etc.</a:t>
+              <a:t> etc.</a:t>
             </a:r>
             <a:endParaRPr lang="en-SG" sz="1600" b="1" dirty="0"/>
           </a:p>
@@ -3912,11 +3898,7 @@
             </a:r>
             <a:r>
               <a:rPr lang="en-US" sz="1600" b="1" dirty="0" smtClean="0"/>
-              <a:t> </a:t>
-            </a:r>
-            <a:r>
-              <a:rPr lang="en-US" sz="1600" b="1" dirty="0" smtClean="0"/>
-              <a:t>etc.</a:t>
+              <a:t> etc.</a:t>
             </a:r>
             <a:endParaRPr lang="en-SG" sz="1600" b="1" dirty="0"/>
           </a:p>
@@ -3964,11 +3946,7 @@
             </a:r>
             <a:r>
               <a:rPr lang="en-US" sz="1600" b="1" dirty="0" smtClean="0"/>
-              <a:t> </a:t>
-            </a:r>
-            <a:r>
-              <a:rPr lang="en-US" sz="1600" b="1" dirty="0" smtClean="0"/>
-              <a:t>etc.</a:t>
+              <a:t> etc.</a:t>
             </a:r>
             <a:endParaRPr lang="en-SG" sz="1600" b="1" dirty="0"/>
           </a:p>
@@ -4565,10 +4543,54 @@
           </a:p>
         </p:txBody>
       </p:sp>
+      <p:sp>
+        <p:nvSpPr>
+          <p:cNvPr id="35" name="Rectangle 34"/>
+          <p:cNvSpPr/>
+          <p:nvPr/>
+        </p:nvSpPr>
+        <p:spPr>
+          <a:xfrm>
+            <a:off x="762000" y="1570037"/>
+            <a:ext cx="1524000" cy="457200"/>
+          </a:xfrm>
+          <a:prstGeom prst="rect">
+            <a:avLst/>
+          </a:prstGeom>
+        </p:spPr>
+        <p:style>
+          <a:lnRef idx="2">
+            <a:schemeClr val="accent3">
+              <a:shade val="50000"/>
+            </a:schemeClr>
+          </a:lnRef>
+          <a:fillRef idx="1">
+            <a:schemeClr val="accent3"/>
+          </a:fillRef>
+          <a:effectRef idx="0">
+            <a:schemeClr val="accent3"/>
+          </a:effectRef>
+          <a:fontRef idx="minor">
+            <a:schemeClr val="lt1"/>
+          </a:fontRef>
+        </p:style>
+        <p:txBody>
+          <a:bodyPr rtlCol="0" anchor="ctr"/>
+          <a:lstStyle/>
+          <a:p>
+            <a:pPr algn="ctr"/>
+            <a:r>
+              <a:rPr lang="en-US" sz="1600" b="1" dirty="0" err="1" smtClean="0"/>
+              <a:t>BuildProperties</a:t>
+            </a:r>
+            <a:endParaRPr lang="en-SG" sz="1600" b="1" dirty="0"/>
+          </a:p>
+        </p:txBody>
+      </p:sp>
     </p:spTree>
     <p:extLst>
       <p:ext uri="{BB962C8B-B14F-4D97-AF65-F5344CB8AC3E}">
-        <p14:creationId xmlns="" xmlns:p14="http://schemas.microsoft.com/office/powerpoint/2010/main" val="2312643091"/>
+        <p14:creationId xmlns:p14="http://schemas.microsoft.com/office/powerpoint/2010/main" val="2312643091"/>
       </p:ext>
     </p:extLst>
   </p:cSld>
@@ -4578,7 +4600,7 @@
   <p:timing>
     <p:tnLst>
       <p:par>
-        <p:cTn id="1" dur="indefinite" restart="never" nodeType="tmRoot"/>
+        <p:cTn xmlns:p14="http://schemas.microsoft.com/office/powerpoint/2010/main" id="1" dur="indefinite" restart="never" nodeType="tmRoot"/>
       </p:par>
     </p:tnLst>
   </p:timing>

</xml_diff>

<commit_message>
merged with default Fails test StudentHomePageUiTest::testStudentHomeCoursePageHTML() Update Issue 233
</commit_message>
<xml_diff>
--- a/doc/diagrams/CommonComponent.pptx
+++ b/doc/diagrams/CommonComponent.pptx
@@ -289,7 +289,7 @@
             <a:fld id="{1D8BD707-D9CF-40AE-B4C6-C98DA3205C09}" type="datetimeFigureOut">
               <a:rPr lang="en-US" smtClean="0"/>
               <a:pPr/>
-              <a:t>14/8/12</a:t>
+              <a:t>27/10/12</a:t>
             </a:fld>
             <a:endParaRPr lang="en-US"/>
           </a:p>
@@ -456,7 +456,7 @@
             <a:fld id="{1D8BD707-D9CF-40AE-B4C6-C98DA3205C09}" type="datetimeFigureOut">
               <a:rPr lang="en-US" smtClean="0"/>
               <a:pPr/>
-              <a:t>14/8/12</a:t>
+              <a:t>27/10/12</a:t>
             </a:fld>
             <a:endParaRPr lang="en-US"/>
           </a:p>
@@ -633,7 +633,7 @@
             <a:fld id="{1D8BD707-D9CF-40AE-B4C6-C98DA3205C09}" type="datetimeFigureOut">
               <a:rPr lang="en-US" smtClean="0"/>
               <a:pPr/>
-              <a:t>14/8/12</a:t>
+              <a:t>27/10/12</a:t>
             </a:fld>
             <a:endParaRPr lang="en-US"/>
           </a:p>
@@ -800,7 +800,7 @@
             <a:fld id="{1D8BD707-D9CF-40AE-B4C6-C98DA3205C09}" type="datetimeFigureOut">
               <a:rPr lang="en-US" smtClean="0"/>
               <a:pPr/>
-              <a:t>14/8/12</a:t>
+              <a:t>27/10/12</a:t>
             </a:fld>
             <a:endParaRPr lang="en-US"/>
           </a:p>
@@ -1043,7 +1043,7 @@
             <a:fld id="{1D8BD707-D9CF-40AE-B4C6-C98DA3205C09}" type="datetimeFigureOut">
               <a:rPr lang="en-US" smtClean="0"/>
               <a:pPr/>
-              <a:t>14/8/12</a:t>
+              <a:t>27/10/12</a:t>
             </a:fld>
             <a:endParaRPr lang="en-US"/>
           </a:p>
@@ -1328,7 +1328,7 @@
             <a:fld id="{1D8BD707-D9CF-40AE-B4C6-C98DA3205C09}" type="datetimeFigureOut">
               <a:rPr lang="en-US" smtClean="0"/>
               <a:pPr/>
-              <a:t>14/8/12</a:t>
+              <a:t>27/10/12</a:t>
             </a:fld>
             <a:endParaRPr lang="en-US"/>
           </a:p>
@@ -1747,7 +1747,7 @@
             <a:fld id="{1D8BD707-D9CF-40AE-B4C6-C98DA3205C09}" type="datetimeFigureOut">
               <a:rPr lang="en-US" smtClean="0"/>
               <a:pPr/>
-              <a:t>14/8/12</a:t>
+              <a:t>27/10/12</a:t>
             </a:fld>
             <a:endParaRPr lang="en-US"/>
           </a:p>
@@ -1862,7 +1862,7 @@
             <a:fld id="{1D8BD707-D9CF-40AE-B4C6-C98DA3205C09}" type="datetimeFigureOut">
               <a:rPr lang="en-US" smtClean="0"/>
               <a:pPr/>
-              <a:t>14/8/12</a:t>
+              <a:t>27/10/12</a:t>
             </a:fld>
             <a:endParaRPr lang="en-US"/>
           </a:p>
@@ -1954,7 +1954,7 @@
             <a:fld id="{1D8BD707-D9CF-40AE-B4C6-C98DA3205C09}" type="datetimeFigureOut">
               <a:rPr lang="en-US" smtClean="0"/>
               <a:pPr/>
-              <a:t>14/8/12</a:t>
+              <a:t>27/10/12</a:t>
             </a:fld>
             <a:endParaRPr lang="en-US"/>
           </a:p>
@@ -2228,7 +2228,7 @@
             <a:fld id="{1D8BD707-D9CF-40AE-B4C6-C98DA3205C09}" type="datetimeFigureOut">
               <a:rPr lang="en-US" smtClean="0"/>
               <a:pPr/>
-              <a:t>14/8/12</a:t>
+              <a:t>27/10/12</a:t>
             </a:fld>
             <a:endParaRPr lang="en-US"/>
           </a:p>
@@ -2478,7 +2478,7 @@
             <a:fld id="{1D8BD707-D9CF-40AE-B4C6-C98DA3205C09}" type="datetimeFigureOut">
               <a:rPr lang="en-US" smtClean="0"/>
               <a:pPr/>
-              <a:t>14/8/12</a:t>
+              <a:t>27/10/12</a:t>
             </a:fld>
             <a:endParaRPr lang="en-US"/>
           </a:p>
@@ -2688,7 +2688,7 @@
             <a:fld id="{1D8BD707-D9CF-40AE-B4C6-C98DA3205C09}" type="datetimeFigureOut">
               <a:rPr lang="en-US" smtClean="0"/>
               <a:pPr/>
-              <a:t>14/8/12</a:t>
+              <a:t>27/10/12</a:t>
             </a:fld>
             <a:endParaRPr lang="en-US"/>
           </a:p>
@@ -3127,7 +3127,7 @@
         <p:grpSpPr>
           <a:xfrm>
             <a:off x="381000" y="2179637"/>
-            <a:ext cx="8305800" cy="2514601"/>
+            <a:ext cx="8305800" cy="2514600"/>
             <a:chOff x="-7162800" y="1371600"/>
             <a:chExt cx="8305800" cy="2357438"/>
           </a:xfrm>
@@ -3266,14 +3266,14 @@
       </p:grpSp>
       <p:sp>
         <p:nvSpPr>
-          <p:cNvPr id="156" name="Rounded Rectangle 155"/>
+          <p:cNvPr id="157" name="Rounded Rectangle 156"/>
           <p:cNvSpPr/>
           <p:nvPr/>
         </p:nvSpPr>
         <p:spPr>
           <a:xfrm>
-            <a:off x="4419600" y="3327587"/>
-            <a:ext cx="2819400" cy="762000"/>
+            <a:off x="2209800" y="2484437"/>
+            <a:ext cx="4953000" cy="2057400"/>
           </a:xfrm>
           <a:prstGeom prst="roundRect">
             <a:avLst>
@@ -3315,57 +3315,6 @@
           </a:p>
         </p:txBody>
       </p:sp>
-      <p:sp>
-        <p:nvSpPr>
-          <p:cNvPr id="157" name="Rounded Rectangle 156"/>
-          <p:cNvSpPr/>
-          <p:nvPr/>
-        </p:nvSpPr>
-        <p:spPr>
-          <a:xfrm>
-            <a:off x="2514600" y="2789237"/>
-            <a:ext cx="2133600" cy="1752600"/>
-          </a:xfrm>
-          <a:prstGeom prst="roundRect">
-            <a:avLst>
-              <a:gd name="adj" fmla="val 9891"/>
-            </a:avLst>
-          </a:prstGeom>
-          <a:solidFill>
-            <a:schemeClr val="accent6">
-              <a:lumMod val="40000"/>
-              <a:lumOff val="60000"/>
-            </a:schemeClr>
-          </a:solidFill>
-          <a:ln>
-            <a:noFill/>
-          </a:ln>
-        </p:spPr>
-        <p:style>
-          <a:lnRef idx="2">
-            <a:schemeClr val="accent1">
-              <a:shade val="50000"/>
-            </a:schemeClr>
-          </a:lnRef>
-          <a:fillRef idx="1">
-            <a:schemeClr val="accent1"/>
-          </a:fillRef>
-          <a:effectRef idx="0">
-            <a:schemeClr val="accent1"/>
-          </a:effectRef>
-          <a:fontRef idx="minor">
-            <a:schemeClr val="lt1"/>
-          </a:fontRef>
-        </p:style>
-        <p:txBody>
-          <a:bodyPr rtlCol="0" anchor="ctr"/>
-          <a:lstStyle/>
-          <a:p>
-            <a:pPr algn="ctr"/>
-            <a:endParaRPr lang="en-US"/>
-          </a:p>
-        </p:txBody>
-      </p:sp>
       <p:grpSp>
         <p:nvGrpSpPr>
           <p:cNvPr id="158" name="Group 157"/>
@@ -3375,7 +3324,7 @@
         <p:grpSpPr>
           <a:xfrm>
             <a:off x="457200" y="427037"/>
-            <a:ext cx="2057400" cy="1676400"/>
+            <a:ext cx="2209800" cy="1828800"/>
             <a:chOff x="-838200" y="1371600"/>
             <a:chExt cx="1981200" cy="1295400"/>
           </a:xfrm>
@@ -3647,8 +3596,8 @@
         </p:nvSpPr>
         <p:spPr>
           <a:xfrm>
-            <a:off x="762000" y="960437"/>
-            <a:ext cx="1524000" cy="457200"/>
+            <a:off x="990600" y="960437"/>
+            <a:ext cx="1143000" cy="304800"/>
           </a:xfrm>
           <a:prstGeom prst="rect">
             <a:avLst/>
@@ -3960,7 +3909,7 @@
         </p:nvSpPr>
         <p:spPr>
           <a:xfrm>
-            <a:off x="5963941" y="2558609"/>
+            <a:off x="7349918" y="4103867"/>
             <a:ext cx="1184482" cy="361770"/>
           </a:xfrm>
           <a:prstGeom prst="rect">
@@ -3990,7 +3939,7 @@
             <a:pPr algn="ctr"/>
             <a:r>
               <a:rPr lang="en-US" sz="1600" b="1" dirty="0" err="1" smtClean="0"/>
-              <a:t>UserData</a:t>
+              <a:t>UserType</a:t>
             </a:r>
             <a:endParaRPr lang="en-SG" sz="1600" b="1" dirty="0"/>
           </a:p>
@@ -3998,14 +3947,14 @@
       </p:sp>
       <p:sp>
         <p:nvSpPr>
-          <p:cNvPr id="172" name="Rectangle 171"/>
+          <p:cNvPr id="173" name="Rectangle 172"/>
           <p:cNvSpPr/>
           <p:nvPr/>
         </p:nvSpPr>
         <p:spPr>
           <a:xfrm>
-            <a:off x="4495800" y="3527487"/>
-            <a:ext cx="1304746" cy="361770"/>
+            <a:off x="5881777" y="4027667"/>
+            <a:ext cx="1204823" cy="361770"/>
           </a:xfrm>
           <a:prstGeom prst="rect">
             <a:avLst/>
@@ -4034,7 +3983,7 @@
             <a:pPr algn="ctr"/>
             <a:r>
               <a:rPr lang="en-US" sz="1600" b="1" dirty="0" err="1" smtClean="0"/>
-              <a:t>StudentData</a:t>
+              <a:t>CoordData</a:t>
             </a:r>
             <a:endParaRPr lang="en-SG" sz="1600" b="1" dirty="0"/>
           </a:p>
@@ -4042,14 +3991,14 @@
       </p:sp>
       <p:sp>
         <p:nvSpPr>
-          <p:cNvPr id="173" name="Rectangle 172"/>
+          <p:cNvPr id="174" name="Rectangle 173"/>
           <p:cNvSpPr/>
           <p:nvPr/>
         </p:nvSpPr>
         <p:spPr>
           <a:xfrm>
-            <a:off x="5933806" y="3530102"/>
-            <a:ext cx="1204823" cy="361770"/>
+            <a:off x="4124593" y="4008437"/>
+            <a:ext cx="1590407" cy="361770"/>
           </a:xfrm>
           <a:prstGeom prst="rect">
             <a:avLst/>
@@ -4078,7 +4027,7 @@
             <a:pPr algn="ctr"/>
             <a:r>
               <a:rPr lang="en-US" sz="1600" b="1" dirty="0" err="1" smtClean="0"/>
-              <a:t>CoordData</a:t>
+              <a:t>EvaluationData</a:t>
             </a:r>
             <a:endParaRPr lang="en-SG" sz="1600" b="1" dirty="0"/>
           </a:p>
@@ -4086,14 +4035,234 @@
       </p:sp>
       <p:sp>
         <p:nvSpPr>
-          <p:cNvPr id="174" name="Rectangle 173"/>
+          <p:cNvPr id="182" name="Rectangle 181"/>
           <p:cNvSpPr/>
           <p:nvPr/>
         </p:nvSpPr>
         <p:spPr>
           <a:xfrm>
-            <a:off x="2792675" y="3526747"/>
-            <a:ext cx="1590407" cy="361770"/>
+            <a:off x="569025" y="3053892"/>
+            <a:ext cx="1524000" cy="361770"/>
+          </a:xfrm>
+          <a:prstGeom prst="rect">
+            <a:avLst/>
+          </a:prstGeom>
+        </p:spPr>
+        <p:style>
+          <a:lnRef idx="2">
+            <a:schemeClr val="accent5">
+              <a:shade val="50000"/>
+            </a:schemeClr>
+          </a:lnRef>
+          <a:fillRef idx="1">
+            <a:schemeClr val="accent5"/>
+          </a:fillRef>
+          <a:effectRef idx="0">
+            <a:schemeClr val="accent5"/>
+          </a:effectRef>
+          <a:fontRef idx="minor">
+            <a:schemeClr val="lt1"/>
+          </a:fontRef>
+        </p:style>
+        <p:txBody>
+          <a:bodyPr rtlCol="0" anchor="ctr"/>
+          <a:lstStyle/>
+          <a:p>
+            <a:pPr algn="ctr"/>
+            <a:r>
+              <a:rPr lang="en-US" sz="1600" b="1" dirty="0" err="1" smtClean="0"/>
+              <a:t>TeamData</a:t>
+            </a:r>
+            <a:endParaRPr lang="en-SG" sz="1600" b="1" dirty="0"/>
+          </a:p>
+        </p:txBody>
+      </p:sp>
+      <p:sp>
+        <p:nvSpPr>
+          <p:cNvPr id="183" name="Rectangle 182"/>
+          <p:cNvSpPr/>
+          <p:nvPr/>
+        </p:nvSpPr>
+        <p:spPr>
+          <a:xfrm>
+            <a:off x="569025" y="3549192"/>
+            <a:ext cx="1524000" cy="361770"/>
+          </a:xfrm>
+          <a:prstGeom prst="rect">
+            <a:avLst/>
+          </a:prstGeom>
+        </p:spPr>
+        <p:style>
+          <a:lnRef idx="2">
+            <a:schemeClr val="accent5">
+              <a:shade val="50000"/>
+            </a:schemeClr>
+          </a:lnRef>
+          <a:fillRef idx="1">
+            <a:schemeClr val="accent5"/>
+          </a:fillRef>
+          <a:effectRef idx="0">
+            <a:schemeClr val="accent5"/>
+          </a:effectRef>
+          <a:fontRef idx="minor">
+            <a:schemeClr val="lt1"/>
+          </a:fontRef>
+        </p:style>
+        <p:txBody>
+          <a:bodyPr rtlCol="0" anchor="ctr"/>
+          <a:lstStyle/>
+          <a:p>
+            <a:pPr algn="ctr"/>
+            <a:r>
+              <a:rPr lang="en-US" sz="1600" b="1" dirty="0" err="1" smtClean="0"/>
+              <a:t>EvalResultData</a:t>
+            </a:r>
+            <a:endParaRPr lang="en-SG" sz="1600" b="1" dirty="0"/>
+          </a:p>
+        </p:txBody>
+      </p:sp>
+      <p:sp>
+        <p:nvSpPr>
+          <p:cNvPr id="184" name="Rectangle 183"/>
+          <p:cNvSpPr/>
+          <p:nvPr/>
+        </p:nvSpPr>
+        <p:spPr>
+          <a:xfrm>
+            <a:off x="569025" y="4044492"/>
+            <a:ext cx="1524000" cy="361770"/>
+          </a:xfrm>
+          <a:prstGeom prst="rect">
+            <a:avLst/>
+          </a:prstGeom>
+        </p:spPr>
+        <p:style>
+          <a:lnRef idx="2">
+            <a:schemeClr val="accent5">
+              <a:shade val="50000"/>
+            </a:schemeClr>
+          </a:lnRef>
+          <a:fillRef idx="1">
+            <a:schemeClr val="accent5"/>
+          </a:fillRef>
+          <a:effectRef idx="0">
+            <a:schemeClr val="accent5"/>
+          </a:effectRef>
+          <a:fontRef idx="minor">
+            <a:schemeClr val="lt1"/>
+          </a:fontRef>
+        </p:style>
+        <p:txBody>
+          <a:bodyPr rtlCol="0" anchor="ctr"/>
+          <a:lstStyle/>
+          <a:p>
+            <a:pPr algn="ctr"/>
+            <a:r>
+              <a:rPr lang="en-US" sz="1600" b="1" dirty="0" err="1" smtClean="0"/>
+              <a:t>DataBundle</a:t>
+            </a:r>
+            <a:endParaRPr lang="en-SG" sz="1600" b="1" dirty="0"/>
+          </a:p>
+        </p:txBody>
+      </p:sp>
+      <p:sp>
+        <p:nvSpPr>
+          <p:cNvPr id="35" name="Rectangle 34"/>
+          <p:cNvSpPr/>
+          <p:nvPr/>
+        </p:nvSpPr>
+        <p:spPr>
+          <a:xfrm>
+            <a:off x="762000" y="1341437"/>
+            <a:ext cx="1600200" cy="304800"/>
+          </a:xfrm>
+          <a:prstGeom prst="rect">
+            <a:avLst/>
+          </a:prstGeom>
+        </p:spPr>
+        <p:style>
+          <a:lnRef idx="2">
+            <a:schemeClr val="accent3">
+              <a:shade val="50000"/>
+            </a:schemeClr>
+          </a:lnRef>
+          <a:fillRef idx="1">
+            <a:schemeClr val="accent3"/>
+          </a:fillRef>
+          <a:effectRef idx="0">
+            <a:schemeClr val="accent3"/>
+          </a:effectRef>
+          <a:fontRef idx="minor">
+            <a:schemeClr val="lt1"/>
+          </a:fontRef>
+        </p:style>
+        <p:txBody>
+          <a:bodyPr rtlCol="0" anchor="ctr"/>
+          <a:lstStyle/>
+          <a:p>
+            <a:pPr algn="ctr"/>
+            <a:r>
+              <a:rPr lang="en-US" sz="1600" b="1" dirty="0" err="1" smtClean="0"/>
+              <a:t>BuildProperties</a:t>
+            </a:r>
+            <a:endParaRPr lang="en-SG" sz="1600" b="1" dirty="0"/>
+          </a:p>
+        </p:txBody>
+      </p:sp>
+      <p:sp>
+        <p:nvSpPr>
+          <p:cNvPr id="36" name="Rectangle 35"/>
+          <p:cNvSpPr/>
+          <p:nvPr/>
+        </p:nvSpPr>
+        <p:spPr>
+          <a:xfrm>
+            <a:off x="762000" y="1722437"/>
+            <a:ext cx="1600200" cy="304800"/>
+          </a:xfrm>
+          <a:prstGeom prst="rect">
+            <a:avLst/>
+          </a:prstGeom>
+        </p:spPr>
+        <p:style>
+          <a:lnRef idx="2">
+            <a:schemeClr val="accent3">
+              <a:shade val="50000"/>
+            </a:schemeClr>
+          </a:lnRef>
+          <a:fillRef idx="1">
+            <a:schemeClr val="accent3"/>
+          </a:fillRef>
+          <a:effectRef idx="0">
+            <a:schemeClr val="accent3"/>
+          </a:effectRef>
+          <a:fontRef idx="minor">
+            <a:schemeClr val="lt1"/>
+          </a:fontRef>
+        </p:style>
+        <p:txBody>
+          <a:bodyPr rtlCol="0" anchor="ctr"/>
+          <a:lstStyle/>
+          <a:p>
+            <a:pPr algn="ctr"/>
+            <a:r>
+              <a:rPr lang="en-US" sz="1600" b="1" dirty="0" smtClean="0"/>
+              <a:t>Assumption</a:t>
+            </a:r>
+            <a:endParaRPr lang="en-SG" sz="1600" b="1" dirty="0"/>
+          </a:p>
+        </p:txBody>
+      </p:sp>
+      <p:sp>
+        <p:nvSpPr>
+          <p:cNvPr id="38" name="Rectangle 37"/>
+          <p:cNvSpPr/>
+          <p:nvPr/>
+        </p:nvSpPr>
+        <p:spPr>
+          <a:xfrm>
+            <a:off x="4052977" y="2579867"/>
+            <a:ext cx="1585823" cy="361770"/>
           </a:xfrm>
           <a:prstGeom prst="rect">
             <a:avLst/>
@@ -4122,12 +4291,170 @@
             <a:pPr algn="ctr"/>
             <a:r>
               <a:rPr lang="en-US" sz="1600" b="1" dirty="0" err="1" smtClean="0"/>
-              <a:t>EvaluationData</a:t>
+              <a:t>BaseData</a:t>
             </a:r>
             <a:endParaRPr lang="en-SG" sz="1600" b="1" dirty="0"/>
           </a:p>
         </p:txBody>
       </p:sp>
+      <p:cxnSp>
+        <p:nvCxnSpPr>
+          <p:cNvPr id="39" name="Elbow Connector 38"/>
+          <p:cNvCxnSpPr/>
+          <p:nvPr/>
+        </p:nvCxnSpPr>
+        <p:spPr>
+          <a:xfrm>
+            <a:off x="2667002" y="3322637"/>
+            <a:ext cx="4190999" cy="1"/>
+          </a:xfrm>
+          <a:prstGeom prst="bentConnector3">
+            <a:avLst>
+              <a:gd name="adj1" fmla="val 50000"/>
+            </a:avLst>
+          </a:prstGeom>
+          <a:ln>
+            <a:headEnd type="none" w="med" len="med"/>
+            <a:tailEnd type="none" w="med" len="med"/>
+          </a:ln>
+        </p:spPr>
+        <p:style>
+          <a:lnRef idx="2">
+            <a:schemeClr val="accent6"/>
+          </a:lnRef>
+          <a:fillRef idx="0">
+            <a:schemeClr val="accent6"/>
+          </a:fillRef>
+          <a:effectRef idx="1">
+            <a:schemeClr val="accent6"/>
+          </a:effectRef>
+          <a:fontRef idx="minor">
+            <a:schemeClr val="tx1"/>
+          </a:fontRef>
+        </p:style>
+      </p:cxnSp>
+      <p:cxnSp>
+        <p:nvCxnSpPr>
+          <p:cNvPr id="69" name="Elbow Connector 68"/>
+          <p:cNvCxnSpPr>
+            <a:endCxn id="37" idx="3"/>
+          </p:cNvCxnSpPr>
+          <p:nvPr/>
+        </p:nvCxnSpPr>
+        <p:spPr>
+          <a:xfrm flipV="1">
+            <a:off x="4800600" y="3194050"/>
+            <a:ext cx="14288" cy="814387"/>
+          </a:xfrm>
+          <a:prstGeom prst="straightConnector1">
+            <a:avLst/>
+          </a:prstGeom>
+        </p:spPr>
+        <p:style>
+          <a:lnRef idx="2">
+            <a:schemeClr val="accent6"/>
+          </a:lnRef>
+          <a:fillRef idx="0">
+            <a:schemeClr val="accent6"/>
+          </a:fillRef>
+          <a:effectRef idx="1">
+            <a:schemeClr val="accent6"/>
+          </a:effectRef>
+          <a:fontRef idx="minor">
+            <a:schemeClr val="tx1"/>
+          </a:fontRef>
+        </p:style>
+      </p:cxnSp>
+      <p:cxnSp>
+        <p:nvCxnSpPr>
+          <p:cNvPr id="99" name="Elbow Connector 68"/>
+          <p:cNvCxnSpPr/>
+          <p:nvPr/>
+        </p:nvCxnSpPr>
+        <p:spPr>
+          <a:xfrm flipV="1">
+            <a:off x="6172200" y="3322637"/>
+            <a:ext cx="0" cy="228600"/>
+          </a:xfrm>
+          <a:prstGeom prst="straightConnector1">
+            <a:avLst/>
+          </a:prstGeom>
+        </p:spPr>
+        <p:style>
+          <a:lnRef idx="2">
+            <a:schemeClr val="accent6"/>
+          </a:lnRef>
+          <a:fillRef idx="0">
+            <a:schemeClr val="accent6"/>
+          </a:fillRef>
+          <a:effectRef idx="1">
+            <a:schemeClr val="accent6"/>
+          </a:effectRef>
+          <a:fontRef idx="minor">
+            <a:schemeClr val="tx1"/>
+          </a:fontRef>
+        </p:style>
+      </p:cxnSp>
+      <p:cxnSp>
+        <p:nvCxnSpPr>
+          <p:cNvPr id="102" name="Elbow Connector 68"/>
+          <p:cNvCxnSpPr/>
+          <p:nvPr/>
+        </p:nvCxnSpPr>
+        <p:spPr>
+          <a:xfrm flipV="1">
+            <a:off x="6858000" y="3322637"/>
+            <a:ext cx="0" cy="685800"/>
+          </a:xfrm>
+          <a:prstGeom prst="straightConnector1">
+            <a:avLst/>
+          </a:prstGeom>
+        </p:spPr>
+        <p:style>
+          <a:lnRef idx="2">
+            <a:schemeClr val="accent6"/>
+          </a:lnRef>
+          <a:fillRef idx="0">
+            <a:schemeClr val="accent6"/>
+          </a:fillRef>
+          <a:effectRef idx="1">
+            <a:schemeClr val="accent6"/>
+          </a:effectRef>
+          <a:fontRef idx="minor">
+            <a:schemeClr val="tx1"/>
+          </a:fontRef>
+        </p:style>
+      </p:cxnSp>
+      <p:cxnSp>
+        <p:nvCxnSpPr>
+          <p:cNvPr id="105" name="Elbow Connector 68"/>
+          <p:cNvCxnSpPr/>
+          <p:nvPr/>
+        </p:nvCxnSpPr>
+        <p:spPr>
+          <a:xfrm flipV="1">
+            <a:off x="2667000" y="3322637"/>
+            <a:ext cx="0" cy="685800"/>
+          </a:xfrm>
+          <a:prstGeom prst="straightConnector1">
+            <a:avLst/>
+          </a:prstGeom>
+        </p:spPr>
+        <p:style>
+          <a:lnRef idx="2">
+            <a:schemeClr val="accent6"/>
+          </a:lnRef>
+          <a:fillRef idx="0">
+            <a:schemeClr val="accent6"/>
+          </a:fillRef>
+          <a:effectRef idx="1">
+            <a:schemeClr val="accent6"/>
+          </a:effectRef>
+          <a:fontRef idx="minor">
+            <a:schemeClr val="tx1"/>
+          </a:fontRef>
+        </p:style>
+      </p:cxnSp>
       <p:sp>
         <p:nvSpPr>
           <p:cNvPr id="175" name="Rectangle 174"/>
@@ -4136,7 +4463,7 @@
         </p:nvSpPr>
         <p:spPr>
           <a:xfrm>
-            <a:off x="2792675" y="4000772"/>
+            <a:off x="2362200" y="4000772"/>
             <a:ext cx="1585823" cy="361770"/>
           </a:xfrm>
           <a:prstGeom prst="rect">
@@ -4174,130 +4501,16 @@
       </p:sp>
       <p:sp>
         <p:nvSpPr>
-          <p:cNvPr id="176" name="Isosceles Triangle 175"/>
+          <p:cNvPr id="37" name="Isosceles Triangle 36"/>
           <p:cNvSpPr/>
           <p:nvPr/>
         </p:nvSpPr>
         <p:spPr>
           <a:xfrm>
-            <a:off x="6400442" y="2917887"/>
+            <a:off x="4676775" y="2965450"/>
             <a:ext cx="276225" cy="228600"/>
           </a:xfrm>
           <a:prstGeom prst="triangle">
-            <a:avLst/>
-          </a:prstGeom>
-        </p:spPr>
-        <p:style>
-          <a:lnRef idx="2">
-            <a:schemeClr val="accent4">
-              <a:shade val="50000"/>
-            </a:schemeClr>
-          </a:lnRef>
-          <a:fillRef idx="1">
-            <a:schemeClr val="accent4"/>
-          </a:fillRef>
-          <a:effectRef idx="0">
-            <a:schemeClr val="accent4"/>
-          </a:effectRef>
-          <a:fontRef idx="minor">
-            <a:schemeClr val="lt1"/>
-          </a:fontRef>
-        </p:style>
-        <p:txBody>
-          <a:bodyPr rtlCol="0" anchor="ctr"/>
-          <a:lstStyle/>
-          <a:p>
-            <a:pPr algn="ctr"/>
-            <a:endParaRPr lang="en-SG"/>
-          </a:p>
-        </p:txBody>
-      </p:sp>
-      <p:cxnSp>
-        <p:nvCxnSpPr>
-          <p:cNvPr id="177" name="Elbow Connector 176"/>
-          <p:cNvCxnSpPr>
-            <a:stCxn id="176" idx="3"/>
-            <a:endCxn id="172" idx="0"/>
-          </p:cNvCxnSpPr>
-          <p:nvPr/>
-        </p:nvCxnSpPr>
-        <p:spPr>
-          <a:xfrm rot="5400000">
-            <a:off x="5652864" y="2641796"/>
-            <a:ext cx="381000" cy="1390382"/>
-          </a:xfrm>
-          <a:prstGeom prst="bentConnector3">
-            <a:avLst>
-              <a:gd name="adj1" fmla="val 25065"/>
-            </a:avLst>
-          </a:prstGeom>
-        </p:spPr>
-        <p:style>
-          <a:lnRef idx="2">
-            <a:schemeClr val="accent4">
-              <a:shade val="50000"/>
-            </a:schemeClr>
-          </a:lnRef>
-          <a:fillRef idx="1">
-            <a:schemeClr val="accent4"/>
-          </a:fillRef>
-          <a:effectRef idx="0">
-            <a:schemeClr val="accent4"/>
-          </a:effectRef>
-          <a:fontRef idx="minor">
-            <a:schemeClr val="lt1"/>
-          </a:fontRef>
-        </p:style>
-      </p:cxnSp>
-      <p:cxnSp>
-        <p:nvCxnSpPr>
-          <p:cNvPr id="178" name="Elbow Connector 177"/>
-          <p:cNvCxnSpPr>
-            <a:stCxn id="173" idx="0"/>
-            <a:endCxn id="176" idx="3"/>
-          </p:cNvCxnSpPr>
-          <p:nvPr/>
-        </p:nvCxnSpPr>
-        <p:spPr>
-          <a:xfrm rot="5400000" flipH="1" flipV="1">
-            <a:off x="6345579" y="3337127"/>
-            <a:ext cx="383615" cy="2337"/>
-          </a:xfrm>
-          <a:prstGeom prst="bentConnector3">
-            <a:avLst>
-              <a:gd name="adj1" fmla="val 50000"/>
-            </a:avLst>
-          </a:prstGeom>
-        </p:spPr>
-        <p:style>
-          <a:lnRef idx="2">
-            <a:schemeClr val="accent4">
-              <a:shade val="50000"/>
-            </a:schemeClr>
-          </a:lnRef>
-          <a:fillRef idx="1">
-            <a:schemeClr val="accent4"/>
-          </a:fillRef>
-          <a:effectRef idx="0">
-            <a:schemeClr val="accent4"/>
-          </a:effectRef>
-          <a:fontRef idx="minor">
-            <a:schemeClr val="lt1"/>
-          </a:fontRef>
-        </p:style>
-      </p:cxnSp>
-      <p:sp>
-        <p:nvSpPr>
-          <p:cNvPr id="179" name="Rectangle 178"/>
-          <p:cNvSpPr/>
-          <p:nvPr/>
-        </p:nvSpPr>
-        <p:spPr>
-          <a:xfrm>
-            <a:off x="2792675" y="3069547"/>
-            <a:ext cx="1585823" cy="361770"/>
-          </a:xfrm>
-          <a:prstGeom prst="rect">
             <a:avLst/>
           </a:prstGeom>
         </p:spPr>
@@ -4322,24 +4535,22 @@
           <a:lstStyle/>
           <a:p>
             <a:pPr algn="ctr"/>
-            <a:r>
-              <a:rPr lang="en-US" sz="1600" b="1" dirty="0" err="1" smtClean="0"/>
-              <a:t>CourseData</a:t>
-            </a:r>
-            <a:endParaRPr lang="en-SG" sz="1600" b="1" dirty="0"/>
-          </a:p>
-        </p:txBody>
-      </p:sp>
-      <p:sp>
-        <p:nvSpPr>
-          <p:cNvPr id="180" name="Rectangle 179"/>
-          <p:cNvSpPr/>
+            <a:endParaRPr lang="en-SG"/>
+          </a:p>
+        </p:txBody>
+      </p:sp>
+      <p:sp>
+        <p:nvSpPr>
+          <p:cNvPr id="172" name="Rectangle 171"/>
+          <p:cNvSpPr>
+            <a:spLocks/>
+          </p:cNvSpPr>
           <p:nvPr/>
         </p:nvSpPr>
         <p:spPr>
           <a:xfrm>
-            <a:off x="7405777" y="3527487"/>
-            <a:ext cx="1204823" cy="361770"/>
+            <a:off x="5324654" y="3551237"/>
+            <a:ext cx="1304746" cy="361770"/>
           </a:xfrm>
           <a:prstGeom prst="rect">
             <a:avLst/>
@@ -4347,15 +4558,15 @@
         </p:spPr>
         <p:style>
           <a:lnRef idx="2">
-            <a:schemeClr val="accent4">
+            <a:schemeClr val="accent6">
               <a:shade val="50000"/>
             </a:schemeClr>
           </a:lnRef>
           <a:fillRef idx="1">
-            <a:schemeClr val="accent4"/>
+            <a:schemeClr val="accent6"/>
           </a:fillRef>
           <a:effectRef idx="0">
-            <a:schemeClr val="accent4"/>
+            <a:schemeClr val="accent6"/>
           </a:effectRef>
           <a:fontRef idx="minor">
             <a:schemeClr val="lt1"/>
@@ -4368,7 +4579,7 @@
             <a:pPr algn="ctr"/>
             <a:r>
               <a:rPr lang="en-US" sz="1600" b="1" dirty="0" err="1" smtClean="0"/>
-              <a:t>AdminData</a:t>
+              <a:t>StudentData</a:t>
             </a:r>
             <a:endParaRPr lang="en-SG" sz="1600" b="1" dirty="0"/>
           </a:p>
@@ -4376,72 +4587,65 @@
       </p:sp>
       <p:cxnSp>
         <p:nvCxnSpPr>
-          <p:cNvPr id="181" name="Elbow Connector 180"/>
-          <p:cNvCxnSpPr>
-            <a:stCxn id="180" idx="0"/>
-            <a:endCxn id="176" idx="3"/>
-          </p:cNvCxnSpPr>
+          <p:cNvPr id="108" name="Elbow Connector 68"/>
+          <p:cNvCxnSpPr/>
           <p:nvPr/>
         </p:nvCxnSpPr>
         <p:spPr>
-          <a:xfrm rot="16200000" flipV="1">
-            <a:off x="7082872" y="2602170"/>
-            <a:ext cx="381000" cy="1469634"/>
-          </a:xfrm>
-          <a:prstGeom prst="bentConnector3">
-            <a:avLst>
-              <a:gd name="adj1" fmla="val 74935"/>
-            </a:avLst>
+          <a:xfrm flipV="1">
+            <a:off x="3810000" y="3322637"/>
+            <a:ext cx="0" cy="228600"/>
+          </a:xfrm>
+          <a:prstGeom prst="straightConnector1">
+            <a:avLst/>
           </a:prstGeom>
         </p:spPr>
         <p:style>
           <a:lnRef idx="2">
-            <a:schemeClr val="accent4">
+            <a:schemeClr val="accent6"/>
+          </a:lnRef>
+          <a:fillRef idx="0">
+            <a:schemeClr val="accent6"/>
+          </a:fillRef>
+          <a:effectRef idx="1">
+            <a:schemeClr val="accent6"/>
+          </a:effectRef>
+          <a:fontRef idx="minor">
+            <a:schemeClr val="tx1"/>
+          </a:fontRef>
+        </p:style>
+      </p:cxnSp>
+      <p:sp>
+        <p:nvSpPr>
+          <p:cNvPr id="179" name="Rectangle 178"/>
+          <p:cNvSpPr/>
+          <p:nvPr/>
+        </p:nvSpPr>
+        <p:spPr>
+          <a:xfrm>
+            <a:off x="2986177" y="3551237"/>
+            <a:ext cx="1585823" cy="361770"/>
+          </a:xfrm>
+          <a:prstGeom prst="rect">
+            <a:avLst/>
+          </a:prstGeom>
+        </p:spPr>
+        <p:style>
+          <a:lnRef idx="2">
+            <a:schemeClr val="accent6">
               <a:shade val="50000"/>
             </a:schemeClr>
           </a:lnRef>
           <a:fillRef idx="1">
-            <a:schemeClr val="accent4"/>
+            <a:schemeClr val="accent6"/>
           </a:fillRef>
           <a:effectRef idx="0">
-            <a:schemeClr val="accent4"/>
+            <a:schemeClr val="accent6"/>
           </a:effectRef>
           <a:fontRef idx="minor">
             <a:schemeClr val="lt1"/>
           </a:fontRef>
         </p:style>
-      </p:cxnSp>
-      <p:sp>
-        <p:nvSpPr>
-          <p:cNvPr id="182" name="Rectangle 181"/>
-          <p:cNvSpPr/>
-          <p:nvPr/>
-        </p:nvSpPr>
-        <p:spPr>
-          <a:xfrm>
-            <a:off x="569025" y="3053892"/>
-            <a:ext cx="1524000" cy="361770"/>
-          </a:xfrm>
-          <a:prstGeom prst="rect">
-            <a:avLst/>
-          </a:prstGeom>
-        </p:spPr>
-        <p:style>
-          <a:lnRef idx="2">
-            <a:schemeClr val="accent5">
-              <a:shade val="50000"/>
-            </a:schemeClr>
-          </a:lnRef>
-          <a:fillRef idx="1">
-            <a:schemeClr val="accent5"/>
-          </a:fillRef>
-          <a:effectRef idx="0">
-            <a:schemeClr val="accent5"/>
-          </a:effectRef>
-          <a:fontRef idx="minor">
-            <a:schemeClr val="lt1"/>
-          </a:fontRef>
-        </p:style>
         <p:txBody>
           <a:bodyPr rtlCol="0" anchor="ctr"/>
           <a:lstStyle/>
@@ -4449,139 +4653,7 @@
             <a:pPr algn="ctr"/>
             <a:r>
               <a:rPr lang="en-US" sz="1600" b="1" dirty="0" err="1" smtClean="0"/>
-              <a:t>TeamData</a:t>
-            </a:r>
-            <a:endParaRPr lang="en-SG" sz="1600" b="1" dirty="0"/>
-          </a:p>
-        </p:txBody>
-      </p:sp>
-      <p:sp>
-        <p:nvSpPr>
-          <p:cNvPr id="183" name="Rectangle 182"/>
-          <p:cNvSpPr/>
-          <p:nvPr/>
-        </p:nvSpPr>
-        <p:spPr>
-          <a:xfrm>
-            <a:off x="569025" y="3549192"/>
-            <a:ext cx="1524000" cy="361770"/>
-          </a:xfrm>
-          <a:prstGeom prst="rect">
-            <a:avLst/>
-          </a:prstGeom>
-        </p:spPr>
-        <p:style>
-          <a:lnRef idx="2">
-            <a:schemeClr val="accent5">
-              <a:shade val="50000"/>
-            </a:schemeClr>
-          </a:lnRef>
-          <a:fillRef idx="1">
-            <a:schemeClr val="accent5"/>
-          </a:fillRef>
-          <a:effectRef idx="0">
-            <a:schemeClr val="accent5"/>
-          </a:effectRef>
-          <a:fontRef idx="minor">
-            <a:schemeClr val="lt1"/>
-          </a:fontRef>
-        </p:style>
-        <p:txBody>
-          <a:bodyPr rtlCol="0" anchor="ctr"/>
-          <a:lstStyle/>
-          <a:p>
-            <a:pPr algn="ctr"/>
-            <a:r>
-              <a:rPr lang="en-US" sz="1600" b="1" dirty="0" err="1" smtClean="0"/>
-              <a:t>EvalResultData</a:t>
-            </a:r>
-            <a:endParaRPr lang="en-SG" sz="1600" b="1" dirty="0"/>
-          </a:p>
-        </p:txBody>
-      </p:sp>
-      <p:sp>
-        <p:nvSpPr>
-          <p:cNvPr id="184" name="Rectangle 183"/>
-          <p:cNvSpPr/>
-          <p:nvPr/>
-        </p:nvSpPr>
-        <p:spPr>
-          <a:xfrm>
-            <a:off x="569025" y="4044492"/>
-            <a:ext cx="1524000" cy="361770"/>
-          </a:xfrm>
-          <a:prstGeom prst="rect">
-            <a:avLst/>
-          </a:prstGeom>
-        </p:spPr>
-        <p:style>
-          <a:lnRef idx="2">
-            <a:schemeClr val="accent5">
-              <a:shade val="50000"/>
-            </a:schemeClr>
-          </a:lnRef>
-          <a:fillRef idx="1">
-            <a:schemeClr val="accent5"/>
-          </a:fillRef>
-          <a:effectRef idx="0">
-            <a:schemeClr val="accent5"/>
-          </a:effectRef>
-          <a:fontRef idx="minor">
-            <a:schemeClr val="lt1"/>
-          </a:fontRef>
-        </p:style>
-        <p:txBody>
-          <a:bodyPr rtlCol="0" anchor="ctr"/>
-          <a:lstStyle/>
-          <a:p>
-            <a:pPr algn="ctr"/>
-            <a:r>
-              <a:rPr lang="en-US" sz="1600" b="1" dirty="0" err="1" smtClean="0"/>
-              <a:t>DataBundle</a:t>
-            </a:r>
-            <a:endParaRPr lang="en-SG" sz="1600" b="1" dirty="0"/>
-          </a:p>
-        </p:txBody>
-      </p:sp>
-      <p:sp>
-        <p:nvSpPr>
-          <p:cNvPr id="35" name="Rectangle 34"/>
-          <p:cNvSpPr/>
-          <p:nvPr/>
-        </p:nvSpPr>
-        <p:spPr>
-          <a:xfrm>
-            <a:off x="762000" y="1570037"/>
-            <a:ext cx="1524000" cy="457200"/>
-          </a:xfrm>
-          <a:prstGeom prst="rect">
-            <a:avLst/>
-          </a:prstGeom>
-        </p:spPr>
-        <p:style>
-          <a:lnRef idx="2">
-            <a:schemeClr val="accent3">
-              <a:shade val="50000"/>
-            </a:schemeClr>
-          </a:lnRef>
-          <a:fillRef idx="1">
-            <a:schemeClr val="accent3"/>
-          </a:fillRef>
-          <a:effectRef idx="0">
-            <a:schemeClr val="accent3"/>
-          </a:effectRef>
-          <a:fontRef idx="minor">
-            <a:schemeClr val="lt1"/>
-          </a:fontRef>
-        </p:style>
-        <p:txBody>
-          <a:bodyPr rtlCol="0" anchor="ctr"/>
-          <a:lstStyle/>
-          <a:p>
-            <a:pPr algn="ctr"/>
-            <a:r>
-              <a:rPr lang="en-US" sz="1600" b="1" dirty="0" err="1" smtClean="0"/>
-              <a:t>BuildProperties</a:t>
+              <a:t>CourseData</a:t>
             </a:r>
             <a:endParaRPr lang="en-SG" sz="1600" b="1" dirty="0"/>
           </a:p>

</xml_diff>

<commit_message>
merged with default Update Issue 313
</commit_message>
<xml_diff>
--- a/doc/diagrams/CommonComponent.pptx
+++ b/doc/diagrams/CommonComponent.pptx
@@ -289,7 +289,7 @@
             <a:fld id="{1D8BD707-D9CF-40AE-B4C6-C98DA3205C09}" type="datetimeFigureOut">
               <a:rPr lang="en-US" smtClean="0"/>
               <a:pPr/>
-              <a:t>14/8/12</a:t>
+              <a:t>27/10/12</a:t>
             </a:fld>
             <a:endParaRPr lang="en-US"/>
           </a:p>
@@ -456,7 +456,7 @@
             <a:fld id="{1D8BD707-D9CF-40AE-B4C6-C98DA3205C09}" type="datetimeFigureOut">
               <a:rPr lang="en-US" smtClean="0"/>
               <a:pPr/>
-              <a:t>14/8/12</a:t>
+              <a:t>27/10/12</a:t>
             </a:fld>
             <a:endParaRPr lang="en-US"/>
           </a:p>
@@ -633,7 +633,7 @@
             <a:fld id="{1D8BD707-D9CF-40AE-B4C6-C98DA3205C09}" type="datetimeFigureOut">
               <a:rPr lang="en-US" smtClean="0"/>
               <a:pPr/>
-              <a:t>14/8/12</a:t>
+              <a:t>27/10/12</a:t>
             </a:fld>
             <a:endParaRPr lang="en-US"/>
           </a:p>
@@ -800,7 +800,7 @@
             <a:fld id="{1D8BD707-D9CF-40AE-B4C6-C98DA3205C09}" type="datetimeFigureOut">
               <a:rPr lang="en-US" smtClean="0"/>
               <a:pPr/>
-              <a:t>14/8/12</a:t>
+              <a:t>27/10/12</a:t>
             </a:fld>
             <a:endParaRPr lang="en-US"/>
           </a:p>
@@ -1043,7 +1043,7 @@
             <a:fld id="{1D8BD707-D9CF-40AE-B4C6-C98DA3205C09}" type="datetimeFigureOut">
               <a:rPr lang="en-US" smtClean="0"/>
               <a:pPr/>
-              <a:t>14/8/12</a:t>
+              <a:t>27/10/12</a:t>
             </a:fld>
             <a:endParaRPr lang="en-US"/>
           </a:p>
@@ -1328,7 +1328,7 @@
             <a:fld id="{1D8BD707-D9CF-40AE-B4C6-C98DA3205C09}" type="datetimeFigureOut">
               <a:rPr lang="en-US" smtClean="0"/>
               <a:pPr/>
-              <a:t>14/8/12</a:t>
+              <a:t>27/10/12</a:t>
             </a:fld>
             <a:endParaRPr lang="en-US"/>
           </a:p>
@@ -1747,7 +1747,7 @@
             <a:fld id="{1D8BD707-D9CF-40AE-B4C6-C98DA3205C09}" type="datetimeFigureOut">
               <a:rPr lang="en-US" smtClean="0"/>
               <a:pPr/>
-              <a:t>14/8/12</a:t>
+              <a:t>27/10/12</a:t>
             </a:fld>
             <a:endParaRPr lang="en-US"/>
           </a:p>
@@ -1862,7 +1862,7 @@
             <a:fld id="{1D8BD707-D9CF-40AE-B4C6-C98DA3205C09}" type="datetimeFigureOut">
               <a:rPr lang="en-US" smtClean="0"/>
               <a:pPr/>
-              <a:t>14/8/12</a:t>
+              <a:t>27/10/12</a:t>
             </a:fld>
             <a:endParaRPr lang="en-US"/>
           </a:p>
@@ -1954,7 +1954,7 @@
             <a:fld id="{1D8BD707-D9CF-40AE-B4C6-C98DA3205C09}" type="datetimeFigureOut">
               <a:rPr lang="en-US" smtClean="0"/>
               <a:pPr/>
-              <a:t>14/8/12</a:t>
+              <a:t>27/10/12</a:t>
             </a:fld>
             <a:endParaRPr lang="en-US"/>
           </a:p>
@@ -2228,7 +2228,7 @@
             <a:fld id="{1D8BD707-D9CF-40AE-B4C6-C98DA3205C09}" type="datetimeFigureOut">
               <a:rPr lang="en-US" smtClean="0"/>
               <a:pPr/>
-              <a:t>14/8/12</a:t>
+              <a:t>27/10/12</a:t>
             </a:fld>
             <a:endParaRPr lang="en-US"/>
           </a:p>
@@ -2478,7 +2478,7 @@
             <a:fld id="{1D8BD707-D9CF-40AE-B4C6-C98DA3205C09}" type="datetimeFigureOut">
               <a:rPr lang="en-US" smtClean="0"/>
               <a:pPr/>
-              <a:t>14/8/12</a:t>
+              <a:t>27/10/12</a:t>
             </a:fld>
             <a:endParaRPr lang="en-US"/>
           </a:p>
@@ -2688,7 +2688,7 @@
             <a:fld id="{1D8BD707-D9CF-40AE-B4C6-C98DA3205C09}" type="datetimeFigureOut">
               <a:rPr lang="en-US" smtClean="0"/>
               <a:pPr/>
-              <a:t>14/8/12</a:t>
+              <a:t>27/10/12</a:t>
             </a:fld>
             <a:endParaRPr lang="en-US"/>
           </a:p>
@@ -3127,7 +3127,7 @@
         <p:grpSpPr>
           <a:xfrm>
             <a:off x="381000" y="2179637"/>
-            <a:ext cx="8305800" cy="2514601"/>
+            <a:ext cx="8305800" cy="2514600"/>
             <a:chOff x="-7162800" y="1371600"/>
             <a:chExt cx="8305800" cy="2357438"/>
           </a:xfrm>
@@ -3266,14 +3266,14 @@
       </p:grpSp>
       <p:sp>
         <p:nvSpPr>
-          <p:cNvPr id="156" name="Rounded Rectangle 155"/>
+          <p:cNvPr id="157" name="Rounded Rectangle 156"/>
           <p:cNvSpPr/>
           <p:nvPr/>
         </p:nvSpPr>
         <p:spPr>
           <a:xfrm>
-            <a:off x="4419600" y="3327587"/>
-            <a:ext cx="2819400" cy="762000"/>
+            <a:off x="2209800" y="2484437"/>
+            <a:ext cx="4953000" cy="2057400"/>
           </a:xfrm>
           <a:prstGeom prst="roundRect">
             <a:avLst>
@@ -3315,57 +3315,6 @@
           </a:p>
         </p:txBody>
       </p:sp>
-      <p:sp>
-        <p:nvSpPr>
-          <p:cNvPr id="157" name="Rounded Rectangle 156"/>
-          <p:cNvSpPr/>
-          <p:nvPr/>
-        </p:nvSpPr>
-        <p:spPr>
-          <a:xfrm>
-            <a:off x="2514600" y="2789237"/>
-            <a:ext cx="2133600" cy="1752600"/>
-          </a:xfrm>
-          <a:prstGeom prst="roundRect">
-            <a:avLst>
-              <a:gd name="adj" fmla="val 9891"/>
-            </a:avLst>
-          </a:prstGeom>
-          <a:solidFill>
-            <a:schemeClr val="accent6">
-              <a:lumMod val="40000"/>
-              <a:lumOff val="60000"/>
-            </a:schemeClr>
-          </a:solidFill>
-          <a:ln>
-            <a:noFill/>
-          </a:ln>
-        </p:spPr>
-        <p:style>
-          <a:lnRef idx="2">
-            <a:schemeClr val="accent1">
-              <a:shade val="50000"/>
-            </a:schemeClr>
-          </a:lnRef>
-          <a:fillRef idx="1">
-            <a:schemeClr val="accent1"/>
-          </a:fillRef>
-          <a:effectRef idx="0">
-            <a:schemeClr val="accent1"/>
-          </a:effectRef>
-          <a:fontRef idx="minor">
-            <a:schemeClr val="lt1"/>
-          </a:fontRef>
-        </p:style>
-        <p:txBody>
-          <a:bodyPr rtlCol="0" anchor="ctr"/>
-          <a:lstStyle/>
-          <a:p>
-            <a:pPr algn="ctr"/>
-            <a:endParaRPr lang="en-US"/>
-          </a:p>
-        </p:txBody>
-      </p:sp>
       <p:grpSp>
         <p:nvGrpSpPr>
           <p:cNvPr id="158" name="Group 157"/>
@@ -3375,7 +3324,7 @@
         <p:grpSpPr>
           <a:xfrm>
             <a:off x="457200" y="427037"/>
-            <a:ext cx="2057400" cy="1676400"/>
+            <a:ext cx="2209800" cy="1828800"/>
             <a:chOff x="-838200" y="1371600"/>
             <a:chExt cx="1981200" cy="1295400"/>
           </a:xfrm>
@@ -3647,8 +3596,8 @@
         </p:nvSpPr>
         <p:spPr>
           <a:xfrm>
-            <a:off x="762000" y="960437"/>
-            <a:ext cx="1524000" cy="457200"/>
+            <a:off x="990600" y="960437"/>
+            <a:ext cx="1143000" cy="304800"/>
           </a:xfrm>
           <a:prstGeom prst="rect">
             <a:avLst/>
@@ -3960,7 +3909,7 @@
         </p:nvSpPr>
         <p:spPr>
           <a:xfrm>
-            <a:off x="5963941" y="2558609"/>
+            <a:off x="7349918" y="4103867"/>
             <a:ext cx="1184482" cy="361770"/>
           </a:xfrm>
           <a:prstGeom prst="rect">
@@ -3990,7 +3939,7 @@
             <a:pPr algn="ctr"/>
             <a:r>
               <a:rPr lang="en-US" sz="1600" b="1" dirty="0" err="1" smtClean="0"/>
-              <a:t>UserData</a:t>
+              <a:t>UserType</a:t>
             </a:r>
             <a:endParaRPr lang="en-SG" sz="1600" b="1" dirty="0"/>
           </a:p>
@@ -3998,14 +3947,14 @@
       </p:sp>
       <p:sp>
         <p:nvSpPr>
-          <p:cNvPr id="172" name="Rectangle 171"/>
+          <p:cNvPr id="173" name="Rectangle 172"/>
           <p:cNvSpPr/>
           <p:nvPr/>
         </p:nvSpPr>
         <p:spPr>
           <a:xfrm>
-            <a:off x="4495800" y="3527487"/>
-            <a:ext cx="1304746" cy="361770"/>
+            <a:off x="5881777" y="4027667"/>
+            <a:ext cx="1204823" cy="361770"/>
           </a:xfrm>
           <a:prstGeom prst="rect">
             <a:avLst/>
@@ -4034,7 +3983,7 @@
             <a:pPr algn="ctr"/>
             <a:r>
               <a:rPr lang="en-US" sz="1600" b="1" dirty="0" err="1" smtClean="0"/>
-              <a:t>StudentData</a:t>
+              <a:t>CoordData</a:t>
             </a:r>
             <a:endParaRPr lang="en-SG" sz="1600" b="1" dirty="0"/>
           </a:p>
@@ -4042,14 +3991,14 @@
       </p:sp>
       <p:sp>
         <p:nvSpPr>
-          <p:cNvPr id="173" name="Rectangle 172"/>
+          <p:cNvPr id="174" name="Rectangle 173"/>
           <p:cNvSpPr/>
           <p:nvPr/>
         </p:nvSpPr>
         <p:spPr>
           <a:xfrm>
-            <a:off x="5933806" y="3530102"/>
-            <a:ext cx="1204823" cy="361770"/>
+            <a:off x="4124593" y="4008437"/>
+            <a:ext cx="1590407" cy="361770"/>
           </a:xfrm>
           <a:prstGeom prst="rect">
             <a:avLst/>
@@ -4078,7 +4027,7 @@
             <a:pPr algn="ctr"/>
             <a:r>
               <a:rPr lang="en-US" sz="1600" b="1" dirty="0" err="1" smtClean="0"/>
-              <a:t>CoordData</a:t>
+              <a:t>EvaluationData</a:t>
             </a:r>
             <a:endParaRPr lang="en-SG" sz="1600" b="1" dirty="0"/>
           </a:p>
@@ -4086,14 +4035,234 @@
       </p:sp>
       <p:sp>
         <p:nvSpPr>
-          <p:cNvPr id="174" name="Rectangle 173"/>
+          <p:cNvPr id="182" name="Rectangle 181"/>
           <p:cNvSpPr/>
           <p:nvPr/>
         </p:nvSpPr>
         <p:spPr>
           <a:xfrm>
-            <a:off x="2792675" y="3526747"/>
-            <a:ext cx="1590407" cy="361770"/>
+            <a:off x="569025" y="3053892"/>
+            <a:ext cx="1524000" cy="361770"/>
+          </a:xfrm>
+          <a:prstGeom prst="rect">
+            <a:avLst/>
+          </a:prstGeom>
+        </p:spPr>
+        <p:style>
+          <a:lnRef idx="2">
+            <a:schemeClr val="accent5">
+              <a:shade val="50000"/>
+            </a:schemeClr>
+          </a:lnRef>
+          <a:fillRef idx="1">
+            <a:schemeClr val="accent5"/>
+          </a:fillRef>
+          <a:effectRef idx="0">
+            <a:schemeClr val="accent5"/>
+          </a:effectRef>
+          <a:fontRef idx="minor">
+            <a:schemeClr val="lt1"/>
+          </a:fontRef>
+        </p:style>
+        <p:txBody>
+          <a:bodyPr rtlCol="0" anchor="ctr"/>
+          <a:lstStyle/>
+          <a:p>
+            <a:pPr algn="ctr"/>
+            <a:r>
+              <a:rPr lang="en-US" sz="1600" b="1" dirty="0" err="1" smtClean="0"/>
+              <a:t>TeamData</a:t>
+            </a:r>
+            <a:endParaRPr lang="en-SG" sz="1600" b="1" dirty="0"/>
+          </a:p>
+        </p:txBody>
+      </p:sp>
+      <p:sp>
+        <p:nvSpPr>
+          <p:cNvPr id="183" name="Rectangle 182"/>
+          <p:cNvSpPr/>
+          <p:nvPr/>
+        </p:nvSpPr>
+        <p:spPr>
+          <a:xfrm>
+            <a:off x="569025" y="3549192"/>
+            <a:ext cx="1524000" cy="361770"/>
+          </a:xfrm>
+          <a:prstGeom prst="rect">
+            <a:avLst/>
+          </a:prstGeom>
+        </p:spPr>
+        <p:style>
+          <a:lnRef idx="2">
+            <a:schemeClr val="accent5">
+              <a:shade val="50000"/>
+            </a:schemeClr>
+          </a:lnRef>
+          <a:fillRef idx="1">
+            <a:schemeClr val="accent5"/>
+          </a:fillRef>
+          <a:effectRef idx="0">
+            <a:schemeClr val="accent5"/>
+          </a:effectRef>
+          <a:fontRef idx="minor">
+            <a:schemeClr val="lt1"/>
+          </a:fontRef>
+        </p:style>
+        <p:txBody>
+          <a:bodyPr rtlCol="0" anchor="ctr"/>
+          <a:lstStyle/>
+          <a:p>
+            <a:pPr algn="ctr"/>
+            <a:r>
+              <a:rPr lang="en-US" sz="1600" b="1" dirty="0" err="1" smtClean="0"/>
+              <a:t>EvalResultData</a:t>
+            </a:r>
+            <a:endParaRPr lang="en-SG" sz="1600" b="1" dirty="0"/>
+          </a:p>
+        </p:txBody>
+      </p:sp>
+      <p:sp>
+        <p:nvSpPr>
+          <p:cNvPr id="184" name="Rectangle 183"/>
+          <p:cNvSpPr/>
+          <p:nvPr/>
+        </p:nvSpPr>
+        <p:spPr>
+          <a:xfrm>
+            <a:off x="569025" y="4044492"/>
+            <a:ext cx="1524000" cy="361770"/>
+          </a:xfrm>
+          <a:prstGeom prst="rect">
+            <a:avLst/>
+          </a:prstGeom>
+        </p:spPr>
+        <p:style>
+          <a:lnRef idx="2">
+            <a:schemeClr val="accent5">
+              <a:shade val="50000"/>
+            </a:schemeClr>
+          </a:lnRef>
+          <a:fillRef idx="1">
+            <a:schemeClr val="accent5"/>
+          </a:fillRef>
+          <a:effectRef idx="0">
+            <a:schemeClr val="accent5"/>
+          </a:effectRef>
+          <a:fontRef idx="minor">
+            <a:schemeClr val="lt1"/>
+          </a:fontRef>
+        </p:style>
+        <p:txBody>
+          <a:bodyPr rtlCol="0" anchor="ctr"/>
+          <a:lstStyle/>
+          <a:p>
+            <a:pPr algn="ctr"/>
+            <a:r>
+              <a:rPr lang="en-US" sz="1600" b="1" dirty="0" err="1" smtClean="0"/>
+              <a:t>DataBundle</a:t>
+            </a:r>
+            <a:endParaRPr lang="en-SG" sz="1600" b="1" dirty="0"/>
+          </a:p>
+        </p:txBody>
+      </p:sp>
+      <p:sp>
+        <p:nvSpPr>
+          <p:cNvPr id="35" name="Rectangle 34"/>
+          <p:cNvSpPr/>
+          <p:nvPr/>
+        </p:nvSpPr>
+        <p:spPr>
+          <a:xfrm>
+            <a:off x="762000" y="1341437"/>
+            <a:ext cx="1600200" cy="304800"/>
+          </a:xfrm>
+          <a:prstGeom prst="rect">
+            <a:avLst/>
+          </a:prstGeom>
+        </p:spPr>
+        <p:style>
+          <a:lnRef idx="2">
+            <a:schemeClr val="accent3">
+              <a:shade val="50000"/>
+            </a:schemeClr>
+          </a:lnRef>
+          <a:fillRef idx="1">
+            <a:schemeClr val="accent3"/>
+          </a:fillRef>
+          <a:effectRef idx="0">
+            <a:schemeClr val="accent3"/>
+          </a:effectRef>
+          <a:fontRef idx="minor">
+            <a:schemeClr val="lt1"/>
+          </a:fontRef>
+        </p:style>
+        <p:txBody>
+          <a:bodyPr rtlCol="0" anchor="ctr"/>
+          <a:lstStyle/>
+          <a:p>
+            <a:pPr algn="ctr"/>
+            <a:r>
+              <a:rPr lang="en-US" sz="1600" b="1" dirty="0" err="1" smtClean="0"/>
+              <a:t>BuildProperties</a:t>
+            </a:r>
+            <a:endParaRPr lang="en-SG" sz="1600" b="1" dirty="0"/>
+          </a:p>
+        </p:txBody>
+      </p:sp>
+      <p:sp>
+        <p:nvSpPr>
+          <p:cNvPr id="36" name="Rectangle 35"/>
+          <p:cNvSpPr/>
+          <p:nvPr/>
+        </p:nvSpPr>
+        <p:spPr>
+          <a:xfrm>
+            <a:off x="762000" y="1722437"/>
+            <a:ext cx="1600200" cy="304800"/>
+          </a:xfrm>
+          <a:prstGeom prst="rect">
+            <a:avLst/>
+          </a:prstGeom>
+        </p:spPr>
+        <p:style>
+          <a:lnRef idx="2">
+            <a:schemeClr val="accent3">
+              <a:shade val="50000"/>
+            </a:schemeClr>
+          </a:lnRef>
+          <a:fillRef idx="1">
+            <a:schemeClr val="accent3"/>
+          </a:fillRef>
+          <a:effectRef idx="0">
+            <a:schemeClr val="accent3"/>
+          </a:effectRef>
+          <a:fontRef idx="minor">
+            <a:schemeClr val="lt1"/>
+          </a:fontRef>
+        </p:style>
+        <p:txBody>
+          <a:bodyPr rtlCol="0" anchor="ctr"/>
+          <a:lstStyle/>
+          <a:p>
+            <a:pPr algn="ctr"/>
+            <a:r>
+              <a:rPr lang="en-US" sz="1600" b="1" dirty="0" smtClean="0"/>
+              <a:t>Assumption</a:t>
+            </a:r>
+            <a:endParaRPr lang="en-SG" sz="1600" b="1" dirty="0"/>
+          </a:p>
+        </p:txBody>
+      </p:sp>
+      <p:sp>
+        <p:nvSpPr>
+          <p:cNvPr id="38" name="Rectangle 37"/>
+          <p:cNvSpPr/>
+          <p:nvPr/>
+        </p:nvSpPr>
+        <p:spPr>
+          <a:xfrm>
+            <a:off x="4052977" y="2579867"/>
+            <a:ext cx="1585823" cy="361770"/>
           </a:xfrm>
           <a:prstGeom prst="rect">
             <a:avLst/>
@@ -4122,12 +4291,170 @@
             <a:pPr algn="ctr"/>
             <a:r>
               <a:rPr lang="en-US" sz="1600" b="1" dirty="0" err="1" smtClean="0"/>
-              <a:t>EvaluationData</a:t>
+              <a:t>BaseData</a:t>
             </a:r>
             <a:endParaRPr lang="en-SG" sz="1600" b="1" dirty="0"/>
           </a:p>
         </p:txBody>
       </p:sp>
+      <p:cxnSp>
+        <p:nvCxnSpPr>
+          <p:cNvPr id="39" name="Elbow Connector 38"/>
+          <p:cNvCxnSpPr/>
+          <p:nvPr/>
+        </p:nvCxnSpPr>
+        <p:spPr>
+          <a:xfrm>
+            <a:off x="2667002" y="3322637"/>
+            <a:ext cx="4190999" cy="1"/>
+          </a:xfrm>
+          <a:prstGeom prst="bentConnector3">
+            <a:avLst>
+              <a:gd name="adj1" fmla="val 50000"/>
+            </a:avLst>
+          </a:prstGeom>
+          <a:ln>
+            <a:headEnd type="none" w="med" len="med"/>
+            <a:tailEnd type="none" w="med" len="med"/>
+          </a:ln>
+        </p:spPr>
+        <p:style>
+          <a:lnRef idx="2">
+            <a:schemeClr val="accent6"/>
+          </a:lnRef>
+          <a:fillRef idx="0">
+            <a:schemeClr val="accent6"/>
+          </a:fillRef>
+          <a:effectRef idx="1">
+            <a:schemeClr val="accent6"/>
+          </a:effectRef>
+          <a:fontRef idx="minor">
+            <a:schemeClr val="tx1"/>
+          </a:fontRef>
+        </p:style>
+      </p:cxnSp>
+      <p:cxnSp>
+        <p:nvCxnSpPr>
+          <p:cNvPr id="69" name="Elbow Connector 68"/>
+          <p:cNvCxnSpPr>
+            <a:endCxn id="37" idx="3"/>
+          </p:cNvCxnSpPr>
+          <p:nvPr/>
+        </p:nvCxnSpPr>
+        <p:spPr>
+          <a:xfrm flipV="1">
+            <a:off x="4800600" y="3194050"/>
+            <a:ext cx="14288" cy="814387"/>
+          </a:xfrm>
+          <a:prstGeom prst="straightConnector1">
+            <a:avLst/>
+          </a:prstGeom>
+        </p:spPr>
+        <p:style>
+          <a:lnRef idx="2">
+            <a:schemeClr val="accent6"/>
+          </a:lnRef>
+          <a:fillRef idx="0">
+            <a:schemeClr val="accent6"/>
+          </a:fillRef>
+          <a:effectRef idx="1">
+            <a:schemeClr val="accent6"/>
+          </a:effectRef>
+          <a:fontRef idx="minor">
+            <a:schemeClr val="tx1"/>
+          </a:fontRef>
+        </p:style>
+      </p:cxnSp>
+      <p:cxnSp>
+        <p:nvCxnSpPr>
+          <p:cNvPr id="99" name="Elbow Connector 68"/>
+          <p:cNvCxnSpPr/>
+          <p:nvPr/>
+        </p:nvCxnSpPr>
+        <p:spPr>
+          <a:xfrm flipV="1">
+            <a:off x="6172200" y="3322637"/>
+            <a:ext cx="0" cy="228600"/>
+          </a:xfrm>
+          <a:prstGeom prst="straightConnector1">
+            <a:avLst/>
+          </a:prstGeom>
+        </p:spPr>
+        <p:style>
+          <a:lnRef idx="2">
+            <a:schemeClr val="accent6"/>
+          </a:lnRef>
+          <a:fillRef idx="0">
+            <a:schemeClr val="accent6"/>
+          </a:fillRef>
+          <a:effectRef idx="1">
+            <a:schemeClr val="accent6"/>
+          </a:effectRef>
+          <a:fontRef idx="minor">
+            <a:schemeClr val="tx1"/>
+          </a:fontRef>
+        </p:style>
+      </p:cxnSp>
+      <p:cxnSp>
+        <p:nvCxnSpPr>
+          <p:cNvPr id="102" name="Elbow Connector 68"/>
+          <p:cNvCxnSpPr/>
+          <p:nvPr/>
+        </p:nvCxnSpPr>
+        <p:spPr>
+          <a:xfrm flipV="1">
+            <a:off x="6858000" y="3322637"/>
+            <a:ext cx="0" cy="685800"/>
+          </a:xfrm>
+          <a:prstGeom prst="straightConnector1">
+            <a:avLst/>
+          </a:prstGeom>
+        </p:spPr>
+        <p:style>
+          <a:lnRef idx="2">
+            <a:schemeClr val="accent6"/>
+          </a:lnRef>
+          <a:fillRef idx="0">
+            <a:schemeClr val="accent6"/>
+          </a:fillRef>
+          <a:effectRef idx="1">
+            <a:schemeClr val="accent6"/>
+          </a:effectRef>
+          <a:fontRef idx="minor">
+            <a:schemeClr val="tx1"/>
+          </a:fontRef>
+        </p:style>
+      </p:cxnSp>
+      <p:cxnSp>
+        <p:nvCxnSpPr>
+          <p:cNvPr id="105" name="Elbow Connector 68"/>
+          <p:cNvCxnSpPr/>
+          <p:nvPr/>
+        </p:nvCxnSpPr>
+        <p:spPr>
+          <a:xfrm flipV="1">
+            <a:off x="2667000" y="3322637"/>
+            <a:ext cx="0" cy="685800"/>
+          </a:xfrm>
+          <a:prstGeom prst="straightConnector1">
+            <a:avLst/>
+          </a:prstGeom>
+        </p:spPr>
+        <p:style>
+          <a:lnRef idx="2">
+            <a:schemeClr val="accent6"/>
+          </a:lnRef>
+          <a:fillRef idx="0">
+            <a:schemeClr val="accent6"/>
+          </a:fillRef>
+          <a:effectRef idx="1">
+            <a:schemeClr val="accent6"/>
+          </a:effectRef>
+          <a:fontRef idx="minor">
+            <a:schemeClr val="tx1"/>
+          </a:fontRef>
+        </p:style>
+      </p:cxnSp>
       <p:sp>
         <p:nvSpPr>
           <p:cNvPr id="175" name="Rectangle 174"/>
@@ -4136,7 +4463,7 @@
         </p:nvSpPr>
         <p:spPr>
           <a:xfrm>
-            <a:off x="2792675" y="4000772"/>
+            <a:off x="2362200" y="4000772"/>
             <a:ext cx="1585823" cy="361770"/>
           </a:xfrm>
           <a:prstGeom prst="rect">
@@ -4174,130 +4501,16 @@
       </p:sp>
       <p:sp>
         <p:nvSpPr>
-          <p:cNvPr id="176" name="Isosceles Triangle 175"/>
+          <p:cNvPr id="37" name="Isosceles Triangle 36"/>
           <p:cNvSpPr/>
           <p:nvPr/>
         </p:nvSpPr>
         <p:spPr>
           <a:xfrm>
-            <a:off x="6400442" y="2917887"/>
+            <a:off x="4676775" y="2965450"/>
             <a:ext cx="276225" cy="228600"/>
           </a:xfrm>
           <a:prstGeom prst="triangle">
-            <a:avLst/>
-          </a:prstGeom>
-        </p:spPr>
-        <p:style>
-          <a:lnRef idx="2">
-            <a:schemeClr val="accent4">
-              <a:shade val="50000"/>
-            </a:schemeClr>
-          </a:lnRef>
-          <a:fillRef idx="1">
-            <a:schemeClr val="accent4"/>
-          </a:fillRef>
-          <a:effectRef idx="0">
-            <a:schemeClr val="accent4"/>
-          </a:effectRef>
-          <a:fontRef idx="minor">
-            <a:schemeClr val="lt1"/>
-          </a:fontRef>
-        </p:style>
-        <p:txBody>
-          <a:bodyPr rtlCol="0" anchor="ctr"/>
-          <a:lstStyle/>
-          <a:p>
-            <a:pPr algn="ctr"/>
-            <a:endParaRPr lang="en-SG"/>
-          </a:p>
-        </p:txBody>
-      </p:sp>
-      <p:cxnSp>
-        <p:nvCxnSpPr>
-          <p:cNvPr id="177" name="Elbow Connector 176"/>
-          <p:cNvCxnSpPr>
-            <a:stCxn id="176" idx="3"/>
-            <a:endCxn id="172" idx="0"/>
-          </p:cNvCxnSpPr>
-          <p:nvPr/>
-        </p:nvCxnSpPr>
-        <p:spPr>
-          <a:xfrm rot="5400000">
-            <a:off x="5652864" y="2641796"/>
-            <a:ext cx="381000" cy="1390382"/>
-          </a:xfrm>
-          <a:prstGeom prst="bentConnector3">
-            <a:avLst>
-              <a:gd name="adj1" fmla="val 25065"/>
-            </a:avLst>
-          </a:prstGeom>
-        </p:spPr>
-        <p:style>
-          <a:lnRef idx="2">
-            <a:schemeClr val="accent4">
-              <a:shade val="50000"/>
-            </a:schemeClr>
-          </a:lnRef>
-          <a:fillRef idx="1">
-            <a:schemeClr val="accent4"/>
-          </a:fillRef>
-          <a:effectRef idx="0">
-            <a:schemeClr val="accent4"/>
-          </a:effectRef>
-          <a:fontRef idx="minor">
-            <a:schemeClr val="lt1"/>
-          </a:fontRef>
-        </p:style>
-      </p:cxnSp>
-      <p:cxnSp>
-        <p:nvCxnSpPr>
-          <p:cNvPr id="178" name="Elbow Connector 177"/>
-          <p:cNvCxnSpPr>
-            <a:stCxn id="173" idx="0"/>
-            <a:endCxn id="176" idx="3"/>
-          </p:cNvCxnSpPr>
-          <p:nvPr/>
-        </p:nvCxnSpPr>
-        <p:spPr>
-          <a:xfrm rot="5400000" flipH="1" flipV="1">
-            <a:off x="6345579" y="3337127"/>
-            <a:ext cx="383615" cy="2337"/>
-          </a:xfrm>
-          <a:prstGeom prst="bentConnector3">
-            <a:avLst>
-              <a:gd name="adj1" fmla="val 50000"/>
-            </a:avLst>
-          </a:prstGeom>
-        </p:spPr>
-        <p:style>
-          <a:lnRef idx="2">
-            <a:schemeClr val="accent4">
-              <a:shade val="50000"/>
-            </a:schemeClr>
-          </a:lnRef>
-          <a:fillRef idx="1">
-            <a:schemeClr val="accent4"/>
-          </a:fillRef>
-          <a:effectRef idx="0">
-            <a:schemeClr val="accent4"/>
-          </a:effectRef>
-          <a:fontRef idx="minor">
-            <a:schemeClr val="lt1"/>
-          </a:fontRef>
-        </p:style>
-      </p:cxnSp>
-      <p:sp>
-        <p:nvSpPr>
-          <p:cNvPr id="179" name="Rectangle 178"/>
-          <p:cNvSpPr/>
-          <p:nvPr/>
-        </p:nvSpPr>
-        <p:spPr>
-          <a:xfrm>
-            <a:off x="2792675" y="3069547"/>
-            <a:ext cx="1585823" cy="361770"/>
-          </a:xfrm>
-          <a:prstGeom prst="rect">
             <a:avLst/>
           </a:prstGeom>
         </p:spPr>
@@ -4322,24 +4535,22 @@
           <a:lstStyle/>
           <a:p>
             <a:pPr algn="ctr"/>
-            <a:r>
-              <a:rPr lang="en-US" sz="1600" b="1" dirty="0" err="1" smtClean="0"/>
-              <a:t>CourseData</a:t>
-            </a:r>
-            <a:endParaRPr lang="en-SG" sz="1600" b="1" dirty="0"/>
-          </a:p>
-        </p:txBody>
-      </p:sp>
-      <p:sp>
-        <p:nvSpPr>
-          <p:cNvPr id="180" name="Rectangle 179"/>
-          <p:cNvSpPr/>
+            <a:endParaRPr lang="en-SG"/>
+          </a:p>
+        </p:txBody>
+      </p:sp>
+      <p:sp>
+        <p:nvSpPr>
+          <p:cNvPr id="172" name="Rectangle 171"/>
+          <p:cNvSpPr>
+            <a:spLocks/>
+          </p:cNvSpPr>
           <p:nvPr/>
         </p:nvSpPr>
         <p:spPr>
           <a:xfrm>
-            <a:off x="7405777" y="3527487"/>
-            <a:ext cx="1204823" cy="361770"/>
+            <a:off x="5324654" y="3551237"/>
+            <a:ext cx="1304746" cy="361770"/>
           </a:xfrm>
           <a:prstGeom prst="rect">
             <a:avLst/>
@@ -4347,15 +4558,15 @@
         </p:spPr>
         <p:style>
           <a:lnRef idx="2">
-            <a:schemeClr val="accent4">
+            <a:schemeClr val="accent6">
               <a:shade val="50000"/>
             </a:schemeClr>
           </a:lnRef>
           <a:fillRef idx="1">
-            <a:schemeClr val="accent4"/>
+            <a:schemeClr val="accent6"/>
           </a:fillRef>
           <a:effectRef idx="0">
-            <a:schemeClr val="accent4"/>
+            <a:schemeClr val="accent6"/>
           </a:effectRef>
           <a:fontRef idx="minor">
             <a:schemeClr val="lt1"/>
@@ -4368,7 +4579,7 @@
             <a:pPr algn="ctr"/>
             <a:r>
               <a:rPr lang="en-US" sz="1600" b="1" dirty="0" err="1" smtClean="0"/>
-              <a:t>AdminData</a:t>
+              <a:t>StudentData</a:t>
             </a:r>
             <a:endParaRPr lang="en-SG" sz="1600" b="1" dirty="0"/>
           </a:p>
@@ -4376,72 +4587,65 @@
       </p:sp>
       <p:cxnSp>
         <p:nvCxnSpPr>
-          <p:cNvPr id="181" name="Elbow Connector 180"/>
-          <p:cNvCxnSpPr>
-            <a:stCxn id="180" idx="0"/>
-            <a:endCxn id="176" idx="3"/>
-          </p:cNvCxnSpPr>
+          <p:cNvPr id="108" name="Elbow Connector 68"/>
+          <p:cNvCxnSpPr/>
           <p:nvPr/>
         </p:nvCxnSpPr>
         <p:spPr>
-          <a:xfrm rot="16200000" flipV="1">
-            <a:off x="7082872" y="2602170"/>
-            <a:ext cx="381000" cy="1469634"/>
-          </a:xfrm>
-          <a:prstGeom prst="bentConnector3">
-            <a:avLst>
-              <a:gd name="adj1" fmla="val 74935"/>
-            </a:avLst>
+          <a:xfrm flipV="1">
+            <a:off x="3810000" y="3322637"/>
+            <a:ext cx="0" cy="228600"/>
+          </a:xfrm>
+          <a:prstGeom prst="straightConnector1">
+            <a:avLst/>
           </a:prstGeom>
         </p:spPr>
         <p:style>
           <a:lnRef idx="2">
-            <a:schemeClr val="accent4">
+            <a:schemeClr val="accent6"/>
+          </a:lnRef>
+          <a:fillRef idx="0">
+            <a:schemeClr val="accent6"/>
+          </a:fillRef>
+          <a:effectRef idx="1">
+            <a:schemeClr val="accent6"/>
+          </a:effectRef>
+          <a:fontRef idx="minor">
+            <a:schemeClr val="tx1"/>
+          </a:fontRef>
+        </p:style>
+      </p:cxnSp>
+      <p:sp>
+        <p:nvSpPr>
+          <p:cNvPr id="179" name="Rectangle 178"/>
+          <p:cNvSpPr/>
+          <p:nvPr/>
+        </p:nvSpPr>
+        <p:spPr>
+          <a:xfrm>
+            <a:off x="2986177" y="3551237"/>
+            <a:ext cx="1585823" cy="361770"/>
+          </a:xfrm>
+          <a:prstGeom prst="rect">
+            <a:avLst/>
+          </a:prstGeom>
+        </p:spPr>
+        <p:style>
+          <a:lnRef idx="2">
+            <a:schemeClr val="accent6">
               <a:shade val="50000"/>
             </a:schemeClr>
           </a:lnRef>
           <a:fillRef idx="1">
-            <a:schemeClr val="accent4"/>
+            <a:schemeClr val="accent6"/>
           </a:fillRef>
           <a:effectRef idx="0">
-            <a:schemeClr val="accent4"/>
+            <a:schemeClr val="accent6"/>
           </a:effectRef>
           <a:fontRef idx="minor">
             <a:schemeClr val="lt1"/>
           </a:fontRef>
         </p:style>
-      </p:cxnSp>
-      <p:sp>
-        <p:nvSpPr>
-          <p:cNvPr id="182" name="Rectangle 181"/>
-          <p:cNvSpPr/>
-          <p:nvPr/>
-        </p:nvSpPr>
-        <p:spPr>
-          <a:xfrm>
-            <a:off x="569025" y="3053892"/>
-            <a:ext cx="1524000" cy="361770"/>
-          </a:xfrm>
-          <a:prstGeom prst="rect">
-            <a:avLst/>
-          </a:prstGeom>
-        </p:spPr>
-        <p:style>
-          <a:lnRef idx="2">
-            <a:schemeClr val="accent5">
-              <a:shade val="50000"/>
-            </a:schemeClr>
-          </a:lnRef>
-          <a:fillRef idx="1">
-            <a:schemeClr val="accent5"/>
-          </a:fillRef>
-          <a:effectRef idx="0">
-            <a:schemeClr val="accent5"/>
-          </a:effectRef>
-          <a:fontRef idx="minor">
-            <a:schemeClr val="lt1"/>
-          </a:fontRef>
-        </p:style>
         <p:txBody>
           <a:bodyPr rtlCol="0" anchor="ctr"/>
           <a:lstStyle/>
@@ -4449,139 +4653,7 @@
             <a:pPr algn="ctr"/>
             <a:r>
               <a:rPr lang="en-US" sz="1600" b="1" dirty="0" err="1" smtClean="0"/>
-              <a:t>TeamData</a:t>
-            </a:r>
-            <a:endParaRPr lang="en-SG" sz="1600" b="1" dirty="0"/>
-          </a:p>
-        </p:txBody>
-      </p:sp>
-      <p:sp>
-        <p:nvSpPr>
-          <p:cNvPr id="183" name="Rectangle 182"/>
-          <p:cNvSpPr/>
-          <p:nvPr/>
-        </p:nvSpPr>
-        <p:spPr>
-          <a:xfrm>
-            <a:off x="569025" y="3549192"/>
-            <a:ext cx="1524000" cy="361770"/>
-          </a:xfrm>
-          <a:prstGeom prst="rect">
-            <a:avLst/>
-          </a:prstGeom>
-        </p:spPr>
-        <p:style>
-          <a:lnRef idx="2">
-            <a:schemeClr val="accent5">
-              <a:shade val="50000"/>
-            </a:schemeClr>
-          </a:lnRef>
-          <a:fillRef idx="1">
-            <a:schemeClr val="accent5"/>
-          </a:fillRef>
-          <a:effectRef idx="0">
-            <a:schemeClr val="accent5"/>
-          </a:effectRef>
-          <a:fontRef idx="minor">
-            <a:schemeClr val="lt1"/>
-          </a:fontRef>
-        </p:style>
-        <p:txBody>
-          <a:bodyPr rtlCol="0" anchor="ctr"/>
-          <a:lstStyle/>
-          <a:p>
-            <a:pPr algn="ctr"/>
-            <a:r>
-              <a:rPr lang="en-US" sz="1600" b="1" dirty="0" err="1" smtClean="0"/>
-              <a:t>EvalResultData</a:t>
-            </a:r>
-            <a:endParaRPr lang="en-SG" sz="1600" b="1" dirty="0"/>
-          </a:p>
-        </p:txBody>
-      </p:sp>
-      <p:sp>
-        <p:nvSpPr>
-          <p:cNvPr id="184" name="Rectangle 183"/>
-          <p:cNvSpPr/>
-          <p:nvPr/>
-        </p:nvSpPr>
-        <p:spPr>
-          <a:xfrm>
-            <a:off x="569025" y="4044492"/>
-            <a:ext cx="1524000" cy="361770"/>
-          </a:xfrm>
-          <a:prstGeom prst="rect">
-            <a:avLst/>
-          </a:prstGeom>
-        </p:spPr>
-        <p:style>
-          <a:lnRef idx="2">
-            <a:schemeClr val="accent5">
-              <a:shade val="50000"/>
-            </a:schemeClr>
-          </a:lnRef>
-          <a:fillRef idx="1">
-            <a:schemeClr val="accent5"/>
-          </a:fillRef>
-          <a:effectRef idx="0">
-            <a:schemeClr val="accent5"/>
-          </a:effectRef>
-          <a:fontRef idx="minor">
-            <a:schemeClr val="lt1"/>
-          </a:fontRef>
-        </p:style>
-        <p:txBody>
-          <a:bodyPr rtlCol="0" anchor="ctr"/>
-          <a:lstStyle/>
-          <a:p>
-            <a:pPr algn="ctr"/>
-            <a:r>
-              <a:rPr lang="en-US" sz="1600" b="1" dirty="0" err="1" smtClean="0"/>
-              <a:t>DataBundle</a:t>
-            </a:r>
-            <a:endParaRPr lang="en-SG" sz="1600" b="1" dirty="0"/>
-          </a:p>
-        </p:txBody>
-      </p:sp>
-      <p:sp>
-        <p:nvSpPr>
-          <p:cNvPr id="35" name="Rectangle 34"/>
-          <p:cNvSpPr/>
-          <p:nvPr/>
-        </p:nvSpPr>
-        <p:spPr>
-          <a:xfrm>
-            <a:off x="762000" y="1570037"/>
-            <a:ext cx="1524000" cy="457200"/>
-          </a:xfrm>
-          <a:prstGeom prst="rect">
-            <a:avLst/>
-          </a:prstGeom>
-        </p:spPr>
-        <p:style>
-          <a:lnRef idx="2">
-            <a:schemeClr val="accent3">
-              <a:shade val="50000"/>
-            </a:schemeClr>
-          </a:lnRef>
-          <a:fillRef idx="1">
-            <a:schemeClr val="accent3"/>
-          </a:fillRef>
-          <a:effectRef idx="0">
-            <a:schemeClr val="accent3"/>
-          </a:effectRef>
-          <a:fontRef idx="minor">
-            <a:schemeClr val="lt1"/>
-          </a:fontRef>
-        </p:style>
-        <p:txBody>
-          <a:bodyPr rtlCol="0" anchor="ctr"/>
-          <a:lstStyle/>
-          <a:p>
-            <a:pPr algn="ctr"/>
-            <a:r>
-              <a:rPr lang="en-US" sz="1600" b="1" dirty="0" err="1" smtClean="0"/>
-              <a:t>BuildProperties</a:t>
+              <a:t>CourseData</a:t>
             </a:r>
             <a:endParaRPr lang="en-SG" sz="1600" b="1" dirty="0"/>
           </a:p>

</xml_diff>

<commit_message>
merged default update Issue 363
</commit_message>
<xml_diff>
--- a/doc/diagrams/CommonComponent.pptx
+++ b/doc/diagrams/CommonComponent.pptx
@@ -289,7 +289,7 @@
             <a:fld id="{1D8BD707-D9CF-40AE-B4C6-C98DA3205C09}" type="datetimeFigureOut">
               <a:rPr lang="en-US" smtClean="0"/>
               <a:pPr/>
-              <a:t>14/8/12</a:t>
+              <a:t>27/10/12</a:t>
             </a:fld>
             <a:endParaRPr lang="en-US"/>
           </a:p>
@@ -456,7 +456,7 @@
             <a:fld id="{1D8BD707-D9CF-40AE-B4C6-C98DA3205C09}" type="datetimeFigureOut">
               <a:rPr lang="en-US" smtClean="0"/>
               <a:pPr/>
-              <a:t>14/8/12</a:t>
+              <a:t>27/10/12</a:t>
             </a:fld>
             <a:endParaRPr lang="en-US"/>
           </a:p>
@@ -633,7 +633,7 @@
             <a:fld id="{1D8BD707-D9CF-40AE-B4C6-C98DA3205C09}" type="datetimeFigureOut">
               <a:rPr lang="en-US" smtClean="0"/>
               <a:pPr/>
-              <a:t>14/8/12</a:t>
+              <a:t>27/10/12</a:t>
             </a:fld>
             <a:endParaRPr lang="en-US"/>
           </a:p>
@@ -800,7 +800,7 @@
             <a:fld id="{1D8BD707-D9CF-40AE-B4C6-C98DA3205C09}" type="datetimeFigureOut">
               <a:rPr lang="en-US" smtClean="0"/>
               <a:pPr/>
-              <a:t>14/8/12</a:t>
+              <a:t>27/10/12</a:t>
             </a:fld>
             <a:endParaRPr lang="en-US"/>
           </a:p>
@@ -1043,7 +1043,7 @@
             <a:fld id="{1D8BD707-D9CF-40AE-B4C6-C98DA3205C09}" type="datetimeFigureOut">
               <a:rPr lang="en-US" smtClean="0"/>
               <a:pPr/>
-              <a:t>14/8/12</a:t>
+              <a:t>27/10/12</a:t>
             </a:fld>
             <a:endParaRPr lang="en-US"/>
           </a:p>
@@ -1328,7 +1328,7 @@
             <a:fld id="{1D8BD707-D9CF-40AE-B4C6-C98DA3205C09}" type="datetimeFigureOut">
               <a:rPr lang="en-US" smtClean="0"/>
               <a:pPr/>
-              <a:t>14/8/12</a:t>
+              <a:t>27/10/12</a:t>
             </a:fld>
             <a:endParaRPr lang="en-US"/>
           </a:p>
@@ -1747,7 +1747,7 @@
             <a:fld id="{1D8BD707-D9CF-40AE-B4C6-C98DA3205C09}" type="datetimeFigureOut">
               <a:rPr lang="en-US" smtClean="0"/>
               <a:pPr/>
-              <a:t>14/8/12</a:t>
+              <a:t>27/10/12</a:t>
             </a:fld>
             <a:endParaRPr lang="en-US"/>
           </a:p>
@@ -1862,7 +1862,7 @@
             <a:fld id="{1D8BD707-D9CF-40AE-B4C6-C98DA3205C09}" type="datetimeFigureOut">
               <a:rPr lang="en-US" smtClean="0"/>
               <a:pPr/>
-              <a:t>14/8/12</a:t>
+              <a:t>27/10/12</a:t>
             </a:fld>
             <a:endParaRPr lang="en-US"/>
           </a:p>
@@ -1954,7 +1954,7 @@
             <a:fld id="{1D8BD707-D9CF-40AE-B4C6-C98DA3205C09}" type="datetimeFigureOut">
               <a:rPr lang="en-US" smtClean="0"/>
               <a:pPr/>
-              <a:t>14/8/12</a:t>
+              <a:t>27/10/12</a:t>
             </a:fld>
             <a:endParaRPr lang="en-US"/>
           </a:p>
@@ -2228,7 +2228,7 @@
             <a:fld id="{1D8BD707-D9CF-40AE-B4C6-C98DA3205C09}" type="datetimeFigureOut">
               <a:rPr lang="en-US" smtClean="0"/>
               <a:pPr/>
-              <a:t>14/8/12</a:t>
+              <a:t>27/10/12</a:t>
             </a:fld>
             <a:endParaRPr lang="en-US"/>
           </a:p>
@@ -2478,7 +2478,7 @@
             <a:fld id="{1D8BD707-D9CF-40AE-B4C6-C98DA3205C09}" type="datetimeFigureOut">
               <a:rPr lang="en-US" smtClean="0"/>
               <a:pPr/>
-              <a:t>14/8/12</a:t>
+              <a:t>27/10/12</a:t>
             </a:fld>
             <a:endParaRPr lang="en-US"/>
           </a:p>
@@ -2688,7 +2688,7 @@
             <a:fld id="{1D8BD707-D9CF-40AE-B4C6-C98DA3205C09}" type="datetimeFigureOut">
               <a:rPr lang="en-US" smtClean="0"/>
               <a:pPr/>
-              <a:t>14/8/12</a:t>
+              <a:t>27/10/12</a:t>
             </a:fld>
             <a:endParaRPr lang="en-US"/>
           </a:p>
@@ -3127,7 +3127,7 @@
         <p:grpSpPr>
           <a:xfrm>
             <a:off x="381000" y="2179637"/>
-            <a:ext cx="8305800" cy="2514601"/>
+            <a:ext cx="8305800" cy="2514600"/>
             <a:chOff x="-7162800" y="1371600"/>
             <a:chExt cx="8305800" cy="2357438"/>
           </a:xfrm>
@@ -3266,14 +3266,14 @@
       </p:grpSp>
       <p:sp>
         <p:nvSpPr>
-          <p:cNvPr id="156" name="Rounded Rectangle 155"/>
+          <p:cNvPr id="157" name="Rounded Rectangle 156"/>
           <p:cNvSpPr/>
           <p:nvPr/>
         </p:nvSpPr>
         <p:spPr>
           <a:xfrm>
-            <a:off x="4419600" y="3327587"/>
-            <a:ext cx="2819400" cy="762000"/>
+            <a:off x="2209800" y="2484437"/>
+            <a:ext cx="4953000" cy="2057400"/>
           </a:xfrm>
           <a:prstGeom prst="roundRect">
             <a:avLst>
@@ -3315,57 +3315,6 @@
           </a:p>
         </p:txBody>
       </p:sp>
-      <p:sp>
-        <p:nvSpPr>
-          <p:cNvPr id="157" name="Rounded Rectangle 156"/>
-          <p:cNvSpPr/>
-          <p:nvPr/>
-        </p:nvSpPr>
-        <p:spPr>
-          <a:xfrm>
-            <a:off x="2514600" y="2789237"/>
-            <a:ext cx="2133600" cy="1752600"/>
-          </a:xfrm>
-          <a:prstGeom prst="roundRect">
-            <a:avLst>
-              <a:gd name="adj" fmla="val 9891"/>
-            </a:avLst>
-          </a:prstGeom>
-          <a:solidFill>
-            <a:schemeClr val="accent6">
-              <a:lumMod val="40000"/>
-              <a:lumOff val="60000"/>
-            </a:schemeClr>
-          </a:solidFill>
-          <a:ln>
-            <a:noFill/>
-          </a:ln>
-        </p:spPr>
-        <p:style>
-          <a:lnRef idx="2">
-            <a:schemeClr val="accent1">
-              <a:shade val="50000"/>
-            </a:schemeClr>
-          </a:lnRef>
-          <a:fillRef idx="1">
-            <a:schemeClr val="accent1"/>
-          </a:fillRef>
-          <a:effectRef idx="0">
-            <a:schemeClr val="accent1"/>
-          </a:effectRef>
-          <a:fontRef idx="minor">
-            <a:schemeClr val="lt1"/>
-          </a:fontRef>
-        </p:style>
-        <p:txBody>
-          <a:bodyPr rtlCol="0" anchor="ctr"/>
-          <a:lstStyle/>
-          <a:p>
-            <a:pPr algn="ctr"/>
-            <a:endParaRPr lang="en-US"/>
-          </a:p>
-        </p:txBody>
-      </p:sp>
       <p:grpSp>
         <p:nvGrpSpPr>
           <p:cNvPr id="158" name="Group 157"/>
@@ -3375,7 +3324,7 @@
         <p:grpSpPr>
           <a:xfrm>
             <a:off x="457200" y="427037"/>
-            <a:ext cx="2057400" cy="1676400"/>
+            <a:ext cx="2209800" cy="1828800"/>
             <a:chOff x="-838200" y="1371600"/>
             <a:chExt cx="1981200" cy="1295400"/>
           </a:xfrm>
@@ -3647,8 +3596,8 @@
         </p:nvSpPr>
         <p:spPr>
           <a:xfrm>
-            <a:off x="762000" y="960437"/>
-            <a:ext cx="1524000" cy="457200"/>
+            <a:off x="990600" y="960437"/>
+            <a:ext cx="1143000" cy="304800"/>
           </a:xfrm>
           <a:prstGeom prst="rect">
             <a:avLst/>
@@ -3960,7 +3909,7 @@
         </p:nvSpPr>
         <p:spPr>
           <a:xfrm>
-            <a:off x="5963941" y="2558609"/>
+            <a:off x="7349918" y="4103867"/>
             <a:ext cx="1184482" cy="361770"/>
           </a:xfrm>
           <a:prstGeom prst="rect">
@@ -3990,7 +3939,7 @@
             <a:pPr algn="ctr"/>
             <a:r>
               <a:rPr lang="en-US" sz="1600" b="1" dirty="0" err="1" smtClean="0"/>
-              <a:t>UserData</a:t>
+              <a:t>UserType</a:t>
             </a:r>
             <a:endParaRPr lang="en-SG" sz="1600" b="1" dirty="0"/>
           </a:p>
@@ -3998,14 +3947,14 @@
       </p:sp>
       <p:sp>
         <p:nvSpPr>
-          <p:cNvPr id="172" name="Rectangle 171"/>
+          <p:cNvPr id="173" name="Rectangle 172"/>
           <p:cNvSpPr/>
           <p:nvPr/>
         </p:nvSpPr>
         <p:spPr>
           <a:xfrm>
-            <a:off x="4495800" y="3527487"/>
-            <a:ext cx="1304746" cy="361770"/>
+            <a:off x="5881777" y="4027667"/>
+            <a:ext cx="1204823" cy="361770"/>
           </a:xfrm>
           <a:prstGeom prst="rect">
             <a:avLst/>
@@ -4034,7 +3983,7 @@
             <a:pPr algn="ctr"/>
             <a:r>
               <a:rPr lang="en-US" sz="1600" b="1" dirty="0" err="1" smtClean="0"/>
-              <a:t>StudentData</a:t>
+              <a:t>CoordData</a:t>
             </a:r>
             <a:endParaRPr lang="en-SG" sz="1600" b="1" dirty="0"/>
           </a:p>
@@ -4042,14 +3991,14 @@
       </p:sp>
       <p:sp>
         <p:nvSpPr>
-          <p:cNvPr id="173" name="Rectangle 172"/>
+          <p:cNvPr id="174" name="Rectangle 173"/>
           <p:cNvSpPr/>
           <p:nvPr/>
         </p:nvSpPr>
         <p:spPr>
           <a:xfrm>
-            <a:off x="5933806" y="3530102"/>
-            <a:ext cx="1204823" cy="361770"/>
+            <a:off x="4124593" y="4008437"/>
+            <a:ext cx="1590407" cy="361770"/>
           </a:xfrm>
           <a:prstGeom prst="rect">
             <a:avLst/>
@@ -4078,7 +4027,7 @@
             <a:pPr algn="ctr"/>
             <a:r>
               <a:rPr lang="en-US" sz="1600" b="1" dirty="0" err="1" smtClean="0"/>
-              <a:t>CoordData</a:t>
+              <a:t>EvaluationData</a:t>
             </a:r>
             <a:endParaRPr lang="en-SG" sz="1600" b="1" dirty="0"/>
           </a:p>
@@ -4086,14 +4035,234 @@
       </p:sp>
       <p:sp>
         <p:nvSpPr>
-          <p:cNvPr id="174" name="Rectangle 173"/>
+          <p:cNvPr id="182" name="Rectangle 181"/>
           <p:cNvSpPr/>
           <p:nvPr/>
         </p:nvSpPr>
         <p:spPr>
           <a:xfrm>
-            <a:off x="2792675" y="3526747"/>
-            <a:ext cx="1590407" cy="361770"/>
+            <a:off x="569025" y="3053892"/>
+            <a:ext cx="1524000" cy="361770"/>
+          </a:xfrm>
+          <a:prstGeom prst="rect">
+            <a:avLst/>
+          </a:prstGeom>
+        </p:spPr>
+        <p:style>
+          <a:lnRef idx="2">
+            <a:schemeClr val="accent5">
+              <a:shade val="50000"/>
+            </a:schemeClr>
+          </a:lnRef>
+          <a:fillRef idx="1">
+            <a:schemeClr val="accent5"/>
+          </a:fillRef>
+          <a:effectRef idx="0">
+            <a:schemeClr val="accent5"/>
+          </a:effectRef>
+          <a:fontRef idx="minor">
+            <a:schemeClr val="lt1"/>
+          </a:fontRef>
+        </p:style>
+        <p:txBody>
+          <a:bodyPr rtlCol="0" anchor="ctr"/>
+          <a:lstStyle/>
+          <a:p>
+            <a:pPr algn="ctr"/>
+            <a:r>
+              <a:rPr lang="en-US" sz="1600" b="1" dirty="0" err="1" smtClean="0"/>
+              <a:t>TeamData</a:t>
+            </a:r>
+            <a:endParaRPr lang="en-SG" sz="1600" b="1" dirty="0"/>
+          </a:p>
+        </p:txBody>
+      </p:sp>
+      <p:sp>
+        <p:nvSpPr>
+          <p:cNvPr id="183" name="Rectangle 182"/>
+          <p:cNvSpPr/>
+          <p:nvPr/>
+        </p:nvSpPr>
+        <p:spPr>
+          <a:xfrm>
+            <a:off x="569025" y="3549192"/>
+            <a:ext cx="1524000" cy="361770"/>
+          </a:xfrm>
+          <a:prstGeom prst="rect">
+            <a:avLst/>
+          </a:prstGeom>
+        </p:spPr>
+        <p:style>
+          <a:lnRef idx="2">
+            <a:schemeClr val="accent5">
+              <a:shade val="50000"/>
+            </a:schemeClr>
+          </a:lnRef>
+          <a:fillRef idx="1">
+            <a:schemeClr val="accent5"/>
+          </a:fillRef>
+          <a:effectRef idx="0">
+            <a:schemeClr val="accent5"/>
+          </a:effectRef>
+          <a:fontRef idx="minor">
+            <a:schemeClr val="lt1"/>
+          </a:fontRef>
+        </p:style>
+        <p:txBody>
+          <a:bodyPr rtlCol="0" anchor="ctr"/>
+          <a:lstStyle/>
+          <a:p>
+            <a:pPr algn="ctr"/>
+            <a:r>
+              <a:rPr lang="en-US" sz="1600" b="1" dirty="0" err="1" smtClean="0"/>
+              <a:t>EvalResultData</a:t>
+            </a:r>
+            <a:endParaRPr lang="en-SG" sz="1600" b="1" dirty="0"/>
+          </a:p>
+        </p:txBody>
+      </p:sp>
+      <p:sp>
+        <p:nvSpPr>
+          <p:cNvPr id="184" name="Rectangle 183"/>
+          <p:cNvSpPr/>
+          <p:nvPr/>
+        </p:nvSpPr>
+        <p:spPr>
+          <a:xfrm>
+            <a:off x="569025" y="4044492"/>
+            <a:ext cx="1524000" cy="361770"/>
+          </a:xfrm>
+          <a:prstGeom prst="rect">
+            <a:avLst/>
+          </a:prstGeom>
+        </p:spPr>
+        <p:style>
+          <a:lnRef idx="2">
+            <a:schemeClr val="accent5">
+              <a:shade val="50000"/>
+            </a:schemeClr>
+          </a:lnRef>
+          <a:fillRef idx="1">
+            <a:schemeClr val="accent5"/>
+          </a:fillRef>
+          <a:effectRef idx="0">
+            <a:schemeClr val="accent5"/>
+          </a:effectRef>
+          <a:fontRef idx="minor">
+            <a:schemeClr val="lt1"/>
+          </a:fontRef>
+        </p:style>
+        <p:txBody>
+          <a:bodyPr rtlCol="0" anchor="ctr"/>
+          <a:lstStyle/>
+          <a:p>
+            <a:pPr algn="ctr"/>
+            <a:r>
+              <a:rPr lang="en-US" sz="1600" b="1" dirty="0" err="1" smtClean="0"/>
+              <a:t>DataBundle</a:t>
+            </a:r>
+            <a:endParaRPr lang="en-SG" sz="1600" b="1" dirty="0"/>
+          </a:p>
+        </p:txBody>
+      </p:sp>
+      <p:sp>
+        <p:nvSpPr>
+          <p:cNvPr id="35" name="Rectangle 34"/>
+          <p:cNvSpPr/>
+          <p:nvPr/>
+        </p:nvSpPr>
+        <p:spPr>
+          <a:xfrm>
+            <a:off x="762000" y="1341437"/>
+            <a:ext cx="1600200" cy="304800"/>
+          </a:xfrm>
+          <a:prstGeom prst="rect">
+            <a:avLst/>
+          </a:prstGeom>
+        </p:spPr>
+        <p:style>
+          <a:lnRef idx="2">
+            <a:schemeClr val="accent3">
+              <a:shade val="50000"/>
+            </a:schemeClr>
+          </a:lnRef>
+          <a:fillRef idx="1">
+            <a:schemeClr val="accent3"/>
+          </a:fillRef>
+          <a:effectRef idx="0">
+            <a:schemeClr val="accent3"/>
+          </a:effectRef>
+          <a:fontRef idx="minor">
+            <a:schemeClr val="lt1"/>
+          </a:fontRef>
+        </p:style>
+        <p:txBody>
+          <a:bodyPr rtlCol="0" anchor="ctr"/>
+          <a:lstStyle/>
+          <a:p>
+            <a:pPr algn="ctr"/>
+            <a:r>
+              <a:rPr lang="en-US" sz="1600" b="1" dirty="0" err="1" smtClean="0"/>
+              <a:t>BuildProperties</a:t>
+            </a:r>
+            <a:endParaRPr lang="en-SG" sz="1600" b="1" dirty="0"/>
+          </a:p>
+        </p:txBody>
+      </p:sp>
+      <p:sp>
+        <p:nvSpPr>
+          <p:cNvPr id="36" name="Rectangle 35"/>
+          <p:cNvSpPr/>
+          <p:nvPr/>
+        </p:nvSpPr>
+        <p:spPr>
+          <a:xfrm>
+            <a:off x="762000" y="1722437"/>
+            <a:ext cx="1600200" cy="304800"/>
+          </a:xfrm>
+          <a:prstGeom prst="rect">
+            <a:avLst/>
+          </a:prstGeom>
+        </p:spPr>
+        <p:style>
+          <a:lnRef idx="2">
+            <a:schemeClr val="accent3">
+              <a:shade val="50000"/>
+            </a:schemeClr>
+          </a:lnRef>
+          <a:fillRef idx="1">
+            <a:schemeClr val="accent3"/>
+          </a:fillRef>
+          <a:effectRef idx="0">
+            <a:schemeClr val="accent3"/>
+          </a:effectRef>
+          <a:fontRef idx="minor">
+            <a:schemeClr val="lt1"/>
+          </a:fontRef>
+        </p:style>
+        <p:txBody>
+          <a:bodyPr rtlCol="0" anchor="ctr"/>
+          <a:lstStyle/>
+          <a:p>
+            <a:pPr algn="ctr"/>
+            <a:r>
+              <a:rPr lang="en-US" sz="1600" b="1" dirty="0" smtClean="0"/>
+              <a:t>Assumption</a:t>
+            </a:r>
+            <a:endParaRPr lang="en-SG" sz="1600" b="1" dirty="0"/>
+          </a:p>
+        </p:txBody>
+      </p:sp>
+      <p:sp>
+        <p:nvSpPr>
+          <p:cNvPr id="38" name="Rectangle 37"/>
+          <p:cNvSpPr/>
+          <p:nvPr/>
+        </p:nvSpPr>
+        <p:spPr>
+          <a:xfrm>
+            <a:off x="4052977" y="2579867"/>
+            <a:ext cx="1585823" cy="361770"/>
           </a:xfrm>
           <a:prstGeom prst="rect">
             <a:avLst/>
@@ -4122,12 +4291,170 @@
             <a:pPr algn="ctr"/>
             <a:r>
               <a:rPr lang="en-US" sz="1600" b="1" dirty="0" err="1" smtClean="0"/>
-              <a:t>EvaluationData</a:t>
+              <a:t>BaseData</a:t>
             </a:r>
             <a:endParaRPr lang="en-SG" sz="1600" b="1" dirty="0"/>
           </a:p>
         </p:txBody>
       </p:sp>
+      <p:cxnSp>
+        <p:nvCxnSpPr>
+          <p:cNvPr id="39" name="Elbow Connector 38"/>
+          <p:cNvCxnSpPr/>
+          <p:nvPr/>
+        </p:nvCxnSpPr>
+        <p:spPr>
+          <a:xfrm>
+            <a:off x="2667002" y="3322637"/>
+            <a:ext cx="4190999" cy="1"/>
+          </a:xfrm>
+          <a:prstGeom prst="bentConnector3">
+            <a:avLst>
+              <a:gd name="adj1" fmla="val 50000"/>
+            </a:avLst>
+          </a:prstGeom>
+          <a:ln>
+            <a:headEnd type="none" w="med" len="med"/>
+            <a:tailEnd type="none" w="med" len="med"/>
+          </a:ln>
+        </p:spPr>
+        <p:style>
+          <a:lnRef idx="2">
+            <a:schemeClr val="accent6"/>
+          </a:lnRef>
+          <a:fillRef idx="0">
+            <a:schemeClr val="accent6"/>
+          </a:fillRef>
+          <a:effectRef idx="1">
+            <a:schemeClr val="accent6"/>
+          </a:effectRef>
+          <a:fontRef idx="minor">
+            <a:schemeClr val="tx1"/>
+          </a:fontRef>
+        </p:style>
+      </p:cxnSp>
+      <p:cxnSp>
+        <p:nvCxnSpPr>
+          <p:cNvPr id="69" name="Elbow Connector 68"/>
+          <p:cNvCxnSpPr>
+            <a:endCxn id="37" idx="3"/>
+          </p:cNvCxnSpPr>
+          <p:nvPr/>
+        </p:nvCxnSpPr>
+        <p:spPr>
+          <a:xfrm flipV="1">
+            <a:off x="4800600" y="3194050"/>
+            <a:ext cx="14288" cy="814387"/>
+          </a:xfrm>
+          <a:prstGeom prst="straightConnector1">
+            <a:avLst/>
+          </a:prstGeom>
+        </p:spPr>
+        <p:style>
+          <a:lnRef idx="2">
+            <a:schemeClr val="accent6"/>
+          </a:lnRef>
+          <a:fillRef idx="0">
+            <a:schemeClr val="accent6"/>
+          </a:fillRef>
+          <a:effectRef idx="1">
+            <a:schemeClr val="accent6"/>
+          </a:effectRef>
+          <a:fontRef idx="minor">
+            <a:schemeClr val="tx1"/>
+          </a:fontRef>
+        </p:style>
+      </p:cxnSp>
+      <p:cxnSp>
+        <p:nvCxnSpPr>
+          <p:cNvPr id="99" name="Elbow Connector 68"/>
+          <p:cNvCxnSpPr/>
+          <p:nvPr/>
+        </p:nvCxnSpPr>
+        <p:spPr>
+          <a:xfrm flipV="1">
+            <a:off x="6172200" y="3322637"/>
+            <a:ext cx="0" cy="228600"/>
+          </a:xfrm>
+          <a:prstGeom prst="straightConnector1">
+            <a:avLst/>
+          </a:prstGeom>
+        </p:spPr>
+        <p:style>
+          <a:lnRef idx="2">
+            <a:schemeClr val="accent6"/>
+          </a:lnRef>
+          <a:fillRef idx="0">
+            <a:schemeClr val="accent6"/>
+          </a:fillRef>
+          <a:effectRef idx="1">
+            <a:schemeClr val="accent6"/>
+          </a:effectRef>
+          <a:fontRef idx="minor">
+            <a:schemeClr val="tx1"/>
+          </a:fontRef>
+        </p:style>
+      </p:cxnSp>
+      <p:cxnSp>
+        <p:nvCxnSpPr>
+          <p:cNvPr id="102" name="Elbow Connector 68"/>
+          <p:cNvCxnSpPr/>
+          <p:nvPr/>
+        </p:nvCxnSpPr>
+        <p:spPr>
+          <a:xfrm flipV="1">
+            <a:off x="6858000" y="3322637"/>
+            <a:ext cx="0" cy="685800"/>
+          </a:xfrm>
+          <a:prstGeom prst="straightConnector1">
+            <a:avLst/>
+          </a:prstGeom>
+        </p:spPr>
+        <p:style>
+          <a:lnRef idx="2">
+            <a:schemeClr val="accent6"/>
+          </a:lnRef>
+          <a:fillRef idx="0">
+            <a:schemeClr val="accent6"/>
+          </a:fillRef>
+          <a:effectRef idx="1">
+            <a:schemeClr val="accent6"/>
+          </a:effectRef>
+          <a:fontRef idx="minor">
+            <a:schemeClr val="tx1"/>
+          </a:fontRef>
+        </p:style>
+      </p:cxnSp>
+      <p:cxnSp>
+        <p:nvCxnSpPr>
+          <p:cNvPr id="105" name="Elbow Connector 68"/>
+          <p:cNvCxnSpPr/>
+          <p:nvPr/>
+        </p:nvCxnSpPr>
+        <p:spPr>
+          <a:xfrm flipV="1">
+            <a:off x="2667000" y="3322637"/>
+            <a:ext cx="0" cy="685800"/>
+          </a:xfrm>
+          <a:prstGeom prst="straightConnector1">
+            <a:avLst/>
+          </a:prstGeom>
+        </p:spPr>
+        <p:style>
+          <a:lnRef idx="2">
+            <a:schemeClr val="accent6"/>
+          </a:lnRef>
+          <a:fillRef idx="0">
+            <a:schemeClr val="accent6"/>
+          </a:fillRef>
+          <a:effectRef idx="1">
+            <a:schemeClr val="accent6"/>
+          </a:effectRef>
+          <a:fontRef idx="minor">
+            <a:schemeClr val="tx1"/>
+          </a:fontRef>
+        </p:style>
+      </p:cxnSp>
       <p:sp>
         <p:nvSpPr>
           <p:cNvPr id="175" name="Rectangle 174"/>
@@ -4136,7 +4463,7 @@
         </p:nvSpPr>
         <p:spPr>
           <a:xfrm>
-            <a:off x="2792675" y="4000772"/>
+            <a:off x="2362200" y="4000772"/>
             <a:ext cx="1585823" cy="361770"/>
           </a:xfrm>
           <a:prstGeom prst="rect">
@@ -4174,130 +4501,16 @@
       </p:sp>
       <p:sp>
         <p:nvSpPr>
-          <p:cNvPr id="176" name="Isosceles Triangle 175"/>
+          <p:cNvPr id="37" name="Isosceles Triangle 36"/>
           <p:cNvSpPr/>
           <p:nvPr/>
         </p:nvSpPr>
         <p:spPr>
           <a:xfrm>
-            <a:off x="6400442" y="2917887"/>
+            <a:off x="4676775" y="2965450"/>
             <a:ext cx="276225" cy="228600"/>
           </a:xfrm>
           <a:prstGeom prst="triangle">
-            <a:avLst/>
-          </a:prstGeom>
-        </p:spPr>
-        <p:style>
-          <a:lnRef idx="2">
-            <a:schemeClr val="accent4">
-              <a:shade val="50000"/>
-            </a:schemeClr>
-          </a:lnRef>
-          <a:fillRef idx="1">
-            <a:schemeClr val="accent4"/>
-          </a:fillRef>
-          <a:effectRef idx="0">
-            <a:schemeClr val="accent4"/>
-          </a:effectRef>
-          <a:fontRef idx="minor">
-            <a:schemeClr val="lt1"/>
-          </a:fontRef>
-        </p:style>
-        <p:txBody>
-          <a:bodyPr rtlCol="0" anchor="ctr"/>
-          <a:lstStyle/>
-          <a:p>
-            <a:pPr algn="ctr"/>
-            <a:endParaRPr lang="en-SG"/>
-          </a:p>
-        </p:txBody>
-      </p:sp>
-      <p:cxnSp>
-        <p:nvCxnSpPr>
-          <p:cNvPr id="177" name="Elbow Connector 176"/>
-          <p:cNvCxnSpPr>
-            <a:stCxn id="176" idx="3"/>
-            <a:endCxn id="172" idx="0"/>
-          </p:cNvCxnSpPr>
-          <p:nvPr/>
-        </p:nvCxnSpPr>
-        <p:spPr>
-          <a:xfrm rot="5400000">
-            <a:off x="5652864" y="2641796"/>
-            <a:ext cx="381000" cy="1390382"/>
-          </a:xfrm>
-          <a:prstGeom prst="bentConnector3">
-            <a:avLst>
-              <a:gd name="adj1" fmla="val 25065"/>
-            </a:avLst>
-          </a:prstGeom>
-        </p:spPr>
-        <p:style>
-          <a:lnRef idx="2">
-            <a:schemeClr val="accent4">
-              <a:shade val="50000"/>
-            </a:schemeClr>
-          </a:lnRef>
-          <a:fillRef idx="1">
-            <a:schemeClr val="accent4"/>
-          </a:fillRef>
-          <a:effectRef idx="0">
-            <a:schemeClr val="accent4"/>
-          </a:effectRef>
-          <a:fontRef idx="minor">
-            <a:schemeClr val="lt1"/>
-          </a:fontRef>
-        </p:style>
-      </p:cxnSp>
-      <p:cxnSp>
-        <p:nvCxnSpPr>
-          <p:cNvPr id="178" name="Elbow Connector 177"/>
-          <p:cNvCxnSpPr>
-            <a:stCxn id="173" idx="0"/>
-            <a:endCxn id="176" idx="3"/>
-          </p:cNvCxnSpPr>
-          <p:nvPr/>
-        </p:nvCxnSpPr>
-        <p:spPr>
-          <a:xfrm rot="5400000" flipH="1" flipV="1">
-            <a:off x="6345579" y="3337127"/>
-            <a:ext cx="383615" cy="2337"/>
-          </a:xfrm>
-          <a:prstGeom prst="bentConnector3">
-            <a:avLst>
-              <a:gd name="adj1" fmla="val 50000"/>
-            </a:avLst>
-          </a:prstGeom>
-        </p:spPr>
-        <p:style>
-          <a:lnRef idx="2">
-            <a:schemeClr val="accent4">
-              <a:shade val="50000"/>
-            </a:schemeClr>
-          </a:lnRef>
-          <a:fillRef idx="1">
-            <a:schemeClr val="accent4"/>
-          </a:fillRef>
-          <a:effectRef idx="0">
-            <a:schemeClr val="accent4"/>
-          </a:effectRef>
-          <a:fontRef idx="minor">
-            <a:schemeClr val="lt1"/>
-          </a:fontRef>
-        </p:style>
-      </p:cxnSp>
-      <p:sp>
-        <p:nvSpPr>
-          <p:cNvPr id="179" name="Rectangle 178"/>
-          <p:cNvSpPr/>
-          <p:nvPr/>
-        </p:nvSpPr>
-        <p:spPr>
-          <a:xfrm>
-            <a:off x="2792675" y="3069547"/>
-            <a:ext cx="1585823" cy="361770"/>
-          </a:xfrm>
-          <a:prstGeom prst="rect">
             <a:avLst/>
           </a:prstGeom>
         </p:spPr>
@@ -4322,24 +4535,22 @@
           <a:lstStyle/>
           <a:p>
             <a:pPr algn="ctr"/>
-            <a:r>
-              <a:rPr lang="en-US" sz="1600" b="1" dirty="0" err="1" smtClean="0"/>
-              <a:t>CourseData</a:t>
-            </a:r>
-            <a:endParaRPr lang="en-SG" sz="1600" b="1" dirty="0"/>
-          </a:p>
-        </p:txBody>
-      </p:sp>
-      <p:sp>
-        <p:nvSpPr>
-          <p:cNvPr id="180" name="Rectangle 179"/>
-          <p:cNvSpPr/>
+            <a:endParaRPr lang="en-SG"/>
+          </a:p>
+        </p:txBody>
+      </p:sp>
+      <p:sp>
+        <p:nvSpPr>
+          <p:cNvPr id="172" name="Rectangle 171"/>
+          <p:cNvSpPr>
+            <a:spLocks/>
+          </p:cNvSpPr>
           <p:nvPr/>
         </p:nvSpPr>
         <p:spPr>
           <a:xfrm>
-            <a:off x="7405777" y="3527487"/>
-            <a:ext cx="1204823" cy="361770"/>
+            <a:off x="5324654" y="3551237"/>
+            <a:ext cx="1304746" cy="361770"/>
           </a:xfrm>
           <a:prstGeom prst="rect">
             <a:avLst/>
@@ -4347,15 +4558,15 @@
         </p:spPr>
         <p:style>
           <a:lnRef idx="2">
-            <a:schemeClr val="accent4">
+            <a:schemeClr val="accent6">
               <a:shade val="50000"/>
             </a:schemeClr>
           </a:lnRef>
           <a:fillRef idx="1">
-            <a:schemeClr val="accent4"/>
+            <a:schemeClr val="accent6"/>
           </a:fillRef>
           <a:effectRef idx="0">
-            <a:schemeClr val="accent4"/>
+            <a:schemeClr val="accent6"/>
           </a:effectRef>
           <a:fontRef idx="minor">
             <a:schemeClr val="lt1"/>
@@ -4368,7 +4579,7 @@
             <a:pPr algn="ctr"/>
             <a:r>
               <a:rPr lang="en-US" sz="1600" b="1" dirty="0" err="1" smtClean="0"/>
-              <a:t>AdminData</a:t>
+              <a:t>StudentData</a:t>
             </a:r>
             <a:endParaRPr lang="en-SG" sz="1600" b="1" dirty="0"/>
           </a:p>
@@ -4376,72 +4587,65 @@
       </p:sp>
       <p:cxnSp>
         <p:nvCxnSpPr>
-          <p:cNvPr id="181" name="Elbow Connector 180"/>
-          <p:cNvCxnSpPr>
-            <a:stCxn id="180" idx="0"/>
-            <a:endCxn id="176" idx="3"/>
-          </p:cNvCxnSpPr>
+          <p:cNvPr id="108" name="Elbow Connector 68"/>
+          <p:cNvCxnSpPr/>
           <p:nvPr/>
         </p:nvCxnSpPr>
         <p:spPr>
-          <a:xfrm rot="16200000" flipV="1">
-            <a:off x="7082872" y="2602170"/>
-            <a:ext cx="381000" cy="1469634"/>
-          </a:xfrm>
-          <a:prstGeom prst="bentConnector3">
-            <a:avLst>
-              <a:gd name="adj1" fmla="val 74935"/>
-            </a:avLst>
+          <a:xfrm flipV="1">
+            <a:off x="3810000" y="3322637"/>
+            <a:ext cx="0" cy="228600"/>
+          </a:xfrm>
+          <a:prstGeom prst="straightConnector1">
+            <a:avLst/>
           </a:prstGeom>
         </p:spPr>
         <p:style>
           <a:lnRef idx="2">
-            <a:schemeClr val="accent4">
+            <a:schemeClr val="accent6"/>
+          </a:lnRef>
+          <a:fillRef idx="0">
+            <a:schemeClr val="accent6"/>
+          </a:fillRef>
+          <a:effectRef idx="1">
+            <a:schemeClr val="accent6"/>
+          </a:effectRef>
+          <a:fontRef idx="minor">
+            <a:schemeClr val="tx1"/>
+          </a:fontRef>
+        </p:style>
+      </p:cxnSp>
+      <p:sp>
+        <p:nvSpPr>
+          <p:cNvPr id="179" name="Rectangle 178"/>
+          <p:cNvSpPr/>
+          <p:nvPr/>
+        </p:nvSpPr>
+        <p:spPr>
+          <a:xfrm>
+            <a:off x="2986177" y="3551237"/>
+            <a:ext cx="1585823" cy="361770"/>
+          </a:xfrm>
+          <a:prstGeom prst="rect">
+            <a:avLst/>
+          </a:prstGeom>
+        </p:spPr>
+        <p:style>
+          <a:lnRef idx="2">
+            <a:schemeClr val="accent6">
               <a:shade val="50000"/>
             </a:schemeClr>
           </a:lnRef>
           <a:fillRef idx="1">
-            <a:schemeClr val="accent4"/>
+            <a:schemeClr val="accent6"/>
           </a:fillRef>
           <a:effectRef idx="0">
-            <a:schemeClr val="accent4"/>
+            <a:schemeClr val="accent6"/>
           </a:effectRef>
           <a:fontRef idx="minor">
             <a:schemeClr val="lt1"/>
           </a:fontRef>
         </p:style>
-      </p:cxnSp>
-      <p:sp>
-        <p:nvSpPr>
-          <p:cNvPr id="182" name="Rectangle 181"/>
-          <p:cNvSpPr/>
-          <p:nvPr/>
-        </p:nvSpPr>
-        <p:spPr>
-          <a:xfrm>
-            <a:off x="569025" y="3053892"/>
-            <a:ext cx="1524000" cy="361770"/>
-          </a:xfrm>
-          <a:prstGeom prst="rect">
-            <a:avLst/>
-          </a:prstGeom>
-        </p:spPr>
-        <p:style>
-          <a:lnRef idx="2">
-            <a:schemeClr val="accent5">
-              <a:shade val="50000"/>
-            </a:schemeClr>
-          </a:lnRef>
-          <a:fillRef idx="1">
-            <a:schemeClr val="accent5"/>
-          </a:fillRef>
-          <a:effectRef idx="0">
-            <a:schemeClr val="accent5"/>
-          </a:effectRef>
-          <a:fontRef idx="minor">
-            <a:schemeClr val="lt1"/>
-          </a:fontRef>
-        </p:style>
         <p:txBody>
           <a:bodyPr rtlCol="0" anchor="ctr"/>
           <a:lstStyle/>
@@ -4449,139 +4653,7 @@
             <a:pPr algn="ctr"/>
             <a:r>
               <a:rPr lang="en-US" sz="1600" b="1" dirty="0" err="1" smtClean="0"/>
-              <a:t>TeamData</a:t>
-            </a:r>
-            <a:endParaRPr lang="en-SG" sz="1600" b="1" dirty="0"/>
-          </a:p>
-        </p:txBody>
-      </p:sp>
-      <p:sp>
-        <p:nvSpPr>
-          <p:cNvPr id="183" name="Rectangle 182"/>
-          <p:cNvSpPr/>
-          <p:nvPr/>
-        </p:nvSpPr>
-        <p:spPr>
-          <a:xfrm>
-            <a:off x="569025" y="3549192"/>
-            <a:ext cx="1524000" cy="361770"/>
-          </a:xfrm>
-          <a:prstGeom prst="rect">
-            <a:avLst/>
-          </a:prstGeom>
-        </p:spPr>
-        <p:style>
-          <a:lnRef idx="2">
-            <a:schemeClr val="accent5">
-              <a:shade val="50000"/>
-            </a:schemeClr>
-          </a:lnRef>
-          <a:fillRef idx="1">
-            <a:schemeClr val="accent5"/>
-          </a:fillRef>
-          <a:effectRef idx="0">
-            <a:schemeClr val="accent5"/>
-          </a:effectRef>
-          <a:fontRef idx="minor">
-            <a:schemeClr val="lt1"/>
-          </a:fontRef>
-        </p:style>
-        <p:txBody>
-          <a:bodyPr rtlCol="0" anchor="ctr"/>
-          <a:lstStyle/>
-          <a:p>
-            <a:pPr algn="ctr"/>
-            <a:r>
-              <a:rPr lang="en-US" sz="1600" b="1" dirty="0" err="1" smtClean="0"/>
-              <a:t>EvalResultData</a:t>
-            </a:r>
-            <a:endParaRPr lang="en-SG" sz="1600" b="1" dirty="0"/>
-          </a:p>
-        </p:txBody>
-      </p:sp>
-      <p:sp>
-        <p:nvSpPr>
-          <p:cNvPr id="184" name="Rectangle 183"/>
-          <p:cNvSpPr/>
-          <p:nvPr/>
-        </p:nvSpPr>
-        <p:spPr>
-          <a:xfrm>
-            <a:off x="569025" y="4044492"/>
-            <a:ext cx="1524000" cy="361770"/>
-          </a:xfrm>
-          <a:prstGeom prst="rect">
-            <a:avLst/>
-          </a:prstGeom>
-        </p:spPr>
-        <p:style>
-          <a:lnRef idx="2">
-            <a:schemeClr val="accent5">
-              <a:shade val="50000"/>
-            </a:schemeClr>
-          </a:lnRef>
-          <a:fillRef idx="1">
-            <a:schemeClr val="accent5"/>
-          </a:fillRef>
-          <a:effectRef idx="0">
-            <a:schemeClr val="accent5"/>
-          </a:effectRef>
-          <a:fontRef idx="minor">
-            <a:schemeClr val="lt1"/>
-          </a:fontRef>
-        </p:style>
-        <p:txBody>
-          <a:bodyPr rtlCol="0" anchor="ctr"/>
-          <a:lstStyle/>
-          <a:p>
-            <a:pPr algn="ctr"/>
-            <a:r>
-              <a:rPr lang="en-US" sz="1600" b="1" dirty="0" err="1" smtClean="0"/>
-              <a:t>DataBundle</a:t>
-            </a:r>
-            <a:endParaRPr lang="en-SG" sz="1600" b="1" dirty="0"/>
-          </a:p>
-        </p:txBody>
-      </p:sp>
-      <p:sp>
-        <p:nvSpPr>
-          <p:cNvPr id="35" name="Rectangle 34"/>
-          <p:cNvSpPr/>
-          <p:nvPr/>
-        </p:nvSpPr>
-        <p:spPr>
-          <a:xfrm>
-            <a:off x="762000" y="1570037"/>
-            <a:ext cx="1524000" cy="457200"/>
-          </a:xfrm>
-          <a:prstGeom prst="rect">
-            <a:avLst/>
-          </a:prstGeom>
-        </p:spPr>
-        <p:style>
-          <a:lnRef idx="2">
-            <a:schemeClr val="accent3">
-              <a:shade val="50000"/>
-            </a:schemeClr>
-          </a:lnRef>
-          <a:fillRef idx="1">
-            <a:schemeClr val="accent3"/>
-          </a:fillRef>
-          <a:effectRef idx="0">
-            <a:schemeClr val="accent3"/>
-          </a:effectRef>
-          <a:fontRef idx="minor">
-            <a:schemeClr val="lt1"/>
-          </a:fontRef>
-        </p:style>
-        <p:txBody>
-          <a:bodyPr rtlCol="0" anchor="ctr"/>
-          <a:lstStyle/>
-          <a:p>
-            <a:pPr algn="ctr"/>
-            <a:r>
-              <a:rPr lang="en-US" sz="1600" b="1" dirty="0" err="1" smtClean="0"/>
-              <a:t>BuildProperties</a:t>
+              <a:t>CourseData</a:t>
             </a:r>
             <a:endParaRPr lang="en-SG" sz="1600" b="1" dirty="0"/>
           </a:p>

</xml_diff>

<commit_message>
Update Issue 316: Merge default & added <noscript> tag to login.jsp
</commit_message>
<xml_diff>
--- a/doc/diagrams/CommonComponent.pptx
+++ b/doc/diagrams/CommonComponent.pptx
@@ -289,7 +289,7 @@
             <a:fld id="{1D8BD707-D9CF-40AE-B4C6-C98DA3205C09}" type="datetimeFigureOut">
               <a:rPr lang="en-US" smtClean="0"/>
               <a:pPr/>
-              <a:t>14/8/12</a:t>
+              <a:t>27/10/12</a:t>
             </a:fld>
             <a:endParaRPr lang="en-US"/>
           </a:p>
@@ -456,7 +456,7 @@
             <a:fld id="{1D8BD707-D9CF-40AE-B4C6-C98DA3205C09}" type="datetimeFigureOut">
               <a:rPr lang="en-US" smtClean="0"/>
               <a:pPr/>
-              <a:t>14/8/12</a:t>
+              <a:t>27/10/12</a:t>
             </a:fld>
             <a:endParaRPr lang="en-US"/>
           </a:p>
@@ -633,7 +633,7 @@
             <a:fld id="{1D8BD707-D9CF-40AE-B4C6-C98DA3205C09}" type="datetimeFigureOut">
               <a:rPr lang="en-US" smtClean="0"/>
               <a:pPr/>
-              <a:t>14/8/12</a:t>
+              <a:t>27/10/12</a:t>
             </a:fld>
             <a:endParaRPr lang="en-US"/>
           </a:p>
@@ -800,7 +800,7 @@
             <a:fld id="{1D8BD707-D9CF-40AE-B4C6-C98DA3205C09}" type="datetimeFigureOut">
               <a:rPr lang="en-US" smtClean="0"/>
               <a:pPr/>
-              <a:t>14/8/12</a:t>
+              <a:t>27/10/12</a:t>
             </a:fld>
             <a:endParaRPr lang="en-US"/>
           </a:p>
@@ -1043,7 +1043,7 @@
             <a:fld id="{1D8BD707-D9CF-40AE-B4C6-C98DA3205C09}" type="datetimeFigureOut">
               <a:rPr lang="en-US" smtClean="0"/>
               <a:pPr/>
-              <a:t>14/8/12</a:t>
+              <a:t>27/10/12</a:t>
             </a:fld>
             <a:endParaRPr lang="en-US"/>
           </a:p>
@@ -1328,7 +1328,7 @@
             <a:fld id="{1D8BD707-D9CF-40AE-B4C6-C98DA3205C09}" type="datetimeFigureOut">
               <a:rPr lang="en-US" smtClean="0"/>
               <a:pPr/>
-              <a:t>14/8/12</a:t>
+              <a:t>27/10/12</a:t>
             </a:fld>
             <a:endParaRPr lang="en-US"/>
           </a:p>
@@ -1747,7 +1747,7 @@
             <a:fld id="{1D8BD707-D9CF-40AE-B4C6-C98DA3205C09}" type="datetimeFigureOut">
               <a:rPr lang="en-US" smtClean="0"/>
               <a:pPr/>
-              <a:t>14/8/12</a:t>
+              <a:t>27/10/12</a:t>
             </a:fld>
             <a:endParaRPr lang="en-US"/>
           </a:p>
@@ -1862,7 +1862,7 @@
             <a:fld id="{1D8BD707-D9CF-40AE-B4C6-C98DA3205C09}" type="datetimeFigureOut">
               <a:rPr lang="en-US" smtClean="0"/>
               <a:pPr/>
-              <a:t>14/8/12</a:t>
+              <a:t>27/10/12</a:t>
             </a:fld>
             <a:endParaRPr lang="en-US"/>
           </a:p>
@@ -1954,7 +1954,7 @@
             <a:fld id="{1D8BD707-D9CF-40AE-B4C6-C98DA3205C09}" type="datetimeFigureOut">
               <a:rPr lang="en-US" smtClean="0"/>
               <a:pPr/>
-              <a:t>14/8/12</a:t>
+              <a:t>27/10/12</a:t>
             </a:fld>
             <a:endParaRPr lang="en-US"/>
           </a:p>
@@ -2228,7 +2228,7 @@
             <a:fld id="{1D8BD707-D9CF-40AE-B4C6-C98DA3205C09}" type="datetimeFigureOut">
               <a:rPr lang="en-US" smtClean="0"/>
               <a:pPr/>
-              <a:t>14/8/12</a:t>
+              <a:t>27/10/12</a:t>
             </a:fld>
             <a:endParaRPr lang="en-US"/>
           </a:p>
@@ -2478,7 +2478,7 @@
             <a:fld id="{1D8BD707-D9CF-40AE-B4C6-C98DA3205C09}" type="datetimeFigureOut">
               <a:rPr lang="en-US" smtClean="0"/>
               <a:pPr/>
-              <a:t>14/8/12</a:t>
+              <a:t>27/10/12</a:t>
             </a:fld>
             <a:endParaRPr lang="en-US"/>
           </a:p>
@@ -2688,7 +2688,7 @@
             <a:fld id="{1D8BD707-D9CF-40AE-B4C6-C98DA3205C09}" type="datetimeFigureOut">
               <a:rPr lang="en-US" smtClean="0"/>
               <a:pPr/>
-              <a:t>14/8/12</a:t>
+              <a:t>27/10/12</a:t>
             </a:fld>
             <a:endParaRPr lang="en-US"/>
           </a:p>
@@ -3127,7 +3127,7 @@
         <p:grpSpPr>
           <a:xfrm>
             <a:off x="381000" y="2179637"/>
-            <a:ext cx="8305800" cy="2514601"/>
+            <a:ext cx="8305800" cy="2514600"/>
             <a:chOff x="-7162800" y="1371600"/>
             <a:chExt cx="8305800" cy="2357438"/>
           </a:xfrm>
@@ -3266,14 +3266,14 @@
       </p:grpSp>
       <p:sp>
         <p:nvSpPr>
-          <p:cNvPr id="156" name="Rounded Rectangle 155"/>
+          <p:cNvPr id="157" name="Rounded Rectangle 156"/>
           <p:cNvSpPr/>
           <p:nvPr/>
         </p:nvSpPr>
         <p:spPr>
           <a:xfrm>
-            <a:off x="4419600" y="3327587"/>
-            <a:ext cx="2819400" cy="762000"/>
+            <a:off x="2209800" y="2484437"/>
+            <a:ext cx="4953000" cy="2057400"/>
           </a:xfrm>
           <a:prstGeom prst="roundRect">
             <a:avLst>
@@ -3315,57 +3315,6 @@
           </a:p>
         </p:txBody>
       </p:sp>
-      <p:sp>
-        <p:nvSpPr>
-          <p:cNvPr id="157" name="Rounded Rectangle 156"/>
-          <p:cNvSpPr/>
-          <p:nvPr/>
-        </p:nvSpPr>
-        <p:spPr>
-          <a:xfrm>
-            <a:off x="2514600" y="2789237"/>
-            <a:ext cx="2133600" cy="1752600"/>
-          </a:xfrm>
-          <a:prstGeom prst="roundRect">
-            <a:avLst>
-              <a:gd name="adj" fmla="val 9891"/>
-            </a:avLst>
-          </a:prstGeom>
-          <a:solidFill>
-            <a:schemeClr val="accent6">
-              <a:lumMod val="40000"/>
-              <a:lumOff val="60000"/>
-            </a:schemeClr>
-          </a:solidFill>
-          <a:ln>
-            <a:noFill/>
-          </a:ln>
-        </p:spPr>
-        <p:style>
-          <a:lnRef idx="2">
-            <a:schemeClr val="accent1">
-              <a:shade val="50000"/>
-            </a:schemeClr>
-          </a:lnRef>
-          <a:fillRef idx="1">
-            <a:schemeClr val="accent1"/>
-          </a:fillRef>
-          <a:effectRef idx="0">
-            <a:schemeClr val="accent1"/>
-          </a:effectRef>
-          <a:fontRef idx="minor">
-            <a:schemeClr val="lt1"/>
-          </a:fontRef>
-        </p:style>
-        <p:txBody>
-          <a:bodyPr rtlCol="0" anchor="ctr"/>
-          <a:lstStyle/>
-          <a:p>
-            <a:pPr algn="ctr"/>
-            <a:endParaRPr lang="en-US"/>
-          </a:p>
-        </p:txBody>
-      </p:sp>
       <p:grpSp>
         <p:nvGrpSpPr>
           <p:cNvPr id="158" name="Group 157"/>
@@ -3375,7 +3324,7 @@
         <p:grpSpPr>
           <a:xfrm>
             <a:off x="457200" y="427037"/>
-            <a:ext cx="2057400" cy="1676400"/>
+            <a:ext cx="2209800" cy="1828800"/>
             <a:chOff x="-838200" y="1371600"/>
             <a:chExt cx="1981200" cy="1295400"/>
           </a:xfrm>
@@ -3647,8 +3596,8 @@
         </p:nvSpPr>
         <p:spPr>
           <a:xfrm>
-            <a:off x="762000" y="960437"/>
-            <a:ext cx="1524000" cy="457200"/>
+            <a:off x="990600" y="960437"/>
+            <a:ext cx="1143000" cy="304800"/>
           </a:xfrm>
           <a:prstGeom prst="rect">
             <a:avLst/>
@@ -3960,7 +3909,7 @@
         </p:nvSpPr>
         <p:spPr>
           <a:xfrm>
-            <a:off x="5963941" y="2558609"/>
+            <a:off x="7349918" y="4103867"/>
             <a:ext cx="1184482" cy="361770"/>
           </a:xfrm>
           <a:prstGeom prst="rect">
@@ -3990,7 +3939,7 @@
             <a:pPr algn="ctr"/>
             <a:r>
               <a:rPr lang="en-US" sz="1600" b="1" dirty="0" err="1" smtClean="0"/>
-              <a:t>UserData</a:t>
+              <a:t>UserType</a:t>
             </a:r>
             <a:endParaRPr lang="en-SG" sz="1600" b="1" dirty="0"/>
           </a:p>
@@ -3998,14 +3947,14 @@
       </p:sp>
       <p:sp>
         <p:nvSpPr>
-          <p:cNvPr id="172" name="Rectangle 171"/>
+          <p:cNvPr id="173" name="Rectangle 172"/>
           <p:cNvSpPr/>
           <p:nvPr/>
         </p:nvSpPr>
         <p:spPr>
           <a:xfrm>
-            <a:off x="4495800" y="3527487"/>
-            <a:ext cx="1304746" cy="361770"/>
+            <a:off x="5881777" y="4027667"/>
+            <a:ext cx="1204823" cy="361770"/>
           </a:xfrm>
           <a:prstGeom prst="rect">
             <a:avLst/>
@@ -4034,7 +3983,7 @@
             <a:pPr algn="ctr"/>
             <a:r>
               <a:rPr lang="en-US" sz="1600" b="1" dirty="0" err="1" smtClean="0"/>
-              <a:t>StudentData</a:t>
+              <a:t>CoordData</a:t>
             </a:r>
             <a:endParaRPr lang="en-SG" sz="1600" b="1" dirty="0"/>
           </a:p>
@@ -4042,14 +3991,14 @@
       </p:sp>
       <p:sp>
         <p:nvSpPr>
-          <p:cNvPr id="173" name="Rectangle 172"/>
+          <p:cNvPr id="174" name="Rectangle 173"/>
           <p:cNvSpPr/>
           <p:nvPr/>
         </p:nvSpPr>
         <p:spPr>
           <a:xfrm>
-            <a:off x="5933806" y="3530102"/>
-            <a:ext cx="1204823" cy="361770"/>
+            <a:off x="4124593" y="4008437"/>
+            <a:ext cx="1590407" cy="361770"/>
           </a:xfrm>
           <a:prstGeom prst="rect">
             <a:avLst/>
@@ -4078,7 +4027,7 @@
             <a:pPr algn="ctr"/>
             <a:r>
               <a:rPr lang="en-US" sz="1600" b="1" dirty="0" err="1" smtClean="0"/>
-              <a:t>CoordData</a:t>
+              <a:t>EvaluationData</a:t>
             </a:r>
             <a:endParaRPr lang="en-SG" sz="1600" b="1" dirty="0"/>
           </a:p>
@@ -4086,14 +4035,234 @@
       </p:sp>
       <p:sp>
         <p:nvSpPr>
-          <p:cNvPr id="174" name="Rectangle 173"/>
+          <p:cNvPr id="182" name="Rectangle 181"/>
           <p:cNvSpPr/>
           <p:nvPr/>
         </p:nvSpPr>
         <p:spPr>
           <a:xfrm>
-            <a:off x="2792675" y="3526747"/>
-            <a:ext cx="1590407" cy="361770"/>
+            <a:off x="569025" y="3053892"/>
+            <a:ext cx="1524000" cy="361770"/>
+          </a:xfrm>
+          <a:prstGeom prst="rect">
+            <a:avLst/>
+          </a:prstGeom>
+        </p:spPr>
+        <p:style>
+          <a:lnRef idx="2">
+            <a:schemeClr val="accent5">
+              <a:shade val="50000"/>
+            </a:schemeClr>
+          </a:lnRef>
+          <a:fillRef idx="1">
+            <a:schemeClr val="accent5"/>
+          </a:fillRef>
+          <a:effectRef idx="0">
+            <a:schemeClr val="accent5"/>
+          </a:effectRef>
+          <a:fontRef idx="minor">
+            <a:schemeClr val="lt1"/>
+          </a:fontRef>
+        </p:style>
+        <p:txBody>
+          <a:bodyPr rtlCol="0" anchor="ctr"/>
+          <a:lstStyle/>
+          <a:p>
+            <a:pPr algn="ctr"/>
+            <a:r>
+              <a:rPr lang="en-US" sz="1600" b="1" dirty="0" err="1" smtClean="0"/>
+              <a:t>TeamData</a:t>
+            </a:r>
+            <a:endParaRPr lang="en-SG" sz="1600" b="1" dirty="0"/>
+          </a:p>
+        </p:txBody>
+      </p:sp>
+      <p:sp>
+        <p:nvSpPr>
+          <p:cNvPr id="183" name="Rectangle 182"/>
+          <p:cNvSpPr/>
+          <p:nvPr/>
+        </p:nvSpPr>
+        <p:spPr>
+          <a:xfrm>
+            <a:off x="569025" y="3549192"/>
+            <a:ext cx="1524000" cy="361770"/>
+          </a:xfrm>
+          <a:prstGeom prst="rect">
+            <a:avLst/>
+          </a:prstGeom>
+        </p:spPr>
+        <p:style>
+          <a:lnRef idx="2">
+            <a:schemeClr val="accent5">
+              <a:shade val="50000"/>
+            </a:schemeClr>
+          </a:lnRef>
+          <a:fillRef idx="1">
+            <a:schemeClr val="accent5"/>
+          </a:fillRef>
+          <a:effectRef idx="0">
+            <a:schemeClr val="accent5"/>
+          </a:effectRef>
+          <a:fontRef idx="minor">
+            <a:schemeClr val="lt1"/>
+          </a:fontRef>
+        </p:style>
+        <p:txBody>
+          <a:bodyPr rtlCol="0" anchor="ctr"/>
+          <a:lstStyle/>
+          <a:p>
+            <a:pPr algn="ctr"/>
+            <a:r>
+              <a:rPr lang="en-US" sz="1600" b="1" dirty="0" err="1" smtClean="0"/>
+              <a:t>EvalResultData</a:t>
+            </a:r>
+            <a:endParaRPr lang="en-SG" sz="1600" b="1" dirty="0"/>
+          </a:p>
+        </p:txBody>
+      </p:sp>
+      <p:sp>
+        <p:nvSpPr>
+          <p:cNvPr id="184" name="Rectangle 183"/>
+          <p:cNvSpPr/>
+          <p:nvPr/>
+        </p:nvSpPr>
+        <p:spPr>
+          <a:xfrm>
+            <a:off x="569025" y="4044492"/>
+            <a:ext cx="1524000" cy="361770"/>
+          </a:xfrm>
+          <a:prstGeom prst="rect">
+            <a:avLst/>
+          </a:prstGeom>
+        </p:spPr>
+        <p:style>
+          <a:lnRef idx="2">
+            <a:schemeClr val="accent5">
+              <a:shade val="50000"/>
+            </a:schemeClr>
+          </a:lnRef>
+          <a:fillRef idx="1">
+            <a:schemeClr val="accent5"/>
+          </a:fillRef>
+          <a:effectRef idx="0">
+            <a:schemeClr val="accent5"/>
+          </a:effectRef>
+          <a:fontRef idx="minor">
+            <a:schemeClr val="lt1"/>
+          </a:fontRef>
+        </p:style>
+        <p:txBody>
+          <a:bodyPr rtlCol="0" anchor="ctr"/>
+          <a:lstStyle/>
+          <a:p>
+            <a:pPr algn="ctr"/>
+            <a:r>
+              <a:rPr lang="en-US" sz="1600" b="1" dirty="0" err="1" smtClean="0"/>
+              <a:t>DataBundle</a:t>
+            </a:r>
+            <a:endParaRPr lang="en-SG" sz="1600" b="1" dirty="0"/>
+          </a:p>
+        </p:txBody>
+      </p:sp>
+      <p:sp>
+        <p:nvSpPr>
+          <p:cNvPr id="35" name="Rectangle 34"/>
+          <p:cNvSpPr/>
+          <p:nvPr/>
+        </p:nvSpPr>
+        <p:spPr>
+          <a:xfrm>
+            <a:off x="762000" y="1341437"/>
+            <a:ext cx="1600200" cy="304800"/>
+          </a:xfrm>
+          <a:prstGeom prst="rect">
+            <a:avLst/>
+          </a:prstGeom>
+        </p:spPr>
+        <p:style>
+          <a:lnRef idx="2">
+            <a:schemeClr val="accent3">
+              <a:shade val="50000"/>
+            </a:schemeClr>
+          </a:lnRef>
+          <a:fillRef idx="1">
+            <a:schemeClr val="accent3"/>
+          </a:fillRef>
+          <a:effectRef idx="0">
+            <a:schemeClr val="accent3"/>
+          </a:effectRef>
+          <a:fontRef idx="minor">
+            <a:schemeClr val="lt1"/>
+          </a:fontRef>
+        </p:style>
+        <p:txBody>
+          <a:bodyPr rtlCol="0" anchor="ctr"/>
+          <a:lstStyle/>
+          <a:p>
+            <a:pPr algn="ctr"/>
+            <a:r>
+              <a:rPr lang="en-US" sz="1600" b="1" dirty="0" err="1" smtClean="0"/>
+              <a:t>BuildProperties</a:t>
+            </a:r>
+            <a:endParaRPr lang="en-SG" sz="1600" b="1" dirty="0"/>
+          </a:p>
+        </p:txBody>
+      </p:sp>
+      <p:sp>
+        <p:nvSpPr>
+          <p:cNvPr id="36" name="Rectangle 35"/>
+          <p:cNvSpPr/>
+          <p:nvPr/>
+        </p:nvSpPr>
+        <p:spPr>
+          <a:xfrm>
+            <a:off x="762000" y="1722437"/>
+            <a:ext cx="1600200" cy="304800"/>
+          </a:xfrm>
+          <a:prstGeom prst="rect">
+            <a:avLst/>
+          </a:prstGeom>
+        </p:spPr>
+        <p:style>
+          <a:lnRef idx="2">
+            <a:schemeClr val="accent3">
+              <a:shade val="50000"/>
+            </a:schemeClr>
+          </a:lnRef>
+          <a:fillRef idx="1">
+            <a:schemeClr val="accent3"/>
+          </a:fillRef>
+          <a:effectRef idx="0">
+            <a:schemeClr val="accent3"/>
+          </a:effectRef>
+          <a:fontRef idx="minor">
+            <a:schemeClr val="lt1"/>
+          </a:fontRef>
+        </p:style>
+        <p:txBody>
+          <a:bodyPr rtlCol="0" anchor="ctr"/>
+          <a:lstStyle/>
+          <a:p>
+            <a:pPr algn="ctr"/>
+            <a:r>
+              <a:rPr lang="en-US" sz="1600" b="1" dirty="0" smtClean="0"/>
+              <a:t>Assumption</a:t>
+            </a:r>
+            <a:endParaRPr lang="en-SG" sz="1600" b="1" dirty="0"/>
+          </a:p>
+        </p:txBody>
+      </p:sp>
+      <p:sp>
+        <p:nvSpPr>
+          <p:cNvPr id="38" name="Rectangle 37"/>
+          <p:cNvSpPr/>
+          <p:nvPr/>
+        </p:nvSpPr>
+        <p:spPr>
+          <a:xfrm>
+            <a:off x="4052977" y="2579867"/>
+            <a:ext cx="1585823" cy="361770"/>
           </a:xfrm>
           <a:prstGeom prst="rect">
             <a:avLst/>
@@ -4122,12 +4291,170 @@
             <a:pPr algn="ctr"/>
             <a:r>
               <a:rPr lang="en-US" sz="1600" b="1" dirty="0" err="1" smtClean="0"/>
-              <a:t>EvaluationData</a:t>
+              <a:t>BaseData</a:t>
             </a:r>
             <a:endParaRPr lang="en-SG" sz="1600" b="1" dirty="0"/>
           </a:p>
         </p:txBody>
       </p:sp>
+      <p:cxnSp>
+        <p:nvCxnSpPr>
+          <p:cNvPr id="39" name="Elbow Connector 38"/>
+          <p:cNvCxnSpPr/>
+          <p:nvPr/>
+        </p:nvCxnSpPr>
+        <p:spPr>
+          <a:xfrm>
+            <a:off x="2667002" y="3322637"/>
+            <a:ext cx="4190999" cy="1"/>
+          </a:xfrm>
+          <a:prstGeom prst="bentConnector3">
+            <a:avLst>
+              <a:gd name="adj1" fmla="val 50000"/>
+            </a:avLst>
+          </a:prstGeom>
+          <a:ln>
+            <a:headEnd type="none" w="med" len="med"/>
+            <a:tailEnd type="none" w="med" len="med"/>
+          </a:ln>
+        </p:spPr>
+        <p:style>
+          <a:lnRef idx="2">
+            <a:schemeClr val="accent6"/>
+          </a:lnRef>
+          <a:fillRef idx="0">
+            <a:schemeClr val="accent6"/>
+          </a:fillRef>
+          <a:effectRef idx="1">
+            <a:schemeClr val="accent6"/>
+          </a:effectRef>
+          <a:fontRef idx="minor">
+            <a:schemeClr val="tx1"/>
+          </a:fontRef>
+        </p:style>
+      </p:cxnSp>
+      <p:cxnSp>
+        <p:nvCxnSpPr>
+          <p:cNvPr id="69" name="Elbow Connector 68"/>
+          <p:cNvCxnSpPr>
+            <a:endCxn id="37" idx="3"/>
+          </p:cNvCxnSpPr>
+          <p:nvPr/>
+        </p:nvCxnSpPr>
+        <p:spPr>
+          <a:xfrm flipV="1">
+            <a:off x="4800600" y="3194050"/>
+            <a:ext cx="14288" cy="814387"/>
+          </a:xfrm>
+          <a:prstGeom prst="straightConnector1">
+            <a:avLst/>
+          </a:prstGeom>
+        </p:spPr>
+        <p:style>
+          <a:lnRef idx="2">
+            <a:schemeClr val="accent6"/>
+          </a:lnRef>
+          <a:fillRef idx="0">
+            <a:schemeClr val="accent6"/>
+          </a:fillRef>
+          <a:effectRef idx="1">
+            <a:schemeClr val="accent6"/>
+          </a:effectRef>
+          <a:fontRef idx="minor">
+            <a:schemeClr val="tx1"/>
+          </a:fontRef>
+        </p:style>
+      </p:cxnSp>
+      <p:cxnSp>
+        <p:nvCxnSpPr>
+          <p:cNvPr id="99" name="Elbow Connector 68"/>
+          <p:cNvCxnSpPr/>
+          <p:nvPr/>
+        </p:nvCxnSpPr>
+        <p:spPr>
+          <a:xfrm flipV="1">
+            <a:off x="6172200" y="3322637"/>
+            <a:ext cx="0" cy="228600"/>
+          </a:xfrm>
+          <a:prstGeom prst="straightConnector1">
+            <a:avLst/>
+          </a:prstGeom>
+        </p:spPr>
+        <p:style>
+          <a:lnRef idx="2">
+            <a:schemeClr val="accent6"/>
+          </a:lnRef>
+          <a:fillRef idx="0">
+            <a:schemeClr val="accent6"/>
+          </a:fillRef>
+          <a:effectRef idx="1">
+            <a:schemeClr val="accent6"/>
+          </a:effectRef>
+          <a:fontRef idx="minor">
+            <a:schemeClr val="tx1"/>
+          </a:fontRef>
+        </p:style>
+      </p:cxnSp>
+      <p:cxnSp>
+        <p:nvCxnSpPr>
+          <p:cNvPr id="102" name="Elbow Connector 68"/>
+          <p:cNvCxnSpPr/>
+          <p:nvPr/>
+        </p:nvCxnSpPr>
+        <p:spPr>
+          <a:xfrm flipV="1">
+            <a:off x="6858000" y="3322637"/>
+            <a:ext cx="0" cy="685800"/>
+          </a:xfrm>
+          <a:prstGeom prst="straightConnector1">
+            <a:avLst/>
+          </a:prstGeom>
+        </p:spPr>
+        <p:style>
+          <a:lnRef idx="2">
+            <a:schemeClr val="accent6"/>
+          </a:lnRef>
+          <a:fillRef idx="0">
+            <a:schemeClr val="accent6"/>
+          </a:fillRef>
+          <a:effectRef idx="1">
+            <a:schemeClr val="accent6"/>
+          </a:effectRef>
+          <a:fontRef idx="minor">
+            <a:schemeClr val="tx1"/>
+          </a:fontRef>
+        </p:style>
+      </p:cxnSp>
+      <p:cxnSp>
+        <p:nvCxnSpPr>
+          <p:cNvPr id="105" name="Elbow Connector 68"/>
+          <p:cNvCxnSpPr/>
+          <p:nvPr/>
+        </p:nvCxnSpPr>
+        <p:spPr>
+          <a:xfrm flipV="1">
+            <a:off x="2667000" y="3322637"/>
+            <a:ext cx="0" cy="685800"/>
+          </a:xfrm>
+          <a:prstGeom prst="straightConnector1">
+            <a:avLst/>
+          </a:prstGeom>
+        </p:spPr>
+        <p:style>
+          <a:lnRef idx="2">
+            <a:schemeClr val="accent6"/>
+          </a:lnRef>
+          <a:fillRef idx="0">
+            <a:schemeClr val="accent6"/>
+          </a:fillRef>
+          <a:effectRef idx="1">
+            <a:schemeClr val="accent6"/>
+          </a:effectRef>
+          <a:fontRef idx="minor">
+            <a:schemeClr val="tx1"/>
+          </a:fontRef>
+        </p:style>
+      </p:cxnSp>
       <p:sp>
         <p:nvSpPr>
           <p:cNvPr id="175" name="Rectangle 174"/>
@@ -4136,7 +4463,7 @@
         </p:nvSpPr>
         <p:spPr>
           <a:xfrm>
-            <a:off x="2792675" y="4000772"/>
+            <a:off x="2362200" y="4000772"/>
             <a:ext cx="1585823" cy="361770"/>
           </a:xfrm>
           <a:prstGeom prst="rect">
@@ -4174,130 +4501,16 @@
       </p:sp>
       <p:sp>
         <p:nvSpPr>
-          <p:cNvPr id="176" name="Isosceles Triangle 175"/>
+          <p:cNvPr id="37" name="Isosceles Triangle 36"/>
           <p:cNvSpPr/>
           <p:nvPr/>
         </p:nvSpPr>
         <p:spPr>
           <a:xfrm>
-            <a:off x="6400442" y="2917887"/>
+            <a:off x="4676775" y="2965450"/>
             <a:ext cx="276225" cy="228600"/>
           </a:xfrm>
           <a:prstGeom prst="triangle">
-            <a:avLst/>
-          </a:prstGeom>
-        </p:spPr>
-        <p:style>
-          <a:lnRef idx="2">
-            <a:schemeClr val="accent4">
-              <a:shade val="50000"/>
-            </a:schemeClr>
-          </a:lnRef>
-          <a:fillRef idx="1">
-            <a:schemeClr val="accent4"/>
-          </a:fillRef>
-          <a:effectRef idx="0">
-            <a:schemeClr val="accent4"/>
-          </a:effectRef>
-          <a:fontRef idx="minor">
-            <a:schemeClr val="lt1"/>
-          </a:fontRef>
-        </p:style>
-        <p:txBody>
-          <a:bodyPr rtlCol="0" anchor="ctr"/>
-          <a:lstStyle/>
-          <a:p>
-            <a:pPr algn="ctr"/>
-            <a:endParaRPr lang="en-SG"/>
-          </a:p>
-        </p:txBody>
-      </p:sp>
-      <p:cxnSp>
-        <p:nvCxnSpPr>
-          <p:cNvPr id="177" name="Elbow Connector 176"/>
-          <p:cNvCxnSpPr>
-            <a:stCxn id="176" idx="3"/>
-            <a:endCxn id="172" idx="0"/>
-          </p:cNvCxnSpPr>
-          <p:nvPr/>
-        </p:nvCxnSpPr>
-        <p:spPr>
-          <a:xfrm rot="5400000">
-            <a:off x="5652864" y="2641796"/>
-            <a:ext cx="381000" cy="1390382"/>
-          </a:xfrm>
-          <a:prstGeom prst="bentConnector3">
-            <a:avLst>
-              <a:gd name="adj1" fmla="val 25065"/>
-            </a:avLst>
-          </a:prstGeom>
-        </p:spPr>
-        <p:style>
-          <a:lnRef idx="2">
-            <a:schemeClr val="accent4">
-              <a:shade val="50000"/>
-            </a:schemeClr>
-          </a:lnRef>
-          <a:fillRef idx="1">
-            <a:schemeClr val="accent4"/>
-          </a:fillRef>
-          <a:effectRef idx="0">
-            <a:schemeClr val="accent4"/>
-          </a:effectRef>
-          <a:fontRef idx="minor">
-            <a:schemeClr val="lt1"/>
-          </a:fontRef>
-        </p:style>
-      </p:cxnSp>
-      <p:cxnSp>
-        <p:nvCxnSpPr>
-          <p:cNvPr id="178" name="Elbow Connector 177"/>
-          <p:cNvCxnSpPr>
-            <a:stCxn id="173" idx="0"/>
-            <a:endCxn id="176" idx="3"/>
-          </p:cNvCxnSpPr>
-          <p:nvPr/>
-        </p:nvCxnSpPr>
-        <p:spPr>
-          <a:xfrm rot="5400000" flipH="1" flipV="1">
-            <a:off x="6345579" y="3337127"/>
-            <a:ext cx="383615" cy="2337"/>
-          </a:xfrm>
-          <a:prstGeom prst="bentConnector3">
-            <a:avLst>
-              <a:gd name="adj1" fmla="val 50000"/>
-            </a:avLst>
-          </a:prstGeom>
-        </p:spPr>
-        <p:style>
-          <a:lnRef idx="2">
-            <a:schemeClr val="accent4">
-              <a:shade val="50000"/>
-            </a:schemeClr>
-          </a:lnRef>
-          <a:fillRef idx="1">
-            <a:schemeClr val="accent4"/>
-          </a:fillRef>
-          <a:effectRef idx="0">
-            <a:schemeClr val="accent4"/>
-          </a:effectRef>
-          <a:fontRef idx="minor">
-            <a:schemeClr val="lt1"/>
-          </a:fontRef>
-        </p:style>
-      </p:cxnSp>
-      <p:sp>
-        <p:nvSpPr>
-          <p:cNvPr id="179" name="Rectangle 178"/>
-          <p:cNvSpPr/>
-          <p:nvPr/>
-        </p:nvSpPr>
-        <p:spPr>
-          <a:xfrm>
-            <a:off x="2792675" y="3069547"/>
-            <a:ext cx="1585823" cy="361770"/>
-          </a:xfrm>
-          <a:prstGeom prst="rect">
             <a:avLst/>
           </a:prstGeom>
         </p:spPr>
@@ -4322,24 +4535,22 @@
           <a:lstStyle/>
           <a:p>
             <a:pPr algn="ctr"/>
-            <a:r>
-              <a:rPr lang="en-US" sz="1600" b="1" dirty="0" err="1" smtClean="0"/>
-              <a:t>CourseData</a:t>
-            </a:r>
-            <a:endParaRPr lang="en-SG" sz="1600" b="1" dirty="0"/>
-          </a:p>
-        </p:txBody>
-      </p:sp>
-      <p:sp>
-        <p:nvSpPr>
-          <p:cNvPr id="180" name="Rectangle 179"/>
-          <p:cNvSpPr/>
+            <a:endParaRPr lang="en-SG"/>
+          </a:p>
+        </p:txBody>
+      </p:sp>
+      <p:sp>
+        <p:nvSpPr>
+          <p:cNvPr id="172" name="Rectangle 171"/>
+          <p:cNvSpPr>
+            <a:spLocks/>
+          </p:cNvSpPr>
           <p:nvPr/>
         </p:nvSpPr>
         <p:spPr>
           <a:xfrm>
-            <a:off x="7405777" y="3527487"/>
-            <a:ext cx="1204823" cy="361770"/>
+            <a:off x="5324654" y="3551237"/>
+            <a:ext cx="1304746" cy="361770"/>
           </a:xfrm>
           <a:prstGeom prst="rect">
             <a:avLst/>
@@ -4347,15 +4558,15 @@
         </p:spPr>
         <p:style>
           <a:lnRef idx="2">
-            <a:schemeClr val="accent4">
+            <a:schemeClr val="accent6">
               <a:shade val="50000"/>
             </a:schemeClr>
           </a:lnRef>
           <a:fillRef idx="1">
-            <a:schemeClr val="accent4"/>
+            <a:schemeClr val="accent6"/>
           </a:fillRef>
           <a:effectRef idx="0">
-            <a:schemeClr val="accent4"/>
+            <a:schemeClr val="accent6"/>
           </a:effectRef>
           <a:fontRef idx="minor">
             <a:schemeClr val="lt1"/>
@@ -4368,7 +4579,7 @@
             <a:pPr algn="ctr"/>
             <a:r>
               <a:rPr lang="en-US" sz="1600" b="1" dirty="0" err="1" smtClean="0"/>
-              <a:t>AdminData</a:t>
+              <a:t>StudentData</a:t>
             </a:r>
             <a:endParaRPr lang="en-SG" sz="1600" b="1" dirty="0"/>
           </a:p>
@@ -4376,72 +4587,65 @@
       </p:sp>
       <p:cxnSp>
         <p:nvCxnSpPr>
-          <p:cNvPr id="181" name="Elbow Connector 180"/>
-          <p:cNvCxnSpPr>
-            <a:stCxn id="180" idx="0"/>
-            <a:endCxn id="176" idx="3"/>
-          </p:cNvCxnSpPr>
+          <p:cNvPr id="108" name="Elbow Connector 68"/>
+          <p:cNvCxnSpPr/>
           <p:nvPr/>
         </p:nvCxnSpPr>
         <p:spPr>
-          <a:xfrm rot="16200000" flipV="1">
-            <a:off x="7082872" y="2602170"/>
-            <a:ext cx="381000" cy="1469634"/>
-          </a:xfrm>
-          <a:prstGeom prst="bentConnector3">
-            <a:avLst>
-              <a:gd name="adj1" fmla="val 74935"/>
-            </a:avLst>
+          <a:xfrm flipV="1">
+            <a:off x="3810000" y="3322637"/>
+            <a:ext cx="0" cy="228600"/>
+          </a:xfrm>
+          <a:prstGeom prst="straightConnector1">
+            <a:avLst/>
           </a:prstGeom>
         </p:spPr>
         <p:style>
           <a:lnRef idx="2">
-            <a:schemeClr val="accent4">
+            <a:schemeClr val="accent6"/>
+          </a:lnRef>
+          <a:fillRef idx="0">
+            <a:schemeClr val="accent6"/>
+          </a:fillRef>
+          <a:effectRef idx="1">
+            <a:schemeClr val="accent6"/>
+          </a:effectRef>
+          <a:fontRef idx="minor">
+            <a:schemeClr val="tx1"/>
+          </a:fontRef>
+        </p:style>
+      </p:cxnSp>
+      <p:sp>
+        <p:nvSpPr>
+          <p:cNvPr id="179" name="Rectangle 178"/>
+          <p:cNvSpPr/>
+          <p:nvPr/>
+        </p:nvSpPr>
+        <p:spPr>
+          <a:xfrm>
+            <a:off x="2986177" y="3551237"/>
+            <a:ext cx="1585823" cy="361770"/>
+          </a:xfrm>
+          <a:prstGeom prst="rect">
+            <a:avLst/>
+          </a:prstGeom>
+        </p:spPr>
+        <p:style>
+          <a:lnRef idx="2">
+            <a:schemeClr val="accent6">
               <a:shade val="50000"/>
             </a:schemeClr>
           </a:lnRef>
           <a:fillRef idx="1">
-            <a:schemeClr val="accent4"/>
+            <a:schemeClr val="accent6"/>
           </a:fillRef>
           <a:effectRef idx="0">
-            <a:schemeClr val="accent4"/>
+            <a:schemeClr val="accent6"/>
           </a:effectRef>
           <a:fontRef idx="minor">
             <a:schemeClr val="lt1"/>
           </a:fontRef>
         </p:style>
-      </p:cxnSp>
-      <p:sp>
-        <p:nvSpPr>
-          <p:cNvPr id="182" name="Rectangle 181"/>
-          <p:cNvSpPr/>
-          <p:nvPr/>
-        </p:nvSpPr>
-        <p:spPr>
-          <a:xfrm>
-            <a:off x="569025" y="3053892"/>
-            <a:ext cx="1524000" cy="361770"/>
-          </a:xfrm>
-          <a:prstGeom prst="rect">
-            <a:avLst/>
-          </a:prstGeom>
-        </p:spPr>
-        <p:style>
-          <a:lnRef idx="2">
-            <a:schemeClr val="accent5">
-              <a:shade val="50000"/>
-            </a:schemeClr>
-          </a:lnRef>
-          <a:fillRef idx="1">
-            <a:schemeClr val="accent5"/>
-          </a:fillRef>
-          <a:effectRef idx="0">
-            <a:schemeClr val="accent5"/>
-          </a:effectRef>
-          <a:fontRef idx="minor">
-            <a:schemeClr val="lt1"/>
-          </a:fontRef>
-        </p:style>
         <p:txBody>
           <a:bodyPr rtlCol="0" anchor="ctr"/>
           <a:lstStyle/>
@@ -4449,139 +4653,7 @@
             <a:pPr algn="ctr"/>
             <a:r>
               <a:rPr lang="en-US" sz="1600" b="1" dirty="0" err="1" smtClean="0"/>
-              <a:t>TeamData</a:t>
-            </a:r>
-            <a:endParaRPr lang="en-SG" sz="1600" b="1" dirty="0"/>
-          </a:p>
-        </p:txBody>
-      </p:sp>
-      <p:sp>
-        <p:nvSpPr>
-          <p:cNvPr id="183" name="Rectangle 182"/>
-          <p:cNvSpPr/>
-          <p:nvPr/>
-        </p:nvSpPr>
-        <p:spPr>
-          <a:xfrm>
-            <a:off x="569025" y="3549192"/>
-            <a:ext cx="1524000" cy="361770"/>
-          </a:xfrm>
-          <a:prstGeom prst="rect">
-            <a:avLst/>
-          </a:prstGeom>
-        </p:spPr>
-        <p:style>
-          <a:lnRef idx="2">
-            <a:schemeClr val="accent5">
-              <a:shade val="50000"/>
-            </a:schemeClr>
-          </a:lnRef>
-          <a:fillRef idx="1">
-            <a:schemeClr val="accent5"/>
-          </a:fillRef>
-          <a:effectRef idx="0">
-            <a:schemeClr val="accent5"/>
-          </a:effectRef>
-          <a:fontRef idx="minor">
-            <a:schemeClr val="lt1"/>
-          </a:fontRef>
-        </p:style>
-        <p:txBody>
-          <a:bodyPr rtlCol="0" anchor="ctr"/>
-          <a:lstStyle/>
-          <a:p>
-            <a:pPr algn="ctr"/>
-            <a:r>
-              <a:rPr lang="en-US" sz="1600" b="1" dirty="0" err="1" smtClean="0"/>
-              <a:t>EvalResultData</a:t>
-            </a:r>
-            <a:endParaRPr lang="en-SG" sz="1600" b="1" dirty="0"/>
-          </a:p>
-        </p:txBody>
-      </p:sp>
-      <p:sp>
-        <p:nvSpPr>
-          <p:cNvPr id="184" name="Rectangle 183"/>
-          <p:cNvSpPr/>
-          <p:nvPr/>
-        </p:nvSpPr>
-        <p:spPr>
-          <a:xfrm>
-            <a:off x="569025" y="4044492"/>
-            <a:ext cx="1524000" cy="361770"/>
-          </a:xfrm>
-          <a:prstGeom prst="rect">
-            <a:avLst/>
-          </a:prstGeom>
-        </p:spPr>
-        <p:style>
-          <a:lnRef idx="2">
-            <a:schemeClr val="accent5">
-              <a:shade val="50000"/>
-            </a:schemeClr>
-          </a:lnRef>
-          <a:fillRef idx="1">
-            <a:schemeClr val="accent5"/>
-          </a:fillRef>
-          <a:effectRef idx="0">
-            <a:schemeClr val="accent5"/>
-          </a:effectRef>
-          <a:fontRef idx="minor">
-            <a:schemeClr val="lt1"/>
-          </a:fontRef>
-        </p:style>
-        <p:txBody>
-          <a:bodyPr rtlCol="0" anchor="ctr"/>
-          <a:lstStyle/>
-          <a:p>
-            <a:pPr algn="ctr"/>
-            <a:r>
-              <a:rPr lang="en-US" sz="1600" b="1" dirty="0" err="1" smtClean="0"/>
-              <a:t>DataBundle</a:t>
-            </a:r>
-            <a:endParaRPr lang="en-SG" sz="1600" b="1" dirty="0"/>
-          </a:p>
-        </p:txBody>
-      </p:sp>
-      <p:sp>
-        <p:nvSpPr>
-          <p:cNvPr id="35" name="Rectangle 34"/>
-          <p:cNvSpPr/>
-          <p:nvPr/>
-        </p:nvSpPr>
-        <p:spPr>
-          <a:xfrm>
-            <a:off x="762000" y="1570037"/>
-            <a:ext cx="1524000" cy="457200"/>
-          </a:xfrm>
-          <a:prstGeom prst="rect">
-            <a:avLst/>
-          </a:prstGeom>
-        </p:spPr>
-        <p:style>
-          <a:lnRef idx="2">
-            <a:schemeClr val="accent3">
-              <a:shade val="50000"/>
-            </a:schemeClr>
-          </a:lnRef>
-          <a:fillRef idx="1">
-            <a:schemeClr val="accent3"/>
-          </a:fillRef>
-          <a:effectRef idx="0">
-            <a:schemeClr val="accent3"/>
-          </a:effectRef>
-          <a:fontRef idx="minor">
-            <a:schemeClr val="lt1"/>
-          </a:fontRef>
-        </p:style>
-        <p:txBody>
-          <a:bodyPr rtlCol="0" anchor="ctr"/>
-          <a:lstStyle/>
-          <a:p>
-            <a:pPr algn="ctr"/>
-            <a:r>
-              <a:rPr lang="en-US" sz="1600" b="1" dirty="0" err="1" smtClean="0"/>
-              <a:t>BuildProperties</a:t>
+              <a:t>CourseData</a:t>
             </a:r>
             <a:endParaRPr lang="en-SG" sz="1600" b="1" dirty="0"/>
           </a:p>

</xml_diff>

<commit_message>
merged default update Issue 354
</commit_message>
<xml_diff>
--- a/doc/diagrams/CommonComponent.pptx
+++ b/doc/diagrams/CommonComponent.pptx
@@ -289,7 +289,7 @@
             <a:fld id="{1D8BD707-D9CF-40AE-B4C6-C98DA3205C09}" type="datetimeFigureOut">
               <a:rPr lang="en-US" smtClean="0"/>
               <a:pPr/>
-              <a:t>14/8/12</a:t>
+              <a:t>27/10/12</a:t>
             </a:fld>
             <a:endParaRPr lang="en-US"/>
           </a:p>
@@ -456,7 +456,7 @@
             <a:fld id="{1D8BD707-D9CF-40AE-B4C6-C98DA3205C09}" type="datetimeFigureOut">
               <a:rPr lang="en-US" smtClean="0"/>
               <a:pPr/>
-              <a:t>14/8/12</a:t>
+              <a:t>27/10/12</a:t>
             </a:fld>
             <a:endParaRPr lang="en-US"/>
           </a:p>
@@ -633,7 +633,7 @@
             <a:fld id="{1D8BD707-D9CF-40AE-B4C6-C98DA3205C09}" type="datetimeFigureOut">
               <a:rPr lang="en-US" smtClean="0"/>
               <a:pPr/>
-              <a:t>14/8/12</a:t>
+              <a:t>27/10/12</a:t>
             </a:fld>
             <a:endParaRPr lang="en-US"/>
           </a:p>
@@ -800,7 +800,7 @@
             <a:fld id="{1D8BD707-D9CF-40AE-B4C6-C98DA3205C09}" type="datetimeFigureOut">
               <a:rPr lang="en-US" smtClean="0"/>
               <a:pPr/>
-              <a:t>14/8/12</a:t>
+              <a:t>27/10/12</a:t>
             </a:fld>
             <a:endParaRPr lang="en-US"/>
           </a:p>
@@ -1043,7 +1043,7 @@
             <a:fld id="{1D8BD707-D9CF-40AE-B4C6-C98DA3205C09}" type="datetimeFigureOut">
               <a:rPr lang="en-US" smtClean="0"/>
               <a:pPr/>
-              <a:t>14/8/12</a:t>
+              <a:t>27/10/12</a:t>
             </a:fld>
             <a:endParaRPr lang="en-US"/>
           </a:p>
@@ -1328,7 +1328,7 @@
             <a:fld id="{1D8BD707-D9CF-40AE-B4C6-C98DA3205C09}" type="datetimeFigureOut">
               <a:rPr lang="en-US" smtClean="0"/>
               <a:pPr/>
-              <a:t>14/8/12</a:t>
+              <a:t>27/10/12</a:t>
             </a:fld>
             <a:endParaRPr lang="en-US"/>
           </a:p>
@@ -1747,7 +1747,7 @@
             <a:fld id="{1D8BD707-D9CF-40AE-B4C6-C98DA3205C09}" type="datetimeFigureOut">
               <a:rPr lang="en-US" smtClean="0"/>
               <a:pPr/>
-              <a:t>14/8/12</a:t>
+              <a:t>27/10/12</a:t>
             </a:fld>
             <a:endParaRPr lang="en-US"/>
           </a:p>
@@ -1862,7 +1862,7 @@
             <a:fld id="{1D8BD707-D9CF-40AE-B4C6-C98DA3205C09}" type="datetimeFigureOut">
               <a:rPr lang="en-US" smtClean="0"/>
               <a:pPr/>
-              <a:t>14/8/12</a:t>
+              <a:t>27/10/12</a:t>
             </a:fld>
             <a:endParaRPr lang="en-US"/>
           </a:p>
@@ -1954,7 +1954,7 @@
             <a:fld id="{1D8BD707-D9CF-40AE-B4C6-C98DA3205C09}" type="datetimeFigureOut">
               <a:rPr lang="en-US" smtClean="0"/>
               <a:pPr/>
-              <a:t>14/8/12</a:t>
+              <a:t>27/10/12</a:t>
             </a:fld>
             <a:endParaRPr lang="en-US"/>
           </a:p>
@@ -2228,7 +2228,7 @@
             <a:fld id="{1D8BD707-D9CF-40AE-B4C6-C98DA3205C09}" type="datetimeFigureOut">
               <a:rPr lang="en-US" smtClean="0"/>
               <a:pPr/>
-              <a:t>14/8/12</a:t>
+              <a:t>27/10/12</a:t>
             </a:fld>
             <a:endParaRPr lang="en-US"/>
           </a:p>
@@ -2478,7 +2478,7 @@
             <a:fld id="{1D8BD707-D9CF-40AE-B4C6-C98DA3205C09}" type="datetimeFigureOut">
               <a:rPr lang="en-US" smtClean="0"/>
               <a:pPr/>
-              <a:t>14/8/12</a:t>
+              <a:t>27/10/12</a:t>
             </a:fld>
             <a:endParaRPr lang="en-US"/>
           </a:p>
@@ -2688,7 +2688,7 @@
             <a:fld id="{1D8BD707-D9CF-40AE-B4C6-C98DA3205C09}" type="datetimeFigureOut">
               <a:rPr lang="en-US" smtClean="0"/>
               <a:pPr/>
-              <a:t>14/8/12</a:t>
+              <a:t>27/10/12</a:t>
             </a:fld>
             <a:endParaRPr lang="en-US"/>
           </a:p>
@@ -3127,7 +3127,7 @@
         <p:grpSpPr>
           <a:xfrm>
             <a:off x="381000" y="2179637"/>
-            <a:ext cx="8305800" cy="2514601"/>
+            <a:ext cx="8305800" cy="2514600"/>
             <a:chOff x="-7162800" y="1371600"/>
             <a:chExt cx="8305800" cy="2357438"/>
           </a:xfrm>
@@ -3266,14 +3266,14 @@
       </p:grpSp>
       <p:sp>
         <p:nvSpPr>
-          <p:cNvPr id="156" name="Rounded Rectangle 155"/>
+          <p:cNvPr id="157" name="Rounded Rectangle 156"/>
           <p:cNvSpPr/>
           <p:nvPr/>
         </p:nvSpPr>
         <p:spPr>
           <a:xfrm>
-            <a:off x="4419600" y="3327587"/>
-            <a:ext cx="2819400" cy="762000"/>
+            <a:off x="2209800" y="2484437"/>
+            <a:ext cx="4953000" cy="2057400"/>
           </a:xfrm>
           <a:prstGeom prst="roundRect">
             <a:avLst>
@@ -3315,57 +3315,6 @@
           </a:p>
         </p:txBody>
       </p:sp>
-      <p:sp>
-        <p:nvSpPr>
-          <p:cNvPr id="157" name="Rounded Rectangle 156"/>
-          <p:cNvSpPr/>
-          <p:nvPr/>
-        </p:nvSpPr>
-        <p:spPr>
-          <a:xfrm>
-            <a:off x="2514600" y="2789237"/>
-            <a:ext cx="2133600" cy="1752600"/>
-          </a:xfrm>
-          <a:prstGeom prst="roundRect">
-            <a:avLst>
-              <a:gd name="adj" fmla="val 9891"/>
-            </a:avLst>
-          </a:prstGeom>
-          <a:solidFill>
-            <a:schemeClr val="accent6">
-              <a:lumMod val="40000"/>
-              <a:lumOff val="60000"/>
-            </a:schemeClr>
-          </a:solidFill>
-          <a:ln>
-            <a:noFill/>
-          </a:ln>
-        </p:spPr>
-        <p:style>
-          <a:lnRef idx="2">
-            <a:schemeClr val="accent1">
-              <a:shade val="50000"/>
-            </a:schemeClr>
-          </a:lnRef>
-          <a:fillRef idx="1">
-            <a:schemeClr val="accent1"/>
-          </a:fillRef>
-          <a:effectRef idx="0">
-            <a:schemeClr val="accent1"/>
-          </a:effectRef>
-          <a:fontRef idx="minor">
-            <a:schemeClr val="lt1"/>
-          </a:fontRef>
-        </p:style>
-        <p:txBody>
-          <a:bodyPr rtlCol="0" anchor="ctr"/>
-          <a:lstStyle/>
-          <a:p>
-            <a:pPr algn="ctr"/>
-            <a:endParaRPr lang="en-US"/>
-          </a:p>
-        </p:txBody>
-      </p:sp>
       <p:grpSp>
         <p:nvGrpSpPr>
           <p:cNvPr id="158" name="Group 157"/>
@@ -3375,7 +3324,7 @@
         <p:grpSpPr>
           <a:xfrm>
             <a:off x="457200" y="427037"/>
-            <a:ext cx="2057400" cy="1676400"/>
+            <a:ext cx="2209800" cy="1828800"/>
             <a:chOff x="-838200" y="1371600"/>
             <a:chExt cx="1981200" cy="1295400"/>
           </a:xfrm>
@@ -3647,8 +3596,8 @@
         </p:nvSpPr>
         <p:spPr>
           <a:xfrm>
-            <a:off x="762000" y="960437"/>
-            <a:ext cx="1524000" cy="457200"/>
+            <a:off x="990600" y="960437"/>
+            <a:ext cx="1143000" cy="304800"/>
           </a:xfrm>
           <a:prstGeom prst="rect">
             <a:avLst/>
@@ -3960,7 +3909,7 @@
         </p:nvSpPr>
         <p:spPr>
           <a:xfrm>
-            <a:off x="5963941" y="2558609"/>
+            <a:off x="7349918" y="4103867"/>
             <a:ext cx="1184482" cy="361770"/>
           </a:xfrm>
           <a:prstGeom prst="rect">
@@ -3990,7 +3939,7 @@
             <a:pPr algn="ctr"/>
             <a:r>
               <a:rPr lang="en-US" sz="1600" b="1" dirty="0" err="1" smtClean="0"/>
-              <a:t>UserData</a:t>
+              <a:t>UserType</a:t>
             </a:r>
             <a:endParaRPr lang="en-SG" sz="1600" b="1" dirty="0"/>
           </a:p>
@@ -3998,14 +3947,14 @@
       </p:sp>
       <p:sp>
         <p:nvSpPr>
-          <p:cNvPr id="172" name="Rectangle 171"/>
+          <p:cNvPr id="173" name="Rectangle 172"/>
           <p:cNvSpPr/>
           <p:nvPr/>
         </p:nvSpPr>
         <p:spPr>
           <a:xfrm>
-            <a:off x="4495800" y="3527487"/>
-            <a:ext cx="1304746" cy="361770"/>
+            <a:off x="5881777" y="4027667"/>
+            <a:ext cx="1204823" cy="361770"/>
           </a:xfrm>
           <a:prstGeom prst="rect">
             <a:avLst/>
@@ -4034,7 +3983,7 @@
             <a:pPr algn="ctr"/>
             <a:r>
               <a:rPr lang="en-US" sz="1600" b="1" dirty="0" err="1" smtClean="0"/>
-              <a:t>StudentData</a:t>
+              <a:t>CoordData</a:t>
             </a:r>
             <a:endParaRPr lang="en-SG" sz="1600" b="1" dirty="0"/>
           </a:p>
@@ -4042,14 +3991,14 @@
       </p:sp>
       <p:sp>
         <p:nvSpPr>
-          <p:cNvPr id="173" name="Rectangle 172"/>
+          <p:cNvPr id="174" name="Rectangle 173"/>
           <p:cNvSpPr/>
           <p:nvPr/>
         </p:nvSpPr>
         <p:spPr>
           <a:xfrm>
-            <a:off x="5933806" y="3530102"/>
-            <a:ext cx="1204823" cy="361770"/>
+            <a:off x="4124593" y="4008437"/>
+            <a:ext cx="1590407" cy="361770"/>
           </a:xfrm>
           <a:prstGeom prst="rect">
             <a:avLst/>
@@ -4078,7 +4027,7 @@
             <a:pPr algn="ctr"/>
             <a:r>
               <a:rPr lang="en-US" sz="1600" b="1" dirty="0" err="1" smtClean="0"/>
-              <a:t>CoordData</a:t>
+              <a:t>EvaluationData</a:t>
             </a:r>
             <a:endParaRPr lang="en-SG" sz="1600" b="1" dirty="0"/>
           </a:p>
@@ -4086,14 +4035,234 @@
       </p:sp>
       <p:sp>
         <p:nvSpPr>
-          <p:cNvPr id="174" name="Rectangle 173"/>
+          <p:cNvPr id="182" name="Rectangle 181"/>
           <p:cNvSpPr/>
           <p:nvPr/>
         </p:nvSpPr>
         <p:spPr>
           <a:xfrm>
-            <a:off x="2792675" y="3526747"/>
-            <a:ext cx="1590407" cy="361770"/>
+            <a:off x="569025" y="3053892"/>
+            <a:ext cx="1524000" cy="361770"/>
+          </a:xfrm>
+          <a:prstGeom prst="rect">
+            <a:avLst/>
+          </a:prstGeom>
+        </p:spPr>
+        <p:style>
+          <a:lnRef idx="2">
+            <a:schemeClr val="accent5">
+              <a:shade val="50000"/>
+            </a:schemeClr>
+          </a:lnRef>
+          <a:fillRef idx="1">
+            <a:schemeClr val="accent5"/>
+          </a:fillRef>
+          <a:effectRef idx="0">
+            <a:schemeClr val="accent5"/>
+          </a:effectRef>
+          <a:fontRef idx="minor">
+            <a:schemeClr val="lt1"/>
+          </a:fontRef>
+        </p:style>
+        <p:txBody>
+          <a:bodyPr rtlCol="0" anchor="ctr"/>
+          <a:lstStyle/>
+          <a:p>
+            <a:pPr algn="ctr"/>
+            <a:r>
+              <a:rPr lang="en-US" sz="1600" b="1" dirty="0" err="1" smtClean="0"/>
+              <a:t>TeamData</a:t>
+            </a:r>
+            <a:endParaRPr lang="en-SG" sz="1600" b="1" dirty="0"/>
+          </a:p>
+        </p:txBody>
+      </p:sp>
+      <p:sp>
+        <p:nvSpPr>
+          <p:cNvPr id="183" name="Rectangle 182"/>
+          <p:cNvSpPr/>
+          <p:nvPr/>
+        </p:nvSpPr>
+        <p:spPr>
+          <a:xfrm>
+            <a:off x="569025" y="3549192"/>
+            <a:ext cx="1524000" cy="361770"/>
+          </a:xfrm>
+          <a:prstGeom prst="rect">
+            <a:avLst/>
+          </a:prstGeom>
+        </p:spPr>
+        <p:style>
+          <a:lnRef idx="2">
+            <a:schemeClr val="accent5">
+              <a:shade val="50000"/>
+            </a:schemeClr>
+          </a:lnRef>
+          <a:fillRef idx="1">
+            <a:schemeClr val="accent5"/>
+          </a:fillRef>
+          <a:effectRef idx="0">
+            <a:schemeClr val="accent5"/>
+          </a:effectRef>
+          <a:fontRef idx="minor">
+            <a:schemeClr val="lt1"/>
+          </a:fontRef>
+        </p:style>
+        <p:txBody>
+          <a:bodyPr rtlCol="0" anchor="ctr"/>
+          <a:lstStyle/>
+          <a:p>
+            <a:pPr algn="ctr"/>
+            <a:r>
+              <a:rPr lang="en-US" sz="1600" b="1" dirty="0" err="1" smtClean="0"/>
+              <a:t>EvalResultData</a:t>
+            </a:r>
+            <a:endParaRPr lang="en-SG" sz="1600" b="1" dirty="0"/>
+          </a:p>
+        </p:txBody>
+      </p:sp>
+      <p:sp>
+        <p:nvSpPr>
+          <p:cNvPr id="184" name="Rectangle 183"/>
+          <p:cNvSpPr/>
+          <p:nvPr/>
+        </p:nvSpPr>
+        <p:spPr>
+          <a:xfrm>
+            <a:off x="569025" y="4044492"/>
+            <a:ext cx="1524000" cy="361770"/>
+          </a:xfrm>
+          <a:prstGeom prst="rect">
+            <a:avLst/>
+          </a:prstGeom>
+        </p:spPr>
+        <p:style>
+          <a:lnRef idx="2">
+            <a:schemeClr val="accent5">
+              <a:shade val="50000"/>
+            </a:schemeClr>
+          </a:lnRef>
+          <a:fillRef idx="1">
+            <a:schemeClr val="accent5"/>
+          </a:fillRef>
+          <a:effectRef idx="0">
+            <a:schemeClr val="accent5"/>
+          </a:effectRef>
+          <a:fontRef idx="minor">
+            <a:schemeClr val="lt1"/>
+          </a:fontRef>
+        </p:style>
+        <p:txBody>
+          <a:bodyPr rtlCol="0" anchor="ctr"/>
+          <a:lstStyle/>
+          <a:p>
+            <a:pPr algn="ctr"/>
+            <a:r>
+              <a:rPr lang="en-US" sz="1600" b="1" dirty="0" err="1" smtClean="0"/>
+              <a:t>DataBundle</a:t>
+            </a:r>
+            <a:endParaRPr lang="en-SG" sz="1600" b="1" dirty="0"/>
+          </a:p>
+        </p:txBody>
+      </p:sp>
+      <p:sp>
+        <p:nvSpPr>
+          <p:cNvPr id="35" name="Rectangle 34"/>
+          <p:cNvSpPr/>
+          <p:nvPr/>
+        </p:nvSpPr>
+        <p:spPr>
+          <a:xfrm>
+            <a:off x="762000" y="1341437"/>
+            <a:ext cx="1600200" cy="304800"/>
+          </a:xfrm>
+          <a:prstGeom prst="rect">
+            <a:avLst/>
+          </a:prstGeom>
+        </p:spPr>
+        <p:style>
+          <a:lnRef idx="2">
+            <a:schemeClr val="accent3">
+              <a:shade val="50000"/>
+            </a:schemeClr>
+          </a:lnRef>
+          <a:fillRef idx="1">
+            <a:schemeClr val="accent3"/>
+          </a:fillRef>
+          <a:effectRef idx="0">
+            <a:schemeClr val="accent3"/>
+          </a:effectRef>
+          <a:fontRef idx="minor">
+            <a:schemeClr val="lt1"/>
+          </a:fontRef>
+        </p:style>
+        <p:txBody>
+          <a:bodyPr rtlCol="0" anchor="ctr"/>
+          <a:lstStyle/>
+          <a:p>
+            <a:pPr algn="ctr"/>
+            <a:r>
+              <a:rPr lang="en-US" sz="1600" b="1" dirty="0" err="1" smtClean="0"/>
+              <a:t>BuildProperties</a:t>
+            </a:r>
+            <a:endParaRPr lang="en-SG" sz="1600" b="1" dirty="0"/>
+          </a:p>
+        </p:txBody>
+      </p:sp>
+      <p:sp>
+        <p:nvSpPr>
+          <p:cNvPr id="36" name="Rectangle 35"/>
+          <p:cNvSpPr/>
+          <p:nvPr/>
+        </p:nvSpPr>
+        <p:spPr>
+          <a:xfrm>
+            <a:off x="762000" y="1722437"/>
+            <a:ext cx="1600200" cy="304800"/>
+          </a:xfrm>
+          <a:prstGeom prst="rect">
+            <a:avLst/>
+          </a:prstGeom>
+        </p:spPr>
+        <p:style>
+          <a:lnRef idx="2">
+            <a:schemeClr val="accent3">
+              <a:shade val="50000"/>
+            </a:schemeClr>
+          </a:lnRef>
+          <a:fillRef idx="1">
+            <a:schemeClr val="accent3"/>
+          </a:fillRef>
+          <a:effectRef idx="0">
+            <a:schemeClr val="accent3"/>
+          </a:effectRef>
+          <a:fontRef idx="minor">
+            <a:schemeClr val="lt1"/>
+          </a:fontRef>
+        </p:style>
+        <p:txBody>
+          <a:bodyPr rtlCol="0" anchor="ctr"/>
+          <a:lstStyle/>
+          <a:p>
+            <a:pPr algn="ctr"/>
+            <a:r>
+              <a:rPr lang="en-US" sz="1600" b="1" dirty="0" smtClean="0"/>
+              <a:t>Assumption</a:t>
+            </a:r>
+            <a:endParaRPr lang="en-SG" sz="1600" b="1" dirty="0"/>
+          </a:p>
+        </p:txBody>
+      </p:sp>
+      <p:sp>
+        <p:nvSpPr>
+          <p:cNvPr id="38" name="Rectangle 37"/>
+          <p:cNvSpPr/>
+          <p:nvPr/>
+        </p:nvSpPr>
+        <p:spPr>
+          <a:xfrm>
+            <a:off x="4052977" y="2579867"/>
+            <a:ext cx="1585823" cy="361770"/>
           </a:xfrm>
           <a:prstGeom prst="rect">
             <a:avLst/>
@@ -4122,12 +4291,170 @@
             <a:pPr algn="ctr"/>
             <a:r>
               <a:rPr lang="en-US" sz="1600" b="1" dirty="0" err="1" smtClean="0"/>
-              <a:t>EvaluationData</a:t>
+              <a:t>BaseData</a:t>
             </a:r>
             <a:endParaRPr lang="en-SG" sz="1600" b="1" dirty="0"/>
           </a:p>
         </p:txBody>
       </p:sp>
+      <p:cxnSp>
+        <p:nvCxnSpPr>
+          <p:cNvPr id="39" name="Elbow Connector 38"/>
+          <p:cNvCxnSpPr/>
+          <p:nvPr/>
+        </p:nvCxnSpPr>
+        <p:spPr>
+          <a:xfrm>
+            <a:off x="2667002" y="3322637"/>
+            <a:ext cx="4190999" cy="1"/>
+          </a:xfrm>
+          <a:prstGeom prst="bentConnector3">
+            <a:avLst>
+              <a:gd name="adj1" fmla="val 50000"/>
+            </a:avLst>
+          </a:prstGeom>
+          <a:ln>
+            <a:headEnd type="none" w="med" len="med"/>
+            <a:tailEnd type="none" w="med" len="med"/>
+          </a:ln>
+        </p:spPr>
+        <p:style>
+          <a:lnRef idx="2">
+            <a:schemeClr val="accent6"/>
+          </a:lnRef>
+          <a:fillRef idx="0">
+            <a:schemeClr val="accent6"/>
+          </a:fillRef>
+          <a:effectRef idx="1">
+            <a:schemeClr val="accent6"/>
+          </a:effectRef>
+          <a:fontRef idx="minor">
+            <a:schemeClr val="tx1"/>
+          </a:fontRef>
+        </p:style>
+      </p:cxnSp>
+      <p:cxnSp>
+        <p:nvCxnSpPr>
+          <p:cNvPr id="69" name="Elbow Connector 68"/>
+          <p:cNvCxnSpPr>
+            <a:endCxn id="37" idx="3"/>
+          </p:cNvCxnSpPr>
+          <p:nvPr/>
+        </p:nvCxnSpPr>
+        <p:spPr>
+          <a:xfrm flipV="1">
+            <a:off x="4800600" y="3194050"/>
+            <a:ext cx="14288" cy="814387"/>
+          </a:xfrm>
+          <a:prstGeom prst="straightConnector1">
+            <a:avLst/>
+          </a:prstGeom>
+        </p:spPr>
+        <p:style>
+          <a:lnRef idx="2">
+            <a:schemeClr val="accent6"/>
+          </a:lnRef>
+          <a:fillRef idx="0">
+            <a:schemeClr val="accent6"/>
+          </a:fillRef>
+          <a:effectRef idx="1">
+            <a:schemeClr val="accent6"/>
+          </a:effectRef>
+          <a:fontRef idx="minor">
+            <a:schemeClr val="tx1"/>
+          </a:fontRef>
+        </p:style>
+      </p:cxnSp>
+      <p:cxnSp>
+        <p:nvCxnSpPr>
+          <p:cNvPr id="99" name="Elbow Connector 68"/>
+          <p:cNvCxnSpPr/>
+          <p:nvPr/>
+        </p:nvCxnSpPr>
+        <p:spPr>
+          <a:xfrm flipV="1">
+            <a:off x="6172200" y="3322637"/>
+            <a:ext cx="0" cy="228600"/>
+          </a:xfrm>
+          <a:prstGeom prst="straightConnector1">
+            <a:avLst/>
+          </a:prstGeom>
+        </p:spPr>
+        <p:style>
+          <a:lnRef idx="2">
+            <a:schemeClr val="accent6"/>
+          </a:lnRef>
+          <a:fillRef idx="0">
+            <a:schemeClr val="accent6"/>
+          </a:fillRef>
+          <a:effectRef idx="1">
+            <a:schemeClr val="accent6"/>
+          </a:effectRef>
+          <a:fontRef idx="minor">
+            <a:schemeClr val="tx1"/>
+          </a:fontRef>
+        </p:style>
+      </p:cxnSp>
+      <p:cxnSp>
+        <p:nvCxnSpPr>
+          <p:cNvPr id="102" name="Elbow Connector 68"/>
+          <p:cNvCxnSpPr/>
+          <p:nvPr/>
+        </p:nvCxnSpPr>
+        <p:spPr>
+          <a:xfrm flipV="1">
+            <a:off x="6858000" y="3322637"/>
+            <a:ext cx="0" cy="685800"/>
+          </a:xfrm>
+          <a:prstGeom prst="straightConnector1">
+            <a:avLst/>
+          </a:prstGeom>
+        </p:spPr>
+        <p:style>
+          <a:lnRef idx="2">
+            <a:schemeClr val="accent6"/>
+          </a:lnRef>
+          <a:fillRef idx="0">
+            <a:schemeClr val="accent6"/>
+          </a:fillRef>
+          <a:effectRef idx="1">
+            <a:schemeClr val="accent6"/>
+          </a:effectRef>
+          <a:fontRef idx="minor">
+            <a:schemeClr val="tx1"/>
+          </a:fontRef>
+        </p:style>
+      </p:cxnSp>
+      <p:cxnSp>
+        <p:nvCxnSpPr>
+          <p:cNvPr id="105" name="Elbow Connector 68"/>
+          <p:cNvCxnSpPr/>
+          <p:nvPr/>
+        </p:nvCxnSpPr>
+        <p:spPr>
+          <a:xfrm flipV="1">
+            <a:off x="2667000" y="3322637"/>
+            <a:ext cx="0" cy="685800"/>
+          </a:xfrm>
+          <a:prstGeom prst="straightConnector1">
+            <a:avLst/>
+          </a:prstGeom>
+        </p:spPr>
+        <p:style>
+          <a:lnRef idx="2">
+            <a:schemeClr val="accent6"/>
+          </a:lnRef>
+          <a:fillRef idx="0">
+            <a:schemeClr val="accent6"/>
+          </a:fillRef>
+          <a:effectRef idx="1">
+            <a:schemeClr val="accent6"/>
+          </a:effectRef>
+          <a:fontRef idx="minor">
+            <a:schemeClr val="tx1"/>
+          </a:fontRef>
+        </p:style>
+      </p:cxnSp>
       <p:sp>
         <p:nvSpPr>
           <p:cNvPr id="175" name="Rectangle 174"/>
@@ -4136,7 +4463,7 @@
         </p:nvSpPr>
         <p:spPr>
           <a:xfrm>
-            <a:off x="2792675" y="4000772"/>
+            <a:off x="2362200" y="4000772"/>
             <a:ext cx="1585823" cy="361770"/>
           </a:xfrm>
           <a:prstGeom prst="rect">
@@ -4174,130 +4501,16 @@
       </p:sp>
       <p:sp>
         <p:nvSpPr>
-          <p:cNvPr id="176" name="Isosceles Triangle 175"/>
+          <p:cNvPr id="37" name="Isosceles Triangle 36"/>
           <p:cNvSpPr/>
           <p:nvPr/>
         </p:nvSpPr>
         <p:spPr>
           <a:xfrm>
-            <a:off x="6400442" y="2917887"/>
+            <a:off x="4676775" y="2965450"/>
             <a:ext cx="276225" cy="228600"/>
           </a:xfrm>
           <a:prstGeom prst="triangle">
-            <a:avLst/>
-          </a:prstGeom>
-        </p:spPr>
-        <p:style>
-          <a:lnRef idx="2">
-            <a:schemeClr val="accent4">
-              <a:shade val="50000"/>
-            </a:schemeClr>
-          </a:lnRef>
-          <a:fillRef idx="1">
-            <a:schemeClr val="accent4"/>
-          </a:fillRef>
-          <a:effectRef idx="0">
-            <a:schemeClr val="accent4"/>
-          </a:effectRef>
-          <a:fontRef idx="minor">
-            <a:schemeClr val="lt1"/>
-          </a:fontRef>
-        </p:style>
-        <p:txBody>
-          <a:bodyPr rtlCol="0" anchor="ctr"/>
-          <a:lstStyle/>
-          <a:p>
-            <a:pPr algn="ctr"/>
-            <a:endParaRPr lang="en-SG"/>
-          </a:p>
-        </p:txBody>
-      </p:sp>
-      <p:cxnSp>
-        <p:nvCxnSpPr>
-          <p:cNvPr id="177" name="Elbow Connector 176"/>
-          <p:cNvCxnSpPr>
-            <a:stCxn id="176" idx="3"/>
-            <a:endCxn id="172" idx="0"/>
-          </p:cNvCxnSpPr>
-          <p:nvPr/>
-        </p:nvCxnSpPr>
-        <p:spPr>
-          <a:xfrm rot="5400000">
-            <a:off x="5652864" y="2641796"/>
-            <a:ext cx="381000" cy="1390382"/>
-          </a:xfrm>
-          <a:prstGeom prst="bentConnector3">
-            <a:avLst>
-              <a:gd name="adj1" fmla="val 25065"/>
-            </a:avLst>
-          </a:prstGeom>
-        </p:spPr>
-        <p:style>
-          <a:lnRef idx="2">
-            <a:schemeClr val="accent4">
-              <a:shade val="50000"/>
-            </a:schemeClr>
-          </a:lnRef>
-          <a:fillRef idx="1">
-            <a:schemeClr val="accent4"/>
-          </a:fillRef>
-          <a:effectRef idx="0">
-            <a:schemeClr val="accent4"/>
-          </a:effectRef>
-          <a:fontRef idx="minor">
-            <a:schemeClr val="lt1"/>
-          </a:fontRef>
-        </p:style>
-      </p:cxnSp>
-      <p:cxnSp>
-        <p:nvCxnSpPr>
-          <p:cNvPr id="178" name="Elbow Connector 177"/>
-          <p:cNvCxnSpPr>
-            <a:stCxn id="173" idx="0"/>
-            <a:endCxn id="176" idx="3"/>
-          </p:cNvCxnSpPr>
-          <p:nvPr/>
-        </p:nvCxnSpPr>
-        <p:spPr>
-          <a:xfrm rot="5400000" flipH="1" flipV="1">
-            <a:off x="6345579" y="3337127"/>
-            <a:ext cx="383615" cy="2337"/>
-          </a:xfrm>
-          <a:prstGeom prst="bentConnector3">
-            <a:avLst>
-              <a:gd name="adj1" fmla="val 50000"/>
-            </a:avLst>
-          </a:prstGeom>
-        </p:spPr>
-        <p:style>
-          <a:lnRef idx="2">
-            <a:schemeClr val="accent4">
-              <a:shade val="50000"/>
-            </a:schemeClr>
-          </a:lnRef>
-          <a:fillRef idx="1">
-            <a:schemeClr val="accent4"/>
-          </a:fillRef>
-          <a:effectRef idx="0">
-            <a:schemeClr val="accent4"/>
-          </a:effectRef>
-          <a:fontRef idx="minor">
-            <a:schemeClr val="lt1"/>
-          </a:fontRef>
-        </p:style>
-      </p:cxnSp>
-      <p:sp>
-        <p:nvSpPr>
-          <p:cNvPr id="179" name="Rectangle 178"/>
-          <p:cNvSpPr/>
-          <p:nvPr/>
-        </p:nvSpPr>
-        <p:spPr>
-          <a:xfrm>
-            <a:off x="2792675" y="3069547"/>
-            <a:ext cx="1585823" cy="361770"/>
-          </a:xfrm>
-          <a:prstGeom prst="rect">
             <a:avLst/>
           </a:prstGeom>
         </p:spPr>
@@ -4322,24 +4535,22 @@
           <a:lstStyle/>
           <a:p>
             <a:pPr algn="ctr"/>
-            <a:r>
-              <a:rPr lang="en-US" sz="1600" b="1" dirty="0" err="1" smtClean="0"/>
-              <a:t>CourseData</a:t>
-            </a:r>
-            <a:endParaRPr lang="en-SG" sz="1600" b="1" dirty="0"/>
-          </a:p>
-        </p:txBody>
-      </p:sp>
-      <p:sp>
-        <p:nvSpPr>
-          <p:cNvPr id="180" name="Rectangle 179"/>
-          <p:cNvSpPr/>
+            <a:endParaRPr lang="en-SG"/>
+          </a:p>
+        </p:txBody>
+      </p:sp>
+      <p:sp>
+        <p:nvSpPr>
+          <p:cNvPr id="172" name="Rectangle 171"/>
+          <p:cNvSpPr>
+            <a:spLocks/>
+          </p:cNvSpPr>
           <p:nvPr/>
         </p:nvSpPr>
         <p:spPr>
           <a:xfrm>
-            <a:off x="7405777" y="3527487"/>
-            <a:ext cx="1204823" cy="361770"/>
+            <a:off x="5324654" y="3551237"/>
+            <a:ext cx="1304746" cy="361770"/>
           </a:xfrm>
           <a:prstGeom prst="rect">
             <a:avLst/>
@@ -4347,15 +4558,15 @@
         </p:spPr>
         <p:style>
           <a:lnRef idx="2">
-            <a:schemeClr val="accent4">
+            <a:schemeClr val="accent6">
               <a:shade val="50000"/>
             </a:schemeClr>
           </a:lnRef>
           <a:fillRef idx="1">
-            <a:schemeClr val="accent4"/>
+            <a:schemeClr val="accent6"/>
           </a:fillRef>
           <a:effectRef idx="0">
-            <a:schemeClr val="accent4"/>
+            <a:schemeClr val="accent6"/>
           </a:effectRef>
           <a:fontRef idx="minor">
             <a:schemeClr val="lt1"/>
@@ -4368,7 +4579,7 @@
             <a:pPr algn="ctr"/>
             <a:r>
               <a:rPr lang="en-US" sz="1600" b="1" dirty="0" err="1" smtClean="0"/>
-              <a:t>AdminData</a:t>
+              <a:t>StudentData</a:t>
             </a:r>
             <a:endParaRPr lang="en-SG" sz="1600" b="1" dirty="0"/>
           </a:p>
@@ -4376,72 +4587,65 @@
       </p:sp>
       <p:cxnSp>
         <p:nvCxnSpPr>
-          <p:cNvPr id="181" name="Elbow Connector 180"/>
-          <p:cNvCxnSpPr>
-            <a:stCxn id="180" idx="0"/>
-            <a:endCxn id="176" idx="3"/>
-          </p:cNvCxnSpPr>
+          <p:cNvPr id="108" name="Elbow Connector 68"/>
+          <p:cNvCxnSpPr/>
           <p:nvPr/>
         </p:nvCxnSpPr>
         <p:spPr>
-          <a:xfrm rot="16200000" flipV="1">
-            <a:off x="7082872" y="2602170"/>
-            <a:ext cx="381000" cy="1469634"/>
-          </a:xfrm>
-          <a:prstGeom prst="bentConnector3">
-            <a:avLst>
-              <a:gd name="adj1" fmla="val 74935"/>
-            </a:avLst>
+          <a:xfrm flipV="1">
+            <a:off x="3810000" y="3322637"/>
+            <a:ext cx="0" cy="228600"/>
+          </a:xfrm>
+          <a:prstGeom prst="straightConnector1">
+            <a:avLst/>
           </a:prstGeom>
         </p:spPr>
         <p:style>
           <a:lnRef idx="2">
-            <a:schemeClr val="accent4">
+            <a:schemeClr val="accent6"/>
+          </a:lnRef>
+          <a:fillRef idx="0">
+            <a:schemeClr val="accent6"/>
+          </a:fillRef>
+          <a:effectRef idx="1">
+            <a:schemeClr val="accent6"/>
+          </a:effectRef>
+          <a:fontRef idx="minor">
+            <a:schemeClr val="tx1"/>
+          </a:fontRef>
+        </p:style>
+      </p:cxnSp>
+      <p:sp>
+        <p:nvSpPr>
+          <p:cNvPr id="179" name="Rectangle 178"/>
+          <p:cNvSpPr/>
+          <p:nvPr/>
+        </p:nvSpPr>
+        <p:spPr>
+          <a:xfrm>
+            <a:off x="2986177" y="3551237"/>
+            <a:ext cx="1585823" cy="361770"/>
+          </a:xfrm>
+          <a:prstGeom prst="rect">
+            <a:avLst/>
+          </a:prstGeom>
+        </p:spPr>
+        <p:style>
+          <a:lnRef idx="2">
+            <a:schemeClr val="accent6">
               <a:shade val="50000"/>
             </a:schemeClr>
           </a:lnRef>
           <a:fillRef idx="1">
-            <a:schemeClr val="accent4"/>
+            <a:schemeClr val="accent6"/>
           </a:fillRef>
           <a:effectRef idx="0">
-            <a:schemeClr val="accent4"/>
+            <a:schemeClr val="accent6"/>
           </a:effectRef>
           <a:fontRef idx="minor">
             <a:schemeClr val="lt1"/>
           </a:fontRef>
         </p:style>
-      </p:cxnSp>
-      <p:sp>
-        <p:nvSpPr>
-          <p:cNvPr id="182" name="Rectangle 181"/>
-          <p:cNvSpPr/>
-          <p:nvPr/>
-        </p:nvSpPr>
-        <p:spPr>
-          <a:xfrm>
-            <a:off x="569025" y="3053892"/>
-            <a:ext cx="1524000" cy="361770"/>
-          </a:xfrm>
-          <a:prstGeom prst="rect">
-            <a:avLst/>
-          </a:prstGeom>
-        </p:spPr>
-        <p:style>
-          <a:lnRef idx="2">
-            <a:schemeClr val="accent5">
-              <a:shade val="50000"/>
-            </a:schemeClr>
-          </a:lnRef>
-          <a:fillRef idx="1">
-            <a:schemeClr val="accent5"/>
-          </a:fillRef>
-          <a:effectRef idx="0">
-            <a:schemeClr val="accent5"/>
-          </a:effectRef>
-          <a:fontRef idx="minor">
-            <a:schemeClr val="lt1"/>
-          </a:fontRef>
-        </p:style>
         <p:txBody>
           <a:bodyPr rtlCol="0" anchor="ctr"/>
           <a:lstStyle/>
@@ -4449,139 +4653,7 @@
             <a:pPr algn="ctr"/>
             <a:r>
               <a:rPr lang="en-US" sz="1600" b="1" dirty="0" err="1" smtClean="0"/>
-              <a:t>TeamData</a:t>
-            </a:r>
-            <a:endParaRPr lang="en-SG" sz="1600" b="1" dirty="0"/>
-          </a:p>
-        </p:txBody>
-      </p:sp>
-      <p:sp>
-        <p:nvSpPr>
-          <p:cNvPr id="183" name="Rectangle 182"/>
-          <p:cNvSpPr/>
-          <p:nvPr/>
-        </p:nvSpPr>
-        <p:spPr>
-          <a:xfrm>
-            <a:off x="569025" y="3549192"/>
-            <a:ext cx="1524000" cy="361770"/>
-          </a:xfrm>
-          <a:prstGeom prst="rect">
-            <a:avLst/>
-          </a:prstGeom>
-        </p:spPr>
-        <p:style>
-          <a:lnRef idx="2">
-            <a:schemeClr val="accent5">
-              <a:shade val="50000"/>
-            </a:schemeClr>
-          </a:lnRef>
-          <a:fillRef idx="1">
-            <a:schemeClr val="accent5"/>
-          </a:fillRef>
-          <a:effectRef idx="0">
-            <a:schemeClr val="accent5"/>
-          </a:effectRef>
-          <a:fontRef idx="minor">
-            <a:schemeClr val="lt1"/>
-          </a:fontRef>
-        </p:style>
-        <p:txBody>
-          <a:bodyPr rtlCol="0" anchor="ctr"/>
-          <a:lstStyle/>
-          <a:p>
-            <a:pPr algn="ctr"/>
-            <a:r>
-              <a:rPr lang="en-US" sz="1600" b="1" dirty="0" err="1" smtClean="0"/>
-              <a:t>EvalResultData</a:t>
-            </a:r>
-            <a:endParaRPr lang="en-SG" sz="1600" b="1" dirty="0"/>
-          </a:p>
-        </p:txBody>
-      </p:sp>
-      <p:sp>
-        <p:nvSpPr>
-          <p:cNvPr id="184" name="Rectangle 183"/>
-          <p:cNvSpPr/>
-          <p:nvPr/>
-        </p:nvSpPr>
-        <p:spPr>
-          <a:xfrm>
-            <a:off x="569025" y="4044492"/>
-            <a:ext cx="1524000" cy="361770"/>
-          </a:xfrm>
-          <a:prstGeom prst="rect">
-            <a:avLst/>
-          </a:prstGeom>
-        </p:spPr>
-        <p:style>
-          <a:lnRef idx="2">
-            <a:schemeClr val="accent5">
-              <a:shade val="50000"/>
-            </a:schemeClr>
-          </a:lnRef>
-          <a:fillRef idx="1">
-            <a:schemeClr val="accent5"/>
-          </a:fillRef>
-          <a:effectRef idx="0">
-            <a:schemeClr val="accent5"/>
-          </a:effectRef>
-          <a:fontRef idx="minor">
-            <a:schemeClr val="lt1"/>
-          </a:fontRef>
-        </p:style>
-        <p:txBody>
-          <a:bodyPr rtlCol="0" anchor="ctr"/>
-          <a:lstStyle/>
-          <a:p>
-            <a:pPr algn="ctr"/>
-            <a:r>
-              <a:rPr lang="en-US" sz="1600" b="1" dirty="0" err="1" smtClean="0"/>
-              <a:t>DataBundle</a:t>
-            </a:r>
-            <a:endParaRPr lang="en-SG" sz="1600" b="1" dirty="0"/>
-          </a:p>
-        </p:txBody>
-      </p:sp>
-      <p:sp>
-        <p:nvSpPr>
-          <p:cNvPr id="35" name="Rectangle 34"/>
-          <p:cNvSpPr/>
-          <p:nvPr/>
-        </p:nvSpPr>
-        <p:spPr>
-          <a:xfrm>
-            <a:off x="762000" y="1570037"/>
-            <a:ext cx="1524000" cy="457200"/>
-          </a:xfrm>
-          <a:prstGeom prst="rect">
-            <a:avLst/>
-          </a:prstGeom>
-        </p:spPr>
-        <p:style>
-          <a:lnRef idx="2">
-            <a:schemeClr val="accent3">
-              <a:shade val="50000"/>
-            </a:schemeClr>
-          </a:lnRef>
-          <a:fillRef idx="1">
-            <a:schemeClr val="accent3"/>
-          </a:fillRef>
-          <a:effectRef idx="0">
-            <a:schemeClr val="accent3"/>
-          </a:effectRef>
-          <a:fontRef idx="minor">
-            <a:schemeClr val="lt1"/>
-          </a:fontRef>
-        </p:style>
-        <p:txBody>
-          <a:bodyPr rtlCol="0" anchor="ctr"/>
-          <a:lstStyle/>
-          <a:p>
-            <a:pPr algn="ctr"/>
-            <a:r>
-              <a:rPr lang="en-US" sz="1600" b="1" dirty="0" err="1" smtClean="0"/>
-              <a:t>BuildProperties</a:t>
+              <a:t>CourseData</a:t>
             </a:r>
             <a:endParaRPr lang="en-SG" sz="1600" b="1" dirty="0"/>
           </a:p>

</xml_diff>

<commit_message>
Handled Issue 417 [Refine DevMan to include new contributor workflow (and other cosmetic changes)] Update Issue 417 Went through the full text and refined where necessary. Updated two diagrams. Reformatted code using Eclipse auto-format.
</commit_message>
<xml_diff>
--- a/doc/diagrams/CommonComponent.pptx
+++ b/doc/diagrams/CommonComponent.pptx
@@ -289,7 +289,7 @@
             <a:fld id="{1D8BD707-D9CF-40AE-B4C6-C98DA3205C09}" type="datetimeFigureOut">
               <a:rPr lang="en-US" smtClean="0"/>
               <a:pPr/>
-              <a:t>12/1/2012</a:t>
+              <a:t>12/8/2012</a:t>
             </a:fld>
             <a:endParaRPr lang="en-US"/>
           </a:p>
@@ -456,7 +456,7 @@
             <a:fld id="{1D8BD707-D9CF-40AE-B4C6-C98DA3205C09}" type="datetimeFigureOut">
               <a:rPr lang="en-US" smtClean="0"/>
               <a:pPr/>
-              <a:t>12/1/2012</a:t>
+              <a:t>12/8/2012</a:t>
             </a:fld>
             <a:endParaRPr lang="en-US"/>
           </a:p>
@@ -633,7 +633,7 @@
             <a:fld id="{1D8BD707-D9CF-40AE-B4C6-C98DA3205C09}" type="datetimeFigureOut">
               <a:rPr lang="en-US" smtClean="0"/>
               <a:pPr/>
-              <a:t>12/1/2012</a:t>
+              <a:t>12/8/2012</a:t>
             </a:fld>
             <a:endParaRPr lang="en-US"/>
           </a:p>
@@ -800,7 +800,7 @@
             <a:fld id="{1D8BD707-D9CF-40AE-B4C6-C98DA3205C09}" type="datetimeFigureOut">
               <a:rPr lang="en-US" smtClean="0"/>
               <a:pPr/>
-              <a:t>12/1/2012</a:t>
+              <a:t>12/8/2012</a:t>
             </a:fld>
             <a:endParaRPr lang="en-US"/>
           </a:p>
@@ -1043,7 +1043,7 @@
             <a:fld id="{1D8BD707-D9CF-40AE-B4C6-C98DA3205C09}" type="datetimeFigureOut">
               <a:rPr lang="en-US" smtClean="0"/>
               <a:pPr/>
-              <a:t>12/1/2012</a:t>
+              <a:t>12/8/2012</a:t>
             </a:fld>
             <a:endParaRPr lang="en-US"/>
           </a:p>
@@ -1328,7 +1328,7 @@
             <a:fld id="{1D8BD707-D9CF-40AE-B4C6-C98DA3205C09}" type="datetimeFigureOut">
               <a:rPr lang="en-US" smtClean="0"/>
               <a:pPr/>
-              <a:t>12/1/2012</a:t>
+              <a:t>12/8/2012</a:t>
             </a:fld>
             <a:endParaRPr lang="en-US"/>
           </a:p>
@@ -1747,7 +1747,7 @@
             <a:fld id="{1D8BD707-D9CF-40AE-B4C6-C98DA3205C09}" type="datetimeFigureOut">
               <a:rPr lang="en-US" smtClean="0"/>
               <a:pPr/>
-              <a:t>12/1/2012</a:t>
+              <a:t>12/8/2012</a:t>
             </a:fld>
             <a:endParaRPr lang="en-US"/>
           </a:p>
@@ -1862,7 +1862,7 @@
             <a:fld id="{1D8BD707-D9CF-40AE-B4C6-C98DA3205C09}" type="datetimeFigureOut">
               <a:rPr lang="en-US" smtClean="0"/>
               <a:pPr/>
-              <a:t>12/1/2012</a:t>
+              <a:t>12/8/2012</a:t>
             </a:fld>
             <a:endParaRPr lang="en-US"/>
           </a:p>
@@ -1954,7 +1954,7 @@
             <a:fld id="{1D8BD707-D9CF-40AE-B4C6-C98DA3205C09}" type="datetimeFigureOut">
               <a:rPr lang="en-US" smtClean="0"/>
               <a:pPr/>
-              <a:t>12/1/2012</a:t>
+              <a:t>12/8/2012</a:t>
             </a:fld>
             <a:endParaRPr lang="en-US"/>
           </a:p>
@@ -2228,7 +2228,7 @@
             <a:fld id="{1D8BD707-D9CF-40AE-B4C6-C98DA3205C09}" type="datetimeFigureOut">
               <a:rPr lang="en-US" smtClean="0"/>
               <a:pPr/>
-              <a:t>12/1/2012</a:t>
+              <a:t>12/8/2012</a:t>
             </a:fld>
             <a:endParaRPr lang="en-US"/>
           </a:p>
@@ -2478,7 +2478,7 @@
             <a:fld id="{1D8BD707-D9CF-40AE-B4C6-C98DA3205C09}" type="datetimeFigureOut">
               <a:rPr lang="en-US" smtClean="0"/>
               <a:pPr/>
-              <a:t>12/1/2012</a:t>
+              <a:t>12/8/2012</a:t>
             </a:fld>
             <a:endParaRPr lang="en-US"/>
           </a:p>
@@ -2688,7 +2688,7 @@
             <a:fld id="{1D8BD707-D9CF-40AE-B4C6-C98DA3205C09}" type="datetimeFigureOut">
               <a:rPr lang="en-US" smtClean="0"/>
               <a:pPr/>
-              <a:t>12/1/2012</a:t>
+              <a:t>12/8/2012</a:t>
             </a:fld>
             <a:endParaRPr lang="en-US"/>
           </a:p>
@@ -3264,57 +3264,6 @@
           </p:txBody>
         </p:sp>
       </p:grpSp>
-      <p:sp>
-        <p:nvSpPr>
-          <p:cNvPr id="157" name="Rounded Rectangle 156"/>
-          <p:cNvSpPr/>
-          <p:nvPr/>
-        </p:nvSpPr>
-        <p:spPr>
-          <a:xfrm>
-            <a:off x="2390775" y="2484437"/>
-            <a:ext cx="6067425" cy="2057400"/>
-          </a:xfrm>
-          <a:prstGeom prst="roundRect">
-            <a:avLst>
-              <a:gd name="adj" fmla="val 9891"/>
-            </a:avLst>
-          </a:prstGeom>
-          <a:solidFill>
-            <a:schemeClr val="accent6">
-              <a:lumMod val="40000"/>
-              <a:lumOff val="60000"/>
-            </a:schemeClr>
-          </a:solidFill>
-          <a:ln>
-            <a:noFill/>
-          </a:ln>
-        </p:spPr>
-        <p:style>
-          <a:lnRef idx="2">
-            <a:schemeClr val="accent1">
-              <a:shade val="50000"/>
-            </a:schemeClr>
-          </a:lnRef>
-          <a:fillRef idx="1">
-            <a:schemeClr val="accent1"/>
-          </a:fillRef>
-          <a:effectRef idx="0">
-            <a:schemeClr val="accent1"/>
-          </a:effectRef>
-          <a:fontRef idx="minor">
-            <a:schemeClr val="lt1"/>
-          </a:fontRef>
-        </p:style>
-        <p:txBody>
-          <a:bodyPr rtlCol="0" anchor="ctr"/>
-          <a:lstStyle/>
-          <a:p>
-            <a:pPr algn="ctr"/>
-            <a:endParaRPr lang="en-US"/>
-          </a:p>
-        </p:txBody>
-      </p:sp>
       <p:grpSp>
         <p:nvGrpSpPr>
           <p:cNvPr id="158" name="Group 157"/>
@@ -3953,7 +3902,7 @@
         </p:nvSpPr>
         <p:spPr>
           <a:xfrm>
-            <a:off x="609601" y="3189467"/>
+            <a:off x="609601" y="3322817"/>
             <a:ext cx="1524000" cy="361770"/>
           </a:xfrm>
           <a:prstGeom prst="rect">
@@ -3997,7 +3946,7 @@
         </p:nvSpPr>
         <p:spPr>
           <a:xfrm>
-            <a:off x="609601" y="3684767"/>
+            <a:off x="609601" y="3751442"/>
             <a:ext cx="1524000" cy="361770"/>
           </a:xfrm>
           <a:prstGeom prst="rect">
@@ -4229,6 +4178,7 @@
             <a:headEnd type="none" w="med" len="med"/>
             <a:tailEnd type="none" w="med" len="med"/>
           </a:ln>
+          <a:effectLst/>
         </p:spPr>
         <p:style>
           <a:lnRef idx="2">
@@ -4261,6 +4211,7 @@
           <a:prstGeom prst="straightConnector1">
             <a:avLst/>
           </a:prstGeom>
+          <a:effectLst/>
         </p:spPr>
         <p:style>
           <a:lnRef idx="2">
@@ -4291,6 +4242,7 @@
           <a:prstGeom prst="straightConnector1">
             <a:avLst/>
           </a:prstGeom>
+          <a:effectLst/>
         </p:spPr>
         <p:style>
           <a:lnRef idx="2">
@@ -4321,6 +4273,7 @@
           <a:prstGeom prst="straightConnector1">
             <a:avLst/>
           </a:prstGeom>
+          <a:effectLst/>
         </p:spPr>
         <p:style>
           <a:lnRef idx="2">
@@ -4351,6 +4304,7 @@
           <a:prstGeom prst="straightConnector1">
             <a:avLst/>
           </a:prstGeom>
+          <a:effectLst/>
         </p:spPr>
         <p:style>
           <a:lnRef idx="2">
@@ -4423,6 +4377,7 @@
           <a:prstGeom prst="rect">
             <a:avLst/>
           </a:prstGeom>
+          <a:effectLst/>
         </p:spPr>
         <p:style>
           <a:lnRef idx="2">
@@ -4467,6 +4422,7 @@
           <a:prstGeom prst="straightConnector1">
             <a:avLst/>
           </a:prstGeom>
+          <a:effectLst/>
         </p:spPr>
         <p:style>
           <a:lnRef idx="2">
@@ -4497,6 +4453,7 @@
           <a:prstGeom prst="rect">
             <a:avLst/>
           </a:prstGeom>
+          <a:effectLst/>
         </p:spPr>
         <p:style>
           <a:lnRef idx="2">

</xml_diff>

<commit_message>
Starting Issue 724 [Update DevMan diagrams to match changes to design] Update Issue 724 Changed the diagrams that I thought required modifications, please let me know if I missed anything Also for dataTransferClasses.png, I changed  it but I'm not sure if it's correct - please let me know your feedback
</commit_message>
<xml_diff>
--- a/doc/diagrams/CommonComponent.pptx
+++ b/doc/diagrams/CommonComponent.pptx
@@ -289,7 +289,7 @@
             <a:fld id="{1D8BD707-D9CF-40AE-B4C6-C98DA3205C09}" type="datetimeFigureOut">
               <a:rPr lang="en-US" smtClean="0"/>
               <a:pPr/>
-              <a:t>12/8/2012</a:t>
+              <a:t>3/24/2013</a:t>
             </a:fld>
             <a:endParaRPr lang="en-US"/>
           </a:p>
@@ -456,7 +456,7 @@
             <a:fld id="{1D8BD707-D9CF-40AE-B4C6-C98DA3205C09}" type="datetimeFigureOut">
               <a:rPr lang="en-US" smtClean="0"/>
               <a:pPr/>
-              <a:t>12/8/2012</a:t>
+              <a:t>3/24/2013</a:t>
             </a:fld>
             <a:endParaRPr lang="en-US"/>
           </a:p>
@@ -633,7 +633,7 @@
             <a:fld id="{1D8BD707-D9CF-40AE-B4C6-C98DA3205C09}" type="datetimeFigureOut">
               <a:rPr lang="en-US" smtClean="0"/>
               <a:pPr/>
-              <a:t>12/8/2012</a:t>
+              <a:t>3/24/2013</a:t>
             </a:fld>
             <a:endParaRPr lang="en-US"/>
           </a:p>
@@ -800,7 +800,7 @@
             <a:fld id="{1D8BD707-D9CF-40AE-B4C6-C98DA3205C09}" type="datetimeFigureOut">
               <a:rPr lang="en-US" smtClean="0"/>
               <a:pPr/>
-              <a:t>12/8/2012</a:t>
+              <a:t>3/24/2013</a:t>
             </a:fld>
             <a:endParaRPr lang="en-US"/>
           </a:p>
@@ -1043,7 +1043,7 @@
             <a:fld id="{1D8BD707-D9CF-40AE-B4C6-C98DA3205C09}" type="datetimeFigureOut">
               <a:rPr lang="en-US" smtClean="0"/>
               <a:pPr/>
-              <a:t>12/8/2012</a:t>
+              <a:t>3/24/2013</a:t>
             </a:fld>
             <a:endParaRPr lang="en-US"/>
           </a:p>
@@ -1328,7 +1328,7 @@
             <a:fld id="{1D8BD707-D9CF-40AE-B4C6-C98DA3205C09}" type="datetimeFigureOut">
               <a:rPr lang="en-US" smtClean="0"/>
               <a:pPr/>
-              <a:t>12/8/2012</a:t>
+              <a:t>3/24/2013</a:t>
             </a:fld>
             <a:endParaRPr lang="en-US"/>
           </a:p>
@@ -1747,7 +1747,7 @@
             <a:fld id="{1D8BD707-D9CF-40AE-B4C6-C98DA3205C09}" type="datetimeFigureOut">
               <a:rPr lang="en-US" smtClean="0"/>
               <a:pPr/>
-              <a:t>12/8/2012</a:t>
+              <a:t>3/24/2013</a:t>
             </a:fld>
             <a:endParaRPr lang="en-US"/>
           </a:p>
@@ -1862,7 +1862,7 @@
             <a:fld id="{1D8BD707-D9CF-40AE-B4C6-C98DA3205C09}" type="datetimeFigureOut">
               <a:rPr lang="en-US" smtClean="0"/>
               <a:pPr/>
-              <a:t>12/8/2012</a:t>
+              <a:t>3/24/2013</a:t>
             </a:fld>
             <a:endParaRPr lang="en-US"/>
           </a:p>
@@ -1954,7 +1954,7 @@
             <a:fld id="{1D8BD707-D9CF-40AE-B4C6-C98DA3205C09}" type="datetimeFigureOut">
               <a:rPr lang="en-US" smtClean="0"/>
               <a:pPr/>
-              <a:t>12/8/2012</a:t>
+              <a:t>3/24/2013</a:t>
             </a:fld>
             <a:endParaRPr lang="en-US"/>
           </a:p>
@@ -2228,7 +2228,7 @@
             <a:fld id="{1D8BD707-D9CF-40AE-B4C6-C98DA3205C09}" type="datetimeFigureOut">
               <a:rPr lang="en-US" smtClean="0"/>
               <a:pPr/>
-              <a:t>12/8/2012</a:t>
+              <a:t>3/24/2013</a:t>
             </a:fld>
             <a:endParaRPr lang="en-US"/>
           </a:p>
@@ -2478,7 +2478,7 @@
             <a:fld id="{1D8BD707-D9CF-40AE-B4C6-C98DA3205C09}" type="datetimeFigureOut">
               <a:rPr lang="en-US" smtClean="0"/>
               <a:pPr/>
-              <a:t>12/8/2012</a:t>
+              <a:t>3/24/2013</a:t>
             </a:fld>
             <a:endParaRPr lang="en-US"/>
           </a:p>
@@ -2688,7 +2688,7 @@
             <a:fld id="{1D8BD707-D9CF-40AE-B4C6-C98DA3205C09}" type="datetimeFigureOut">
               <a:rPr lang="en-US" smtClean="0"/>
               <a:pPr/>
-              <a:t>12/8/2012</a:t>
+              <a:t>3/24/2013</a:t>
             </a:fld>
             <a:endParaRPr lang="en-US"/>
           </a:p>
@@ -4122,7 +4122,7 @@
         </p:nvSpPr>
         <p:spPr>
           <a:xfrm>
-            <a:off x="4814977" y="2579867"/>
+            <a:off x="4114800" y="2560637"/>
             <a:ext cx="1585823" cy="361770"/>
           </a:xfrm>
           <a:prstGeom prst="rect">
@@ -4166,7 +4166,7 @@
         </p:nvCxnSpPr>
         <p:spPr>
           <a:xfrm>
-            <a:off x="3429002" y="3322637"/>
+            <a:off x="2819401" y="3475036"/>
             <a:ext cx="4190999" cy="1"/>
           </a:xfrm>
           <a:prstGeom prst="bentConnector3">
@@ -4199,14 +4199,15 @@
         <p:nvCxnSpPr>
           <p:cNvPr id="69" name="Elbow Connector 68"/>
           <p:cNvCxnSpPr>
+            <a:stCxn id="174" idx="0"/>
             <a:endCxn id="37" idx="3"/>
           </p:cNvCxnSpPr>
           <p:nvPr/>
         </p:nvCxnSpPr>
         <p:spPr>
-          <a:xfrm flipV="1">
-            <a:off x="5562600" y="3194050"/>
-            <a:ext cx="14288" cy="814387"/>
+          <a:xfrm flipH="1" flipV="1">
+            <a:off x="4891088" y="3194050"/>
+            <a:ext cx="18916" cy="966787"/>
           </a:xfrm>
           <a:prstGeom prst="straightConnector1">
             <a:avLst/>
@@ -4236,7 +4237,7 @@
         </p:nvCxnSpPr>
         <p:spPr>
           <a:xfrm flipV="1">
-            <a:off x="6934200" y="3322637"/>
+            <a:off x="5715000" y="3475037"/>
             <a:ext cx="0" cy="278606"/>
           </a:xfrm>
           <a:prstGeom prst="straightConnector1">
@@ -4267,7 +4268,7 @@
         </p:nvCxnSpPr>
         <p:spPr>
           <a:xfrm flipV="1">
-            <a:off x="7620000" y="3322637"/>
+            <a:off x="6477000" y="3475037"/>
             <a:ext cx="0" cy="685800"/>
           </a:xfrm>
           <a:prstGeom prst="straightConnector1">
@@ -4298,7 +4299,7 @@
         </p:nvCxnSpPr>
         <p:spPr>
           <a:xfrm flipV="1">
-            <a:off x="3429000" y="3322637"/>
+            <a:off x="2819400" y="3475037"/>
             <a:ext cx="0" cy="685800"/>
           </a:xfrm>
           <a:prstGeom prst="straightConnector1">
@@ -4329,7 +4330,7 @@
         </p:nvSpPr>
         <p:spPr>
           <a:xfrm>
-            <a:off x="5438775" y="2965450"/>
+            <a:off x="4752975" y="2965450"/>
             <a:ext cx="276225" cy="228600"/>
           </a:xfrm>
           <a:prstGeom prst="triangle">
@@ -4371,7 +4372,7 @@
         </p:nvSpPr>
         <p:spPr>
           <a:xfrm>
-            <a:off x="6086654" y="3551237"/>
+            <a:off x="5029200" y="3703637"/>
             <a:ext cx="1304746" cy="361770"/>
           </a:xfrm>
           <a:prstGeom prst="rect">
@@ -4416,7 +4417,7 @@
         </p:nvCxnSpPr>
         <p:spPr>
           <a:xfrm flipV="1">
-            <a:off x="4572000" y="3322637"/>
+            <a:off x="3886200" y="3475037"/>
             <a:ext cx="0" cy="228600"/>
           </a:xfrm>
           <a:prstGeom prst="straightConnector1">
@@ -4447,7 +4448,7 @@
         </p:nvSpPr>
         <p:spPr>
           <a:xfrm>
-            <a:off x="3748177" y="3551237"/>
+            <a:off x="3048000" y="3703637"/>
             <a:ext cx="1585823" cy="361770"/>
           </a:xfrm>
           <a:prstGeom prst="rect">
@@ -4492,7 +4493,7 @@
         </p:nvSpPr>
         <p:spPr>
           <a:xfrm>
-            <a:off x="6858000" y="4000772"/>
+            <a:off x="5943600" y="4160837"/>
             <a:ext cx="1447801" cy="361770"/>
           </a:xfrm>
           <a:prstGeom prst="rect">
@@ -4536,7 +4537,7 @@
         </p:nvSpPr>
         <p:spPr>
           <a:xfrm>
-            <a:off x="4760208" y="4000772"/>
+            <a:off x="4114800" y="4160837"/>
             <a:ext cx="1590407" cy="361770"/>
           </a:xfrm>
           <a:prstGeom prst="rect">
@@ -4580,7 +4581,7 @@
         </p:nvSpPr>
         <p:spPr>
           <a:xfrm>
-            <a:off x="2590800" y="4000772"/>
+            <a:off x="2286000" y="4160837"/>
             <a:ext cx="1585823" cy="361770"/>
           </a:xfrm>
           <a:prstGeom prst="rect">
@@ -4616,10 +4617,88 @@
           </a:p>
         </p:txBody>
       </p:sp>
+      <p:sp>
+        <p:nvSpPr>
+          <p:cNvPr id="48" name="Rectangle 47"/>
+          <p:cNvSpPr>
+            <a:spLocks/>
+          </p:cNvSpPr>
+          <p:nvPr/>
+        </p:nvSpPr>
+        <p:spPr>
+          <a:xfrm>
+            <a:off x="6553200" y="3703637"/>
+            <a:ext cx="1304746" cy="361770"/>
+          </a:xfrm>
+          <a:prstGeom prst="rect">
+            <a:avLst/>
+          </a:prstGeom>
+          <a:effectLst/>
+        </p:spPr>
+        <p:style>
+          <a:lnRef idx="2">
+            <a:schemeClr val="accent6">
+              <a:shade val="50000"/>
+            </a:schemeClr>
+          </a:lnRef>
+          <a:fillRef idx="1">
+            <a:schemeClr val="accent6"/>
+          </a:fillRef>
+          <a:effectRef idx="0">
+            <a:schemeClr val="accent6"/>
+          </a:effectRef>
+          <a:fontRef idx="minor">
+            <a:schemeClr val="lt1"/>
+          </a:fontRef>
+        </p:style>
+        <p:txBody>
+          <a:bodyPr rtlCol="0" anchor="ctr"/>
+          <a:lstStyle/>
+          <a:p>
+            <a:pPr algn="ctr"/>
+            <a:r>
+              <a:rPr lang="en-US" sz="1600" b="1" dirty="0" err="1" smtClean="0"/>
+              <a:t>AccountData</a:t>
+            </a:r>
+            <a:endParaRPr lang="en-SG" sz="1600" b="1" dirty="0"/>
+          </a:p>
+        </p:txBody>
+      </p:sp>
+      <p:cxnSp>
+        <p:nvCxnSpPr>
+          <p:cNvPr id="49" name="Elbow Connector 68"/>
+          <p:cNvCxnSpPr/>
+          <p:nvPr/>
+        </p:nvCxnSpPr>
+        <p:spPr>
+          <a:xfrm flipV="1">
+            <a:off x="7010400" y="3475037"/>
+            <a:ext cx="0" cy="228600"/>
+          </a:xfrm>
+          <a:prstGeom prst="straightConnector1">
+            <a:avLst/>
+          </a:prstGeom>
+          <a:effectLst/>
+        </p:spPr>
+        <p:style>
+          <a:lnRef idx="2">
+            <a:schemeClr val="accent6"/>
+          </a:lnRef>
+          <a:fillRef idx="0">
+            <a:schemeClr val="accent6"/>
+          </a:fillRef>
+          <a:effectRef idx="1">
+            <a:schemeClr val="accent6"/>
+          </a:effectRef>
+          <a:fontRef idx="minor">
+            <a:schemeClr val="tx1"/>
+          </a:fontRef>
+        </p:style>
+      </p:cxnSp>
     </p:spTree>
     <p:extLst>
       <p:ext uri="{BB962C8B-B14F-4D97-AF65-F5344CB8AC3E}">
-        <p14:creationId xmlns:p14="http://schemas.microsoft.com/office/powerpoint/2010/main" val="2312643091"/>
+        <p14:creationId xmlns:p14="http://schemas.microsoft.com/office/powerpoint/2010/main" xmlns="" val="2312643091"/>
       </p:ext>
     </p:extLst>
   </p:cSld>

</xml_diff>

<commit_message>
Syncing Issue727 [InstructorEvalResultsPageUiTest:testInstructorEvalResultsOpenEval is taking too long]
</commit_message>
<xml_diff>
--- a/doc/diagrams/CommonComponent.pptx
+++ b/doc/diagrams/CommonComponent.pptx
@@ -289,7 +289,7 @@
             <a:fld id="{1D8BD707-D9CF-40AE-B4C6-C98DA3205C09}" type="datetimeFigureOut">
               <a:rPr lang="en-US" smtClean="0"/>
               <a:pPr/>
-              <a:t>12/8/2012</a:t>
+              <a:t>3/24/2013</a:t>
             </a:fld>
             <a:endParaRPr lang="en-US"/>
           </a:p>
@@ -456,7 +456,7 @@
             <a:fld id="{1D8BD707-D9CF-40AE-B4C6-C98DA3205C09}" type="datetimeFigureOut">
               <a:rPr lang="en-US" smtClean="0"/>
               <a:pPr/>
-              <a:t>12/8/2012</a:t>
+              <a:t>3/24/2013</a:t>
             </a:fld>
             <a:endParaRPr lang="en-US"/>
           </a:p>
@@ -633,7 +633,7 @@
             <a:fld id="{1D8BD707-D9CF-40AE-B4C6-C98DA3205C09}" type="datetimeFigureOut">
               <a:rPr lang="en-US" smtClean="0"/>
               <a:pPr/>
-              <a:t>12/8/2012</a:t>
+              <a:t>3/24/2013</a:t>
             </a:fld>
             <a:endParaRPr lang="en-US"/>
           </a:p>
@@ -800,7 +800,7 @@
             <a:fld id="{1D8BD707-D9CF-40AE-B4C6-C98DA3205C09}" type="datetimeFigureOut">
               <a:rPr lang="en-US" smtClean="0"/>
               <a:pPr/>
-              <a:t>12/8/2012</a:t>
+              <a:t>3/24/2013</a:t>
             </a:fld>
             <a:endParaRPr lang="en-US"/>
           </a:p>
@@ -1043,7 +1043,7 @@
             <a:fld id="{1D8BD707-D9CF-40AE-B4C6-C98DA3205C09}" type="datetimeFigureOut">
               <a:rPr lang="en-US" smtClean="0"/>
               <a:pPr/>
-              <a:t>12/8/2012</a:t>
+              <a:t>3/24/2013</a:t>
             </a:fld>
             <a:endParaRPr lang="en-US"/>
           </a:p>
@@ -1328,7 +1328,7 @@
             <a:fld id="{1D8BD707-D9CF-40AE-B4C6-C98DA3205C09}" type="datetimeFigureOut">
               <a:rPr lang="en-US" smtClean="0"/>
               <a:pPr/>
-              <a:t>12/8/2012</a:t>
+              <a:t>3/24/2013</a:t>
             </a:fld>
             <a:endParaRPr lang="en-US"/>
           </a:p>
@@ -1747,7 +1747,7 @@
             <a:fld id="{1D8BD707-D9CF-40AE-B4C6-C98DA3205C09}" type="datetimeFigureOut">
               <a:rPr lang="en-US" smtClean="0"/>
               <a:pPr/>
-              <a:t>12/8/2012</a:t>
+              <a:t>3/24/2013</a:t>
             </a:fld>
             <a:endParaRPr lang="en-US"/>
           </a:p>
@@ -1862,7 +1862,7 @@
             <a:fld id="{1D8BD707-D9CF-40AE-B4C6-C98DA3205C09}" type="datetimeFigureOut">
               <a:rPr lang="en-US" smtClean="0"/>
               <a:pPr/>
-              <a:t>12/8/2012</a:t>
+              <a:t>3/24/2013</a:t>
             </a:fld>
             <a:endParaRPr lang="en-US"/>
           </a:p>
@@ -1954,7 +1954,7 @@
             <a:fld id="{1D8BD707-D9CF-40AE-B4C6-C98DA3205C09}" type="datetimeFigureOut">
               <a:rPr lang="en-US" smtClean="0"/>
               <a:pPr/>
-              <a:t>12/8/2012</a:t>
+              <a:t>3/24/2013</a:t>
             </a:fld>
             <a:endParaRPr lang="en-US"/>
           </a:p>
@@ -2228,7 +2228,7 @@
             <a:fld id="{1D8BD707-D9CF-40AE-B4C6-C98DA3205C09}" type="datetimeFigureOut">
               <a:rPr lang="en-US" smtClean="0"/>
               <a:pPr/>
-              <a:t>12/8/2012</a:t>
+              <a:t>3/24/2013</a:t>
             </a:fld>
             <a:endParaRPr lang="en-US"/>
           </a:p>
@@ -2478,7 +2478,7 @@
             <a:fld id="{1D8BD707-D9CF-40AE-B4C6-C98DA3205C09}" type="datetimeFigureOut">
               <a:rPr lang="en-US" smtClean="0"/>
               <a:pPr/>
-              <a:t>12/8/2012</a:t>
+              <a:t>3/24/2013</a:t>
             </a:fld>
             <a:endParaRPr lang="en-US"/>
           </a:p>
@@ -2688,7 +2688,7 @@
             <a:fld id="{1D8BD707-D9CF-40AE-B4C6-C98DA3205C09}" type="datetimeFigureOut">
               <a:rPr lang="en-US" smtClean="0"/>
               <a:pPr/>
-              <a:t>12/8/2012</a:t>
+              <a:t>3/24/2013</a:t>
             </a:fld>
             <a:endParaRPr lang="en-US"/>
           </a:p>
@@ -4122,7 +4122,7 @@
         </p:nvSpPr>
         <p:spPr>
           <a:xfrm>
-            <a:off x="4814977" y="2579867"/>
+            <a:off x="4114800" y="2560637"/>
             <a:ext cx="1585823" cy="361770"/>
           </a:xfrm>
           <a:prstGeom prst="rect">
@@ -4166,7 +4166,7 @@
         </p:nvCxnSpPr>
         <p:spPr>
           <a:xfrm>
-            <a:off x="3429002" y="3322637"/>
+            <a:off x="2819401" y="3475036"/>
             <a:ext cx="4190999" cy="1"/>
           </a:xfrm>
           <a:prstGeom prst="bentConnector3">
@@ -4199,14 +4199,15 @@
         <p:nvCxnSpPr>
           <p:cNvPr id="69" name="Elbow Connector 68"/>
           <p:cNvCxnSpPr>
+            <a:stCxn id="174" idx="0"/>
             <a:endCxn id="37" idx="3"/>
           </p:cNvCxnSpPr>
           <p:nvPr/>
         </p:nvCxnSpPr>
         <p:spPr>
-          <a:xfrm flipV="1">
-            <a:off x="5562600" y="3194050"/>
-            <a:ext cx="14288" cy="814387"/>
+          <a:xfrm flipH="1" flipV="1">
+            <a:off x="4891088" y="3194050"/>
+            <a:ext cx="18916" cy="966787"/>
           </a:xfrm>
           <a:prstGeom prst="straightConnector1">
             <a:avLst/>
@@ -4236,7 +4237,7 @@
         </p:nvCxnSpPr>
         <p:spPr>
           <a:xfrm flipV="1">
-            <a:off x="6934200" y="3322637"/>
+            <a:off x="5715000" y="3475037"/>
             <a:ext cx="0" cy="278606"/>
           </a:xfrm>
           <a:prstGeom prst="straightConnector1">
@@ -4267,7 +4268,7 @@
         </p:nvCxnSpPr>
         <p:spPr>
           <a:xfrm flipV="1">
-            <a:off x="7620000" y="3322637"/>
+            <a:off x="6477000" y="3475037"/>
             <a:ext cx="0" cy="685800"/>
           </a:xfrm>
           <a:prstGeom prst="straightConnector1">
@@ -4298,7 +4299,7 @@
         </p:nvCxnSpPr>
         <p:spPr>
           <a:xfrm flipV="1">
-            <a:off x="3429000" y="3322637"/>
+            <a:off x="2819400" y="3475037"/>
             <a:ext cx="0" cy="685800"/>
           </a:xfrm>
           <a:prstGeom prst="straightConnector1">
@@ -4329,7 +4330,7 @@
         </p:nvSpPr>
         <p:spPr>
           <a:xfrm>
-            <a:off x="5438775" y="2965450"/>
+            <a:off x="4752975" y="2965450"/>
             <a:ext cx="276225" cy="228600"/>
           </a:xfrm>
           <a:prstGeom prst="triangle">
@@ -4371,7 +4372,7 @@
         </p:nvSpPr>
         <p:spPr>
           <a:xfrm>
-            <a:off x="6086654" y="3551237"/>
+            <a:off x="5029200" y="3703637"/>
             <a:ext cx="1304746" cy="361770"/>
           </a:xfrm>
           <a:prstGeom prst="rect">
@@ -4416,7 +4417,7 @@
         </p:nvCxnSpPr>
         <p:spPr>
           <a:xfrm flipV="1">
-            <a:off x="4572000" y="3322637"/>
+            <a:off x="3886200" y="3475037"/>
             <a:ext cx="0" cy="228600"/>
           </a:xfrm>
           <a:prstGeom prst="straightConnector1">
@@ -4447,7 +4448,7 @@
         </p:nvSpPr>
         <p:spPr>
           <a:xfrm>
-            <a:off x="3748177" y="3551237"/>
+            <a:off x="3048000" y="3703637"/>
             <a:ext cx="1585823" cy="361770"/>
           </a:xfrm>
           <a:prstGeom prst="rect">
@@ -4492,7 +4493,7 @@
         </p:nvSpPr>
         <p:spPr>
           <a:xfrm>
-            <a:off x="6858000" y="4000772"/>
+            <a:off x="5943600" y="4160837"/>
             <a:ext cx="1447801" cy="361770"/>
           </a:xfrm>
           <a:prstGeom prst="rect">
@@ -4536,7 +4537,7 @@
         </p:nvSpPr>
         <p:spPr>
           <a:xfrm>
-            <a:off x="4760208" y="4000772"/>
+            <a:off x="4114800" y="4160837"/>
             <a:ext cx="1590407" cy="361770"/>
           </a:xfrm>
           <a:prstGeom prst="rect">
@@ -4580,7 +4581,7 @@
         </p:nvSpPr>
         <p:spPr>
           <a:xfrm>
-            <a:off x="2590800" y="4000772"/>
+            <a:off x="2286000" y="4160837"/>
             <a:ext cx="1585823" cy="361770"/>
           </a:xfrm>
           <a:prstGeom prst="rect">
@@ -4616,10 +4617,88 @@
           </a:p>
         </p:txBody>
       </p:sp>
+      <p:sp>
+        <p:nvSpPr>
+          <p:cNvPr id="48" name="Rectangle 47"/>
+          <p:cNvSpPr>
+            <a:spLocks/>
+          </p:cNvSpPr>
+          <p:nvPr/>
+        </p:nvSpPr>
+        <p:spPr>
+          <a:xfrm>
+            <a:off x="6553200" y="3703637"/>
+            <a:ext cx="1304746" cy="361770"/>
+          </a:xfrm>
+          <a:prstGeom prst="rect">
+            <a:avLst/>
+          </a:prstGeom>
+          <a:effectLst/>
+        </p:spPr>
+        <p:style>
+          <a:lnRef idx="2">
+            <a:schemeClr val="accent6">
+              <a:shade val="50000"/>
+            </a:schemeClr>
+          </a:lnRef>
+          <a:fillRef idx="1">
+            <a:schemeClr val="accent6"/>
+          </a:fillRef>
+          <a:effectRef idx="0">
+            <a:schemeClr val="accent6"/>
+          </a:effectRef>
+          <a:fontRef idx="minor">
+            <a:schemeClr val="lt1"/>
+          </a:fontRef>
+        </p:style>
+        <p:txBody>
+          <a:bodyPr rtlCol="0" anchor="ctr"/>
+          <a:lstStyle/>
+          <a:p>
+            <a:pPr algn="ctr"/>
+            <a:r>
+              <a:rPr lang="en-US" sz="1600" b="1" dirty="0" err="1" smtClean="0"/>
+              <a:t>AccountData</a:t>
+            </a:r>
+            <a:endParaRPr lang="en-SG" sz="1600" b="1" dirty="0"/>
+          </a:p>
+        </p:txBody>
+      </p:sp>
+      <p:cxnSp>
+        <p:nvCxnSpPr>
+          <p:cNvPr id="49" name="Elbow Connector 68"/>
+          <p:cNvCxnSpPr/>
+          <p:nvPr/>
+        </p:nvCxnSpPr>
+        <p:spPr>
+          <a:xfrm flipV="1">
+            <a:off x="7010400" y="3475037"/>
+            <a:ext cx="0" cy="228600"/>
+          </a:xfrm>
+          <a:prstGeom prst="straightConnector1">
+            <a:avLst/>
+          </a:prstGeom>
+          <a:effectLst/>
+        </p:spPr>
+        <p:style>
+          <a:lnRef idx="2">
+            <a:schemeClr val="accent6"/>
+          </a:lnRef>
+          <a:fillRef idx="0">
+            <a:schemeClr val="accent6"/>
+          </a:fillRef>
+          <a:effectRef idx="1">
+            <a:schemeClr val="accent6"/>
+          </a:effectRef>
+          <a:fontRef idx="minor">
+            <a:schemeClr val="tx1"/>
+          </a:fontRef>
+        </p:style>
+      </p:cxnSp>
     </p:spTree>
     <p:extLst>
       <p:ext uri="{BB962C8B-B14F-4D97-AF65-F5344CB8AC3E}">
-        <p14:creationId xmlns:p14="http://schemas.microsoft.com/office/powerpoint/2010/main" val="2312643091"/>
+        <p14:creationId xmlns:p14="http://schemas.microsoft.com/office/powerpoint/2010/main" xmlns="" val="2312643091"/>
       </p:ext>
     </p:extLst>
   </p:cSld>

</xml_diff>

<commit_message>
Reversing hotfix on Issue608a [Improve testing for table sorting in the UI]
</commit_message>
<xml_diff>
--- a/doc/diagrams/CommonComponent.pptx
+++ b/doc/diagrams/CommonComponent.pptx
@@ -289,7 +289,7 @@
             <a:fld id="{1D8BD707-D9CF-40AE-B4C6-C98DA3205C09}" type="datetimeFigureOut">
               <a:rPr lang="en-US" smtClean="0"/>
               <a:pPr/>
-              <a:t>12/8/2012</a:t>
+              <a:t>3/24/2013</a:t>
             </a:fld>
             <a:endParaRPr lang="en-US"/>
           </a:p>
@@ -456,7 +456,7 @@
             <a:fld id="{1D8BD707-D9CF-40AE-B4C6-C98DA3205C09}" type="datetimeFigureOut">
               <a:rPr lang="en-US" smtClean="0"/>
               <a:pPr/>
-              <a:t>12/8/2012</a:t>
+              <a:t>3/24/2013</a:t>
             </a:fld>
             <a:endParaRPr lang="en-US"/>
           </a:p>
@@ -633,7 +633,7 @@
             <a:fld id="{1D8BD707-D9CF-40AE-B4C6-C98DA3205C09}" type="datetimeFigureOut">
               <a:rPr lang="en-US" smtClean="0"/>
               <a:pPr/>
-              <a:t>12/8/2012</a:t>
+              <a:t>3/24/2013</a:t>
             </a:fld>
             <a:endParaRPr lang="en-US"/>
           </a:p>
@@ -800,7 +800,7 @@
             <a:fld id="{1D8BD707-D9CF-40AE-B4C6-C98DA3205C09}" type="datetimeFigureOut">
               <a:rPr lang="en-US" smtClean="0"/>
               <a:pPr/>
-              <a:t>12/8/2012</a:t>
+              <a:t>3/24/2013</a:t>
             </a:fld>
             <a:endParaRPr lang="en-US"/>
           </a:p>
@@ -1043,7 +1043,7 @@
             <a:fld id="{1D8BD707-D9CF-40AE-B4C6-C98DA3205C09}" type="datetimeFigureOut">
               <a:rPr lang="en-US" smtClean="0"/>
               <a:pPr/>
-              <a:t>12/8/2012</a:t>
+              <a:t>3/24/2013</a:t>
             </a:fld>
             <a:endParaRPr lang="en-US"/>
           </a:p>
@@ -1328,7 +1328,7 @@
             <a:fld id="{1D8BD707-D9CF-40AE-B4C6-C98DA3205C09}" type="datetimeFigureOut">
               <a:rPr lang="en-US" smtClean="0"/>
               <a:pPr/>
-              <a:t>12/8/2012</a:t>
+              <a:t>3/24/2013</a:t>
             </a:fld>
             <a:endParaRPr lang="en-US"/>
           </a:p>
@@ -1747,7 +1747,7 @@
             <a:fld id="{1D8BD707-D9CF-40AE-B4C6-C98DA3205C09}" type="datetimeFigureOut">
               <a:rPr lang="en-US" smtClean="0"/>
               <a:pPr/>
-              <a:t>12/8/2012</a:t>
+              <a:t>3/24/2013</a:t>
             </a:fld>
             <a:endParaRPr lang="en-US"/>
           </a:p>
@@ -1862,7 +1862,7 @@
             <a:fld id="{1D8BD707-D9CF-40AE-B4C6-C98DA3205C09}" type="datetimeFigureOut">
               <a:rPr lang="en-US" smtClean="0"/>
               <a:pPr/>
-              <a:t>12/8/2012</a:t>
+              <a:t>3/24/2013</a:t>
             </a:fld>
             <a:endParaRPr lang="en-US"/>
           </a:p>
@@ -1954,7 +1954,7 @@
             <a:fld id="{1D8BD707-D9CF-40AE-B4C6-C98DA3205C09}" type="datetimeFigureOut">
               <a:rPr lang="en-US" smtClean="0"/>
               <a:pPr/>
-              <a:t>12/8/2012</a:t>
+              <a:t>3/24/2013</a:t>
             </a:fld>
             <a:endParaRPr lang="en-US"/>
           </a:p>
@@ -2228,7 +2228,7 @@
             <a:fld id="{1D8BD707-D9CF-40AE-B4C6-C98DA3205C09}" type="datetimeFigureOut">
               <a:rPr lang="en-US" smtClean="0"/>
               <a:pPr/>
-              <a:t>12/8/2012</a:t>
+              <a:t>3/24/2013</a:t>
             </a:fld>
             <a:endParaRPr lang="en-US"/>
           </a:p>
@@ -2478,7 +2478,7 @@
             <a:fld id="{1D8BD707-D9CF-40AE-B4C6-C98DA3205C09}" type="datetimeFigureOut">
               <a:rPr lang="en-US" smtClean="0"/>
               <a:pPr/>
-              <a:t>12/8/2012</a:t>
+              <a:t>3/24/2013</a:t>
             </a:fld>
             <a:endParaRPr lang="en-US"/>
           </a:p>
@@ -2688,7 +2688,7 @@
             <a:fld id="{1D8BD707-D9CF-40AE-B4C6-C98DA3205C09}" type="datetimeFigureOut">
               <a:rPr lang="en-US" smtClean="0"/>
               <a:pPr/>
-              <a:t>12/8/2012</a:t>
+              <a:t>3/24/2013</a:t>
             </a:fld>
             <a:endParaRPr lang="en-US"/>
           </a:p>
@@ -4122,7 +4122,7 @@
         </p:nvSpPr>
         <p:spPr>
           <a:xfrm>
-            <a:off x="4814977" y="2579867"/>
+            <a:off x="4114800" y="2560637"/>
             <a:ext cx="1585823" cy="361770"/>
           </a:xfrm>
           <a:prstGeom prst="rect">
@@ -4166,7 +4166,7 @@
         </p:nvCxnSpPr>
         <p:spPr>
           <a:xfrm>
-            <a:off x="3429002" y="3322637"/>
+            <a:off x="2819401" y="3475036"/>
             <a:ext cx="4190999" cy="1"/>
           </a:xfrm>
           <a:prstGeom prst="bentConnector3">
@@ -4199,14 +4199,15 @@
         <p:nvCxnSpPr>
           <p:cNvPr id="69" name="Elbow Connector 68"/>
           <p:cNvCxnSpPr>
+            <a:stCxn id="174" idx="0"/>
             <a:endCxn id="37" idx="3"/>
           </p:cNvCxnSpPr>
           <p:nvPr/>
         </p:nvCxnSpPr>
         <p:spPr>
-          <a:xfrm flipV="1">
-            <a:off x="5562600" y="3194050"/>
-            <a:ext cx="14288" cy="814387"/>
+          <a:xfrm flipH="1" flipV="1">
+            <a:off x="4891088" y="3194050"/>
+            <a:ext cx="18916" cy="966787"/>
           </a:xfrm>
           <a:prstGeom prst="straightConnector1">
             <a:avLst/>
@@ -4236,7 +4237,7 @@
         </p:nvCxnSpPr>
         <p:spPr>
           <a:xfrm flipV="1">
-            <a:off x="6934200" y="3322637"/>
+            <a:off x="5715000" y="3475037"/>
             <a:ext cx="0" cy="278606"/>
           </a:xfrm>
           <a:prstGeom prst="straightConnector1">
@@ -4267,7 +4268,7 @@
         </p:nvCxnSpPr>
         <p:spPr>
           <a:xfrm flipV="1">
-            <a:off x="7620000" y="3322637"/>
+            <a:off x="6477000" y="3475037"/>
             <a:ext cx="0" cy="685800"/>
           </a:xfrm>
           <a:prstGeom prst="straightConnector1">
@@ -4298,7 +4299,7 @@
         </p:nvCxnSpPr>
         <p:spPr>
           <a:xfrm flipV="1">
-            <a:off x="3429000" y="3322637"/>
+            <a:off x="2819400" y="3475037"/>
             <a:ext cx="0" cy="685800"/>
           </a:xfrm>
           <a:prstGeom prst="straightConnector1">
@@ -4329,7 +4330,7 @@
         </p:nvSpPr>
         <p:spPr>
           <a:xfrm>
-            <a:off x="5438775" y="2965450"/>
+            <a:off x="4752975" y="2965450"/>
             <a:ext cx="276225" cy="228600"/>
           </a:xfrm>
           <a:prstGeom prst="triangle">
@@ -4371,7 +4372,7 @@
         </p:nvSpPr>
         <p:spPr>
           <a:xfrm>
-            <a:off x="6086654" y="3551237"/>
+            <a:off x="5029200" y="3703637"/>
             <a:ext cx="1304746" cy="361770"/>
           </a:xfrm>
           <a:prstGeom prst="rect">
@@ -4416,7 +4417,7 @@
         </p:nvCxnSpPr>
         <p:spPr>
           <a:xfrm flipV="1">
-            <a:off x="4572000" y="3322637"/>
+            <a:off x="3886200" y="3475037"/>
             <a:ext cx="0" cy="228600"/>
           </a:xfrm>
           <a:prstGeom prst="straightConnector1">
@@ -4447,7 +4448,7 @@
         </p:nvSpPr>
         <p:spPr>
           <a:xfrm>
-            <a:off x="3748177" y="3551237"/>
+            <a:off x="3048000" y="3703637"/>
             <a:ext cx="1585823" cy="361770"/>
           </a:xfrm>
           <a:prstGeom prst="rect">
@@ -4492,7 +4493,7 @@
         </p:nvSpPr>
         <p:spPr>
           <a:xfrm>
-            <a:off x="6858000" y="4000772"/>
+            <a:off x="5943600" y="4160837"/>
             <a:ext cx="1447801" cy="361770"/>
           </a:xfrm>
           <a:prstGeom prst="rect">
@@ -4536,7 +4537,7 @@
         </p:nvSpPr>
         <p:spPr>
           <a:xfrm>
-            <a:off x="4760208" y="4000772"/>
+            <a:off x="4114800" y="4160837"/>
             <a:ext cx="1590407" cy="361770"/>
           </a:xfrm>
           <a:prstGeom prst="rect">
@@ -4580,7 +4581,7 @@
         </p:nvSpPr>
         <p:spPr>
           <a:xfrm>
-            <a:off x="2590800" y="4000772"/>
+            <a:off x="2286000" y="4160837"/>
             <a:ext cx="1585823" cy="361770"/>
           </a:xfrm>
           <a:prstGeom prst="rect">
@@ -4616,10 +4617,88 @@
           </a:p>
         </p:txBody>
       </p:sp>
+      <p:sp>
+        <p:nvSpPr>
+          <p:cNvPr id="48" name="Rectangle 47"/>
+          <p:cNvSpPr>
+            <a:spLocks/>
+          </p:cNvSpPr>
+          <p:nvPr/>
+        </p:nvSpPr>
+        <p:spPr>
+          <a:xfrm>
+            <a:off x="6553200" y="3703637"/>
+            <a:ext cx="1304746" cy="361770"/>
+          </a:xfrm>
+          <a:prstGeom prst="rect">
+            <a:avLst/>
+          </a:prstGeom>
+          <a:effectLst/>
+        </p:spPr>
+        <p:style>
+          <a:lnRef idx="2">
+            <a:schemeClr val="accent6">
+              <a:shade val="50000"/>
+            </a:schemeClr>
+          </a:lnRef>
+          <a:fillRef idx="1">
+            <a:schemeClr val="accent6"/>
+          </a:fillRef>
+          <a:effectRef idx="0">
+            <a:schemeClr val="accent6"/>
+          </a:effectRef>
+          <a:fontRef idx="minor">
+            <a:schemeClr val="lt1"/>
+          </a:fontRef>
+        </p:style>
+        <p:txBody>
+          <a:bodyPr rtlCol="0" anchor="ctr"/>
+          <a:lstStyle/>
+          <a:p>
+            <a:pPr algn="ctr"/>
+            <a:r>
+              <a:rPr lang="en-US" sz="1600" b="1" dirty="0" err="1" smtClean="0"/>
+              <a:t>AccountData</a:t>
+            </a:r>
+            <a:endParaRPr lang="en-SG" sz="1600" b="1" dirty="0"/>
+          </a:p>
+        </p:txBody>
+      </p:sp>
+      <p:cxnSp>
+        <p:nvCxnSpPr>
+          <p:cNvPr id="49" name="Elbow Connector 68"/>
+          <p:cNvCxnSpPr/>
+          <p:nvPr/>
+        </p:nvCxnSpPr>
+        <p:spPr>
+          <a:xfrm flipV="1">
+            <a:off x="7010400" y="3475037"/>
+            <a:ext cx="0" cy="228600"/>
+          </a:xfrm>
+          <a:prstGeom prst="straightConnector1">
+            <a:avLst/>
+          </a:prstGeom>
+          <a:effectLst/>
+        </p:spPr>
+        <p:style>
+          <a:lnRef idx="2">
+            <a:schemeClr val="accent6"/>
+          </a:lnRef>
+          <a:fillRef idx="0">
+            <a:schemeClr val="accent6"/>
+          </a:fillRef>
+          <a:effectRef idx="1">
+            <a:schemeClr val="accent6"/>
+          </a:effectRef>
+          <a:fontRef idx="minor">
+            <a:schemeClr val="tx1"/>
+          </a:fontRef>
+        </p:style>
+      </p:cxnSp>
     </p:spTree>
     <p:extLst>
       <p:ext uri="{BB962C8B-B14F-4D97-AF65-F5344CB8AC3E}">
-        <p14:creationId xmlns:p14="http://schemas.microsoft.com/office/powerpoint/2010/main" val="2312643091"/>
+        <p14:creationId xmlns:p14="http://schemas.microsoft.com/office/powerpoint/2010/main" xmlns="" val="2312643091"/>
       </p:ext>
     </p:extLst>
   </p:cSld>

</xml_diff>

<commit_message>
Issue 863: Update devman for the refactored backend design and new patch workflow Update Issue 863
</commit_message>
<xml_diff>
--- a/doc/diagrams/CommonComponent.pptx
+++ b/doc/diagrams/CommonComponent.pptx
@@ -9,6 +9,9 @@
   </p:sldIdLst>
   <p:sldSz cx="9144000" cy="5121275"/>
   <p:notesSz cx="6858000" cy="9144000"/>
+  <p:custDataLst>
+    <p:tags r:id="rId3"/>
+  </p:custDataLst>
   <p:defaultTextStyle>
     <a:defPPr>
       <a:defRPr lang="en-US"/>
@@ -139,6 +142,9 @@
             <a:off x="685800" y="1590916"/>
             <a:ext cx="7772400" cy="1097755"/>
           </a:xfrm>
+          <a:prstGeom prst="rect">
+            <a:avLst/>
+          </a:prstGeom>
         </p:spPr>
         <p:txBody>
           <a:bodyPr/>
@@ -167,6 +173,9 @@
             <a:off x="1371600" y="2902056"/>
             <a:ext cx="6400800" cy="1308770"/>
           </a:xfrm>
+          <a:prstGeom prst="rect">
+            <a:avLst/>
+          </a:prstGeom>
         </p:spPr>
         <p:txBody>
           <a:bodyPr/>
@@ -281,7 +290,15 @@
             <p:ph type="dt" sz="half" idx="10"/>
           </p:nvPr>
         </p:nvSpPr>
-        <p:spPr/>
+        <p:spPr>
+          <a:xfrm>
+            <a:off x="457200" y="4746664"/>
+            <a:ext cx="2133600" cy="272661"/>
+          </a:xfrm>
+          <a:prstGeom prst="rect">
+            <a:avLst/>
+          </a:prstGeom>
+        </p:spPr>
         <p:txBody>
           <a:bodyPr/>
           <a:lstStyle/>
@@ -289,7 +306,7 @@
             <a:fld id="{1D8BD707-D9CF-40AE-B4C6-C98DA3205C09}" type="datetimeFigureOut">
               <a:rPr lang="en-US" smtClean="0"/>
               <a:pPr/>
-              <a:t>3/24/2013</a:t>
+              <a:t>5/18/2013</a:t>
             </a:fld>
             <a:endParaRPr lang="en-US"/>
           </a:p>
@@ -305,7 +322,15 @@
             <p:ph type="ftr" sz="quarter" idx="11"/>
           </p:nvPr>
         </p:nvSpPr>
-        <p:spPr/>
+        <p:spPr>
+          <a:xfrm>
+            <a:off x="3124200" y="4746664"/>
+            <a:ext cx="2895600" cy="272661"/>
+          </a:xfrm>
+          <a:prstGeom prst="rect">
+            <a:avLst/>
+          </a:prstGeom>
+        </p:spPr>
         <p:txBody>
           <a:bodyPr/>
           <a:lstStyle/>
@@ -324,7 +349,15 @@
             <p:ph type="sldNum" sz="quarter" idx="12"/>
           </p:nvPr>
         </p:nvSpPr>
-        <p:spPr/>
+        <p:spPr>
+          <a:xfrm>
+            <a:off x="6553200" y="4746664"/>
+            <a:ext cx="2133600" cy="272661"/>
+          </a:xfrm>
+          <a:prstGeom prst="rect">
+            <a:avLst/>
+          </a:prstGeom>
+        </p:spPr>
         <p:txBody>
           <a:bodyPr/>
           <a:lstStyle/>
@@ -373,7 +406,15 @@
             <p:ph type="title"/>
           </p:nvPr>
         </p:nvSpPr>
-        <p:spPr/>
+        <p:spPr>
+          <a:xfrm>
+            <a:off x="457200" y="205088"/>
+            <a:ext cx="8229600" cy="853546"/>
+          </a:xfrm>
+          <a:prstGeom prst="rect">
+            <a:avLst/>
+          </a:prstGeom>
+        </p:spPr>
         <p:txBody>
           <a:bodyPr/>
           <a:lstStyle/>
@@ -396,7 +437,15 @@
             <p:ph type="body" orient="vert" idx="1"/>
           </p:nvPr>
         </p:nvSpPr>
-        <p:spPr/>
+        <p:spPr>
+          <a:xfrm>
+            <a:off x="457200" y="1194965"/>
+            <a:ext cx="8229600" cy="3379805"/>
+          </a:xfrm>
+          <a:prstGeom prst="rect">
+            <a:avLst/>
+          </a:prstGeom>
+        </p:spPr>
         <p:txBody>
           <a:bodyPr vert="eaVert"/>
           <a:lstStyle/>
@@ -448,7 +497,15 @@
             <p:ph type="dt" sz="half" idx="10"/>
           </p:nvPr>
         </p:nvSpPr>
-        <p:spPr/>
+        <p:spPr>
+          <a:xfrm>
+            <a:off x="457200" y="4746664"/>
+            <a:ext cx="2133600" cy="272661"/>
+          </a:xfrm>
+          <a:prstGeom prst="rect">
+            <a:avLst/>
+          </a:prstGeom>
+        </p:spPr>
         <p:txBody>
           <a:bodyPr/>
           <a:lstStyle/>
@@ -456,7 +513,7 @@
             <a:fld id="{1D8BD707-D9CF-40AE-B4C6-C98DA3205C09}" type="datetimeFigureOut">
               <a:rPr lang="en-US" smtClean="0"/>
               <a:pPr/>
-              <a:t>3/24/2013</a:t>
+              <a:t>5/18/2013</a:t>
             </a:fld>
             <a:endParaRPr lang="en-US"/>
           </a:p>
@@ -472,7 +529,15 @@
             <p:ph type="ftr" sz="quarter" idx="11"/>
           </p:nvPr>
         </p:nvSpPr>
-        <p:spPr/>
+        <p:spPr>
+          <a:xfrm>
+            <a:off x="3124200" y="4746664"/>
+            <a:ext cx="2895600" cy="272661"/>
+          </a:xfrm>
+          <a:prstGeom prst="rect">
+            <a:avLst/>
+          </a:prstGeom>
+        </p:spPr>
         <p:txBody>
           <a:bodyPr/>
           <a:lstStyle/>
@@ -491,7 +556,15 @@
             <p:ph type="sldNum" sz="quarter" idx="12"/>
           </p:nvPr>
         </p:nvSpPr>
-        <p:spPr/>
+        <p:spPr>
+          <a:xfrm>
+            <a:off x="6553200" y="4746664"/>
+            <a:ext cx="2133600" cy="272661"/>
+          </a:xfrm>
+          <a:prstGeom prst="rect">
+            <a:avLst/>
+          </a:prstGeom>
+        </p:spPr>
         <p:txBody>
           <a:bodyPr/>
           <a:lstStyle/>
@@ -545,6 +618,9 @@
             <a:off x="6629400" y="205089"/>
             <a:ext cx="2057400" cy="4369681"/>
           </a:xfrm>
+          <a:prstGeom prst="rect">
+            <a:avLst/>
+          </a:prstGeom>
         </p:spPr>
         <p:txBody>
           <a:bodyPr vert="eaVert"/>
@@ -573,6 +649,9 @@
             <a:off x="457200" y="205089"/>
             <a:ext cx="6019800" cy="4369681"/>
           </a:xfrm>
+          <a:prstGeom prst="rect">
+            <a:avLst/>
+          </a:prstGeom>
         </p:spPr>
         <p:txBody>
           <a:bodyPr vert="eaVert"/>
@@ -625,7 +704,15 @@
             <p:ph type="dt" sz="half" idx="10"/>
           </p:nvPr>
         </p:nvSpPr>
-        <p:spPr/>
+        <p:spPr>
+          <a:xfrm>
+            <a:off x="457200" y="4746664"/>
+            <a:ext cx="2133600" cy="272661"/>
+          </a:xfrm>
+          <a:prstGeom prst="rect">
+            <a:avLst/>
+          </a:prstGeom>
+        </p:spPr>
         <p:txBody>
           <a:bodyPr/>
           <a:lstStyle/>
@@ -633,7 +720,7 @@
             <a:fld id="{1D8BD707-D9CF-40AE-B4C6-C98DA3205C09}" type="datetimeFigureOut">
               <a:rPr lang="en-US" smtClean="0"/>
               <a:pPr/>
-              <a:t>3/24/2013</a:t>
+              <a:t>5/18/2013</a:t>
             </a:fld>
             <a:endParaRPr lang="en-US"/>
           </a:p>
@@ -649,7 +736,15 @@
             <p:ph type="ftr" sz="quarter" idx="11"/>
           </p:nvPr>
         </p:nvSpPr>
-        <p:spPr/>
+        <p:spPr>
+          <a:xfrm>
+            <a:off x="3124200" y="4746664"/>
+            <a:ext cx="2895600" cy="272661"/>
+          </a:xfrm>
+          <a:prstGeom prst="rect">
+            <a:avLst/>
+          </a:prstGeom>
+        </p:spPr>
         <p:txBody>
           <a:bodyPr/>
           <a:lstStyle/>
@@ -668,7 +763,15 @@
             <p:ph type="sldNum" sz="quarter" idx="12"/>
           </p:nvPr>
         </p:nvSpPr>
-        <p:spPr/>
+        <p:spPr>
+          <a:xfrm>
+            <a:off x="6553200" y="4746664"/>
+            <a:ext cx="2133600" cy="272661"/>
+          </a:xfrm>
+          <a:prstGeom prst="rect">
+            <a:avLst/>
+          </a:prstGeom>
+        </p:spPr>
         <p:txBody>
           <a:bodyPr/>
           <a:lstStyle/>
@@ -717,7 +820,15 @@
             <p:ph type="title"/>
           </p:nvPr>
         </p:nvSpPr>
-        <p:spPr/>
+        <p:spPr>
+          <a:xfrm>
+            <a:off x="457200" y="205088"/>
+            <a:ext cx="8229600" cy="853546"/>
+          </a:xfrm>
+          <a:prstGeom prst="rect">
+            <a:avLst/>
+          </a:prstGeom>
+        </p:spPr>
         <p:txBody>
           <a:bodyPr/>
           <a:lstStyle/>
@@ -740,7 +851,15 @@
             <p:ph idx="1"/>
           </p:nvPr>
         </p:nvSpPr>
-        <p:spPr/>
+        <p:spPr>
+          <a:xfrm>
+            <a:off x="457200" y="1194965"/>
+            <a:ext cx="8229600" cy="3379805"/>
+          </a:xfrm>
+          <a:prstGeom prst="rect">
+            <a:avLst/>
+          </a:prstGeom>
+        </p:spPr>
         <p:txBody>
           <a:bodyPr/>
           <a:lstStyle/>
@@ -792,7 +911,15 @@
             <p:ph type="dt" sz="half" idx="10"/>
           </p:nvPr>
         </p:nvSpPr>
-        <p:spPr/>
+        <p:spPr>
+          <a:xfrm>
+            <a:off x="457200" y="4746664"/>
+            <a:ext cx="2133600" cy="272661"/>
+          </a:xfrm>
+          <a:prstGeom prst="rect">
+            <a:avLst/>
+          </a:prstGeom>
+        </p:spPr>
         <p:txBody>
           <a:bodyPr/>
           <a:lstStyle/>
@@ -800,7 +927,7 @@
             <a:fld id="{1D8BD707-D9CF-40AE-B4C6-C98DA3205C09}" type="datetimeFigureOut">
               <a:rPr lang="en-US" smtClean="0"/>
               <a:pPr/>
-              <a:t>3/24/2013</a:t>
+              <a:t>5/18/2013</a:t>
             </a:fld>
             <a:endParaRPr lang="en-US"/>
           </a:p>
@@ -816,7 +943,15 @@
             <p:ph type="ftr" sz="quarter" idx="11"/>
           </p:nvPr>
         </p:nvSpPr>
-        <p:spPr/>
+        <p:spPr>
+          <a:xfrm>
+            <a:off x="3124200" y="4746664"/>
+            <a:ext cx="2895600" cy="272661"/>
+          </a:xfrm>
+          <a:prstGeom prst="rect">
+            <a:avLst/>
+          </a:prstGeom>
+        </p:spPr>
         <p:txBody>
           <a:bodyPr/>
           <a:lstStyle/>
@@ -835,7 +970,15 @@
             <p:ph type="sldNum" sz="quarter" idx="12"/>
           </p:nvPr>
         </p:nvSpPr>
-        <p:spPr/>
+        <p:spPr>
+          <a:xfrm>
+            <a:off x="6553200" y="4746664"/>
+            <a:ext cx="2133600" cy="272661"/>
+          </a:xfrm>
+          <a:prstGeom prst="rect">
+            <a:avLst/>
+          </a:prstGeom>
+        </p:spPr>
         <p:txBody>
           <a:bodyPr/>
           <a:lstStyle/>
@@ -889,6 +1032,9 @@
             <a:off x="722313" y="3290894"/>
             <a:ext cx="7772400" cy="1017142"/>
           </a:xfrm>
+          <a:prstGeom prst="rect">
+            <a:avLst/>
+          </a:prstGeom>
         </p:spPr>
         <p:txBody>
           <a:bodyPr anchor="t"/>
@@ -921,6 +1067,9 @@
             <a:off x="722313" y="2170616"/>
             <a:ext cx="7772400" cy="1120279"/>
           </a:xfrm>
+          <a:prstGeom prst="rect">
+            <a:avLst/>
+          </a:prstGeom>
         </p:spPr>
         <p:txBody>
           <a:bodyPr anchor="b"/>
@@ -1035,7 +1184,15 @@
             <p:ph type="dt" sz="half" idx="10"/>
           </p:nvPr>
         </p:nvSpPr>
-        <p:spPr/>
+        <p:spPr>
+          <a:xfrm>
+            <a:off x="457200" y="4746664"/>
+            <a:ext cx="2133600" cy="272661"/>
+          </a:xfrm>
+          <a:prstGeom prst="rect">
+            <a:avLst/>
+          </a:prstGeom>
+        </p:spPr>
         <p:txBody>
           <a:bodyPr/>
           <a:lstStyle/>
@@ -1043,7 +1200,7 @@
             <a:fld id="{1D8BD707-D9CF-40AE-B4C6-C98DA3205C09}" type="datetimeFigureOut">
               <a:rPr lang="en-US" smtClean="0"/>
               <a:pPr/>
-              <a:t>3/24/2013</a:t>
+              <a:t>5/18/2013</a:t>
             </a:fld>
             <a:endParaRPr lang="en-US"/>
           </a:p>
@@ -1059,7 +1216,15 @@
             <p:ph type="ftr" sz="quarter" idx="11"/>
           </p:nvPr>
         </p:nvSpPr>
-        <p:spPr/>
+        <p:spPr>
+          <a:xfrm>
+            <a:off x="3124200" y="4746664"/>
+            <a:ext cx="2895600" cy="272661"/>
+          </a:xfrm>
+          <a:prstGeom prst="rect">
+            <a:avLst/>
+          </a:prstGeom>
+        </p:spPr>
         <p:txBody>
           <a:bodyPr/>
           <a:lstStyle/>
@@ -1078,7 +1243,15 @@
             <p:ph type="sldNum" sz="quarter" idx="12"/>
           </p:nvPr>
         </p:nvSpPr>
-        <p:spPr/>
+        <p:spPr>
+          <a:xfrm>
+            <a:off x="6553200" y="4746664"/>
+            <a:ext cx="2133600" cy="272661"/>
+          </a:xfrm>
+          <a:prstGeom prst="rect">
+            <a:avLst/>
+          </a:prstGeom>
+        </p:spPr>
         <p:txBody>
           <a:bodyPr/>
           <a:lstStyle/>
@@ -1127,7 +1300,15 @@
             <p:ph type="title"/>
           </p:nvPr>
         </p:nvSpPr>
-        <p:spPr/>
+        <p:spPr>
+          <a:xfrm>
+            <a:off x="457200" y="205088"/>
+            <a:ext cx="8229600" cy="853546"/>
+          </a:xfrm>
+          <a:prstGeom prst="rect">
+            <a:avLst/>
+          </a:prstGeom>
+        </p:spPr>
         <p:txBody>
           <a:bodyPr/>
           <a:lstStyle/>
@@ -1155,6 +1336,9 @@
             <a:off x="457200" y="1194965"/>
             <a:ext cx="4038600" cy="3379805"/>
           </a:xfrm>
+          <a:prstGeom prst="rect">
+            <a:avLst/>
+          </a:prstGeom>
         </p:spPr>
         <p:txBody>
           <a:bodyPr/>
@@ -1240,6 +1424,9 @@
             <a:off x="4648200" y="1194965"/>
             <a:ext cx="4038600" cy="3379805"/>
           </a:xfrm>
+          <a:prstGeom prst="rect">
+            <a:avLst/>
+          </a:prstGeom>
         </p:spPr>
         <p:txBody>
           <a:bodyPr/>
@@ -1320,7 +1507,15 @@
             <p:ph type="dt" sz="half" idx="10"/>
           </p:nvPr>
         </p:nvSpPr>
-        <p:spPr/>
+        <p:spPr>
+          <a:xfrm>
+            <a:off x="457200" y="4746664"/>
+            <a:ext cx="2133600" cy="272661"/>
+          </a:xfrm>
+          <a:prstGeom prst="rect">
+            <a:avLst/>
+          </a:prstGeom>
+        </p:spPr>
         <p:txBody>
           <a:bodyPr/>
           <a:lstStyle/>
@@ -1328,7 +1523,7 @@
             <a:fld id="{1D8BD707-D9CF-40AE-B4C6-C98DA3205C09}" type="datetimeFigureOut">
               <a:rPr lang="en-US" smtClean="0"/>
               <a:pPr/>
-              <a:t>3/24/2013</a:t>
+              <a:t>5/18/2013</a:t>
             </a:fld>
             <a:endParaRPr lang="en-US"/>
           </a:p>
@@ -1344,7 +1539,15 @@
             <p:ph type="ftr" sz="quarter" idx="11"/>
           </p:nvPr>
         </p:nvSpPr>
-        <p:spPr/>
+        <p:spPr>
+          <a:xfrm>
+            <a:off x="3124200" y="4746664"/>
+            <a:ext cx="2895600" cy="272661"/>
+          </a:xfrm>
+          <a:prstGeom prst="rect">
+            <a:avLst/>
+          </a:prstGeom>
+        </p:spPr>
         <p:txBody>
           <a:bodyPr/>
           <a:lstStyle/>
@@ -1363,7 +1566,15 @@
             <p:ph type="sldNum" sz="quarter" idx="12"/>
           </p:nvPr>
         </p:nvSpPr>
-        <p:spPr/>
+        <p:spPr>
+          <a:xfrm>
+            <a:off x="6553200" y="4746664"/>
+            <a:ext cx="2133600" cy="272661"/>
+          </a:xfrm>
+          <a:prstGeom prst="rect">
+            <a:avLst/>
+          </a:prstGeom>
+        </p:spPr>
         <p:txBody>
           <a:bodyPr/>
           <a:lstStyle/>
@@ -1412,7 +1623,15 @@
             <p:ph type="title"/>
           </p:nvPr>
         </p:nvSpPr>
-        <p:spPr/>
+        <p:spPr>
+          <a:xfrm>
+            <a:off x="457200" y="205088"/>
+            <a:ext cx="8229600" cy="853546"/>
+          </a:xfrm>
+          <a:prstGeom prst="rect">
+            <a:avLst/>
+          </a:prstGeom>
+        </p:spPr>
         <p:txBody>
           <a:bodyPr/>
           <a:lstStyle>
@@ -1444,6 +1663,9 @@
             <a:off x="457200" y="1146360"/>
             <a:ext cx="4040188" cy="477748"/>
           </a:xfrm>
+          <a:prstGeom prst="rect">
+            <a:avLst/>
+          </a:prstGeom>
         </p:spPr>
         <p:txBody>
           <a:bodyPr anchor="b"/>
@@ -1509,6 +1731,9 @@
             <a:off x="457200" y="1624108"/>
             <a:ext cx="4040188" cy="2950661"/>
           </a:xfrm>
+          <a:prstGeom prst="rect">
+            <a:avLst/>
+          </a:prstGeom>
         </p:spPr>
         <p:txBody>
           <a:bodyPr/>
@@ -1594,6 +1819,9 @@
             <a:off x="4645027" y="1146360"/>
             <a:ext cx="4041775" cy="477748"/>
           </a:xfrm>
+          <a:prstGeom prst="rect">
+            <a:avLst/>
+          </a:prstGeom>
         </p:spPr>
         <p:txBody>
           <a:bodyPr anchor="b"/>
@@ -1659,6 +1887,9 @@
             <a:off x="4645027" y="1624108"/>
             <a:ext cx="4041775" cy="2950661"/>
           </a:xfrm>
+          <a:prstGeom prst="rect">
+            <a:avLst/>
+          </a:prstGeom>
         </p:spPr>
         <p:txBody>
           <a:bodyPr/>
@@ -1739,7 +1970,15 @@
             <p:ph type="dt" sz="half" idx="10"/>
           </p:nvPr>
         </p:nvSpPr>
-        <p:spPr/>
+        <p:spPr>
+          <a:xfrm>
+            <a:off x="457200" y="4746664"/>
+            <a:ext cx="2133600" cy="272661"/>
+          </a:xfrm>
+          <a:prstGeom prst="rect">
+            <a:avLst/>
+          </a:prstGeom>
+        </p:spPr>
         <p:txBody>
           <a:bodyPr/>
           <a:lstStyle/>
@@ -1747,7 +1986,7 @@
             <a:fld id="{1D8BD707-D9CF-40AE-B4C6-C98DA3205C09}" type="datetimeFigureOut">
               <a:rPr lang="en-US" smtClean="0"/>
               <a:pPr/>
-              <a:t>3/24/2013</a:t>
+              <a:t>5/18/2013</a:t>
             </a:fld>
             <a:endParaRPr lang="en-US"/>
           </a:p>
@@ -1763,7 +2002,15 @@
             <p:ph type="ftr" sz="quarter" idx="11"/>
           </p:nvPr>
         </p:nvSpPr>
-        <p:spPr/>
+        <p:spPr>
+          <a:xfrm>
+            <a:off x="3124200" y="4746664"/>
+            <a:ext cx="2895600" cy="272661"/>
+          </a:xfrm>
+          <a:prstGeom prst="rect">
+            <a:avLst/>
+          </a:prstGeom>
+        </p:spPr>
         <p:txBody>
           <a:bodyPr/>
           <a:lstStyle/>
@@ -1782,7 +2029,15 @@
             <p:ph type="sldNum" sz="quarter" idx="12"/>
           </p:nvPr>
         </p:nvSpPr>
-        <p:spPr/>
+        <p:spPr>
+          <a:xfrm>
+            <a:off x="6553200" y="4746664"/>
+            <a:ext cx="2133600" cy="272661"/>
+          </a:xfrm>
+          <a:prstGeom prst="rect">
+            <a:avLst/>
+          </a:prstGeom>
+        </p:spPr>
         <p:txBody>
           <a:bodyPr/>
           <a:lstStyle/>
@@ -1831,7 +2086,15 @@
             <p:ph type="title"/>
           </p:nvPr>
         </p:nvSpPr>
-        <p:spPr/>
+        <p:spPr>
+          <a:xfrm>
+            <a:off x="457200" y="205088"/>
+            <a:ext cx="8229600" cy="853546"/>
+          </a:xfrm>
+          <a:prstGeom prst="rect">
+            <a:avLst/>
+          </a:prstGeom>
+        </p:spPr>
         <p:txBody>
           <a:bodyPr/>
           <a:lstStyle/>
@@ -1854,7 +2117,15 @@
             <p:ph type="dt" sz="half" idx="10"/>
           </p:nvPr>
         </p:nvSpPr>
-        <p:spPr/>
+        <p:spPr>
+          <a:xfrm>
+            <a:off x="457200" y="4746664"/>
+            <a:ext cx="2133600" cy="272661"/>
+          </a:xfrm>
+          <a:prstGeom prst="rect">
+            <a:avLst/>
+          </a:prstGeom>
+        </p:spPr>
         <p:txBody>
           <a:bodyPr/>
           <a:lstStyle/>
@@ -1862,7 +2133,7 @@
             <a:fld id="{1D8BD707-D9CF-40AE-B4C6-C98DA3205C09}" type="datetimeFigureOut">
               <a:rPr lang="en-US" smtClean="0"/>
               <a:pPr/>
-              <a:t>3/24/2013</a:t>
+              <a:t>5/18/2013</a:t>
             </a:fld>
             <a:endParaRPr lang="en-US"/>
           </a:p>
@@ -1878,7 +2149,15 @@
             <p:ph type="ftr" sz="quarter" idx="11"/>
           </p:nvPr>
         </p:nvSpPr>
-        <p:spPr/>
+        <p:spPr>
+          <a:xfrm>
+            <a:off x="3124200" y="4746664"/>
+            <a:ext cx="2895600" cy="272661"/>
+          </a:xfrm>
+          <a:prstGeom prst="rect">
+            <a:avLst/>
+          </a:prstGeom>
+        </p:spPr>
         <p:txBody>
           <a:bodyPr/>
           <a:lstStyle/>
@@ -1897,7 +2176,15 @@
             <p:ph type="sldNum" sz="quarter" idx="12"/>
           </p:nvPr>
         </p:nvSpPr>
-        <p:spPr/>
+        <p:spPr>
+          <a:xfrm>
+            <a:off x="6553200" y="4746664"/>
+            <a:ext cx="2133600" cy="272661"/>
+          </a:xfrm>
+          <a:prstGeom prst="rect">
+            <a:avLst/>
+          </a:prstGeom>
+        </p:spPr>
         <p:txBody>
           <a:bodyPr/>
           <a:lstStyle/>
@@ -1946,7 +2233,15 @@
             <p:ph type="dt" sz="half" idx="10"/>
           </p:nvPr>
         </p:nvSpPr>
-        <p:spPr/>
+        <p:spPr>
+          <a:xfrm>
+            <a:off x="457200" y="4746664"/>
+            <a:ext cx="2133600" cy="272661"/>
+          </a:xfrm>
+          <a:prstGeom prst="rect">
+            <a:avLst/>
+          </a:prstGeom>
+        </p:spPr>
         <p:txBody>
           <a:bodyPr/>
           <a:lstStyle/>
@@ -1954,7 +2249,7 @@
             <a:fld id="{1D8BD707-D9CF-40AE-B4C6-C98DA3205C09}" type="datetimeFigureOut">
               <a:rPr lang="en-US" smtClean="0"/>
               <a:pPr/>
-              <a:t>3/24/2013</a:t>
+              <a:t>5/18/2013</a:t>
             </a:fld>
             <a:endParaRPr lang="en-US"/>
           </a:p>
@@ -1970,7 +2265,15 @@
             <p:ph type="ftr" sz="quarter" idx="11"/>
           </p:nvPr>
         </p:nvSpPr>
-        <p:spPr/>
+        <p:spPr>
+          <a:xfrm>
+            <a:off x="3124200" y="4746664"/>
+            <a:ext cx="2895600" cy="272661"/>
+          </a:xfrm>
+          <a:prstGeom prst="rect">
+            <a:avLst/>
+          </a:prstGeom>
+        </p:spPr>
         <p:txBody>
           <a:bodyPr/>
           <a:lstStyle/>
@@ -1989,7 +2292,15 @@
             <p:ph type="sldNum" sz="quarter" idx="12"/>
           </p:nvPr>
         </p:nvSpPr>
-        <p:spPr/>
+        <p:spPr>
+          <a:xfrm>
+            <a:off x="6553200" y="4746664"/>
+            <a:ext cx="2133600" cy="272661"/>
+          </a:xfrm>
+          <a:prstGeom prst="rect">
+            <a:avLst/>
+          </a:prstGeom>
+        </p:spPr>
         <p:txBody>
           <a:bodyPr/>
           <a:lstStyle/>
@@ -2043,6 +2354,9 @@
             <a:off x="457202" y="203902"/>
             <a:ext cx="3008313" cy="867772"/>
           </a:xfrm>
+          <a:prstGeom prst="rect">
+            <a:avLst/>
+          </a:prstGeom>
         </p:spPr>
         <p:txBody>
           <a:bodyPr anchor="b"/>
@@ -2075,6 +2389,9 @@
             <a:off x="3575050" y="203904"/>
             <a:ext cx="5111750" cy="4370866"/>
           </a:xfrm>
+          <a:prstGeom prst="rect">
+            <a:avLst/>
+          </a:prstGeom>
         </p:spPr>
         <p:txBody>
           <a:bodyPr/>
@@ -2160,6 +2477,9 @@
             <a:off x="457202" y="1071676"/>
             <a:ext cx="3008313" cy="3503094"/>
           </a:xfrm>
+          <a:prstGeom prst="rect">
+            <a:avLst/>
+          </a:prstGeom>
         </p:spPr>
         <p:txBody>
           <a:bodyPr/>
@@ -2220,7 +2540,15 @@
             <p:ph type="dt" sz="half" idx="10"/>
           </p:nvPr>
         </p:nvSpPr>
-        <p:spPr/>
+        <p:spPr>
+          <a:xfrm>
+            <a:off x="457200" y="4746664"/>
+            <a:ext cx="2133600" cy="272661"/>
+          </a:xfrm>
+          <a:prstGeom prst="rect">
+            <a:avLst/>
+          </a:prstGeom>
+        </p:spPr>
         <p:txBody>
           <a:bodyPr/>
           <a:lstStyle/>
@@ -2228,7 +2556,7 @@
             <a:fld id="{1D8BD707-D9CF-40AE-B4C6-C98DA3205C09}" type="datetimeFigureOut">
               <a:rPr lang="en-US" smtClean="0"/>
               <a:pPr/>
-              <a:t>3/24/2013</a:t>
+              <a:t>5/18/2013</a:t>
             </a:fld>
             <a:endParaRPr lang="en-US"/>
           </a:p>
@@ -2244,7 +2572,15 @@
             <p:ph type="ftr" sz="quarter" idx="11"/>
           </p:nvPr>
         </p:nvSpPr>
-        <p:spPr/>
+        <p:spPr>
+          <a:xfrm>
+            <a:off x="3124200" y="4746664"/>
+            <a:ext cx="2895600" cy="272661"/>
+          </a:xfrm>
+          <a:prstGeom prst="rect">
+            <a:avLst/>
+          </a:prstGeom>
+        </p:spPr>
         <p:txBody>
           <a:bodyPr/>
           <a:lstStyle/>
@@ -2263,7 +2599,15 @@
             <p:ph type="sldNum" sz="quarter" idx="12"/>
           </p:nvPr>
         </p:nvSpPr>
-        <p:spPr/>
+        <p:spPr>
+          <a:xfrm>
+            <a:off x="6553200" y="4746664"/>
+            <a:ext cx="2133600" cy="272661"/>
+          </a:xfrm>
+          <a:prstGeom prst="rect">
+            <a:avLst/>
+          </a:prstGeom>
+        </p:spPr>
         <p:txBody>
           <a:bodyPr/>
           <a:lstStyle/>
@@ -2317,6 +2661,9 @@
             <a:off x="1792288" y="3584893"/>
             <a:ext cx="5486400" cy="423216"/>
           </a:xfrm>
+          <a:prstGeom prst="rect">
+            <a:avLst/>
+          </a:prstGeom>
         </p:spPr>
         <p:txBody>
           <a:bodyPr anchor="b"/>
@@ -2349,6 +2696,9 @@
             <a:off x="1792288" y="457596"/>
             <a:ext cx="5486400" cy="3072765"/>
           </a:xfrm>
+          <a:prstGeom prst="rect">
+            <a:avLst/>
+          </a:prstGeom>
         </p:spPr>
         <p:txBody>
           <a:bodyPr/>
@@ -2410,6 +2760,9 @@
             <a:off x="1792288" y="4008109"/>
             <a:ext cx="5486400" cy="601039"/>
           </a:xfrm>
+          <a:prstGeom prst="rect">
+            <a:avLst/>
+          </a:prstGeom>
         </p:spPr>
         <p:txBody>
           <a:bodyPr/>
@@ -2470,7 +2823,15 @@
             <p:ph type="dt" sz="half" idx="10"/>
           </p:nvPr>
         </p:nvSpPr>
-        <p:spPr/>
+        <p:spPr>
+          <a:xfrm>
+            <a:off x="457200" y="4746664"/>
+            <a:ext cx="2133600" cy="272661"/>
+          </a:xfrm>
+          <a:prstGeom prst="rect">
+            <a:avLst/>
+          </a:prstGeom>
+        </p:spPr>
         <p:txBody>
           <a:bodyPr/>
           <a:lstStyle/>
@@ -2478,7 +2839,7 @@
             <a:fld id="{1D8BD707-D9CF-40AE-B4C6-C98DA3205C09}" type="datetimeFigureOut">
               <a:rPr lang="en-US" smtClean="0"/>
               <a:pPr/>
-              <a:t>3/24/2013</a:t>
+              <a:t>5/18/2013</a:t>
             </a:fld>
             <a:endParaRPr lang="en-US"/>
           </a:p>
@@ -2494,7 +2855,15 @@
             <p:ph type="ftr" sz="quarter" idx="11"/>
           </p:nvPr>
         </p:nvSpPr>
-        <p:spPr/>
+        <p:spPr>
+          <a:xfrm>
+            <a:off x="3124200" y="4746664"/>
+            <a:ext cx="2895600" cy="272661"/>
+          </a:xfrm>
+          <a:prstGeom prst="rect">
+            <a:avLst/>
+          </a:prstGeom>
+        </p:spPr>
         <p:txBody>
           <a:bodyPr/>
           <a:lstStyle/>
@@ -2513,7 +2882,15 @@
             <p:ph type="sldNum" sz="quarter" idx="12"/>
           </p:nvPr>
         </p:nvSpPr>
-        <p:spPr/>
+        <p:spPr>
+          <a:xfrm>
+            <a:off x="6553200" y="4746664"/>
+            <a:ext cx="2133600" cy="272661"/>
+          </a:xfrm>
+          <a:prstGeom prst="rect">
+            <a:avLst/>
+          </a:prstGeom>
+        </p:spPr>
         <p:txBody>
           <a:bodyPr/>
           <a:lstStyle/>
@@ -2559,217 +2936,436 @@
       </p:grpSpPr>
       <p:sp>
         <p:nvSpPr>
-          <p:cNvPr id="2" name="Title Placeholder 1"/>
-          <p:cNvSpPr>
-            <a:spLocks noGrp="1"/>
-          </p:cNvSpPr>
-          <p:nvPr>
-            <p:ph type="title"/>
-          </p:nvPr>
-        </p:nvSpPr>
-        <p:spPr>
-          <a:xfrm>
-            <a:off x="457200" y="205088"/>
-            <a:ext cx="8229600" cy="853546"/>
-          </a:xfrm>
-          <a:prstGeom prst="rect">
-            <a:avLst/>
-          </a:prstGeom>
-        </p:spPr>
-        <p:txBody>
-          <a:bodyPr vert="horz" lIns="91440" tIns="45720" rIns="91440" bIns="45720" rtlCol="0" anchor="ctr">
-            <a:normAutofit/>
-          </a:bodyPr>
-          <a:lstStyle/>
-          <a:p>
-            <a:r>
-              <a:rPr lang="en-US" smtClean="0"/>
-              <a:t>Click to edit Master title style</a:t>
-            </a:r>
-            <a:endParaRPr lang="en-US"/>
-          </a:p>
-        </p:txBody>
-      </p:sp>
-      <p:sp>
-        <p:nvSpPr>
-          <p:cNvPr id="3" name="Text Placeholder 2"/>
-          <p:cNvSpPr>
-            <a:spLocks noGrp="1"/>
-          </p:cNvSpPr>
-          <p:nvPr>
-            <p:ph type="body" idx="1"/>
-          </p:nvPr>
-        </p:nvSpPr>
-        <p:spPr>
-          <a:xfrm>
-            <a:off x="457200" y="1194965"/>
-            <a:ext cx="8229600" cy="3379805"/>
-          </a:xfrm>
-          <a:prstGeom prst="rect">
-            <a:avLst/>
-          </a:prstGeom>
-        </p:spPr>
-        <p:txBody>
-          <a:bodyPr vert="horz" lIns="91440" tIns="45720" rIns="91440" bIns="45720" rtlCol="0">
-            <a:normAutofit/>
-          </a:bodyPr>
-          <a:lstStyle/>
-          <a:p>
-            <a:pPr lvl="0"/>
-            <a:r>
-              <a:rPr lang="en-US" smtClean="0"/>
-              <a:t>Click to edit Master text styles</a:t>
-            </a:r>
-          </a:p>
-          <a:p>
-            <a:pPr lvl="1"/>
-            <a:r>
-              <a:rPr lang="en-US" smtClean="0"/>
-              <a:t>Second level</a:t>
-            </a:r>
-          </a:p>
-          <a:p>
-            <a:pPr lvl="2"/>
-            <a:r>
-              <a:rPr lang="en-US" smtClean="0"/>
-              <a:t>Third level</a:t>
-            </a:r>
-          </a:p>
-          <a:p>
-            <a:pPr lvl="3"/>
-            <a:r>
-              <a:rPr lang="en-US" smtClean="0"/>
-              <a:t>Fourth level</a:t>
-            </a:r>
-          </a:p>
-          <a:p>
-            <a:pPr lvl="4"/>
-            <a:r>
-              <a:rPr lang="en-US" smtClean="0"/>
-              <a:t>Fifth level</a:t>
-            </a:r>
-            <a:endParaRPr lang="en-US"/>
-          </a:p>
-        </p:txBody>
-      </p:sp>
-      <p:sp>
-        <p:nvSpPr>
-          <p:cNvPr id="4" name="Date Placeholder 3"/>
-          <p:cNvSpPr>
-            <a:spLocks noGrp="1"/>
-          </p:cNvSpPr>
-          <p:nvPr>
-            <p:ph type="dt" sz="half" idx="2"/>
-          </p:nvPr>
-        </p:nvSpPr>
-        <p:spPr>
-          <a:xfrm>
-            <a:off x="457200" y="4746664"/>
-            <a:ext cx="2133600" cy="272661"/>
-          </a:xfrm>
-          <a:prstGeom prst="rect">
-            <a:avLst/>
-          </a:prstGeom>
-        </p:spPr>
-        <p:txBody>
-          <a:bodyPr vert="horz" lIns="91440" tIns="45720" rIns="91440" bIns="45720" rtlCol="0" anchor="ctr"/>
-          <a:lstStyle>
-            <a:lvl1pPr algn="l">
-              <a:defRPr sz="1200">
+          <p:cNvPr id="7" name="Rounded Rectangle 6"/>
+          <p:cNvSpPr/>
+          <p:nvPr userDrawn="1"/>
+        </p:nvSpPr>
+        <p:spPr>
+          <a:xfrm>
+            <a:off x="228600" y="122237"/>
+            <a:ext cx="8610600" cy="4724400"/>
+          </a:xfrm>
+          <a:prstGeom prst="roundRect">
+            <a:avLst>
+              <a:gd name="adj" fmla="val 3232"/>
+            </a:avLst>
+          </a:prstGeom>
+          <a:solidFill>
+            <a:schemeClr val="accent5">
+              <a:lumMod val="40000"/>
+              <a:lumOff val="60000"/>
+            </a:schemeClr>
+          </a:solidFill>
+          <a:ln>
+            <a:solidFill>
+              <a:schemeClr val="accent5">
+                <a:lumMod val="60000"/>
+                <a:lumOff val="40000"/>
+              </a:schemeClr>
+            </a:solidFill>
+          </a:ln>
+        </p:spPr>
+        <p:style>
+          <a:lnRef idx="2">
+            <a:schemeClr val="accent1">
+              <a:shade val="50000"/>
+            </a:schemeClr>
+          </a:lnRef>
+          <a:fillRef idx="1">
+            <a:schemeClr val="accent1"/>
+          </a:fillRef>
+          <a:effectRef idx="0">
+            <a:schemeClr val="accent1"/>
+          </a:effectRef>
+          <a:fontRef idx="minor">
+            <a:schemeClr val="lt1"/>
+          </a:fontRef>
+        </p:style>
+        <p:txBody>
+          <a:bodyPr vert="horz" rtlCol="0" anchor="t" anchorCtr="0"/>
+          <a:lstStyle/>
+          <a:p>
+            <a:r>
+              <a:rPr lang="en-US" sz="1600" b="1" dirty="0" smtClean="0"/>
+              <a:t>Common</a:t>
+            </a:r>
+            <a:endParaRPr lang="en-SG" sz="1600" b="1" dirty="0"/>
+          </a:p>
+        </p:txBody>
+      </p:sp>
+      <p:sp>
+        <p:nvSpPr>
+          <p:cNvPr id="9" name="Rectangle 8"/>
+          <p:cNvSpPr/>
+          <p:nvPr/>
+        </p:nvSpPr>
+        <p:spPr>
+          <a:xfrm>
+            <a:off x="381000" y="2342197"/>
+            <a:ext cx="8305800" cy="2352040"/>
+          </a:xfrm>
+          <a:prstGeom prst="rect">
+            <a:avLst/>
+          </a:prstGeom>
+          <a:solidFill>
+            <a:schemeClr val="bg1"/>
+          </a:solidFill>
+          <a:ln>
+            <a:solidFill>
+              <a:schemeClr val="accent5">
+                <a:lumMod val="60000"/>
+                <a:lumOff val="40000"/>
+              </a:schemeClr>
+            </a:solidFill>
+          </a:ln>
+        </p:spPr>
+        <p:style>
+          <a:lnRef idx="2">
+            <a:schemeClr val="accent1">
+              <a:shade val="50000"/>
+            </a:schemeClr>
+          </a:lnRef>
+          <a:fillRef idx="1">
+            <a:schemeClr val="accent1"/>
+          </a:fillRef>
+          <a:effectRef idx="0">
+            <a:schemeClr val="accent1"/>
+          </a:effectRef>
+          <a:fontRef idx="minor">
+            <a:schemeClr val="lt1"/>
+          </a:fontRef>
+        </p:style>
+        <p:txBody>
+          <a:bodyPr rtlCol="0" anchor="t" anchorCtr="0"/>
+          <a:lstStyle/>
+          <a:p>
+            <a:r>
+              <a:rPr lang="en-US" sz="1400" b="1" dirty="0" smtClean="0">
                 <a:solidFill>
-                  <a:schemeClr val="tx1">
-                    <a:tint val="75000"/>
+                  <a:schemeClr val="accent5">
+                    <a:lumMod val="75000"/>
                   </a:schemeClr>
                 </a:solidFill>
-              </a:defRPr>
-            </a:lvl1pPr>
-          </a:lstStyle>
-          <a:p>
-            <a:fld id="{1D8BD707-D9CF-40AE-B4C6-C98DA3205C09}" type="datetimeFigureOut">
-              <a:rPr lang="en-US" smtClean="0"/>
-              <a:pPr/>
-              <a:t>3/24/2013</a:t>
-            </a:fld>
-            <a:endParaRPr lang="en-US"/>
-          </a:p>
-        </p:txBody>
-      </p:sp>
-      <p:sp>
-        <p:nvSpPr>
-          <p:cNvPr id="5" name="Footer Placeholder 4"/>
-          <p:cNvSpPr>
-            <a:spLocks noGrp="1"/>
-          </p:cNvSpPr>
-          <p:nvPr>
-            <p:ph type="ftr" sz="quarter" idx="3"/>
-          </p:nvPr>
-        </p:nvSpPr>
-        <p:spPr>
-          <a:xfrm>
-            <a:off x="3124200" y="4746664"/>
-            <a:ext cx="2895600" cy="272661"/>
-          </a:xfrm>
-          <a:prstGeom prst="rect">
-            <a:avLst/>
-          </a:prstGeom>
-        </p:spPr>
-        <p:txBody>
-          <a:bodyPr vert="horz" lIns="91440" tIns="45720" rIns="91440" bIns="45720" rtlCol="0" anchor="ctr"/>
-          <a:lstStyle>
-            <a:lvl1pPr algn="ctr">
-              <a:defRPr sz="1200">
+              </a:rPr>
+              <a:t>common::</a:t>
+            </a:r>
+            <a:r>
+              <a:rPr lang="en-US" sz="1400" b="1" dirty="0" err="1" smtClean="0">
                 <a:solidFill>
-                  <a:schemeClr val="tx1">
-                    <a:tint val="75000"/>
+                  <a:schemeClr val="accent5">
+                    <a:lumMod val="75000"/>
                   </a:schemeClr>
                 </a:solidFill>
-              </a:defRPr>
-            </a:lvl1pPr>
-          </a:lstStyle>
-          <a:p>
-            <a:endParaRPr lang="en-US"/>
-          </a:p>
-        </p:txBody>
-      </p:sp>
-      <p:sp>
-        <p:nvSpPr>
-          <p:cNvPr id="6" name="Slide Number Placeholder 5"/>
-          <p:cNvSpPr>
-            <a:spLocks noGrp="1"/>
-          </p:cNvSpPr>
-          <p:nvPr>
-            <p:ph type="sldNum" sz="quarter" idx="4"/>
-          </p:nvPr>
-        </p:nvSpPr>
-        <p:spPr>
-          <a:xfrm>
-            <a:off x="6553200" y="4746664"/>
-            <a:ext cx="2133600" cy="272661"/>
-          </a:xfrm>
-          <a:prstGeom prst="rect">
-            <a:avLst/>
-          </a:prstGeom>
-        </p:spPr>
-        <p:txBody>
-          <a:bodyPr vert="horz" lIns="91440" tIns="45720" rIns="91440" bIns="45720" rtlCol="0" anchor="ctr"/>
-          <a:lstStyle>
-            <a:lvl1pPr algn="r">
-              <a:defRPr sz="1200">
+              </a:rPr>
+              <a:t>datatransfer</a:t>
+            </a:r>
+            <a:endParaRPr lang="en-SG" sz="1400" b="1" dirty="0">
+              <a:solidFill>
+                <a:schemeClr val="accent5">
+                  <a:lumMod val="75000"/>
+                </a:schemeClr>
+              </a:solidFill>
+            </a:endParaRPr>
+          </a:p>
+        </p:txBody>
+      </p:sp>
+      <p:sp>
+        <p:nvSpPr>
+          <p:cNvPr id="10" name="Rectangle 9"/>
+          <p:cNvSpPr/>
+          <p:nvPr/>
+        </p:nvSpPr>
+        <p:spPr>
+          <a:xfrm>
+            <a:off x="8191500" y="2260917"/>
+            <a:ext cx="495300" cy="81280"/>
+          </a:xfrm>
+          <a:prstGeom prst="rect">
+            <a:avLst/>
+          </a:prstGeom>
+          <a:solidFill>
+            <a:schemeClr val="bg1"/>
+          </a:solidFill>
+          <a:ln>
+            <a:solidFill>
+              <a:schemeClr val="accent5">
+                <a:lumMod val="60000"/>
+                <a:lumOff val="40000"/>
+              </a:schemeClr>
+            </a:solidFill>
+          </a:ln>
+        </p:spPr>
+        <p:style>
+          <a:lnRef idx="2">
+            <a:schemeClr val="accent1">
+              <a:shade val="50000"/>
+            </a:schemeClr>
+          </a:lnRef>
+          <a:fillRef idx="1">
+            <a:schemeClr val="accent1"/>
+          </a:fillRef>
+          <a:effectRef idx="0">
+            <a:schemeClr val="accent1"/>
+          </a:effectRef>
+          <a:fontRef idx="minor">
+            <a:schemeClr val="lt1"/>
+          </a:fontRef>
+        </p:style>
+        <p:txBody>
+          <a:bodyPr rtlCol="0" anchor="t" anchorCtr="0"/>
+          <a:lstStyle/>
+          <a:p>
+            <a:endParaRPr lang="en-SG" sz="1400" b="1">
+              <a:solidFill>
+                <a:schemeClr val="accent5">
+                  <a:lumMod val="75000"/>
+                </a:schemeClr>
+              </a:solidFill>
+            </a:endParaRPr>
+          </a:p>
+        </p:txBody>
+      </p:sp>
+      <p:sp>
+        <p:nvSpPr>
+          <p:cNvPr id="12" name="Rectangle 11"/>
+          <p:cNvSpPr/>
+          <p:nvPr/>
+        </p:nvSpPr>
+        <p:spPr>
+          <a:xfrm>
+            <a:off x="380999" y="565987"/>
+            <a:ext cx="4495801" cy="1613650"/>
+          </a:xfrm>
+          <a:prstGeom prst="rect">
+            <a:avLst/>
+          </a:prstGeom>
+          <a:solidFill>
+            <a:schemeClr val="bg1"/>
+          </a:solidFill>
+          <a:ln>
+            <a:solidFill>
+              <a:schemeClr val="accent5">
+                <a:lumMod val="60000"/>
+                <a:lumOff val="40000"/>
+              </a:schemeClr>
+            </a:solidFill>
+          </a:ln>
+        </p:spPr>
+        <p:style>
+          <a:lnRef idx="2">
+            <a:schemeClr val="accent1">
+              <a:shade val="50000"/>
+            </a:schemeClr>
+          </a:lnRef>
+          <a:fillRef idx="1">
+            <a:schemeClr val="accent1"/>
+          </a:fillRef>
+          <a:effectRef idx="0">
+            <a:schemeClr val="accent1"/>
+          </a:effectRef>
+          <a:fontRef idx="minor">
+            <a:schemeClr val="lt1"/>
+          </a:fontRef>
+        </p:style>
+        <p:txBody>
+          <a:bodyPr rtlCol="0" anchor="t" anchorCtr="0"/>
+          <a:lstStyle/>
+          <a:p>
+            <a:r>
+              <a:rPr lang="en-US" sz="1400" b="1" dirty="0" smtClean="0">
                 <a:solidFill>
-                  <a:schemeClr val="tx1">
-                    <a:tint val="75000"/>
+                  <a:schemeClr val="accent5">
+                    <a:lumMod val="75000"/>
                   </a:schemeClr>
                 </a:solidFill>
-              </a:defRPr>
-            </a:lvl1pPr>
-          </a:lstStyle>
-          <a:p>
-            <a:fld id="{B6F15528-21DE-4FAA-801E-634DDDAF4B2B}" type="slidenum">
-              <a:rPr lang="en-US" smtClean="0"/>
-              <a:pPr/>
-              <a:t>‹#›</a:t>
-            </a:fld>
-            <a:endParaRPr lang="en-US"/>
+              </a:rPr>
+              <a:t>common</a:t>
+            </a:r>
+            <a:endParaRPr lang="en-SG" sz="1400" b="1" dirty="0">
+              <a:solidFill>
+                <a:schemeClr val="accent5">
+                  <a:lumMod val="75000"/>
+                </a:schemeClr>
+              </a:solidFill>
+            </a:endParaRPr>
+          </a:p>
+        </p:txBody>
+      </p:sp>
+      <p:sp>
+        <p:nvSpPr>
+          <p:cNvPr id="15" name="Rectangle 14"/>
+          <p:cNvSpPr/>
+          <p:nvPr userDrawn="1"/>
+        </p:nvSpPr>
+        <p:spPr>
+          <a:xfrm>
+            <a:off x="5105400" y="542992"/>
+            <a:ext cx="3581400" cy="1636645"/>
+          </a:xfrm>
+          <a:prstGeom prst="rect">
+            <a:avLst/>
+          </a:prstGeom>
+          <a:solidFill>
+            <a:schemeClr val="bg1"/>
+          </a:solidFill>
+          <a:ln>
+            <a:solidFill>
+              <a:schemeClr val="accent5">
+                <a:lumMod val="60000"/>
+                <a:lumOff val="40000"/>
+              </a:schemeClr>
+            </a:solidFill>
+          </a:ln>
+        </p:spPr>
+        <p:style>
+          <a:lnRef idx="2">
+            <a:schemeClr val="accent1">
+              <a:shade val="50000"/>
+            </a:schemeClr>
+          </a:lnRef>
+          <a:fillRef idx="1">
+            <a:schemeClr val="accent1"/>
+          </a:fillRef>
+          <a:effectRef idx="0">
+            <a:schemeClr val="accent1"/>
+          </a:effectRef>
+          <a:fontRef idx="minor">
+            <a:schemeClr val="lt1"/>
+          </a:fontRef>
+        </p:style>
+        <p:txBody>
+          <a:bodyPr rtlCol="0" anchor="t" anchorCtr="0"/>
+          <a:lstStyle/>
+          <a:p>
+            <a:r>
+              <a:rPr lang="en-US" sz="1400" b="1" dirty="0" smtClean="0">
+                <a:solidFill>
+                  <a:schemeClr val="accent5">
+                    <a:lumMod val="75000"/>
+                  </a:schemeClr>
+                </a:solidFill>
+              </a:rPr>
+              <a:t>common::exception</a:t>
+            </a:r>
+            <a:endParaRPr lang="en-SG" sz="1400" b="1" dirty="0">
+              <a:solidFill>
+                <a:schemeClr val="accent5">
+                  <a:lumMod val="75000"/>
+                </a:schemeClr>
+              </a:solidFill>
+            </a:endParaRPr>
+          </a:p>
+        </p:txBody>
+      </p:sp>
+      <p:sp>
+        <p:nvSpPr>
+          <p:cNvPr id="45" name="Rectangle 44"/>
+          <p:cNvSpPr/>
+          <p:nvPr userDrawn="1"/>
+        </p:nvSpPr>
+        <p:spPr>
+          <a:xfrm>
+            <a:off x="8191500" y="458411"/>
+            <a:ext cx="495300" cy="81280"/>
+          </a:xfrm>
+          <a:prstGeom prst="rect">
+            <a:avLst/>
+          </a:prstGeom>
+          <a:solidFill>
+            <a:schemeClr val="bg1"/>
+          </a:solidFill>
+          <a:ln>
+            <a:solidFill>
+              <a:schemeClr val="accent5">
+                <a:lumMod val="60000"/>
+                <a:lumOff val="40000"/>
+              </a:schemeClr>
+            </a:solidFill>
+          </a:ln>
+        </p:spPr>
+        <p:style>
+          <a:lnRef idx="2">
+            <a:schemeClr val="accent1">
+              <a:shade val="50000"/>
+            </a:schemeClr>
+          </a:lnRef>
+          <a:fillRef idx="1">
+            <a:schemeClr val="accent1"/>
+          </a:fillRef>
+          <a:effectRef idx="0">
+            <a:schemeClr val="accent1"/>
+          </a:effectRef>
+          <a:fontRef idx="minor">
+            <a:schemeClr val="lt1"/>
+          </a:fontRef>
+        </p:style>
+        <p:txBody>
+          <a:bodyPr rtlCol="0" anchor="t" anchorCtr="0"/>
+          <a:lstStyle/>
+          <a:p>
+            <a:endParaRPr lang="en-SG" sz="1400" b="1">
+              <a:solidFill>
+                <a:schemeClr val="accent5">
+                  <a:lumMod val="75000"/>
+                </a:schemeClr>
+              </a:solidFill>
+            </a:endParaRPr>
+          </a:p>
+        </p:txBody>
+      </p:sp>
+      <p:sp>
+        <p:nvSpPr>
+          <p:cNvPr id="46" name="Rectangle 45"/>
+          <p:cNvSpPr/>
+          <p:nvPr userDrawn="1"/>
+        </p:nvSpPr>
+        <p:spPr>
+          <a:xfrm>
+            <a:off x="4381500" y="484707"/>
+            <a:ext cx="495300" cy="81280"/>
+          </a:xfrm>
+          <a:prstGeom prst="rect">
+            <a:avLst/>
+          </a:prstGeom>
+          <a:solidFill>
+            <a:schemeClr val="bg1"/>
+          </a:solidFill>
+          <a:ln>
+            <a:solidFill>
+              <a:schemeClr val="accent5">
+                <a:lumMod val="60000"/>
+                <a:lumOff val="40000"/>
+              </a:schemeClr>
+            </a:solidFill>
+          </a:ln>
+        </p:spPr>
+        <p:style>
+          <a:lnRef idx="2">
+            <a:schemeClr val="accent1">
+              <a:shade val="50000"/>
+            </a:schemeClr>
+          </a:lnRef>
+          <a:fillRef idx="1">
+            <a:schemeClr val="accent1"/>
+          </a:fillRef>
+          <a:effectRef idx="0">
+            <a:schemeClr val="accent1"/>
+          </a:effectRef>
+          <a:fontRef idx="minor">
+            <a:schemeClr val="lt1"/>
+          </a:fontRef>
+        </p:style>
+        <p:txBody>
+          <a:bodyPr rtlCol="0" anchor="t" anchorCtr="0"/>
+          <a:lstStyle/>
+          <a:p>
+            <a:endParaRPr lang="en-SG" sz="1400" b="1">
+              <a:solidFill>
+                <a:schemeClr val="accent5">
+                  <a:lumMod val="75000"/>
+                </a:schemeClr>
+              </a:solidFill>
+            </a:endParaRPr>
           </a:p>
         </p:txBody>
       </p:sp>
@@ -3061,491 +3657,13 @@
       </p:grpSpPr>
       <p:sp>
         <p:nvSpPr>
-          <p:cNvPr id="152" name="Rounded Rectangle 151"/>
-          <p:cNvSpPr/>
-          <p:nvPr/>
-        </p:nvSpPr>
-        <p:spPr>
-          <a:xfrm>
-            <a:off x="228600" y="122237"/>
-            <a:ext cx="8610600" cy="4724400"/>
-          </a:xfrm>
-          <a:prstGeom prst="roundRect">
-            <a:avLst>
-              <a:gd name="adj" fmla="val 4940"/>
-            </a:avLst>
-          </a:prstGeom>
-          <a:solidFill>
-            <a:schemeClr val="accent5">
-              <a:lumMod val="40000"/>
-              <a:lumOff val="60000"/>
-            </a:schemeClr>
-          </a:solidFill>
-          <a:ln>
-            <a:solidFill>
-              <a:schemeClr val="accent5">
-                <a:lumMod val="60000"/>
-                <a:lumOff val="40000"/>
-              </a:schemeClr>
-            </a:solidFill>
-          </a:ln>
-        </p:spPr>
-        <p:style>
-          <a:lnRef idx="2">
-            <a:schemeClr val="accent1">
-              <a:shade val="50000"/>
-            </a:schemeClr>
-          </a:lnRef>
-          <a:fillRef idx="1">
-            <a:schemeClr val="accent1"/>
-          </a:fillRef>
-          <a:effectRef idx="0">
-            <a:schemeClr val="accent1"/>
-          </a:effectRef>
-          <a:fontRef idx="minor">
-            <a:schemeClr val="lt1"/>
-          </a:fontRef>
-        </p:style>
-        <p:txBody>
-          <a:bodyPr vert="horz" rtlCol="0" anchor="t" anchorCtr="0"/>
-          <a:lstStyle/>
-          <a:p>
-            <a:r>
-              <a:rPr lang="en-US" sz="1600" b="1" dirty="0" smtClean="0"/>
-              <a:t>Common</a:t>
-            </a:r>
-            <a:endParaRPr lang="en-SG" sz="1600" b="1" dirty="0"/>
-          </a:p>
-        </p:txBody>
-      </p:sp>
-      <p:grpSp>
-        <p:nvGrpSpPr>
-          <p:cNvPr id="153" name="Group 152"/>
-          <p:cNvGrpSpPr/>
-          <p:nvPr/>
-        </p:nvGrpSpPr>
-        <p:grpSpPr>
-          <a:xfrm>
-            <a:off x="381000" y="2179637"/>
-            <a:ext cx="8305800" cy="2514600"/>
-            <a:chOff x="-7162800" y="1371600"/>
-            <a:chExt cx="8305800" cy="2357438"/>
-          </a:xfrm>
-          <a:solidFill>
-            <a:schemeClr val="bg1"/>
-          </a:solidFill>
-        </p:grpSpPr>
-        <p:sp>
-          <p:nvSpPr>
-            <p:cNvPr id="154" name="Rectangle 153"/>
-            <p:cNvSpPr/>
-            <p:nvPr/>
-          </p:nvSpPr>
-          <p:spPr>
-            <a:xfrm>
-              <a:off x="-7162800" y="1524000"/>
-              <a:ext cx="8305800" cy="2205038"/>
-            </a:xfrm>
-            <a:prstGeom prst="rect">
-              <a:avLst/>
-            </a:prstGeom>
-            <a:grpFill/>
-            <a:ln>
-              <a:solidFill>
-                <a:schemeClr val="accent5">
-                  <a:lumMod val="60000"/>
-                  <a:lumOff val="40000"/>
-                </a:schemeClr>
-              </a:solidFill>
-            </a:ln>
-          </p:spPr>
-          <p:style>
-            <a:lnRef idx="2">
-              <a:schemeClr val="accent1">
-                <a:shade val="50000"/>
-              </a:schemeClr>
-            </a:lnRef>
-            <a:fillRef idx="1">
-              <a:schemeClr val="accent1"/>
-            </a:fillRef>
-            <a:effectRef idx="0">
-              <a:schemeClr val="accent1"/>
-            </a:effectRef>
-            <a:fontRef idx="minor">
-              <a:schemeClr val="lt1"/>
-            </a:fontRef>
-          </p:style>
-          <p:txBody>
-            <a:bodyPr rtlCol="0" anchor="t" anchorCtr="0"/>
-            <a:lstStyle/>
-            <a:p>
-              <a:r>
-                <a:rPr lang="en-US" sz="1400" b="1" dirty="0" smtClean="0">
-                  <a:solidFill>
-                    <a:schemeClr val="accent5">
-                      <a:lumMod val="75000"/>
-                    </a:schemeClr>
-                  </a:solidFill>
-                </a:rPr>
-                <a:t>common::</a:t>
-              </a:r>
-              <a:r>
-                <a:rPr lang="en-US" sz="1400" b="1" dirty="0" err="1" smtClean="0">
-                  <a:solidFill>
-                    <a:schemeClr val="accent5">
-                      <a:lumMod val="75000"/>
-                    </a:schemeClr>
-                  </a:solidFill>
-                </a:rPr>
-                <a:t>datatransfer</a:t>
-              </a:r>
-              <a:endParaRPr lang="en-SG" sz="1400" b="1" dirty="0">
-                <a:solidFill>
-                  <a:schemeClr val="accent5">
-                    <a:lumMod val="75000"/>
-                  </a:schemeClr>
-                </a:solidFill>
-              </a:endParaRPr>
-            </a:p>
-          </p:txBody>
-        </p:sp>
-        <p:sp>
-          <p:nvSpPr>
-            <p:cNvPr id="155" name="Rectangle 154"/>
-            <p:cNvSpPr/>
-            <p:nvPr/>
-          </p:nvSpPr>
-          <p:spPr>
-            <a:xfrm>
-              <a:off x="647700" y="1371600"/>
-              <a:ext cx="495300" cy="152400"/>
-            </a:xfrm>
-            <a:prstGeom prst="rect">
-              <a:avLst/>
-            </a:prstGeom>
-            <a:grpFill/>
-            <a:ln>
-              <a:solidFill>
-                <a:schemeClr val="accent5">
-                  <a:lumMod val="60000"/>
-                  <a:lumOff val="40000"/>
-                </a:schemeClr>
-              </a:solidFill>
-            </a:ln>
-          </p:spPr>
-          <p:style>
-            <a:lnRef idx="2">
-              <a:schemeClr val="accent1">
-                <a:shade val="50000"/>
-              </a:schemeClr>
-            </a:lnRef>
-            <a:fillRef idx="1">
-              <a:schemeClr val="accent1"/>
-            </a:fillRef>
-            <a:effectRef idx="0">
-              <a:schemeClr val="accent1"/>
-            </a:effectRef>
-            <a:fontRef idx="minor">
-              <a:schemeClr val="lt1"/>
-            </a:fontRef>
-          </p:style>
-          <p:txBody>
-            <a:bodyPr rtlCol="0" anchor="t" anchorCtr="0"/>
-            <a:lstStyle/>
-            <a:p>
-              <a:endParaRPr lang="en-SG" sz="1400" b="1">
-                <a:solidFill>
-                  <a:schemeClr val="accent5">
-                    <a:lumMod val="75000"/>
-                  </a:schemeClr>
-                </a:solidFill>
-              </a:endParaRPr>
-            </a:p>
-          </p:txBody>
-        </p:sp>
-      </p:grpSp>
-      <p:grpSp>
-        <p:nvGrpSpPr>
-          <p:cNvPr id="158" name="Group 157"/>
-          <p:cNvGrpSpPr/>
-          <p:nvPr/>
-        </p:nvGrpSpPr>
-        <p:grpSpPr>
-          <a:xfrm>
-            <a:off x="457200" y="427037"/>
-            <a:ext cx="2209800" cy="1828800"/>
-            <a:chOff x="-838200" y="1371600"/>
-            <a:chExt cx="1981200" cy="1295400"/>
-          </a:xfrm>
-          <a:solidFill>
-            <a:schemeClr val="bg1"/>
-          </a:solidFill>
-        </p:grpSpPr>
-        <p:sp>
-          <p:nvSpPr>
-            <p:cNvPr id="159" name="Rectangle 158"/>
-            <p:cNvSpPr/>
-            <p:nvPr/>
-          </p:nvSpPr>
-          <p:spPr>
-            <a:xfrm>
-              <a:off x="-838200" y="1523999"/>
-              <a:ext cx="1981200" cy="1143001"/>
-            </a:xfrm>
-            <a:prstGeom prst="rect">
-              <a:avLst/>
-            </a:prstGeom>
-            <a:grpFill/>
-            <a:ln>
-              <a:solidFill>
-                <a:schemeClr val="accent5">
-                  <a:lumMod val="60000"/>
-                  <a:lumOff val="40000"/>
-                </a:schemeClr>
-              </a:solidFill>
-            </a:ln>
-          </p:spPr>
-          <p:style>
-            <a:lnRef idx="2">
-              <a:schemeClr val="accent1">
-                <a:shade val="50000"/>
-              </a:schemeClr>
-            </a:lnRef>
-            <a:fillRef idx="1">
-              <a:schemeClr val="accent1"/>
-            </a:fillRef>
-            <a:effectRef idx="0">
-              <a:schemeClr val="accent1"/>
-            </a:effectRef>
-            <a:fontRef idx="minor">
-              <a:schemeClr val="lt1"/>
-            </a:fontRef>
-          </p:style>
-          <p:txBody>
-            <a:bodyPr rtlCol="0" anchor="t" anchorCtr="0"/>
-            <a:lstStyle/>
-            <a:p>
-              <a:r>
-                <a:rPr lang="en-US" sz="1400" b="1" dirty="0" smtClean="0">
-                  <a:solidFill>
-                    <a:schemeClr val="accent5">
-                      <a:lumMod val="75000"/>
-                    </a:schemeClr>
-                  </a:solidFill>
-                </a:rPr>
-                <a:t>common</a:t>
-              </a:r>
-              <a:endParaRPr lang="en-SG" sz="1400" b="1" dirty="0">
-                <a:solidFill>
-                  <a:schemeClr val="accent5">
-                    <a:lumMod val="75000"/>
-                  </a:schemeClr>
-                </a:solidFill>
-              </a:endParaRPr>
-            </a:p>
-          </p:txBody>
-        </p:sp>
-        <p:sp>
-          <p:nvSpPr>
-            <p:cNvPr id="160" name="Rectangle 159"/>
-            <p:cNvSpPr/>
-            <p:nvPr/>
-          </p:nvSpPr>
-          <p:spPr>
-            <a:xfrm>
-              <a:off x="647700" y="1371600"/>
-              <a:ext cx="495300" cy="152400"/>
-            </a:xfrm>
-            <a:prstGeom prst="rect">
-              <a:avLst/>
-            </a:prstGeom>
-            <a:grpFill/>
-            <a:ln>
-              <a:solidFill>
-                <a:schemeClr val="accent5">
-                  <a:lumMod val="60000"/>
-                  <a:lumOff val="40000"/>
-                </a:schemeClr>
-              </a:solidFill>
-            </a:ln>
-          </p:spPr>
-          <p:style>
-            <a:lnRef idx="2">
-              <a:schemeClr val="accent1">
-                <a:shade val="50000"/>
-              </a:schemeClr>
-            </a:lnRef>
-            <a:fillRef idx="1">
-              <a:schemeClr val="accent1"/>
-            </a:fillRef>
-            <a:effectRef idx="0">
-              <a:schemeClr val="accent1"/>
-            </a:effectRef>
-            <a:fontRef idx="minor">
-              <a:schemeClr val="lt1"/>
-            </a:fontRef>
-          </p:style>
-          <p:txBody>
-            <a:bodyPr rtlCol="0" anchor="ctr"/>
-            <a:lstStyle/>
-            <a:p>
-              <a:pPr algn="ctr"/>
-              <a:endParaRPr lang="en-SG" sz="1400" b="1">
-                <a:solidFill>
-                  <a:schemeClr val="accent5">
-                    <a:lumMod val="75000"/>
-                  </a:schemeClr>
-                </a:solidFill>
-              </a:endParaRPr>
-            </a:p>
-          </p:txBody>
-        </p:sp>
-      </p:grpSp>
-      <p:grpSp>
-        <p:nvGrpSpPr>
-          <p:cNvPr id="161" name="Group 160"/>
-          <p:cNvGrpSpPr/>
-          <p:nvPr/>
-        </p:nvGrpSpPr>
-        <p:grpSpPr>
-          <a:xfrm>
-            <a:off x="2743200" y="427037"/>
-            <a:ext cx="5943600" cy="1524000"/>
-            <a:chOff x="-4800600" y="1371600"/>
-            <a:chExt cx="5943600" cy="1208690"/>
-          </a:xfrm>
-          <a:solidFill>
-            <a:schemeClr val="bg1"/>
-          </a:solidFill>
-        </p:grpSpPr>
-        <p:sp>
-          <p:nvSpPr>
-            <p:cNvPr id="162" name="Rectangle 161"/>
-            <p:cNvSpPr/>
-            <p:nvPr/>
-          </p:nvSpPr>
-          <p:spPr>
-            <a:xfrm>
-              <a:off x="-4800600" y="1523999"/>
-              <a:ext cx="5943600" cy="1056291"/>
-            </a:xfrm>
-            <a:prstGeom prst="rect">
-              <a:avLst/>
-            </a:prstGeom>
-            <a:grpFill/>
-            <a:ln>
-              <a:solidFill>
-                <a:schemeClr val="accent5">
-                  <a:lumMod val="60000"/>
-                  <a:lumOff val="40000"/>
-                </a:schemeClr>
-              </a:solidFill>
-            </a:ln>
-          </p:spPr>
-          <p:style>
-            <a:lnRef idx="2">
-              <a:schemeClr val="accent1">
-                <a:shade val="50000"/>
-              </a:schemeClr>
-            </a:lnRef>
-            <a:fillRef idx="1">
-              <a:schemeClr val="accent1"/>
-            </a:fillRef>
-            <a:effectRef idx="0">
-              <a:schemeClr val="accent1"/>
-            </a:effectRef>
-            <a:fontRef idx="minor">
-              <a:schemeClr val="lt1"/>
-            </a:fontRef>
-          </p:style>
-          <p:txBody>
-            <a:bodyPr rtlCol="0" anchor="t" anchorCtr="0"/>
-            <a:lstStyle/>
-            <a:p>
-              <a:r>
-                <a:rPr lang="en-US" sz="1400" b="1" dirty="0" smtClean="0">
-                  <a:solidFill>
-                    <a:schemeClr val="accent5">
-                      <a:lumMod val="75000"/>
-                    </a:schemeClr>
-                  </a:solidFill>
-                </a:rPr>
-                <a:t>common::exception</a:t>
-              </a:r>
-              <a:endParaRPr lang="en-SG" sz="1400" b="1" dirty="0">
-                <a:solidFill>
-                  <a:schemeClr val="accent5">
-                    <a:lumMod val="75000"/>
-                  </a:schemeClr>
-                </a:solidFill>
-              </a:endParaRPr>
-            </a:p>
-          </p:txBody>
-        </p:sp>
-        <p:sp>
-          <p:nvSpPr>
-            <p:cNvPr id="163" name="Rectangle 162"/>
-            <p:cNvSpPr/>
-            <p:nvPr/>
-          </p:nvSpPr>
-          <p:spPr>
-            <a:xfrm>
-              <a:off x="647700" y="1371600"/>
-              <a:ext cx="495300" cy="152400"/>
-            </a:xfrm>
-            <a:prstGeom prst="rect">
-              <a:avLst/>
-            </a:prstGeom>
-            <a:grpFill/>
-            <a:ln>
-              <a:solidFill>
-                <a:schemeClr val="accent5">
-                  <a:lumMod val="60000"/>
-                  <a:lumOff val="40000"/>
-                </a:schemeClr>
-              </a:solidFill>
-            </a:ln>
-          </p:spPr>
-          <p:style>
-            <a:lnRef idx="2">
-              <a:schemeClr val="accent1">
-                <a:shade val="50000"/>
-              </a:schemeClr>
-            </a:lnRef>
-            <a:fillRef idx="1">
-              <a:schemeClr val="accent1"/>
-            </a:fillRef>
-            <a:effectRef idx="0">
-              <a:schemeClr val="accent1"/>
-            </a:effectRef>
-            <a:fontRef idx="minor">
-              <a:schemeClr val="lt1"/>
-            </a:fontRef>
-          </p:style>
-          <p:txBody>
-            <a:bodyPr rtlCol="0" anchor="t" anchorCtr="0"/>
-            <a:lstStyle/>
-            <a:p>
-              <a:endParaRPr lang="en-SG" sz="1400" b="1">
-                <a:solidFill>
-                  <a:schemeClr val="accent5">
-                    <a:lumMod val="75000"/>
-                  </a:schemeClr>
-                </a:solidFill>
-              </a:endParaRPr>
-            </a:p>
-          </p:txBody>
-        </p:sp>
-      </p:grpSp>
-      <p:sp>
-        <p:nvSpPr>
           <p:cNvPr id="164" name="Rectangle 163"/>
           <p:cNvSpPr/>
           <p:nvPr/>
         </p:nvSpPr>
         <p:spPr>
           <a:xfrm>
-            <a:off x="762001" y="960437"/>
+            <a:off x="609600" y="922337"/>
             <a:ext cx="1600200" cy="304800"/>
           </a:xfrm>
           <a:prstGeom prst="rect">
@@ -3589,7 +3707,7 @@
         </p:nvSpPr>
         <p:spPr>
           <a:xfrm>
-            <a:off x="6248400" y="1204277"/>
+            <a:off x="5990616" y="960437"/>
             <a:ext cx="2133600" cy="304800"/>
           </a:xfrm>
           <a:prstGeom prst="rect">
@@ -3633,7 +3751,7 @@
         </p:nvSpPr>
         <p:spPr>
           <a:xfrm>
-            <a:off x="3581400" y="1189037"/>
+            <a:off x="5867400" y="1570037"/>
             <a:ext cx="2133600" cy="304800"/>
           </a:xfrm>
           <a:prstGeom prst="rect">
@@ -3680,8 +3798,8 @@
           <p:nvPr/>
         </p:nvSpPr>
         <p:spPr>
-          <a:xfrm rot="5400000">
-            <a:off x="5995987" y="1228090"/>
+          <a:xfrm>
+            <a:off x="6719582" y="1265237"/>
             <a:ext cx="276225" cy="228600"/>
           </a:xfrm>
           <a:prstGeom prst="triangle">
@@ -3718,14 +3836,14 @@
           <p:cNvPr id="168" name="Elbow Connector 167"/>
           <p:cNvCxnSpPr>
             <a:stCxn id="167" idx="3"/>
-            <a:endCxn id="166" idx="3"/>
+            <a:endCxn id="169" idx="0"/>
           </p:cNvCxnSpPr>
           <p:nvPr/>
         </p:nvCxnSpPr>
         <p:spPr>
-          <a:xfrm rot="10800000">
-            <a:off x="5715000" y="1341437"/>
-            <a:ext cx="304800" cy="954"/>
+          <a:xfrm rot="16200000" flipH="1">
+            <a:off x="6781647" y="1569884"/>
+            <a:ext cx="152400" cy="305"/>
           </a:xfrm>
           <a:prstGeom prst="bentConnector3">
             <a:avLst>
@@ -3762,7 +3880,7 @@
         </p:nvSpPr>
         <p:spPr>
           <a:xfrm>
-            <a:off x="3505200" y="1265237"/>
+            <a:off x="5791200" y="1646237"/>
             <a:ext cx="2133600" cy="304800"/>
           </a:xfrm>
           <a:prstGeom prst="rect">
@@ -3810,7 +3928,7 @@
         </p:nvSpPr>
         <p:spPr>
           <a:xfrm>
-            <a:off x="3429000" y="1341437"/>
+            <a:off x="5715000" y="1722437"/>
             <a:ext cx="2133600" cy="304800"/>
           </a:xfrm>
           <a:prstGeom prst="rect">
@@ -3858,8 +3976,8 @@
         </p:nvSpPr>
         <p:spPr>
           <a:xfrm>
-            <a:off x="609600" y="2739255"/>
-            <a:ext cx="1545525" cy="361770"/>
+            <a:off x="609599" y="3250641"/>
+            <a:ext cx="1219201" cy="361770"/>
           </a:xfrm>
           <a:prstGeom prst="rect">
             <a:avLst/>
@@ -3896,14 +4014,664 @@
       </p:sp>
       <p:sp>
         <p:nvSpPr>
-          <p:cNvPr id="182" name="Rectangle 181"/>
+          <p:cNvPr id="35" name="Rectangle 34"/>
           <p:cNvSpPr/>
           <p:nvPr/>
         </p:nvSpPr>
         <p:spPr>
           <a:xfrm>
-            <a:off x="609601" y="3322817"/>
-            <a:ext cx="1524000" cy="361770"/>
+            <a:off x="609601" y="1343700"/>
+            <a:ext cx="1600200" cy="304800"/>
+          </a:xfrm>
+          <a:prstGeom prst="rect">
+            <a:avLst/>
+          </a:prstGeom>
+        </p:spPr>
+        <p:style>
+          <a:lnRef idx="2">
+            <a:schemeClr val="accent3">
+              <a:shade val="50000"/>
+            </a:schemeClr>
+          </a:lnRef>
+          <a:fillRef idx="1">
+            <a:schemeClr val="accent3"/>
+          </a:fillRef>
+          <a:effectRef idx="0">
+            <a:schemeClr val="accent3"/>
+          </a:effectRef>
+          <a:fontRef idx="minor">
+            <a:schemeClr val="lt1"/>
+          </a:fontRef>
+        </p:style>
+        <p:txBody>
+          <a:bodyPr rtlCol="0" anchor="ctr"/>
+          <a:lstStyle/>
+          <a:p>
+            <a:pPr algn="ctr"/>
+            <a:r>
+              <a:rPr lang="en-US" sz="1600" b="1" dirty="0" err="1" smtClean="0"/>
+              <a:t>BuildProperties</a:t>
+            </a:r>
+            <a:endParaRPr lang="en-SG" sz="1600" b="1" dirty="0"/>
+          </a:p>
+        </p:txBody>
+      </p:sp>
+      <p:sp>
+        <p:nvSpPr>
+          <p:cNvPr id="36" name="Rectangle 35"/>
+          <p:cNvSpPr/>
+          <p:nvPr/>
+        </p:nvSpPr>
+        <p:spPr>
+          <a:xfrm>
+            <a:off x="2438400" y="922337"/>
+            <a:ext cx="1600200" cy="304800"/>
+          </a:xfrm>
+          <a:prstGeom prst="rect">
+            <a:avLst/>
+          </a:prstGeom>
+        </p:spPr>
+        <p:style>
+          <a:lnRef idx="2">
+            <a:schemeClr val="accent3">
+              <a:shade val="50000"/>
+            </a:schemeClr>
+          </a:lnRef>
+          <a:fillRef idx="1">
+            <a:schemeClr val="accent3"/>
+          </a:fillRef>
+          <a:effectRef idx="0">
+            <a:schemeClr val="accent3"/>
+          </a:effectRef>
+          <a:fontRef idx="minor">
+            <a:schemeClr val="lt1"/>
+          </a:fontRef>
+        </p:style>
+        <p:txBody>
+          <a:bodyPr rtlCol="0" anchor="ctr"/>
+          <a:lstStyle/>
+          <a:p>
+            <a:pPr algn="ctr"/>
+            <a:r>
+              <a:rPr lang="en-US" sz="1600" b="1" dirty="0" err="1" smtClean="0"/>
+              <a:t>FieldValidator</a:t>
+            </a:r>
+            <a:endParaRPr lang="en-SG" sz="1600" b="1" dirty="0"/>
+          </a:p>
+        </p:txBody>
+      </p:sp>
+      <p:sp>
+        <p:nvSpPr>
+          <p:cNvPr id="38" name="Rectangle 37"/>
+          <p:cNvSpPr/>
+          <p:nvPr/>
+        </p:nvSpPr>
+        <p:spPr>
+          <a:xfrm>
+            <a:off x="5277256" y="2553649"/>
+            <a:ext cx="1585823" cy="361770"/>
+          </a:xfrm>
+          <a:prstGeom prst="rect">
+            <a:avLst/>
+          </a:prstGeom>
+        </p:spPr>
+        <p:style>
+          <a:lnRef idx="2">
+            <a:schemeClr val="accent6">
+              <a:shade val="50000"/>
+            </a:schemeClr>
+          </a:lnRef>
+          <a:fillRef idx="1">
+            <a:schemeClr val="accent6"/>
+          </a:fillRef>
+          <a:effectRef idx="0">
+            <a:schemeClr val="accent6"/>
+          </a:effectRef>
+          <a:fontRef idx="minor">
+            <a:schemeClr val="lt1"/>
+          </a:fontRef>
+        </p:style>
+        <p:txBody>
+          <a:bodyPr rtlCol="0" anchor="ctr"/>
+          <a:lstStyle/>
+          <a:p>
+            <a:pPr algn="ctr"/>
+            <a:r>
+              <a:rPr lang="en-US" sz="1600" b="1" dirty="0" err="1" smtClean="0"/>
+              <a:t>EntityAttributes</a:t>
+            </a:r>
+            <a:endParaRPr lang="en-SG" sz="1600" b="1" dirty="0"/>
+          </a:p>
+        </p:txBody>
+      </p:sp>
+      <p:sp>
+        <p:nvSpPr>
+          <p:cNvPr id="37" name="Isosceles Triangle 36"/>
+          <p:cNvSpPr/>
+          <p:nvPr/>
+        </p:nvSpPr>
+        <p:spPr>
+          <a:xfrm>
+            <a:off x="5932054" y="2941637"/>
+            <a:ext cx="276225" cy="228600"/>
+          </a:xfrm>
+          <a:prstGeom prst="triangle">
+            <a:avLst/>
+          </a:prstGeom>
+        </p:spPr>
+        <p:style>
+          <a:lnRef idx="2">
+            <a:schemeClr val="accent6">
+              <a:shade val="50000"/>
+            </a:schemeClr>
+          </a:lnRef>
+          <a:fillRef idx="1">
+            <a:schemeClr val="accent6"/>
+          </a:fillRef>
+          <a:effectRef idx="0">
+            <a:schemeClr val="accent6"/>
+          </a:effectRef>
+          <a:fontRef idx="minor">
+            <a:schemeClr val="lt1"/>
+          </a:fontRef>
+        </p:style>
+        <p:txBody>
+          <a:bodyPr rtlCol="0" anchor="ctr"/>
+          <a:lstStyle/>
+          <a:p>
+            <a:pPr algn="ctr"/>
+            <a:endParaRPr lang="en-SG"/>
+          </a:p>
+        </p:txBody>
+      </p:sp>
+      <p:sp>
+        <p:nvSpPr>
+          <p:cNvPr id="172" name="Rectangle 171"/>
+          <p:cNvSpPr>
+            <a:spLocks/>
+          </p:cNvSpPr>
+          <p:nvPr/>
+        </p:nvSpPr>
+        <p:spPr>
+          <a:xfrm>
+            <a:off x="3810000" y="4150546"/>
+            <a:ext cx="1944758" cy="361770"/>
+          </a:xfrm>
+          <a:prstGeom prst="rect">
+            <a:avLst/>
+          </a:prstGeom>
+          <a:effectLst/>
+        </p:spPr>
+        <p:style>
+          <a:lnRef idx="2">
+            <a:schemeClr val="accent6">
+              <a:shade val="50000"/>
+            </a:schemeClr>
+          </a:lnRef>
+          <a:fillRef idx="1">
+            <a:schemeClr val="accent6"/>
+          </a:fillRef>
+          <a:effectRef idx="0">
+            <a:schemeClr val="accent6"/>
+          </a:effectRef>
+          <a:fontRef idx="minor">
+            <a:schemeClr val="lt1"/>
+          </a:fontRef>
+        </p:style>
+        <p:txBody>
+          <a:bodyPr rtlCol="0" anchor="ctr"/>
+          <a:lstStyle/>
+          <a:p>
+            <a:pPr algn="r"/>
+            <a:r>
+              <a:rPr lang="en-US" sz="1600" b="1" dirty="0" err="1" smtClean="0"/>
+              <a:t>StudentAttributes</a:t>
+            </a:r>
+            <a:endParaRPr lang="en-SG" sz="1600" b="1" dirty="0"/>
+          </a:p>
+        </p:txBody>
+      </p:sp>
+      <p:sp>
+        <p:nvSpPr>
+          <p:cNvPr id="179" name="Rectangle 178"/>
+          <p:cNvSpPr/>
+          <p:nvPr/>
+        </p:nvSpPr>
+        <p:spPr>
+          <a:xfrm>
+            <a:off x="6381858" y="3249302"/>
+            <a:ext cx="2130157" cy="361770"/>
+          </a:xfrm>
+          <a:prstGeom prst="rect">
+            <a:avLst/>
+          </a:prstGeom>
+          <a:effectLst/>
+        </p:spPr>
+        <p:style>
+          <a:lnRef idx="2">
+            <a:schemeClr val="accent6">
+              <a:shade val="50000"/>
+            </a:schemeClr>
+          </a:lnRef>
+          <a:fillRef idx="1">
+            <a:schemeClr val="accent6"/>
+          </a:fillRef>
+          <a:effectRef idx="0">
+            <a:schemeClr val="accent6"/>
+          </a:effectRef>
+          <a:fontRef idx="minor">
+            <a:schemeClr val="lt1"/>
+          </a:fontRef>
+        </p:style>
+        <p:txBody>
+          <a:bodyPr rtlCol="0" anchor="ctr"/>
+          <a:lstStyle/>
+          <a:p>
+            <a:r>
+              <a:rPr lang="en-US" sz="1600" b="1" dirty="0" err="1" smtClean="0"/>
+              <a:t>CourseAttributes</a:t>
+            </a:r>
+            <a:endParaRPr lang="en-SG" sz="1600" b="1" dirty="0"/>
+          </a:p>
+        </p:txBody>
+      </p:sp>
+      <p:sp>
+        <p:nvSpPr>
+          <p:cNvPr id="173" name="Rectangle 172"/>
+          <p:cNvSpPr/>
+          <p:nvPr/>
+        </p:nvSpPr>
+        <p:spPr>
+          <a:xfrm>
+            <a:off x="3810000" y="3700011"/>
+            <a:ext cx="1944758" cy="361770"/>
+          </a:xfrm>
+          <a:prstGeom prst="rect">
+            <a:avLst/>
+          </a:prstGeom>
+        </p:spPr>
+        <p:style>
+          <a:lnRef idx="2">
+            <a:schemeClr val="accent6">
+              <a:shade val="50000"/>
+            </a:schemeClr>
+          </a:lnRef>
+          <a:fillRef idx="1">
+            <a:schemeClr val="accent6"/>
+          </a:fillRef>
+          <a:effectRef idx="0">
+            <a:schemeClr val="accent6"/>
+          </a:effectRef>
+          <a:fontRef idx="minor">
+            <a:schemeClr val="lt1"/>
+          </a:fontRef>
+        </p:style>
+        <p:txBody>
+          <a:bodyPr rtlCol="0" anchor="ctr"/>
+          <a:lstStyle/>
+          <a:p>
+            <a:pPr algn="r"/>
+            <a:r>
+              <a:rPr lang="en-US" sz="1600" b="1" dirty="0" err="1" smtClean="0"/>
+              <a:t>InstructorAttributes</a:t>
+            </a:r>
+            <a:endParaRPr lang="en-SG" sz="1600" b="1" dirty="0"/>
+          </a:p>
+        </p:txBody>
+      </p:sp>
+      <p:sp>
+        <p:nvSpPr>
+          <p:cNvPr id="174" name="Rectangle 173"/>
+          <p:cNvSpPr/>
+          <p:nvPr/>
+        </p:nvSpPr>
+        <p:spPr>
+          <a:xfrm>
+            <a:off x="6378780" y="3700663"/>
+            <a:ext cx="2136314" cy="361770"/>
+          </a:xfrm>
+          <a:prstGeom prst="rect">
+            <a:avLst/>
+          </a:prstGeom>
+        </p:spPr>
+        <p:style>
+          <a:lnRef idx="2">
+            <a:schemeClr val="accent6">
+              <a:shade val="50000"/>
+            </a:schemeClr>
+          </a:lnRef>
+          <a:fillRef idx="1">
+            <a:schemeClr val="accent6"/>
+          </a:fillRef>
+          <a:effectRef idx="0">
+            <a:schemeClr val="accent6"/>
+          </a:effectRef>
+          <a:fontRef idx="minor">
+            <a:schemeClr val="lt1"/>
+          </a:fontRef>
+        </p:style>
+        <p:txBody>
+          <a:bodyPr rtlCol="0" anchor="ctr"/>
+          <a:lstStyle/>
+          <a:p>
+            <a:r>
+              <a:rPr lang="en-US" sz="1600" b="1" dirty="0" err="1" smtClean="0"/>
+              <a:t>EvaluationAttributes</a:t>
+            </a:r>
+            <a:endParaRPr lang="en-SG" sz="1600" b="1" dirty="0"/>
+          </a:p>
+        </p:txBody>
+      </p:sp>
+      <p:sp>
+        <p:nvSpPr>
+          <p:cNvPr id="175" name="Rectangle 174"/>
+          <p:cNvSpPr/>
+          <p:nvPr/>
+        </p:nvSpPr>
+        <p:spPr>
+          <a:xfrm>
+            <a:off x="6378780" y="4150546"/>
+            <a:ext cx="2130157" cy="361770"/>
+          </a:xfrm>
+          <a:prstGeom prst="rect">
+            <a:avLst/>
+          </a:prstGeom>
+        </p:spPr>
+        <p:style>
+          <a:lnRef idx="2">
+            <a:schemeClr val="accent6">
+              <a:shade val="50000"/>
+            </a:schemeClr>
+          </a:lnRef>
+          <a:fillRef idx="1">
+            <a:schemeClr val="accent6"/>
+          </a:fillRef>
+          <a:effectRef idx="0">
+            <a:schemeClr val="accent6"/>
+          </a:effectRef>
+          <a:fontRef idx="minor">
+            <a:schemeClr val="lt1"/>
+          </a:fontRef>
+        </p:style>
+        <p:txBody>
+          <a:bodyPr rtlCol="0" anchor="ctr"/>
+          <a:lstStyle/>
+          <a:p>
+            <a:r>
+              <a:rPr lang="en-US" sz="1600" b="1" dirty="0" err="1" smtClean="0"/>
+              <a:t>SubmissionAttributes</a:t>
+            </a:r>
+            <a:endParaRPr lang="en-SG" sz="1600" b="1" dirty="0"/>
+          </a:p>
+        </p:txBody>
+      </p:sp>
+      <p:sp>
+        <p:nvSpPr>
+          <p:cNvPr id="48" name="Rectangle 47"/>
+          <p:cNvSpPr>
+            <a:spLocks/>
+          </p:cNvSpPr>
+          <p:nvPr/>
+        </p:nvSpPr>
+        <p:spPr>
+          <a:xfrm>
+            <a:off x="3810000" y="3246437"/>
+            <a:ext cx="1944758" cy="361770"/>
+          </a:xfrm>
+          <a:prstGeom prst="rect">
+            <a:avLst/>
+          </a:prstGeom>
+          <a:effectLst/>
+        </p:spPr>
+        <p:style>
+          <a:lnRef idx="2">
+            <a:schemeClr val="accent6">
+              <a:shade val="50000"/>
+            </a:schemeClr>
+          </a:lnRef>
+          <a:fillRef idx="1">
+            <a:schemeClr val="accent6"/>
+          </a:fillRef>
+          <a:effectRef idx="0">
+            <a:schemeClr val="accent6"/>
+          </a:effectRef>
+          <a:fontRef idx="minor">
+            <a:schemeClr val="lt1"/>
+          </a:fontRef>
+        </p:style>
+        <p:txBody>
+          <a:bodyPr rtlCol="0" anchor="ctr"/>
+          <a:lstStyle/>
+          <a:p>
+            <a:pPr algn="r"/>
+            <a:r>
+              <a:rPr lang="en-US" sz="1600" b="1" dirty="0" err="1" smtClean="0"/>
+              <a:t>AccountAttributes</a:t>
+            </a:r>
+            <a:endParaRPr lang="en-SG" sz="1600" b="1" dirty="0"/>
+          </a:p>
+        </p:txBody>
+      </p:sp>
+      <p:cxnSp>
+        <p:nvCxnSpPr>
+          <p:cNvPr id="12" name="Elbow Connector 11"/>
+          <p:cNvCxnSpPr>
+            <a:stCxn id="37" idx="3"/>
+            <a:endCxn id="48" idx="3"/>
+          </p:cNvCxnSpPr>
+          <p:nvPr/>
+        </p:nvCxnSpPr>
+        <p:spPr>
+          <a:xfrm rot="5400000">
+            <a:off x="5783921" y="3141075"/>
+            <a:ext cx="257085" cy="315409"/>
+          </a:xfrm>
+          <a:prstGeom prst="bentConnector2">
+            <a:avLst/>
+          </a:prstGeom>
+        </p:spPr>
+        <p:style>
+          <a:lnRef idx="2">
+            <a:schemeClr val="accent6">
+              <a:shade val="50000"/>
+            </a:schemeClr>
+          </a:lnRef>
+          <a:fillRef idx="1">
+            <a:schemeClr val="accent6"/>
+          </a:fillRef>
+          <a:effectRef idx="0">
+            <a:schemeClr val="accent6"/>
+          </a:effectRef>
+          <a:fontRef idx="minor">
+            <a:schemeClr val="lt1"/>
+          </a:fontRef>
+        </p:style>
+      </p:cxnSp>
+      <p:cxnSp>
+        <p:nvCxnSpPr>
+          <p:cNvPr id="51" name="Elbow Connector 50"/>
+          <p:cNvCxnSpPr>
+            <a:stCxn id="37" idx="3"/>
+            <a:endCxn id="173" idx="3"/>
+          </p:cNvCxnSpPr>
+          <p:nvPr/>
+        </p:nvCxnSpPr>
+        <p:spPr>
+          <a:xfrm rot="5400000">
+            <a:off x="5557134" y="3367862"/>
+            <a:ext cx="710659" cy="315409"/>
+          </a:xfrm>
+          <a:prstGeom prst="bentConnector2">
+            <a:avLst/>
+          </a:prstGeom>
+        </p:spPr>
+        <p:style>
+          <a:lnRef idx="2">
+            <a:schemeClr val="accent6">
+              <a:shade val="50000"/>
+            </a:schemeClr>
+          </a:lnRef>
+          <a:fillRef idx="1">
+            <a:schemeClr val="accent6"/>
+          </a:fillRef>
+          <a:effectRef idx="0">
+            <a:schemeClr val="accent6"/>
+          </a:effectRef>
+          <a:fontRef idx="minor">
+            <a:schemeClr val="lt1"/>
+          </a:fontRef>
+        </p:style>
+      </p:cxnSp>
+      <p:cxnSp>
+        <p:nvCxnSpPr>
+          <p:cNvPr id="55" name="Elbow Connector 54"/>
+          <p:cNvCxnSpPr>
+            <a:stCxn id="37" idx="3"/>
+            <a:endCxn id="172" idx="3"/>
+          </p:cNvCxnSpPr>
+          <p:nvPr/>
+        </p:nvCxnSpPr>
+        <p:spPr>
+          <a:xfrm rot="5400000">
+            <a:off x="5331866" y="3593130"/>
+            <a:ext cx="1161194" cy="315409"/>
+          </a:xfrm>
+          <a:prstGeom prst="bentConnector2">
+            <a:avLst/>
+          </a:prstGeom>
+        </p:spPr>
+        <p:style>
+          <a:lnRef idx="2">
+            <a:schemeClr val="accent6">
+              <a:shade val="50000"/>
+            </a:schemeClr>
+          </a:lnRef>
+          <a:fillRef idx="1">
+            <a:schemeClr val="accent6"/>
+          </a:fillRef>
+          <a:effectRef idx="0">
+            <a:schemeClr val="accent6"/>
+          </a:effectRef>
+          <a:fontRef idx="minor">
+            <a:schemeClr val="lt1"/>
+          </a:fontRef>
+        </p:style>
+      </p:cxnSp>
+      <p:cxnSp>
+        <p:nvCxnSpPr>
+          <p:cNvPr id="58" name="Elbow Connector 57"/>
+          <p:cNvCxnSpPr>
+            <a:stCxn id="37" idx="3"/>
+            <a:endCxn id="179" idx="1"/>
+          </p:cNvCxnSpPr>
+          <p:nvPr/>
+        </p:nvCxnSpPr>
+        <p:spPr>
+          <a:xfrm rot="16200000" flipH="1">
+            <a:off x="6096037" y="3144366"/>
+            <a:ext cx="259950" cy="311691"/>
+          </a:xfrm>
+          <a:prstGeom prst="bentConnector2">
+            <a:avLst/>
+          </a:prstGeom>
+        </p:spPr>
+        <p:style>
+          <a:lnRef idx="2">
+            <a:schemeClr val="accent6">
+              <a:shade val="50000"/>
+            </a:schemeClr>
+          </a:lnRef>
+          <a:fillRef idx="1">
+            <a:schemeClr val="accent6"/>
+          </a:fillRef>
+          <a:effectRef idx="0">
+            <a:schemeClr val="accent6"/>
+          </a:effectRef>
+          <a:fontRef idx="minor">
+            <a:schemeClr val="lt1"/>
+          </a:fontRef>
+        </p:style>
+      </p:cxnSp>
+      <p:cxnSp>
+        <p:nvCxnSpPr>
+          <p:cNvPr id="61" name="Elbow Connector 60"/>
+          <p:cNvCxnSpPr>
+            <a:stCxn id="37" idx="3"/>
+            <a:endCxn id="174" idx="1"/>
+          </p:cNvCxnSpPr>
+          <p:nvPr/>
+        </p:nvCxnSpPr>
+        <p:spPr>
+          <a:xfrm rot="16200000" flipH="1">
+            <a:off x="5868818" y="3371585"/>
+            <a:ext cx="711311" cy="308613"/>
+          </a:xfrm>
+          <a:prstGeom prst="bentConnector2">
+            <a:avLst/>
+          </a:prstGeom>
+        </p:spPr>
+        <p:style>
+          <a:lnRef idx="2">
+            <a:schemeClr val="accent6">
+              <a:shade val="50000"/>
+            </a:schemeClr>
+          </a:lnRef>
+          <a:fillRef idx="1">
+            <a:schemeClr val="accent6"/>
+          </a:fillRef>
+          <a:effectRef idx="0">
+            <a:schemeClr val="accent6"/>
+          </a:effectRef>
+          <a:fontRef idx="minor">
+            <a:schemeClr val="lt1"/>
+          </a:fontRef>
+        </p:style>
+      </p:cxnSp>
+      <p:cxnSp>
+        <p:nvCxnSpPr>
+          <p:cNvPr id="65" name="Elbow Connector 64"/>
+          <p:cNvCxnSpPr>
+            <a:stCxn id="37" idx="3"/>
+            <a:endCxn id="175" idx="1"/>
+          </p:cNvCxnSpPr>
+          <p:nvPr/>
+        </p:nvCxnSpPr>
+        <p:spPr>
+          <a:xfrm rot="16200000" flipH="1">
+            <a:off x="5643876" y="3596527"/>
+            <a:ext cx="1161194" cy="308613"/>
+          </a:xfrm>
+          <a:prstGeom prst="bentConnector2">
+            <a:avLst/>
+          </a:prstGeom>
+        </p:spPr>
+        <p:style>
+          <a:lnRef idx="2">
+            <a:schemeClr val="accent6">
+              <a:shade val="50000"/>
+            </a:schemeClr>
+          </a:lnRef>
+          <a:fillRef idx="1">
+            <a:schemeClr val="accent6"/>
+          </a:fillRef>
+          <a:effectRef idx="0">
+            <a:schemeClr val="accent6"/>
+          </a:effectRef>
+          <a:fontRef idx="minor">
+            <a:schemeClr val="lt1"/>
+          </a:fontRef>
+        </p:style>
+      </p:cxnSp>
+      <p:sp>
+        <p:nvSpPr>
+          <p:cNvPr id="70" name="Rectangle 69"/>
+          <p:cNvSpPr/>
+          <p:nvPr/>
+        </p:nvSpPr>
+        <p:spPr>
+          <a:xfrm>
+            <a:off x="595006" y="3958960"/>
+            <a:ext cx="1219200" cy="361770"/>
           </a:xfrm>
           <a:prstGeom prst="rect">
             <a:avLst/>
@@ -3931,8 +4699,8 @@
           <a:p>
             <a:pPr algn="ctr"/>
             <a:r>
-              <a:rPr lang="en-US" sz="1600" b="1" dirty="0" err="1" smtClean="0"/>
-              <a:t>TeamData</a:t>
+              <a:rPr lang="en-US" sz="1600" b="1" dirty="0" smtClean="0"/>
+              <a:t>*Bundle</a:t>
             </a:r>
             <a:endParaRPr lang="en-SG" sz="1600" b="1" dirty="0"/>
           </a:p>
@@ -3940,14 +4708,14 @@
       </p:sp>
       <p:sp>
         <p:nvSpPr>
-          <p:cNvPr id="183" name="Rectangle 182"/>
+          <p:cNvPr id="72" name="Rectangle 71"/>
           <p:cNvSpPr/>
           <p:nvPr/>
         </p:nvSpPr>
         <p:spPr>
           <a:xfrm>
-            <a:off x="609601" y="3751442"/>
-            <a:ext cx="1524000" cy="361770"/>
+            <a:off x="643647" y="4007556"/>
+            <a:ext cx="1219200" cy="361770"/>
           </a:xfrm>
           <a:prstGeom prst="rect">
             <a:avLst/>
@@ -3975,8 +4743,8 @@
           <a:p>
             <a:pPr algn="ctr"/>
             <a:r>
-              <a:rPr lang="en-US" sz="1600" b="1" dirty="0" err="1" smtClean="0"/>
-              <a:t>EvalResultData</a:t>
+              <a:rPr lang="en-US" sz="1600" b="1" dirty="0" smtClean="0"/>
+              <a:t>*Bundle</a:t>
             </a:r>
             <a:endParaRPr lang="en-SG" sz="1600" b="1" dirty="0"/>
           </a:p>
@@ -3984,14 +4752,14 @@
       </p:sp>
       <p:sp>
         <p:nvSpPr>
-          <p:cNvPr id="184" name="Rectangle 183"/>
+          <p:cNvPr id="73" name="Rectangle 72"/>
           <p:cNvSpPr/>
           <p:nvPr/>
         </p:nvSpPr>
         <p:spPr>
           <a:xfrm>
-            <a:off x="609601" y="4180067"/>
-            <a:ext cx="1524000" cy="361770"/>
+            <a:off x="697150" y="4056152"/>
+            <a:ext cx="1219200" cy="361770"/>
           </a:xfrm>
           <a:prstGeom prst="rect">
             <a:avLst/>
@@ -4019,8 +4787,8 @@
           <a:p>
             <a:pPr algn="ctr"/>
             <a:r>
-              <a:rPr lang="en-US" sz="1600" b="1" dirty="0" err="1" smtClean="0"/>
-              <a:t>DataBundle</a:t>
+              <a:rPr lang="en-US" sz="1600" b="1" dirty="0" smtClean="0"/>
+              <a:t>*Bundle</a:t>
             </a:r>
             <a:endParaRPr lang="en-SG" sz="1600" b="1" dirty="0"/>
           </a:p>
@@ -4028,14 +4796,14 @@
       </p:sp>
       <p:sp>
         <p:nvSpPr>
-          <p:cNvPr id="35" name="Rectangle 34"/>
+          <p:cNvPr id="74" name="Rectangle 73"/>
           <p:cNvSpPr/>
           <p:nvPr/>
         </p:nvSpPr>
         <p:spPr>
           <a:xfrm>
-            <a:off x="762000" y="1341437"/>
-            <a:ext cx="1600200" cy="304800"/>
+            <a:off x="2174133" y="3246437"/>
+            <a:ext cx="1219200" cy="361770"/>
           </a:xfrm>
           <a:prstGeom prst="rect">
             <a:avLst/>
@@ -4043,15 +4811,15 @@
         </p:spPr>
         <p:style>
           <a:lnRef idx="2">
-            <a:schemeClr val="accent3">
+            <a:schemeClr val="accent5">
               <a:shade val="50000"/>
             </a:schemeClr>
           </a:lnRef>
           <a:fillRef idx="1">
-            <a:schemeClr val="accent3"/>
+            <a:schemeClr val="accent5"/>
           </a:fillRef>
           <a:effectRef idx="0">
-            <a:schemeClr val="accent3"/>
+            <a:schemeClr val="accent5"/>
           </a:effectRef>
           <a:fontRef idx="minor">
             <a:schemeClr val="lt1"/>
@@ -4063,8 +4831,8 @@
           <a:p>
             <a:pPr algn="ctr"/>
             <a:r>
-              <a:rPr lang="en-US" sz="1600" b="1" dirty="0" err="1" smtClean="0"/>
-              <a:t>BuildProperties</a:t>
+              <a:rPr lang="en-US" sz="1600" b="1" dirty="0" smtClean="0"/>
+              <a:t>*Bundle</a:t>
             </a:r>
             <a:endParaRPr lang="en-SG" sz="1600" b="1" dirty="0"/>
           </a:p>
@@ -4072,14 +4840,14 @@
       </p:sp>
       <p:sp>
         <p:nvSpPr>
-          <p:cNvPr id="36" name="Rectangle 35"/>
+          <p:cNvPr id="75" name="Rectangle 74"/>
           <p:cNvSpPr/>
           <p:nvPr/>
         </p:nvSpPr>
         <p:spPr>
           <a:xfrm>
-            <a:off x="762000" y="1722437"/>
-            <a:ext cx="1600200" cy="304800"/>
+            <a:off x="2222774" y="3295033"/>
+            <a:ext cx="1219200" cy="361770"/>
           </a:xfrm>
           <a:prstGeom prst="rect">
             <a:avLst/>
@@ -4087,15 +4855,15 @@
         </p:spPr>
         <p:style>
           <a:lnRef idx="2">
-            <a:schemeClr val="accent3">
+            <a:schemeClr val="accent5">
               <a:shade val="50000"/>
             </a:schemeClr>
           </a:lnRef>
           <a:fillRef idx="1">
-            <a:schemeClr val="accent3"/>
+            <a:schemeClr val="accent5"/>
           </a:fillRef>
           <a:effectRef idx="0">
-            <a:schemeClr val="accent3"/>
+            <a:schemeClr val="accent5"/>
           </a:effectRef>
           <a:fontRef idx="minor">
             <a:schemeClr val="lt1"/>
@@ -4108,7 +4876,7 @@
             <a:pPr algn="ctr"/>
             <a:r>
               <a:rPr lang="en-US" sz="1600" b="1" dirty="0" smtClean="0"/>
-              <a:t>Assumption</a:t>
+              <a:t>*Bundle</a:t>
             </a:r>
             <a:endParaRPr lang="en-SG" sz="1600" b="1" dirty="0"/>
           </a:p>
@@ -4116,14 +4884,14 @@
       </p:sp>
       <p:sp>
         <p:nvSpPr>
-          <p:cNvPr id="38" name="Rectangle 37"/>
+          <p:cNvPr id="76" name="Rectangle 75"/>
           <p:cNvSpPr/>
           <p:nvPr/>
         </p:nvSpPr>
         <p:spPr>
           <a:xfrm>
-            <a:off x="4114800" y="2560637"/>
-            <a:ext cx="1585823" cy="361770"/>
+            <a:off x="2276277" y="3343629"/>
+            <a:ext cx="1219200" cy="361770"/>
           </a:xfrm>
           <a:prstGeom prst="rect">
             <a:avLst/>
@@ -4131,15 +4899,15 @@
         </p:spPr>
         <p:style>
           <a:lnRef idx="2">
-            <a:schemeClr val="accent6">
+            <a:schemeClr val="accent5">
               <a:shade val="50000"/>
             </a:schemeClr>
           </a:lnRef>
           <a:fillRef idx="1">
-            <a:schemeClr val="accent6"/>
+            <a:schemeClr val="accent5"/>
           </a:fillRef>
           <a:effectRef idx="0">
-            <a:schemeClr val="accent6"/>
+            <a:schemeClr val="accent5"/>
           </a:effectRef>
           <a:fontRef idx="minor">
             <a:schemeClr val="lt1"/>
@@ -4151,203 +4919,39 @@
           <a:p>
             <a:pPr algn="ctr"/>
             <a:r>
-              <a:rPr lang="en-US" sz="1600" b="1" dirty="0" err="1" smtClean="0"/>
-              <a:t>BaseData</a:t>
+              <a:rPr lang="en-US" sz="1600" b="1" dirty="0" smtClean="0"/>
+              <a:t>*Stats</a:t>
             </a:r>
             <a:endParaRPr lang="en-SG" sz="1600" b="1" dirty="0"/>
           </a:p>
         </p:txBody>
       </p:sp>
-      <p:cxnSp>
-        <p:nvCxnSpPr>
-          <p:cNvPr id="39" name="Elbow Connector 38"/>
-          <p:cNvCxnSpPr/>
+      <p:sp>
+        <p:nvSpPr>
+          <p:cNvPr id="77" name="Rectangle 76"/>
+          <p:cNvSpPr/>
           <p:nvPr/>
-        </p:nvCxnSpPr>
-        <p:spPr>
-          <a:xfrm>
-            <a:off x="2819401" y="3475036"/>
-            <a:ext cx="4190999" cy="1"/>
-          </a:xfrm>
-          <a:prstGeom prst="bentConnector3">
-            <a:avLst>
-              <a:gd name="adj1" fmla="val 50000"/>
-            </a:avLst>
-          </a:prstGeom>
-          <a:ln>
-            <a:headEnd type="none" w="med" len="med"/>
-            <a:tailEnd type="none" w="med" len="med"/>
-          </a:ln>
-          <a:effectLst/>
+        </p:nvSpPr>
+        <p:spPr>
+          <a:xfrm>
+            <a:off x="2174133" y="4007556"/>
+            <a:ext cx="1219200" cy="361770"/>
+          </a:xfrm>
+          <a:prstGeom prst="rect">
+            <a:avLst/>
+          </a:prstGeom>
         </p:spPr>
         <p:style>
           <a:lnRef idx="2">
-            <a:schemeClr val="accent6"/>
-          </a:lnRef>
-          <a:fillRef idx="0">
-            <a:schemeClr val="accent6"/>
-          </a:fillRef>
-          <a:effectRef idx="1">
-            <a:schemeClr val="accent6"/>
-          </a:effectRef>
-          <a:fontRef idx="minor">
-            <a:schemeClr val="tx1"/>
-          </a:fontRef>
-        </p:style>
-      </p:cxnSp>
-      <p:cxnSp>
-        <p:nvCxnSpPr>
-          <p:cNvPr id="69" name="Elbow Connector 68"/>
-          <p:cNvCxnSpPr>
-            <a:stCxn id="174" idx="0"/>
-            <a:endCxn id="37" idx="3"/>
-          </p:cNvCxnSpPr>
-          <p:nvPr/>
-        </p:nvCxnSpPr>
-        <p:spPr>
-          <a:xfrm flipH="1" flipV="1">
-            <a:off x="4891088" y="3194050"/>
-            <a:ext cx="18916" cy="966787"/>
-          </a:xfrm>
-          <a:prstGeom prst="straightConnector1">
-            <a:avLst/>
-          </a:prstGeom>
-          <a:effectLst/>
-        </p:spPr>
-        <p:style>
-          <a:lnRef idx="2">
-            <a:schemeClr val="accent6"/>
-          </a:lnRef>
-          <a:fillRef idx="0">
-            <a:schemeClr val="accent6"/>
-          </a:fillRef>
-          <a:effectRef idx="1">
-            <a:schemeClr val="accent6"/>
-          </a:effectRef>
-          <a:fontRef idx="minor">
-            <a:schemeClr val="tx1"/>
-          </a:fontRef>
-        </p:style>
-      </p:cxnSp>
-      <p:cxnSp>
-        <p:nvCxnSpPr>
-          <p:cNvPr id="99" name="Elbow Connector 68"/>
-          <p:cNvCxnSpPr/>
-          <p:nvPr/>
-        </p:nvCxnSpPr>
-        <p:spPr>
-          <a:xfrm flipV="1">
-            <a:off x="5715000" y="3475037"/>
-            <a:ext cx="0" cy="278606"/>
-          </a:xfrm>
-          <a:prstGeom prst="straightConnector1">
-            <a:avLst/>
-          </a:prstGeom>
-          <a:effectLst/>
-        </p:spPr>
-        <p:style>
-          <a:lnRef idx="2">
-            <a:schemeClr val="accent6"/>
-          </a:lnRef>
-          <a:fillRef idx="0">
-            <a:schemeClr val="accent6"/>
-          </a:fillRef>
-          <a:effectRef idx="1">
-            <a:schemeClr val="accent6"/>
-          </a:effectRef>
-          <a:fontRef idx="minor">
-            <a:schemeClr val="tx1"/>
-          </a:fontRef>
-        </p:style>
-      </p:cxnSp>
-      <p:cxnSp>
-        <p:nvCxnSpPr>
-          <p:cNvPr id="102" name="Elbow Connector 68"/>
-          <p:cNvCxnSpPr/>
-          <p:nvPr/>
-        </p:nvCxnSpPr>
-        <p:spPr>
-          <a:xfrm flipV="1">
-            <a:off x="6477000" y="3475037"/>
-            <a:ext cx="0" cy="685800"/>
-          </a:xfrm>
-          <a:prstGeom prst="straightConnector1">
-            <a:avLst/>
-          </a:prstGeom>
-          <a:effectLst/>
-        </p:spPr>
-        <p:style>
-          <a:lnRef idx="2">
-            <a:schemeClr val="accent6"/>
-          </a:lnRef>
-          <a:fillRef idx="0">
-            <a:schemeClr val="accent6"/>
-          </a:fillRef>
-          <a:effectRef idx="1">
-            <a:schemeClr val="accent6"/>
-          </a:effectRef>
-          <a:fontRef idx="minor">
-            <a:schemeClr val="tx1"/>
-          </a:fontRef>
-        </p:style>
-      </p:cxnSp>
-      <p:cxnSp>
-        <p:nvCxnSpPr>
-          <p:cNvPr id="105" name="Elbow Connector 68"/>
-          <p:cNvCxnSpPr/>
-          <p:nvPr/>
-        </p:nvCxnSpPr>
-        <p:spPr>
-          <a:xfrm flipV="1">
-            <a:off x="2819400" y="3475037"/>
-            <a:ext cx="0" cy="685800"/>
-          </a:xfrm>
-          <a:prstGeom prst="straightConnector1">
-            <a:avLst/>
-          </a:prstGeom>
-          <a:effectLst/>
-        </p:spPr>
-        <p:style>
-          <a:lnRef idx="2">
-            <a:schemeClr val="accent6"/>
-          </a:lnRef>
-          <a:fillRef idx="0">
-            <a:schemeClr val="accent6"/>
-          </a:fillRef>
-          <a:effectRef idx="1">
-            <a:schemeClr val="accent6"/>
-          </a:effectRef>
-          <a:fontRef idx="minor">
-            <a:schemeClr val="tx1"/>
-          </a:fontRef>
-        </p:style>
-      </p:cxnSp>
-      <p:sp>
-        <p:nvSpPr>
-          <p:cNvPr id="37" name="Isosceles Triangle 36"/>
-          <p:cNvSpPr/>
-          <p:nvPr/>
-        </p:nvSpPr>
-        <p:spPr>
-          <a:xfrm>
-            <a:off x="4752975" y="2965450"/>
-            <a:ext cx="276225" cy="228600"/>
-          </a:xfrm>
-          <a:prstGeom prst="triangle">
-            <a:avLst/>
-          </a:prstGeom>
-        </p:spPr>
-        <p:style>
-          <a:lnRef idx="2">
-            <a:schemeClr val="accent6">
+            <a:schemeClr val="accent5">
               <a:shade val="50000"/>
             </a:schemeClr>
           </a:lnRef>
           <a:fillRef idx="1">
-            <a:schemeClr val="accent6"/>
+            <a:schemeClr val="accent5"/>
           </a:fillRef>
           <a:effectRef idx="0">
-            <a:schemeClr val="accent6"/>
+            <a:schemeClr val="accent5"/>
           </a:effectRef>
           <a:fontRef idx="minor">
             <a:schemeClr val="lt1"/>
@@ -4358,39 +4962,40 @@
           <a:lstStyle/>
           <a:p>
             <a:pPr algn="ctr"/>
-            <a:endParaRPr lang="en-SG"/>
-          </a:p>
-        </p:txBody>
-      </p:sp>
-      <p:sp>
-        <p:nvSpPr>
-          <p:cNvPr id="172" name="Rectangle 171"/>
-          <p:cNvSpPr>
-            <a:spLocks/>
-          </p:cNvSpPr>
+            <a:r>
+              <a:rPr lang="en-US" sz="1600" b="1" dirty="0" smtClean="0"/>
+              <a:t>*Bundle</a:t>
+            </a:r>
+            <a:endParaRPr lang="en-SG" sz="1600" b="1" dirty="0"/>
+          </a:p>
+        </p:txBody>
+      </p:sp>
+      <p:sp>
+        <p:nvSpPr>
+          <p:cNvPr id="78" name="Rectangle 77"/>
+          <p:cNvSpPr/>
           <p:nvPr/>
         </p:nvSpPr>
         <p:spPr>
           <a:xfrm>
-            <a:off x="5029200" y="3703637"/>
-            <a:ext cx="1304746" cy="361770"/>
-          </a:xfrm>
-          <a:prstGeom prst="rect">
-            <a:avLst/>
-          </a:prstGeom>
-          <a:effectLst/>
+            <a:off x="2222774" y="4056152"/>
+            <a:ext cx="1219200" cy="361770"/>
+          </a:xfrm>
+          <a:prstGeom prst="rect">
+            <a:avLst/>
+          </a:prstGeom>
         </p:spPr>
         <p:style>
           <a:lnRef idx="2">
-            <a:schemeClr val="accent6">
+            <a:schemeClr val="accent5">
               <a:shade val="50000"/>
             </a:schemeClr>
           </a:lnRef>
           <a:fillRef idx="1">
-            <a:schemeClr val="accent6"/>
+            <a:schemeClr val="accent5"/>
           </a:fillRef>
           <a:effectRef idx="0">
-            <a:schemeClr val="accent6"/>
+            <a:schemeClr val="accent5"/>
           </a:effectRef>
           <a:fontRef idx="minor">
             <a:schemeClr val="lt1"/>
@@ -4402,71 +5007,39 @@
           <a:p>
             <a:pPr algn="ctr"/>
             <a:r>
-              <a:rPr lang="en-US" sz="1600" b="1" dirty="0" err="1" smtClean="0"/>
-              <a:t>StudentData</a:t>
+              <a:rPr lang="en-US" sz="1600" b="1" dirty="0" smtClean="0"/>
+              <a:t>*Bundle</a:t>
             </a:r>
             <a:endParaRPr lang="en-SG" sz="1600" b="1" dirty="0"/>
           </a:p>
         </p:txBody>
       </p:sp>
-      <p:cxnSp>
-        <p:nvCxnSpPr>
-          <p:cNvPr id="108" name="Elbow Connector 68"/>
-          <p:cNvCxnSpPr/>
+      <p:sp>
+        <p:nvSpPr>
+          <p:cNvPr id="79" name="Rectangle 78"/>
+          <p:cNvSpPr/>
           <p:nvPr/>
-        </p:nvCxnSpPr>
-        <p:spPr>
-          <a:xfrm flipV="1">
-            <a:off x="3886200" y="3475037"/>
-            <a:ext cx="0" cy="228600"/>
-          </a:xfrm>
-          <a:prstGeom prst="straightConnector1">
-            <a:avLst/>
-          </a:prstGeom>
-          <a:effectLst/>
+        </p:nvSpPr>
+        <p:spPr>
+          <a:xfrm>
+            <a:off x="2276277" y="4104748"/>
+            <a:ext cx="1219200" cy="361770"/>
+          </a:xfrm>
+          <a:prstGeom prst="rect">
+            <a:avLst/>
+          </a:prstGeom>
         </p:spPr>
         <p:style>
           <a:lnRef idx="2">
-            <a:schemeClr val="accent6"/>
-          </a:lnRef>
-          <a:fillRef idx="0">
-            <a:schemeClr val="accent6"/>
-          </a:fillRef>
-          <a:effectRef idx="1">
-            <a:schemeClr val="accent6"/>
-          </a:effectRef>
-          <a:fontRef idx="minor">
-            <a:schemeClr val="tx1"/>
-          </a:fontRef>
-        </p:style>
-      </p:cxnSp>
-      <p:sp>
-        <p:nvSpPr>
-          <p:cNvPr id="179" name="Rectangle 178"/>
-          <p:cNvSpPr/>
-          <p:nvPr/>
-        </p:nvSpPr>
-        <p:spPr>
-          <a:xfrm>
-            <a:off x="3048000" y="3703637"/>
-            <a:ext cx="1585823" cy="361770"/>
-          </a:xfrm>
-          <a:prstGeom prst="rect">
-            <a:avLst/>
-          </a:prstGeom>
-          <a:effectLst/>
-        </p:spPr>
-        <p:style>
-          <a:lnRef idx="2">
-            <a:schemeClr val="accent6">
+            <a:schemeClr val="accent5">
               <a:shade val="50000"/>
             </a:schemeClr>
           </a:lnRef>
           <a:fillRef idx="1">
-            <a:schemeClr val="accent6"/>
+            <a:schemeClr val="accent5"/>
           </a:fillRef>
           <a:effectRef idx="0">
-            <a:schemeClr val="accent6"/>
+            <a:schemeClr val="accent5"/>
           </a:effectRef>
           <a:fontRef idx="minor">
             <a:schemeClr val="lt1"/>
@@ -4478,227 +5051,21 @@
           <a:p>
             <a:pPr algn="ctr"/>
             <a:r>
+              <a:rPr lang="en-US" sz="1600" b="1" dirty="0" smtClean="0"/>
+              <a:t>*</a:t>
+            </a:r>
+            <a:r>
               <a:rPr lang="en-US" sz="1600" b="1" dirty="0" err="1" smtClean="0"/>
-              <a:t>CourseData</a:t>
+              <a:t>Summry</a:t>
             </a:r>
             <a:endParaRPr lang="en-SG" sz="1600" b="1" dirty="0"/>
           </a:p>
         </p:txBody>
       </p:sp>
-      <p:sp>
-        <p:nvSpPr>
-          <p:cNvPr id="173" name="Rectangle 172"/>
-          <p:cNvSpPr/>
-          <p:nvPr/>
-        </p:nvSpPr>
-        <p:spPr>
-          <a:xfrm>
-            <a:off x="5943600" y="4160837"/>
-            <a:ext cx="1447801" cy="361770"/>
-          </a:xfrm>
-          <a:prstGeom prst="rect">
-            <a:avLst/>
-          </a:prstGeom>
-        </p:spPr>
-        <p:style>
-          <a:lnRef idx="2">
-            <a:schemeClr val="accent6">
-              <a:shade val="50000"/>
-            </a:schemeClr>
-          </a:lnRef>
-          <a:fillRef idx="1">
-            <a:schemeClr val="accent6"/>
-          </a:fillRef>
-          <a:effectRef idx="0">
-            <a:schemeClr val="accent6"/>
-          </a:effectRef>
-          <a:fontRef idx="minor">
-            <a:schemeClr val="lt1"/>
-          </a:fontRef>
-        </p:style>
-        <p:txBody>
-          <a:bodyPr rtlCol="0" anchor="ctr"/>
-          <a:lstStyle/>
-          <a:p>
-            <a:pPr algn="ctr"/>
-            <a:r>
-              <a:rPr lang="en-US" sz="1600" b="1" dirty="0" err="1" smtClean="0"/>
-              <a:t>InstructorData</a:t>
-            </a:r>
-            <a:endParaRPr lang="en-SG" sz="1600" b="1" dirty="0"/>
-          </a:p>
-        </p:txBody>
-      </p:sp>
-      <p:sp>
-        <p:nvSpPr>
-          <p:cNvPr id="174" name="Rectangle 173"/>
-          <p:cNvSpPr/>
-          <p:nvPr/>
-        </p:nvSpPr>
-        <p:spPr>
-          <a:xfrm>
-            <a:off x="4114800" y="4160837"/>
-            <a:ext cx="1590407" cy="361770"/>
-          </a:xfrm>
-          <a:prstGeom prst="rect">
-            <a:avLst/>
-          </a:prstGeom>
-        </p:spPr>
-        <p:style>
-          <a:lnRef idx="2">
-            <a:schemeClr val="accent6">
-              <a:shade val="50000"/>
-            </a:schemeClr>
-          </a:lnRef>
-          <a:fillRef idx="1">
-            <a:schemeClr val="accent6"/>
-          </a:fillRef>
-          <a:effectRef idx="0">
-            <a:schemeClr val="accent6"/>
-          </a:effectRef>
-          <a:fontRef idx="minor">
-            <a:schemeClr val="lt1"/>
-          </a:fontRef>
-        </p:style>
-        <p:txBody>
-          <a:bodyPr rtlCol="0" anchor="ctr"/>
-          <a:lstStyle/>
-          <a:p>
-            <a:pPr algn="ctr"/>
-            <a:r>
-              <a:rPr lang="en-US" sz="1600" b="1" dirty="0" err="1" smtClean="0"/>
-              <a:t>EvaluationData</a:t>
-            </a:r>
-            <a:endParaRPr lang="en-SG" sz="1600" b="1" dirty="0"/>
-          </a:p>
-        </p:txBody>
-      </p:sp>
-      <p:sp>
-        <p:nvSpPr>
-          <p:cNvPr id="175" name="Rectangle 174"/>
-          <p:cNvSpPr/>
-          <p:nvPr/>
-        </p:nvSpPr>
-        <p:spPr>
-          <a:xfrm>
-            <a:off x="2286000" y="4160837"/>
-            <a:ext cx="1585823" cy="361770"/>
-          </a:xfrm>
-          <a:prstGeom prst="rect">
-            <a:avLst/>
-          </a:prstGeom>
-        </p:spPr>
-        <p:style>
-          <a:lnRef idx="2">
-            <a:schemeClr val="accent6">
-              <a:shade val="50000"/>
-            </a:schemeClr>
-          </a:lnRef>
-          <a:fillRef idx="1">
-            <a:schemeClr val="accent6"/>
-          </a:fillRef>
-          <a:effectRef idx="0">
-            <a:schemeClr val="accent6"/>
-          </a:effectRef>
-          <a:fontRef idx="minor">
-            <a:schemeClr val="lt1"/>
-          </a:fontRef>
-        </p:style>
-        <p:txBody>
-          <a:bodyPr rtlCol="0" anchor="ctr"/>
-          <a:lstStyle/>
-          <a:p>
-            <a:pPr algn="ctr"/>
-            <a:r>
-              <a:rPr lang="en-US" sz="1600" b="1" dirty="0" err="1" smtClean="0"/>
-              <a:t>SubmissionData</a:t>
-            </a:r>
-            <a:endParaRPr lang="en-SG" sz="1600" b="1" dirty="0"/>
-          </a:p>
-        </p:txBody>
-      </p:sp>
-      <p:sp>
-        <p:nvSpPr>
-          <p:cNvPr id="48" name="Rectangle 47"/>
-          <p:cNvSpPr>
-            <a:spLocks/>
-          </p:cNvSpPr>
-          <p:nvPr/>
-        </p:nvSpPr>
-        <p:spPr>
-          <a:xfrm>
-            <a:off x="6553200" y="3703637"/>
-            <a:ext cx="1304746" cy="361770"/>
-          </a:xfrm>
-          <a:prstGeom prst="rect">
-            <a:avLst/>
-          </a:prstGeom>
-          <a:effectLst/>
-        </p:spPr>
-        <p:style>
-          <a:lnRef idx="2">
-            <a:schemeClr val="accent6">
-              <a:shade val="50000"/>
-            </a:schemeClr>
-          </a:lnRef>
-          <a:fillRef idx="1">
-            <a:schemeClr val="accent6"/>
-          </a:fillRef>
-          <a:effectRef idx="0">
-            <a:schemeClr val="accent6"/>
-          </a:effectRef>
-          <a:fontRef idx="minor">
-            <a:schemeClr val="lt1"/>
-          </a:fontRef>
-        </p:style>
-        <p:txBody>
-          <a:bodyPr rtlCol="0" anchor="ctr"/>
-          <a:lstStyle/>
-          <a:p>
-            <a:pPr algn="ctr"/>
-            <a:r>
-              <a:rPr lang="en-US" sz="1600" b="1" dirty="0" err="1" smtClean="0"/>
-              <a:t>AccountData</a:t>
-            </a:r>
-            <a:endParaRPr lang="en-SG" sz="1600" b="1" dirty="0"/>
-          </a:p>
-        </p:txBody>
-      </p:sp>
-      <p:cxnSp>
-        <p:nvCxnSpPr>
-          <p:cNvPr id="49" name="Elbow Connector 68"/>
-          <p:cNvCxnSpPr/>
-          <p:nvPr/>
-        </p:nvCxnSpPr>
-        <p:spPr>
-          <a:xfrm flipV="1">
-            <a:off x="7010400" y="3475037"/>
-            <a:ext cx="0" cy="228600"/>
-          </a:xfrm>
-          <a:prstGeom prst="straightConnector1">
-            <a:avLst/>
-          </a:prstGeom>
-          <a:effectLst/>
-        </p:spPr>
-        <p:style>
-          <a:lnRef idx="2">
-            <a:schemeClr val="accent6"/>
-          </a:lnRef>
-          <a:fillRef idx="0">
-            <a:schemeClr val="accent6"/>
-          </a:fillRef>
-          <a:effectRef idx="1">
-            <a:schemeClr val="accent6"/>
-          </a:effectRef>
-          <a:fontRef idx="minor">
-            <a:schemeClr val="tx1"/>
-          </a:fontRef>
-        </p:style>
-      </p:cxnSp>
     </p:spTree>
     <p:extLst>
       <p:ext uri="{BB962C8B-B14F-4D97-AF65-F5344CB8AC3E}">
-        <p14:creationId xmlns:p14="http://schemas.microsoft.com/office/powerpoint/2010/main" xmlns="" val="2312643091"/>
+        <p14:creationId xmlns:p14="http://schemas.microsoft.com/office/powerpoint/2010/main" val="2312643091"/>
       </p:ext>
     </p:extLst>
   </p:cSld>
@@ -4713,6 +5080,12 @@
     </p:tnLst>
   </p:timing>
 </p:sld>
+</file>
+
+<file path=ppt/tags/tag1.xml><?xml version="1.0" encoding="utf-8"?>
+<p:tagLst xmlns:a="http://schemas.openxmlformats.org/drawingml/2006/main" xmlns:r="http://schemas.openxmlformats.org/officeDocument/2006/relationships" xmlns:p="http://schemas.openxmlformats.org/presentationml/2006/main">
+  <p:tag name="ARTICULATE_PROJECT_OPEN" val="0"/>
+</p:tagLst>
 </file>
 
 <file path=ppt/theme/theme1.xml><?xml version="1.0" encoding="utf-8"?>

</xml_diff>

<commit_message>
Issue 976: DevMan: update to reflect changes for V4.55 Update Issue 976
</commit_message>
<xml_diff>
--- a/doc/diagrams/CommonComponent.pptx
+++ b/doc/diagrams/CommonComponent.pptx
@@ -306,7 +306,7 @@
             <a:fld id="{1D8BD707-D9CF-40AE-B4C6-C98DA3205C09}" type="datetimeFigureOut">
               <a:rPr lang="en-US" smtClean="0"/>
               <a:pPr/>
-              <a:t>5/18/2013</a:t>
+              <a:t>7/6/2013</a:t>
             </a:fld>
             <a:endParaRPr lang="en-US"/>
           </a:p>
@@ -513,7 +513,7 @@
             <a:fld id="{1D8BD707-D9CF-40AE-B4C6-C98DA3205C09}" type="datetimeFigureOut">
               <a:rPr lang="en-US" smtClean="0"/>
               <a:pPr/>
-              <a:t>5/18/2013</a:t>
+              <a:t>7/6/2013</a:t>
             </a:fld>
             <a:endParaRPr lang="en-US"/>
           </a:p>
@@ -720,7 +720,7 @@
             <a:fld id="{1D8BD707-D9CF-40AE-B4C6-C98DA3205C09}" type="datetimeFigureOut">
               <a:rPr lang="en-US" smtClean="0"/>
               <a:pPr/>
-              <a:t>5/18/2013</a:t>
+              <a:t>7/6/2013</a:t>
             </a:fld>
             <a:endParaRPr lang="en-US"/>
           </a:p>
@@ -927,7 +927,7 @@
             <a:fld id="{1D8BD707-D9CF-40AE-B4C6-C98DA3205C09}" type="datetimeFigureOut">
               <a:rPr lang="en-US" smtClean="0"/>
               <a:pPr/>
-              <a:t>5/18/2013</a:t>
+              <a:t>7/6/2013</a:t>
             </a:fld>
             <a:endParaRPr lang="en-US"/>
           </a:p>
@@ -1200,7 +1200,7 @@
             <a:fld id="{1D8BD707-D9CF-40AE-B4C6-C98DA3205C09}" type="datetimeFigureOut">
               <a:rPr lang="en-US" smtClean="0"/>
               <a:pPr/>
-              <a:t>5/18/2013</a:t>
+              <a:t>7/6/2013</a:t>
             </a:fld>
             <a:endParaRPr lang="en-US"/>
           </a:p>
@@ -1523,7 +1523,7 @@
             <a:fld id="{1D8BD707-D9CF-40AE-B4C6-C98DA3205C09}" type="datetimeFigureOut">
               <a:rPr lang="en-US" smtClean="0"/>
               <a:pPr/>
-              <a:t>5/18/2013</a:t>
+              <a:t>7/6/2013</a:t>
             </a:fld>
             <a:endParaRPr lang="en-US"/>
           </a:p>
@@ -1986,7 +1986,7 @@
             <a:fld id="{1D8BD707-D9CF-40AE-B4C6-C98DA3205C09}" type="datetimeFigureOut">
               <a:rPr lang="en-US" smtClean="0"/>
               <a:pPr/>
-              <a:t>5/18/2013</a:t>
+              <a:t>7/6/2013</a:t>
             </a:fld>
             <a:endParaRPr lang="en-US"/>
           </a:p>
@@ -2133,7 +2133,7 @@
             <a:fld id="{1D8BD707-D9CF-40AE-B4C6-C98DA3205C09}" type="datetimeFigureOut">
               <a:rPr lang="en-US" smtClean="0"/>
               <a:pPr/>
-              <a:t>5/18/2013</a:t>
+              <a:t>7/6/2013</a:t>
             </a:fld>
             <a:endParaRPr lang="en-US"/>
           </a:p>
@@ -2249,7 +2249,7 @@
             <a:fld id="{1D8BD707-D9CF-40AE-B4C6-C98DA3205C09}" type="datetimeFigureOut">
               <a:rPr lang="en-US" smtClean="0"/>
               <a:pPr/>
-              <a:t>5/18/2013</a:t>
+              <a:t>7/6/2013</a:t>
             </a:fld>
             <a:endParaRPr lang="en-US"/>
           </a:p>
@@ -2556,7 +2556,7 @@
             <a:fld id="{1D8BD707-D9CF-40AE-B4C6-C98DA3205C09}" type="datetimeFigureOut">
               <a:rPr lang="en-US" smtClean="0"/>
               <a:pPr/>
-              <a:t>5/18/2013</a:t>
+              <a:t>7/6/2013</a:t>
             </a:fld>
             <a:endParaRPr lang="en-US"/>
           </a:p>
@@ -2839,7 +2839,7 @@
             <a:fld id="{1D8BD707-D9CF-40AE-B4C6-C98DA3205C09}" type="datetimeFigureOut">
               <a:rPr lang="en-US" smtClean="0"/>
               <a:pPr/>
-              <a:t>5/18/2013</a:t>
+              <a:t>7/6/2013</a:t>
             </a:fld>
             <a:endParaRPr lang="en-US"/>
           </a:p>
@@ -3179,7 +3179,17 @@
                   </a:schemeClr>
                 </a:solidFill>
               </a:rPr>
-              <a:t>common</a:t>
+              <a:t>common::</a:t>
+            </a:r>
+            <a:r>
+              <a:rPr lang="en-US" sz="1400" b="1" dirty="0" err="1" smtClean="0">
+                <a:solidFill>
+                  <a:schemeClr val="accent5">
+                    <a:lumMod val="75000"/>
+                  </a:schemeClr>
+                </a:solidFill>
+              </a:rPr>
+              <a:t>util</a:t>
             </a:r>
             <a:endParaRPr lang="en-SG" sz="1400" b="1" dirty="0">
               <a:solidFill>
@@ -3385,6 +3395,13 @@
     <p:sldLayoutId id="2147483658" r:id="rId10"/>
     <p:sldLayoutId id="2147483659" r:id="rId11"/>
   </p:sldLayoutIdLst>
+  <p:timing>
+    <p:tnLst>
+      <p:par>
+        <p:cTn id="1" dur="indefinite" restart="never" nodeType="tmRoot"/>
+      </p:par>
+    </p:tnLst>
+  </p:timing>
   <p:txStyles>
     <p:titleStyle>
       <a:lvl1pPr algn="ctr" defTabSz="914400" rtl="0" eaLnBrk="1" latinLnBrk="0" hangingPunct="1">
@@ -3663,8 +3680,8 @@
         </p:nvSpPr>
         <p:spPr>
           <a:xfrm>
-            <a:off x="609600" y="922337"/>
-            <a:ext cx="1600200" cy="304800"/>
+            <a:off x="533400" y="1036637"/>
+            <a:ext cx="1253247" cy="304800"/>
           </a:xfrm>
           <a:prstGeom prst="rect">
             <a:avLst/>
@@ -3693,7 +3710,7 @@
             <a:pPr algn="ctr"/>
             <a:r>
               <a:rPr lang="en-US" sz="1600" b="1" dirty="0" smtClean="0"/>
-              <a:t>Common</a:t>
+              <a:t>Assumption</a:t>
             </a:r>
             <a:endParaRPr lang="en-SG" sz="1600" b="1" dirty="0"/>
           </a:p>
@@ -4005,8 +4022,8 @@
           <a:p>
             <a:pPr algn="ctr"/>
             <a:r>
-              <a:rPr lang="en-US" sz="1600" b="1" dirty="0" err="1" smtClean="0"/>
-              <a:t>UserType</a:t>
+              <a:rPr lang="en-US" sz="1600" b="1" dirty="0" smtClean="0"/>
+              <a:t>*Type</a:t>
             </a:r>
             <a:endParaRPr lang="en-SG" sz="1600" b="1" dirty="0"/>
           </a:p>
@@ -4020,7 +4037,7 @@
         </p:nvSpPr>
         <p:spPr>
           <a:xfrm>
-            <a:off x="609601" y="1343700"/>
+            <a:off x="3162299" y="1189037"/>
             <a:ext cx="1600200" cy="304800"/>
           </a:xfrm>
           <a:prstGeom prst="rect">
@@ -4050,7 +4067,7 @@
             <a:pPr algn="ctr"/>
             <a:r>
               <a:rPr lang="en-US" sz="1600" b="1" dirty="0" err="1" smtClean="0"/>
-              <a:t>BuildProperties</a:t>
+              <a:t>EmailTemplates</a:t>
             </a:r>
             <a:endParaRPr lang="en-SG" sz="1600" b="1" dirty="0"/>
           </a:p>
@@ -4064,7 +4081,7 @@
         </p:nvSpPr>
         <p:spPr>
           <a:xfrm>
-            <a:off x="2438400" y="922337"/>
+            <a:off x="3162299" y="808037"/>
             <a:ext cx="1600200" cy="304800"/>
           </a:xfrm>
           <a:prstGeom prst="rect">
@@ -4398,8 +4415,12 @@
           <a:lstStyle/>
           <a:p>
             <a:r>
-              <a:rPr lang="en-US" sz="1600" b="1" dirty="0" err="1" smtClean="0"/>
-              <a:t>SubmissionAttributes</a:t>
+              <a:rPr lang="en-US" sz="1600" b="1" dirty="0" smtClean="0"/>
+              <a:t>……………</a:t>
+            </a:r>
+            <a:r>
+              <a:rPr lang="en-US" sz="1600" b="1" dirty="0" smtClean="0"/>
+              <a:t>…Attributes</a:t>
             </a:r>
             <a:endParaRPr lang="en-SG" sz="1600" b="1" dirty="0"/>
           </a:p>
@@ -5057,6 +5078,446 @@
             <a:r>
               <a:rPr lang="en-US" sz="1600" b="1" dirty="0" err="1" smtClean="0"/>
               <a:t>Summry</a:t>
+            </a:r>
+            <a:endParaRPr lang="en-SG" sz="1600" b="1" dirty="0"/>
+          </a:p>
+        </p:txBody>
+      </p:sp>
+      <p:sp>
+        <p:nvSpPr>
+          <p:cNvPr id="39" name="Rectangle 38"/>
+          <p:cNvSpPr/>
+          <p:nvPr/>
+        </p:nvSpPr>
+        <p:spPr>
+          <a:xfrm>
+            <a:off x="3303639" y="1593273"/>
+            <a:ext cx="1458859" cy="304800"/>
+          </a:xfrm>
+          <a:prstGeom prst="rect">
+            <a:avLst/>
+          </a:prstGeom>
+        </p:spPr>
+        <p:style>
+          <a:lnRef idx="2">
+            <a:schemeClr val="accent3">
+              <a:shade val="50000"/>
+            </a:schemeClr>
+          </a:lnRef>
+          <a:fillRef idx="1">
+            <a:schemeClr val="accent3"/>
+          </a:fillRef>
+          <a:effectRef idx="0">
+            <a:schemeClr val="accent3"/>
+          </a:effectRef>
+          <a:fontRef idx="minor">
+            <a:schemeClr val="lt1"/>
+          </a:fontRef>
+        </p:style>
+        <p:txBody>
+          <a:bodyPr rtlCol="0" anchor="ctr"/>
+          <a:lstStyle/>
+          <a:p>
+            <a:pPr algn="ctr"/>
+            <a:r>
+              <a:rPr lang="en-US" sz="1600" b="1" dirty="0" smtClean="0"/>
+              <a:t>*Helper</a:t>
+            </a:r>
+            <a:endParaRPr lang="en-SG" sz="1600" b="1" dirty="0"/>
+          </a:p>
+        </p:txBody>
+      </p:sp>
+      <p:sp>
+        <p:nvSpPr>
+          <p:cNvPr id="40" name="Rectangle 39"/>
+          <p:cNvSpPr/>
+          <p:nvPr/>
+        </p:nvSpPr>
+        <p:spPr>
+          <a:xfrm>
+            <a:off x="3227439" y="1667019"/>
+            <a:ext cx="1458859" cy="304800"/>
+          </a:xfrm>
+          <a:prstGeom prst="rect">
+            <a:avLst/>
+          </a:prstGeom>
+        </p:spPr>
+        <p:style>
+          <a:lnRef idx="2">
+            <a:schemeClr val="accent3">
+              <a:shade val="50000"/>
+            </a:schemeClr>
+          </a:lnRef>
+          <a:fillRef idx="1">
+            <a:schemeClr val="accent3"/>
+          </a:fillRef>
+          <a:effectRef idx="0">
+            <a:schemeClr val="accent3"/>
+          </a:effectRef>
+          <a:fontRef idx="minor">
+            <a:schemeClr val="lt1"/>
+          </a:fontRef>
+        </p:style>
+        <p:txBody>
+          <a:bodyPr rtlCol="0" anchor="ctr"/>
+          <a:lstStyle/>
+          <a:p>
+            <a:pPr algn="ctr"/>
+            <a:r>
+              <a:rPr lang="en-US" sz="1600" b="1" dirty="0" smtClean="0"/>
+              <a:t>*Helper</a:t>
+            </a:r>
+            <a:endParaRPr lang="en-SG" sz="1600" b="1" dirty="0"/>
+          </a:p>
+        </p:txBody>
+      </p:sp>
+      <p:sp>
+        <p:nvSpPr>
+          <p:cNvPr id="41" name="Rectangle 40"/>
+          <p:cNvSpPr/>
+          <p:nvPr/>
+        </p:nvSpPr>
+        <p:spPr>
+          <a:xfrm>
+            <a:off x="3162298" y="1722437"/>
+            <a:ext cx="1458859" cy="304800"/>
+          </a:xfrm>
+          <a:prstGeom prst="rect">
+            <a:avLst/>
+          </a:prstGeom>
+        </p:spPr>
+        <p:style>
+          <a:lnRef idx="2">
+            <a:schemeClr val="accent3">
+              <a:shade val="50000"/>
+            </a:schemeClr>
+          </a:lnRef>
+          <a:fillRef idx="1">
+            <a:schemeClr val="accent3"/>
+          </a:fillRef>
+          <a:effectRef idx="0">
+            <a:schemeClr val="accent3"/>
+          </a:effectRef>
+          <a:fontRef idx="minor">
+            <a:schemeClr val="lt1"/>
+          </a:fontRef>
+        </p:style>
+        <p:txBody>
+          <a:bodyPr rtlCol="0" anchor="ctr"/>
+          <a:lstStyle/>
+          <a:p>
+            <a:pPr algn="ctr"/>
+            <a:r>
+              <a:rPr lang="en-US" sz="1600" b="1" dirty="0" smtClean="0"/>
+              <a:t>*Helper</a:t>
+            </a:r>
+            <a:endParaRPr lang="en-SG" sz="1600" b="1" dirty="0"/>
+          </a:p>
+        </p:txBody>
+      </p:sp>
+      <p:sp>
+        <p:nvSpPr>
+          <p:cNvPr id="42" name="Rectangle 41"/>
+          <p:cNvSpPr/>
+          <p:nvPr/>
+        </p:nvSpPr>
+        <p:spPr>
+          <a:xfrm>
+            <a:off x="533400" y="1390938"/>
+            <a:ext cx="1253247" cy="304800"/>
+          </a:xfrm>
+          <a:prstGeom prst="rect">
+            <a:avLst/>
+          </a:prstGeom>
+        </p:spPr>
+        <p:style>
+          <a:lnRef idx="2">
+            <a:schemeClr val="accent3">
+              <a:shade val="50000"/>
+            </a:schemeClr>
+          </a:lnRef>
+          <a:fillRef idx="1">
+            <a:schemeClr val="accent3"/>
+          </a:fillRef>
+          <a:effectRef idx="0">
+            <a:schemeClr val="accent3"/>
+          </a:effectRef>
+          <a:fontRef idx="minor">
+            <a:schemeClr val="lt1"/>
+          </a:fontRef>
+        </p:style>
+        <p:txBody>
+          <a:bodyPr rtlCol="0" anchor="ctr"/>
+          <a:lstStyle/>
+          <a:p>
+            <a:pPr algn="ctr"/>
+            <a:r>
+              <a:rPr lang="en-US" sz="1600" b="1" dirty="0" smtClean="0"/>
+              <a:t>Sanitizer</a:t>
+            </a:r>
+            <a:endParaRPr lang="en-SG" sz="1600" b="1" dirty="0"/>
+          </a:p>
+        </p:txBody>
+      </p:sp>
+      <p:sp>
+        <p:nvSpPr>
+          <p:cNvPr id="43" name="Rectangle 42"/>
+          <p:cNvSpPr/>
+          <p:nvPr/>
+        </p:nvSpPr>
+        <p:spPr>
+          <a:xfrm>
+            <a:off x="1948770" y="1016864"/>
+            <a:ext cx="1023030" cy="304800"/>
+          </a:xfrm>
+          <a:prstGeom prst="rect">
+            <a:avLst/>
+          </a:prstGeom>
+        </p:spPr>
+        <p:style>
+          <a:lnRef idx="2">
+            <a:schemeClr val="accent3">
+              <a:shade val="50000"/>
+            </a:schemeClr>
+          </a:lnRef>
+          <a:fillRef idx="1">
+            <a:schemeClr val="accent3"/>
+          </a:fillRef>
+          <a:effectRef idx="0">
+            <a:schemeClr val="accent3"/>
+          </a:effectRef>
+          <a:fontRef idx="minor">
+            <a:schemeClr val="lt1"/>
+          </a:fontRef>
+        </p:style>
+        <p:txBody>
+          <a:bodyPr rtlCol="0" anchor="ctr"/>
+          <a:lstStyle/>
+          <a:p>
+            <a:pPr algn="ctr"/>
+            <a:r>
+              <a:rPr lang="en-US" sz="1600" b="1" dirty="0" err="1" smtClean="0"/>
+              <a:t>Config</a:t>
+            </a:r>
+            <a:endParaRPr lang="en-SG" sz="1600" b="1" dirty="0"/>
+          </a:p>
+        </p:txBody>
+      </p:sp>
+      <p:sp>
+        <p:nvSpPr>
+          <p:cNvPr id="44" name="Rectangle 43"/>
+          <p:cNvSpPr/>
+          <p:nvPr/>
+        </p:nvSpPr>
+        <p:spPr>
+          <a:xfrm>
+            <a:off x="1940962" y="1373619"/>
+            <a:ext cx="1023030" cy="304800"/>
+          </a:xfrm>
+          <a:prstGeom prst="rect">
+            <a:avLst/>
+          </a:prstGeom>
+        </p:spPr>
+        <p:style>
+          <a:lnRef idx="2">
+            <a:schemeClr val="accent3">
+              <a:shade val="50000"/>
+            </a:schemeClr>
+          </a:lnRef>
+          <a:fillRef idx="1">
+            <a:schemeClr val="accent3"/>
+          </a:fillRef>
+          <a:effectRef idx="0">
+            <a:schemeClr val="accent3"/>
+          </a:effectRef>
+          <a:fontRef idx="minor">
+            <a:schemeClr val="lt1"/>
+          </a:fontRef>
+        </p:style>
+        <p:txBody>
+          <a:bodyPr rtlCol="0" anchor="ctr"/>
+          <a:lstStyle/>
+          <a:p>
+            <a:pPr algn="ctr"/>
+            <a:r>
+              <a:rPr lang="en-US" sz="1600" b="1" dirty="0" err="1" smtClean="0"/>
+              <a:t>Const</a:t>
+            </a:r>
+            <a:endParaRPr lang="en-SG" sz="1600" b="1" dirty="0"/>
+          </a:p>
+        </p:txBody>
+      </p:sp>
+      <p:sp>
+        <p:nvSpPr>
+          <p:cNvPr id="45" name="Rectangle 44"/>
+          <p:cNvSpPr/>
+          <p:nvPr/>
+        </p:nvSpPr>
+        <p:spPr>
+          <a:xfrm>
+            <a:off x="1941843" y="1722437"/>
+            <a:ext cx="1023030" cy="304800"/>
+          </a:xfrm>
+          <a:prstGeom prst="rect">
+            <a:avLst/>
+          </a:prstGeom>
+        </p:spPr>
+        <p:style>
+          <a:lnRef idx="2">
+            <a:schemeClr val="accent3">
+              <a:shade val="50000"/>
+            </a:schemeClr>
+          </a:lnRef>
+          <a:fillRef idx="1">
+            <a:schemeClr val="accent3"/>
+          </a:fillRef>
+          <a:effectRef idx="0">
+            <a:schemeClr val="accent3"/>
+          </a:effectRef>
+          <a:fontRef idx="minor">
+            <a:schemeClr val="lt1"/>
+          </a:fontRef>
+        </p:style>
+        <p:txBody>
+          <a:bodyPr rtlCol="0" anchor="ctr"/>
+          <a:lstStyle/>
+          <a:p>
+            <a:pPr algn="ctr"/>
+            <a:r>
+              <a:rPr lang="en-US" sz="1600" b="1" dirty="0" err="1" smtClean="0"/>
+              <a:t>Url</a:t>
+            </a:r>
+            <a:endParaRPr lang="en-SG" sz="1600" b="1" dirty="0"/>
+          </a:p>
+        </p:txBody>
+      </p:sp>
+      <p:sp>
+        <p:nvSpPr>
+          <p:cNvPr id="46" name="Rectangle 45"/>
+          <p:cNvSpPr/>
+          <p:nvPr/>
+        </p:nvSpPr>
+        <p:spPr>
+          <a:xfrm>
+            <a:off x="533399" y="1747692"/>
+            <a:ext cx="1253247" cy="304800"/>
+          </a:xfrm>
+          <a:prstGeom prst="rect">
+            <a:avLst/>
+          </a:prstGeom>
+        </p:spPr>
+        <p:style>
+          <a:lnRef idx="2">
+            <a:schemeClr val="accent3">
+              <a:shade val="50000"/>
+            </a:schemeClr>
+          </a:lnRef>
+          <a:fillRef idx="1">
+            <a:schemeClr val="accent3"/>
+          </a:fillRef>
+          <a:effectRef idx="0">
+            <a:schemeClr val="accent3"/>
+          </a:effectRef>
+          <a:fontRef idx="minor">
+            <a:schemeClr val="lt1"/>
+          </a:fontRef>
+        </p:style>
+        <p:txBody>
+          <a:bodyPr rtlCol="0" anchor="ctr"/>
+          <a:lstStyle/>
+          <a:p>
+            <a:pPr algn="ctr"/>
+            <a:r>
+              <a:rPr lang="en-US" sz="1600" b="1" dirty="0" err="1" smtClean="0"/>
+              <a:t>Utils</a:t>
+            </a:r>
+            <a:endParaRPr lang="en-SG" sz="1600" b="1" dirty="0"/>
+          </a:p>
+        </p:txBody>
+      </p:sp>
+      <p:sp>
+        <p:nvSpPr>
+          <p:cNvPr id="50" name="Rectangle 49"/>
+          <p:cNvSpPr/>
+          <p:nvPr/>
+        </p:nvSpPr>
+        <p:spPr>
+          <a:xfrm>
+            <a:off x="643647" y="3295033"/>
+            <a:ext cx="1219201" cy="361770"/>
+          </a:xfrm>
+          <a:prstGeom prst="rect">
+            <a:avLst/>
+          </a:prstGeom>
+        </p:spPr>
+        <p:style>
+          <a:lnRef idx="2">
+            <a:schemeClr val="accent4">
+              <a:shade val="50000"/>
+            </a:schemeClr>
+          </a:lnRef>
+          <a:fillRef idx="1">
+            <a:schemeClr val="accent4"/>
+          </a:fillRef>
+          <a:effectRef idx="0">
+            <a:schemeClr val="accent4"/>
+          </a:effectRef>
+          <a:fontRef idx="minor">
+            <a:schemeClr val="lt1"/>
+          </a:fontRef>
+        </p:style>
+        <p:txBody>
+          <a:bodyPr rtlCol="0" anchor="ctr"/>
+          <a:lstStyle/>
+          <a:p>
+            <a:pPr algn="ctr"/>
+            <a:r>
+              <a:rPr lang="en-US" sz="1600" b="1" dirty="0" smtClean="0"/>
+              <a:t>*Type</a:t>
+            </a:r>
+            <a:endParaRPr lang="en-SG" sz="1600" b="1" dirty="0"/>
+          </a:p>
+        </p:txBody>
+      </p:sp>
+      <p:sp>
+        <p:nvSpPr>
+          <p:cNvPr id="52" name="Rectangle 51"/>
+          <p:cNvSpPr/>
+          <p:nvPr/>
+        </p:nvSpPr>
+        <p:spPr>
+          <a:xfrm>
+            <a:off x="697150" y="3338241"/>
+            <a:ext cx="1219201" cy="361770"/>
+          </a:xfrm>
+          <a:prstGeom prst="rect">
+            <a:avLst/>
+          </a:prstGeom>
+        </p:spPr>
+        <p:style>
+          <a:lnRef idx="2">
+            <a:schemeClr val="accent4">
+              <a:shade val="50000"/>
+            </a:schemeClr>
+          </a:lnRef>
+          <a:fillRef idx="1">
+            <a:schemeClr val="accent4"/>
+          </a:fillRef>
+          <a:effectRef idx="0">
+            <a:schemeClr val="accent4"/>
+          </a:effectRef>
+          <a:fontRef idx="minor">
+            <a:schemeClr val="lt1"/>
+          </a:fontRef>
+        </p:style>
+        <p:txBody>
+          <a:bodyPr rtlCol="0" anchor="ctr"/>
+          <a:lstStyle/>
+          <a:p>
+            <a:pPr algn="ctr"/>
+            <a:r>
+              <a:rPr lang="en-US" sz="1600" b="1" dirty="0" smtClean="0"/>
+              <a:t>*Type</a:t>
             </a:r>
             <a:endParaRPr lang="en-SG" sz="1600" b="1" dirty="0"/>
           </a:p>

</xml_diff>